<commit_message>
Actualización 1 - Semana 8
</commit_message>
<xml_diff>
--- a/PresentacionAvances.pptx
+++ b/PresentacionAvances.pptx
@@ -9,10 +9,13 @@
     <p:sldId id="257" r:id="rId3"/>
     <p:sldId id="258" r:id="rId4"/>
     <p:sldId id="259" r:id="rId5"/>
-    <p:sldId id="260" r:id="rId6"/>
-    <p:sldId id="261" r:id="rId7"/>
-    <p:sldId id="262" r:id="rId8"/>
-    <p:sldId id="263" r:id="rId9"/>
+    <p:sldId id="265" r:id="rId6"/>
+    <p:sldId id="260" r:id="rId7"/>
+    <p:sldId id="261" r:id="rId8"/>
+    <p:sldId id="262" r:id="rId9"/>
+    <p:sldId id="263" r:id="rId10"/>
+    <p:sldId id="264" r:id="rId11"/>
+    <p:sldId id="266" r:id="rId12"/>
   </p:sldIdLst>
   <p:sldSz cx="12192000" cy="6858000"/>
   <p:notesSz cx="6858000" cy="9144000"/>
@@ -119,12 +122,20 @@
 </p:presentation>
 </file>
 
+<file path=ppt/revisionInfo.xml><?xml version="1.0" encoding="utf-8"?>
+<p1510:revInfo xmlns:a="http://schemas.openxmlformats.org/drawingml/2006/main" xmlns:r="http://schemas.openxmlformats.org/officeDocument/2006/relationships" xmlns:p1510="http://schemas.microsoft.com/office/powerpoint/2015/10/main">
+  <p1510:revLst>
+    <p1510:client id="{FC4B2C3D-7DCE-4352-BD0F-1FDE76483D74}" v="14" dt="2025-09-18T04:08:05.746"/>
+  </p1510:revLst>
+</p1510:revInfo>
+</file>
+
 <file path=ppt/changesInfos/changesInfo1.xml><?xml version="1.0" encoding="utf-8"?>
 <pc:chgInfo xmlns:a="http://schemas.openxmlformats.org/drawingml/2006/main" xmlns:r="http://schemas.openxmlformats.org/officeDocument/2006/relationships" xmlns:ac="http://schemas.microsoft.com/office/drawing/2013/main/command" xmlns:pc="http://schemas.microsoft.com/office/powerpoint/2013/main/command">
   <pc:docChgLst>
     <pc:chgData name="Pedro Sánchez" userId="41291a4e6da63335" providerId="LiveId" clId="{3ED0C291-7D32-44BD-821E-EEABF2784BA8}"/>
-    <pc:docChg chg="custSel modSld">
-      <pc:chgData name="Pedro Sánchez" userId="41291a4e6da63335" providerId="LiveId" clId="{3ED0C291-7D32-44BD-821E-EEABF2784BA8}" dt="2025-09-16T14:46:23.053" v="57" actId="20577"/>
+    <pc:docChg chg="undo custSel addSld modSld sldOrd">
+      <pc:chgData name="Pedro Sánchez" userId="41291a4e6da63335" providerId="LiveId" clId="{3ED0C291-7D32-44BD-821E-EEABF2784BA8}" dt="2025-09-18T04:10:18.661" v="465" actId="1076"/>
       <pc:docMkLst>
         <pc:docMk/>
       </pc:docMkLst>
@@ -140,6 +151,316 @@
             <pc:docMk/>
             <pc:sldMk cId="2079003264" sldId="256"/>
             <ac:spMk id="3" creationId="{30C10488-ABCD-709F-10D8-81AC907E5ED9}"/>
+          </ac:spMkLst>
+        </pc:spChg>
+      </pc:sldChg>
+      <pc:sldChg chg="addSp modSp mod">
+        <pc:chgData name="Pedro Sánchez" userId="41291a4e6da63335" providerId="LiveId" clId="{3ED0C291-7D32-44BD-821E-EEABF2784BA8}" dt="2025-09-18T03:46:23.171" v="72" actId="14100"/>
+        <pc:sldMkLst>
+          <pc:docMk/>
+          <pc:sldMk cId="3168108746" sldId="257"/>
+        </pc:sldMkLst>
+        <pc:spChg chg="add">
+          <ac:chgData name="Pedro Sánchez" userId="41291a4e6da63335" providerId="LiveId" clId="{3ED0C291-7D32-44BD-821E-EEABF2784BA8}" dt="2025-09-18T03:44:50.810" v="58"/>
+          <ac:spMkLst>
+            <pc:docMk/>
+            <pc:sldMk cId="3168108746" sldId="257"/>
+            <ac:spMk id="2" creationId="{18138EA1-B63D-D902-7F32-17788F437D72}"/>
+          </ac:spMkLst>
+        </pc:spChg>
+        <pc:spChg chg="mod">
+          <ac:chgData name="Pedro Sánchez" userId="41291a4e6da63335" providerId="LiveId" clId="{3ED0C291-7D32-44BD-821E-EEABF2784BA8}" dt="2025-09-18T03:46:23.171" v="72" actId="14100"/>
+          <ac:spMkLst>
+            <pc:docMk/>
+            <pc:sldMk cId="3168108746" sldId="257"/>
+            <ac:spMk id="3" creationId="{38251BFC-9B91-8D60-19EB-029C5093B96D}"/>
+          </ac:spMkLst>
+        </pc:spChg>
+        <pc:spChg chg="add">
+          <ac:chgData name="Pedro Sánchez" userId="41291a4e6da63335" providerId="LiveId" clId="{3ED0C291-7D32-44BD-821E-EEABF2784BA8}" dt="2025-09-18T03:44:58.038" v="59"/>
+          <ac:spMkLst>
+            <pc:docMk/>
+            <pc:sldMk cId="3168108746" sldId="257"/>
+            <ac:spMk id="6" creationId="{77305749-19B0-AD22-66D9-EB975697649A}"/>
+          </ac:spMkLst>
+        </pc:spChg>
+      </pc:sldChg>
+      <pc:sldChg chg="addSp modSp mod">
+        <pc:chgData name="Pedro Sánchez" userId="41291a4e6da63335" providerId="LiveId" clId="{3ED0C291-7D32-44BD-821E-EEABF2784BA8}" dt="2025-09-18T04:08:24.857" v="367" actId="14100"/>
+        <pc:sldMkLst>
+          <pc:docMk/>
+          <pc:sldMk cId="2424761874" sldId="258"/>
+        </pc:sldMkLst>
+        <pc:spChg chg="add">
+          <ac:chgData name="Pedro Sánchez" userId="41291a4e6da63335" providerId="LiveId" clId="{3ED0C291-7D32-44BD-821E-EEABF2784BA8}" dt="2025-09-18T03:47:27.546" v="73"/>
+          <ac:spMkLst>
+            <pc:docMk/>
+            <pc:sldMk cId="2424761874" sldId="258"/>
+            <ac:spMk id="2" creationId="{D17D54F6-50C5-37EA-63CC-6890C62DAC88}"/>
+          </ac:spMkLst>
+        </pc:spChg>
+        <pc:spChg chg="mod">
+          <ac:chgData name="Pedro Sánchez" userId="41291a4e6da63335" providerId="LiveId" clId="{3ED0C291-7D32-44BD-821E-EEABF2784BA8}" dt="2025-09-18T03:48:48.973" v="132" actId="113"/>
+          <ac:spMkLst>
+            <pc:docMk/>
+            <pc:sldMk cId="2424761874" sldId="258"/>
+            <ac:spMk id="3" creationId="{713DC48A-224C-56BB-369B-818F222D6346}"/>
+          </ac:spMkLst>
+        </pc:spChg>
+        <pc:picChg chg="mod">
+          <ac:chgData name="Pedro Sánchez" userId="41291a4e6da63335" providerId="LiveId" clId="{3ED0C291-7D32-44BD-821E-EEABF2784BA8}" dt="2025-09-18T04:08:24.857" v="367" actId="14100"/>
+          <ac:picMkLst>
+            <pc:docMk/>
+            <pc:sldMk cId="2424761874" sldId="258"/>
+            <ac:picMk id="9" creationId="{04236AC5-857F-EE0C-2A7E-1CB662255589}"/>
+          </ac:picMkLst>
+        </pc:picChg>
+      </pc:sldChg>
+      <pc:sldChg chg="modSp mod">
+        <pc:chgData name="Pedro Sánchez" userId="41291a4e6da63335" providerId="LiveId" clId="{3ED0C291-7D32-44BD-821E-EEABF2784BA8}" dt="2025-09-18T03:49:56.349" v="145" actId="14100"/>
+        <pc:sldMkLst>
+          <pc:docMk/>
+          <pc:sldMk cId="152558511" sldId="259"/>
+        </pc:sldMkLst>
+        <pc:spChg chg="mod">
+          <ac:chgData name="Pedro Sánchez" userId="41291a4e6da63335" providerId="LiveId" clId="{3ED0C291-7D32-44BD-821E-EEABF2784BA8}" dt="2025-09-18T03:49:56.349" v="145" actId="14100"/>
+          <ac:spMkLst>
+            <pc:docMk/>
+            <pc:sldMk cId="152558511" sldId="259"/>
+            <ac:spMk id="14" creationId="{6CEC363E-8ED6-4890-1AFD-B9CCDF29565D}"/>
+          </ac:spMkLst>
+        </pc:spChg>
+      </pc:sldChg>
+      <pc:sldChg chg="modSp mod">
+        <pc:chgData name="Pedro Sánchez" userId="41291a4e6da63335" providerId="LiveId" clId="{3ED0C291-7D32-44BD-821E-EEABF2784BA8}" dt="2025-09-18T04:10:18.661" v="465" actId="1076"/>
+        <pc:sldMkLst>
+          <pc:docMk/>
+          <pc:sldMk cId="3125701131" sldId="260"/>
+        </pc:sldMkLst>
+        <pc:spChg chg="mod">
+          <ac:chgData name="Pedro Sánchez" userId="41291a4e6da63335" providerId="LiveId" clId="{3ED0C291-7D32-44BD-821E-EEABF2784BA8}" dt="2025-09-18T04:10:18.661" v="465" actId="1076"/>
+          <ac:spMkLst>
+            <pc:docMk/>
+            <pc:sldMk cId="3125701131" sldId="260"/>
+            <ac:spMk id="2" creationId="{B6A5D0FF-1723-D124-523D-E88FA436823A}"/>
+          </ac:spMkLst>
+        </pc:spChg>
+        <pc:spChg chg="mod">
+          <ac:chgData name="Pedro Sánchez" userId="41291a4e6da63335" providerId="LiveId" clId="{3ED0C291-7D32-44BD-821E-EEABF2784BA8}" dt="2025-09-18T04:10:18.661" v="465" actId="1076"/>
+          <ac:spMkLst>
+            <pc:docMk/>
+            <pc:sldMk cId="3125701131" sldId="260"/>
+            <ac:spMk id="3" creationId="{6B3DF7AE-265B-2314-CABD-7E650040C2CE}"/>
+          </ac:spMkLst>
+        </pc:spChg>
+      </pc:sldChg>
+      <pc:sldChg chg="addSp modSp mod">
+        <pc:chgData name="Pedro Sánchez" userId="41291a4e6da63335" providerId="LiveId" clId="{3ED0C291-7D32-44BD-821E-EEABF2784BA8}" dt="2025-09-18T03:59:55.382" v="281" actId="14826"/>
+        <pc:sldMkLst>
+          <pc:docMk/>
+          <pc:sldMk cId="1808529488" sldId="261"/>
+        </pc:sldMkLst>
+        <pc:spChg chg="add">
+          <ac:chgData name="Pedro Sánchez" userId="41291a4e6da63335" providerId="LiveId" clId="{3ED0C291-7D32-44BD-821E-EEABF2784BA8}" dt="2025-09-18T03:51:02.213" v="148"/>
+          <ac:spMkLst>
+            <pc:docMk/>
+            <pc:sldMk cId="1808529488" sldId="261"/>
+            <ac:spMk id="2" creationId="{E3DAEFC2-FA3D-8F06-882D-C4C185A934D1}"/>
+          </ac:spMkLst>
+        </pc:spChg>
+        <pc:spChg chg="mod">
+          <ac:chgData name="Pedro Sánchez" userId="41291a4e6da63335" providerId="LiveId" clId="{3ED0C291-7D32-44BD-821E-EEABF2784BA8}" dt="2025-09-18T03:56:47.574" v="230" actId="14100"/>
+          <ac:spMkLst>
+            <pc:docMk/>
+            <pc:sldMk cId="1808529488" sldId="261"/>
+            <ac:spMk id="3" creationId="{E0612DCE-1DEF-6D31-048A-4DA1989D8825}"/>
+          </ac:spMkLst>
+        </pc:spChg>
+        <pc:spChg chg="mod">
+          <ac:chgData name="Pedro Sánchez" userId="41291a4e6da63335" providerId="LiveId" clId="{3ED0C291-7D32-44BD-821E-EEABF2784BA8}" dt="2025-09-18T03:59:34.217" v="280" actId="20577"/>
+          <ac:spMkLst>
+            <pc:docMk/>
+            <pc:sldMk cId="1808529488" sldId="261"/>
+            <ac:spMk id="8" creationId="{135E7A1F-3A09-77D9-B01C-DA13E43B2176}"/>
+          </ac:spMkLst>
+        </pc:spChg>
+        <pc:picChg chg="mod">
+          <ac:chgData name="Pedro Sánchez" userId="41291a4e6da63335" providerId="LiveId" clId="{3ED0C291-7D32-44BD-821E-EEABF2784BA8}" dt="2025-09-18T03:59:55.382" v="281" actId="14826"/>
+          <ac:picMkLst>
+            <pc:docMk/>
+            <pc:sldMk cId="1808529488" sldId="261"/>
+            <ac:picMk id="7" creationId="{92B8253B-EFEA-9B5F-727B-2B615C7C9478}"/>
+          </ac:picMkLst>
+        </pc:picChg>
+      </pc:sldChg>
+      <pc:sldChg chg="modSp mod">
+        <pc:chgData name="Pedro Sánchez" userId="41291a4e6da63335" providerId="LiveId" clId="{3ED0C291-7D32-44BD-821E-EEABF2784BA8}" dt="2025-09-18T04:01:29.816" v="329" actId="20577"/>
+        <pc:sldMkLst>
+          <pc:docMk/>
+          <pc:sldMk cId="2248330113" sldId="262"/>
+        </pc:sldMkLst>
+        <pc:spChg chg="mod">
+          <ac:chgData name="Pedro Sánchez" userId="41291a4e6da63335" providerId="LiveId" clId="{3ED0C291-7D32-44BD-821E-EEABF2784BA8}" dt="2025-09-18T03:54:24.965" v="184" actId="948"/>
+          <ac:spMkLst>
+            <pc:docMk/>
+            <pc:sldMk cId="2248330113" sldId="262"/>
+            <ac:spMk id="3" creationId="{19EBB4F4-5822-F8CA-39F5-0439B9882C53}"/>
+          </ac:spMkLst>
+        </pc:spChg>
+        <pc:spChg chg="mod">
+          <ac:chgData name="Pedro Sánchez" userId="41291a4e6da63335" providerId="LiveId" clId="{3ED0C291-7D32-44BD-821E-EEABF2784BA8}" dt="2025-09-18T04:01:29.816" v="329" actId="20577"/>
+          <ac:spMkLst>
+            <pc:docMk/>
+            <pc:sldMk cId="2248330113" sldId="262"/>
+            <ac:spMk id="8" creationId="{FB1E0EED-EE72-350A-A469-4DEBB29853E7}"/>
+          </ac:spMkLst>
+        </pc:spChg>
+        <pc:picChg chg="mod">
+          <ac:chgData name="Pedro Sánchez" userId="41291a4e6da63335" providerId="LiveId" clId="{3ED0C291-7D32-44BD-821E-EEABF2784BA8}" dt="2025-09-18T04:00:14.240" v="282" actId="14826"/>
+          <ac:picMkLst>
+            <pc:docMk/>
+            <pc:sldMk cId="2248330113" sldId="262"/>
+            <ac:picMk id="7" creationId="{58A2FEFB-2262-1E84-25C1-E48B1423F11F}"/>
+          </ac:picMkLst>
+        </pc:picChg>
+      </pc:sldChg>
+      <pc:sldChg chg="addSp modSp mod">
+        <pc:chgData name="Pedro Sánchez" userId="41291a4e6da63335" providerId="LiveId" clId="{3ED0C291-7D32-44BD-821E-EEABF2784BA8}" dt="2025-09-18T04:04:29.524" v="334" actId="14826"/>
+        <pc:sldMkLst>
+          <pc:docMk/>
+          <pc:sldMk cId="856540980" sldId="263"/>
+        </pc:sldMkLst>
+        <pc:spChg chg="mod">
+          <ac:chgData name="Pedro Sánchez" userId="41291a4e6da63335" providerId="LiveId" clId="{3ED0C291-7D32-44BD-821E-EEABF2784BA8}" dt="2025-09-18T03:56:54.860" v="231" actId="14100"/>
+          <ac:spMkLst>
+            <pc:docMk/>
+            <pc:sldMk cId="856540980" sldId="263"/>
+            <ac:spMk id="3" creationId="{324BC577-5816-B7D0-08A1-26DDDEEA840A}"/>
+          </ac:spMkLst>
+        </pc:spChg>
+        <pc:picChg chg="add mod">
+          <ac:chgData name="Pedro Sánchez" userId="41291a4e6da63335" providerId="LiveId" clId="{3ED0C291-7D32-44BD-821E-EEABF2784BA8}" dt="2025-09-18T04:04:29.524" v="334" actId="14826"/>
+          <ac:picMkLst>
+            <pc:docMk/>
+            <pc:sldMk cId="856540980" sldId="263"/>
+            <ac:picMk id="6" creationId="{435911E5-7130-3392-ED40-D74B22ADC32A}"/>
+          </ac:picMkLst>
+        </pc:picChg>
+      </pc:sldChg>
+      <pc:sldChg chg="modSp add mod ord">
+        <pc:chgData name="Pedro Sánchez" userId="41291a4e6da63335" providerId="LiveId" clId="{3ED0C291-7D32-44BD-821E-EEABF2784BA8}" dt="2025-09-18T04:10:09.755" v="464" actId="1076"/>
+        <pc:sldMkLst>
+          <pc:docMk/>
+          <pc:sldMk cId="1825084229" sldId="264"/>
+        </pc:sldMkLst>
+        <pc:spChg chg="mod">
+          <ac:chgData name="Pedro Sánchez" userId="41291a4e6da63335" providerId="LiveId" clId="{3ED0C291-7D32-44BD-821E-EEABF2784BA8}" dt="2025-09-18T04:10:09.755" v="464" actId="1076"/>
+          <ac:spMkLst>
+            <pc:docMk/>
+            <pc:sldMk cId="1825084229" sldId="264"/>
+            <ac:spMk id="2" creationId="{06F8662D-E655-D0AB-C953-7E57D740C5D7}"/>
+          </ac:spMkLst>
+        </pc:spChg>
+        <pc:spChg chg="mod">
+          <ac:chgData name="Pedro Sánchez" userId="41291a4e6da63335" providerId="LiveId" clId="{3ED0C291-7D32-44BD-821E-EEABF2784BA8}" dt="2025-09-18T04:10:09.755" v="464" actId="1076"/>
+          <ac:spMkLst>
+            <pc:docMk/>
+            <pc:sldMk cId="1825084229" sldId="264"/>
+            <ac:spMk id="3" creationId="{63654C2C-F047-C140-1CEA-4F3DF814A794}"/>
+          </ac:spMkLst>
+        </pc:spChg>
+      </pc:sldChg>
+      <pc:sldChg chg="addSp delSp modSp add mod">
+        <pc:chgData name="Pedro Sánchez" userId="41291a4e6da63335" providerId="LiveId" clId="{3ED0C291-7D32-44BD-821E-EEABF2784BA8}" dt="2025-09-18T04:06:38.906" v="351" actId="1076"/>
+        <pc:sldMkLst>
+          <pc:docMk/>
+          <pc:sldMk cId="2294619585" sldId="265"/>
+        </pc:sldMkLst>
+        <pc:spChg chg="del">
+          <ac:chgData name="Pedro Sánchez" userId="41291a4e6da63335" providerId="LiveId" clId="{3ED0C291-7D32-44BD-821E-EEABF2784BA8}" dt="2025-09-18T04:06:05.468" v="342" actId="478"/>
+          <ac:spMkLst>
+            <pc:docMk/>
+            <pc:sldMk cId="2294619585" sldId="265"/>
+            <ac:spMk id="3" creationId="{AE88FFEE-A7E1-C110-7C65-8ACC647B61AF}"/>
+          </ac:spMkLst>
+        </pc:spChg>
+        <pc:spChg chg="add del mod">
+          <ac:chgData name="Pedro Sánchez" userId="41291a4e6da63335" providerId="LiveId" clId="{3ED0C291-7D32-44BD-821E-EEABF2784BA8}" dt="2025-09-18T04:06:07.444" v="343" actId="478"/>
+          <ac:spMkLst>
+            <pc:docMk/>
+            <pc:sldMk cId="2294619585" sldId="265"/>
+            <ac:spMk id="7" creationId="{6AE70E53-1016-7DA6-BEBB-AEC225F0D4DE}"/>
+          </ac:spMkLst>
+        </pc:spChg>
+        <pc:spChg chg="del">
+          <ac:chgData name="Pedro Sánchez" userId="41291a4e6da63335" providerId="LiveId" clId="{3ED0C291-7D32-44BD-821E-EEABF2784BA8}" dt="2025-09-18T04:06:08.657" v="344" actId="478"/>
+          <ac:spMkLst>
+            <pc:docMk/>
+            <pc:sldMk cId="2294619585" sldId="265"/>
+            <ac:spMk id="14" creationId="{308CE843-A81D-DC43-C81F-9502B70C6902}"/>
+          </ac:spMkLst>
+        </pc:spChg>
+        <pc:picChg chg="mod">
+          <ac:chgData name="Pedro Sánchez" userId="41291a4e6da63335" providerId="LiveId" clId="{3ED0C291-7D32-44BD-821E-EEABF2784BA8}" dt="2025-09-18T04:06:38.906" v="351" actId="1076"/>
+          <ac:picMkLst>
+            <pc:docMk/>
+            <pc:sldMk cId="2294619585" sldId="265"/>
+            <ac:picMk id="6" creationId="{95C1263D-76F3-679D-9574-1945259AD3B0}"/>
+          </ac:picMkLst>
+        </pc:picChg>
+        <pc:picChg chg="mod">
+          <ac:chgData name="Pedro Sánchez" userId="41291a4e6da63335" providerId="LiveId" clId="{3ED0C291-7D32-44BD-821E-EEABF2784BA8}" dt="2025-09-18T04:06:38.906" v="351" actId="1076"/>
+          <ac:picMkLst>
+            <pc:docMk/>
+            <pc:sldMk cId="2294619585" sldId="265"/>
+            <ac:picMk id="8" creationId="{224333C7-9340-8C8C-AFBD-2DA95A325136}"/>
+          </ac:picMkLst>
+        </pc:picChg>
+        <pc:picChg chg="mod">
+          <ac:chgData name="Pedro Sánchez" userId="41291a4e6da63335" providerId="LiveId" clId="{3ED0C291-7D32-44BD-821E-EEABF2784BA8}" dt="2025-09-18T04:06:38.906" v="351" actId="1076"/>
+          <ac:picMkLst>
+            <pc:docMk/>
+            <pc:sldMk cId="2294619585" sldId="265"/>
+            <ac:picMk id="11" creationId="{63D2AFE4-C934-A4ED-F14F-DF565C95B087}"/>
+          </ac:picMkLst>
+        </pc:picChg>
+        <pc:picChg chg="mod">
+          <ac:chgData name="Pedro Sánchez" userId="41291a4e6da63335" providerId="LiveId" clId="{3ED0C291-7D32-44BD-821E-EEABF2784BA8}" dt="2025-09-18T04:06:38.906" v="351" actId="1076"/>
+          <ac:picMkLst>
+            <pc:docMk/>
+            <pc:sldMk cId="2294619585" sldId="265"/>
+            <ac:picMk id="13" creationId="{50050EAC-4239-3740-F684-7A3F1D30C0E8}"/>
+          </ac:picMkLst>
+        </pc:picChg>
+      </pc:sldChg>
+      <pc:sldChg chg="delSp modSp add mod">
+        <pc:chgData name="Pedro Sánchez" userId="41291a4e6da63335" providerId="LiveId" clId="{3ED0C291-7D32-44BD-821E-EEABF2784BA8}" dt="2025-09-18T04:09:51.234" v="462" actId="1076"/>
+        <pc:sldMkLst>
+          <pc:docMk/>
+          <pc:sldMk cId="3835149613" sldId="266"/>
+        </pc:sldMkLst>
+        <pc:spChg chg="del">
+          <ac:chgData name="Pedro Sánchez" userId="41291a4e6da63335" providerId="LiveId" clId="{3ED0C291-7D32-44BD-821E-EEABF2784BA8}" dt="2025-09-18T04:08:49.415" v="369" actId="478"/>
+          <ac:spMkLst>
+            <pc:docMk/>
+            <pc:sldMk cId="3835149613" sldId="266"/>
+            <ac:spMk id="2" creationId="{93F2138E-FF86-3699-1F23-06E73C8F64A7}"/>
+          </ac:spMkLst>
+        </pc:spChg>
+        <pc:spChg chg="mod">
+          <ac:chgData name="Pedro Sánchez" userId="41291a4e6da63335" providerId="LiveId" clId="{3ED0C291-7D32-44BD-821E-EEABF2784BA8}" dt="2025-09-18T04:09:51.234" v="462" actId="1076"/>
+          <ac:spMkLst>
+            <pc:docMk/>
+            <pc:sldMk cId="3835149613" sldId="266"/>
+            <ac:spMk id="3" creationId="{358FFBA6-2721-3365-E68D-AC8AD2EF99B4}"/>
+          </ac:spMkLst>
+        </pc:spChg>
+        <pc:spChg chg="mod">
+          <ac:chgData name="Pedro Sánchez" userId="41291a4e6da63335" providerId="LiveId" clId="{3ED0C291-7D32-44BD-821E-EEABF2784BA8}" dt="2025-09-18T04:08:57.515" v="388" actId="20577"/>
+          <ac:spMkLst>
+            <pc:docMk/>
+            <pc:sldMk cId="3835149613" sldId="266"/>
+            <ac:spMk id="5" creationId="{3C3A45BC-25E4-F4F1-4F13-A0EFB41321DA}"/>
           </ac:spMkLst>
         </pc:spChg>
       </pc:sldChg>
@@ -297,7 +618,7 @@
           <a:p>
             <a:fld id="{25A05EA2-0A53-4C12-BE14-DA45449A4726}" type="datetimeFigureOut">
               <a:rPr lang="es-CO" smtClean="0"/>
-              <a:t>16/09/2025</a:t>
+              <a:t>17/09/2025</a:t>
             </a:fld>
             <a:endParaRPr lang="es-CO"/>
           </a:p>
@@ -497,7 +818,7 @@
           <a:p>
             <a:fld id="{25A05EA2-0A53-4C12-BE14-DA45449A4726}" type="datetimeFigureOut">
               <a:rPr lang="es-CO" smtClean="0"/>
-              <a:t>16/09/2025</a:t>
+              <a:t>17/09/2025</a:t>
             </a:fld>
             <a:endParaRPr lang="es-CO"/>
           </a:p>
@@ -707,7 +1028,7 @@
           <a:p>
             <a:fld id="{25A05EA2-0A53-4C12-BE14-DA45449A4726}" type="datetimeFigureOut">
               <a:rPr lang="es-CO" smtClean="0"/>
-              <a:t>16/09/2025</a:t>
+              <a:t>17/09/2025</a:t>
             </a:fld>
             <a:endParaRPr lang="es-CO"/>
           </a:p>
@@ -907,7 +1228,7 @@
           <a:p>
             <a:fld id="{25A05EA2-0A53-4C12-BE14-DA45449A4726}" type="datetimeFigureOut">
               <a:rPr lang="es-CO" smtClean="0"/>
-              <a:t>16/09/2025</a:t>
+              <a:t>17/09/2025</a:t>
             </a:fld>
             <a:endParaRPr lang="es-CO"/>
           </a:p>
@@ -1183,7 +1504,7 @@
           <a:p>
             <a:fld id="{25A05EA2-0A53-4C12-BE14-DA45449A4726}" type="datetimeFigureOut">
               <a:rPr lang="es-CO" smtClean="0"/>
-              <a:t>16/09/2025</a:t>
+              <a:t>17/09/2025</a:t>
             </a:fld>
             <a:endParaRPr lang="es-CO"/>
           </a:p>
@@ -1451,7 +1772,7 @@
           <a:p>
             <a:fld id="{25A05EA2-0A53-4C12-BE14-DA45449A4726}" type="datetimeFigureOut">
               <a:rPr lang="es-CO" smtClean="0"/>
-              <a:t>16/09/2025</a:t>
+              <a:t>17/09/2025</a:t>
             </a:fld>
             <a:endParaRPr lang="es-CO"/>
           </a:p>
@@ -1866,7 +2187,7 @@
           <a:p>
             <a:fld id="{25A05EA2-0A53-4C12-BE14-DA45449A4726}" type="datetimeFigureOut">
               <a:rPr lang="es-CO" smtClean="0"/>
-              <a:t>16/09/2025</a:t>
+              <a:t>17/09/2025</a:t>
             </a:fld>
             <a:endParaRPr lang="es-CO"/>
           </a:p>
@@ -2008,7 +2329,7 @@
           <a:p>
             <a:fld id="{25A05EA2-0A53-4C12-BE14-DA45449A4726}" type="datetimeFigureOut">
               <a:rPr lang="es-CO" smtClean="0"/>
-              <a:t>16/09/2025</a:t>
+              <a:t>17/09/2025</a:t>
             </a:fld>
             <a:endParaRPr lang="es-CO"/>
           </a:p>
@@ -2121,7 +2442,7 @@
           <a:p>
             <a:fld id="{25A05EA2-0A53-4C12-BE14-DA45449A4726}" type="datetimeFigureOut">
               <a:rPr lang="es-CO" smtClean="0"/>
-              <a:t>16/09/2025</a:t>
+              <a:t>17/09/2025</a:t>
             </a:fld>
             <a:endParaRPr lang="es-CO"/>
           </a:p>
@@ -2434,7 +2755,7 @@
           <a:p>
             <a:fld id="{25A05EA2-0A53-4C12-BE14-DA45449A4726}" type="datetimeFigureOut">
               <a:rPr lang="es-CO" smtClean="0"/>
-              <a:t>16/09/2025</a:t>
+              <a:t>17/09/2025</a:t>
             </a:fld>
             <a:endParaRPr lang="es-CO"/>
           </a:p>
@@ -2723,7 +3044,7 @@
           <a:p>
             <a:fld id="{25A05EA2-0A53-4C12-BE14-DA45449A4726}" type="datetimeFigureOut">
               <a:rPr lang="es-CO" smtClean="0"/>
-              <a:t>16/09/2025</a:t>
+              <a:t>17/09/2025</a:t>
             </a:fld>
             <a:endParaRPr lang="es-CO"/>
           </a:p>
@@ -2966,7 +3287,7 @@
           <a:p>
             <a:fld id="{25A05EA2-0A53-4C12-BE14-DA45449A4726}" type="datetimeFigureOut">
               <a:rPr lang="es-CO" smtClean="0"/>
-              <a:t>16/09/2025</a:t>
+              <a:t>17/09/2025</a:t>
             </a:fld>
             <a:endParaRPr lang="es-CO"/>
           </a:p>
@@ -3578,6 +3899,763 @@
 </p:sld>
 </file>
 
+<file path=ppt/slides/slide10.xml><?xml version="1.0" encoding="utf-8"?>
+<p:sld xmlns:a="http://schemas.openxmlformats.org/drawingml/2006/main" xmlns:r="http://schemas.openxmlformats.org/officeDocument/2006/relationships" xmlns:p="http://schemas.openxmlformats.org/presentationml/2006/main">
+  <p:cSld>
+    <p:spTree>
+      <p:nvGrpSpPr>
+        <p:cNvPr id="1" name="">
+          <a:extLst>
+            <a:ext uri="{FF2B5EF4-FFF2-40B4-BE49-F238E27FC236}">
+              <a16:creationId xmlns:a16="http://schemas.microsoft.com/office/drawing/2014/main" id="{A5E0EE13-240E-308E-CF5B-8577EF461E5C}"/>
+            </a:ext>
+          </a:extLst>
+        </p:cNvPr>
+        <p:cNvGrpSpPr/>
+        <p:nvPr/>
+      </p:nvGrpSpPr>
+      <p:grpSpPr>
+        <a:xfrm>
+          <a:off x="0" y="0"/>
+          <a:ext cx="0" cy="0"/>
+          <a:chOff x="0" y="0"/>
+          <a:chExt cx="0" cy="0"/>
+        </a:xfrm>
+      </p:grpSpPr>
+      <p:sp>
+        <p:nvSpPr>
+          <p:cNvPr id="3" name="Subtítulo 2">
+            <a:extLst>
+              <a:ext uri="{FF2B5EF4-FFF2-40B4-BE49-F238E27FC236}">
+                <a16:creationId xmlns:a16="http://schemas.microsoft.com/office/drawing/2014/main" id="{63654C2C-F047-C140-1CEA-4F3DF814A794}"/>
+              </a:ext>
+            </a:extLst>
+          </p:cNvPr>
+          <p:cNvSpPr>
+            <a:spLocks noGrp="1"/>
+          </p:cNvSpPr>
+          <p:nvPr>
+            <p:ph type="subTitle" idx="1"/>
+          </p:nvPr>
+        </p:nvSpPr>
+        <p:spPr>
+          <a:xfrm>
+            <a:off x="987286" y="1991137"/>
+            <a:ext cx="6367670" cy="1437863"/>
+          </a:xfrm>
+        </p:spPr>
+        <p:txBody>
+          <a:bodyPr>
+            <a:noAutofit/>
+          </a:bodyPr>
+          <a:lstStyle/>
+          <a:p>
+            <a:pPr algn="just"/>
+            <a:r>
+              <a:rPr lang="es-MX" sz="1400" b="1" dirty="0">
+                <a:solidFill>
+                  <a:schemeClr val="bg2">
+                    <a:lumMod val="75000"/>
+                  </a:schemeClr>
+                </a:solidFill>
+              </a:rPr>
+              <a:t>¿Qué se ha hecho?</a:t>
+            </a:r>
+          </a:p>
+          <a:p>
+            <a:pPr marL="228600" indent="-228600" algn="just">
+              <a:buFont typeface="+mj-lt"/>
+              <a:buAutoNum type="arabicPeriod"/>
+            </a:pPr>
+            <a:r>
+              <a:rPr lang="es-MX" sz="1400" dirty="0">
+                <a:solidFill>
+                  <a:schemeClr val="bg2">
+                    <a:lumMod val="75000"/>
+                  </a:schemeClr>
+                </a:solidFill>
+              </a:rPr>
+              <a:t>Entender el contexto</a:t>
+            </a:r>
+          </a:p>
+          <a:p>
+            <a:pPr marL="228600" indent="-228600" algn="just">
+              <a:buFont typeface="+mj-lt"/>
+              <a:buAutoNum type="arabicPeriod"/>
+            </a:pPr>
+            <a:r>
+              <a:rPr lang="es-MX" sz="1400" dirty="0">
+                <a:solidFill>
+                  <a:schemeClr val="bg2">
+                    <a:lumMod val="75000"/>
+                  </a:schemeClr>
+                </a:solidFill>
+              </a:rPr>
+              <a:t>Identificar variables a usar</a:t>
+            </a:r>
+          </a:p>
+          <a:p>
+            <a:pPr marL="228600" indent="-228600" algn="just">
+              <a:buFont typeface="+mj-lt"/>
+              <a:buAutoNum type="arabicPeriod"/>
+            </a:pPr>
+            <a:r>
+              <a:rPr lang="es-MX" sz="1400" dirty="0">
+                <a:solidFill>
+                  <a:schemeClr val="bg2">
+                    <a:lumMod val="75000"/>
+                  </a:schemeClr>
+                </a:solidFill>
+              </a:rPr>
+              <a:t>Aplicar modelos </a:t>
+            </a:r>
+            <a:r>
+              <a:rPr lang="es-MX" sz="1400" dirty="0" err="1">
+                <a:solidFill>
+                  <a:schemeClr val="bg2">
+                    <a:lumMod val="75000"/>
+                  </a:schemeClr>
+                </a:solidFill>
+              </a:rPr>
+              <a:t>univariados</a:t>
+            </a:r>
+            <a:r>
+              <a:rPr lang="es-MX" sz="1400" dirty="0">
+                <a:solidFill>
+                  <a:schemeClr val="bg2">
+                    <a:lumMod val="75000"/>
+                  </a:schemeClr>
+                </a:solidFill>
+              </a:rPr>
+              <a:t>: SARIMA</a:t>
+            </a:r>
+          </a:p>
+          <a:p>
+            <a:pPr marL="228600" indent="-228600" algn="just">
+              <a:buFont typeface="+mj-lt"/>
+              <a:buAutoNum type="arabicPeriod"/>
+            </a:pPr>
+            <a:r>
+              <a:rPr lang="es-MX" sz="1400" dirty="0">
+                <a:solidFill>
+                  <a:schemeClr val="bg2">
+                    <a:lumMod val="75000"/>
+                  </a:schemeClr>
+                </a:solidFill>
+              </a:rPr>
+              <a:t>Aplicar modelos multivariados: SARIMAX y VAR</a:t>
+            </a:r>
+          </a:p>
+        </p:txBody>
+      </p:sp>
+      <p:sp>
+        <p:nvSpPr>
+          <p:cNvPr id="4" name="Rectángulo 3">
+            <a:extLst>
+              <a:ext uri="{FF2B5EF4-FFF2-40B4-BE49-F238E27FC236}">
+                <a16:creationId xmlns:a16="http://schemas.microsoft.com/office/drawing/2014/main" id="{2AC14BCC-8B44-03BC-2BE4-C144568F039D}"/>
+              </a:ext>
+            </a:extLst>
+          </p:cNvPr>
+          <p:cNvSpPr/>
+          <p:nvPr/>
+        </p:nvSpPr>
+        <p:spPr>
+          <a:xfrm>
+            <a:off x="0" y="-1"/>
+            <a:ext cx="12192000" cy="808383"/>
+          </a:xfrm>
+          <a:prstGeom prst="rect">
+            <a:avLst/>
+          </a:prstGeom>
+          <a:solidFill>
+            <a:schemeClr val="tx2">
+              <a:lumMod val="50000"/>
+              <a:lumOff val="50000"/>
+            </a:schemeClr>
+          </a:solidFill>
+          <a:ln>
+            <a:noFill/>
+          </a:ln>
+        </p:spPr>
+        <p:style>
+          <a:lnRef idx="2">
+            <a:schemeClr val="accent1">
+              <a:shade val="15000"/>
+            </a:schemeClr>
+          </a:lnRef>
+          <a:fillRef idx="1">
+            <a:schemeClr val="accent1"/>
+          </a:fillRef>
+          <a:effectRef idx="0">
+            <a:schemeClr val="accent1"/>
+          </a:effectRef>
+          <a:fontRef idx="minor">
+            <a:schemeClr val="lt1"/>
+          </a:fontRef>
+        </p:style>
+        <p:txBody>
+          <a:bodyPr rtlCol="0" anchor="ctr"/>
+          <a:lstStyle/>
+          <a:p>
+            <a:pPr algn="ctr"/>
+            <a:endParaRPr lang="es-CO"/>
+          </a:p>
+        </p:txBody>
+      </p:sp>
+      <p:pic>
+        <p:nvPicPr>
+          <p:cNvPr id="1026" name="Picture 2" descr="Carreras y oferta Académica de Pregrado | Uniandes">
+            <a:extLst>
+              <a:ext uri="{FF2B5EF4-FFF2-40B4-BE49-F238E27FC236}">
+                <a16:creationId xmlns:a16="http://schemas.microsoft.com/office/drawing/2014/main" id="{C577E146-7C19-13DD-7D91-7FC5D2BC35E3}"/>
+              </a:ext>
+            </a:extLst>
+          </p:cNvPr>
+          <p:cNvPicPr>
+            <a:picLocks noChangeAspect="1" noChangeArrowheads="1"/>
+          </p:cNvPicPr>
+          <p:nvPr/>
+        </p:nvPicPr>
+        <p:blipFill>
+          <a:blip r:embed="rId2">
+            <a:extLst>
+              <a:ext uri="{28A0092B-C50C-407E-A947-70E740481C1C}">
+                <a14:useLocalDpi xmlns:a14="http://schemas.microsoft.com/office/drawing/2010/main" val="0"/>
+              </a:ext>
+            </a:extLst>
+          </a:blip>
+          <a:srcRect/>
+          <a:stretch>
+            <a:fillRect/>
+          </a:stretch>
+        </p:blipFill>
+        <p:spPr bwMode="auto">
+          <a:xfrm>
+            <a:off x="10668000" y="62932"/>
+            <a:ext cx="1444901" cy="682516"/>
+          </a:xfrm>
+          <a:prstGeom prst="rect">
+            <a:avLst/>
+          </a:prstGeom>
+          <a:noFill/>
+          <a:extLst>
+            <a:ext uri="{909E8E84-426E-40DD-AFC4-6F175D3DCCD1}">
+              <a14:hiddenFill xmlns:a14="http://schemas.microsoft.com/office/drawing/2010/main">
+                <a:solidFill>
+                  <a:srgbClr val="FFFFFF"/>
+                </a:solidFill>
+              </a14:hiddenFill>
+            </a:ext>
+          </a:extLst>
+        </p:spPr>
+      </p:pic>
+      <p:sp>
+        <p:nvSpPr>
+          <p:cNvPr id="5" name="CuadroTexto 4">
+            <a:extLst>
+              <a:ext uri="{FF2B5EF4-FFF2-40B4-BE49-F238E27FC236}">
+                <a16:creationId xmlns:a16="http://schemas.microsoft.com/office/drawing/2014/main" id="{DE7E73BC-9557-F4B7-3970-53075E6B4A2B}"/>
+              </a:ext>
+            </a:extLst>
+          </p:cNvPr>
+          <p:cNvSpPr txBox="1"/>
+          <p:nvPr/>
+        </p:nvSpPr>
+        <p:spPr>
+          <a:xfrm>
+            <a:off x="125896" y="219524"/>
+            <a:ext cx="1623392" cy="369332"/>
+          </a:xfrm>
+          <a:prstGeom prst="rect">
+            <a:avLst/>
+          </a:prstGeom>
+          <a:noFill/>
+        </p:spPr>
+        <p:txBody>
+          <a:bodyPr wrap="square" rtlCol="0">
+            <a:spAutoFit/>
+          </a:bodyPr>
+          <a:lstStyle/>
+          <a:p>
+            <a:r>
+              <a:rPr lang="es-CO" b="1" dirty="0"/>
+              <a:t>Metodología</a:t>
+            </a:r>
+          </a:p>
+        </p:txBody>
+      </p:sp>
+      <p:sp>
+        <p:nvSpPr>
+          <p:cNvPr id="2" name="Subtítulo 2">
+            <a:extLst>
+              <a:ext uri="{FF2B5EF4-FFF2-40B4-BE49-F238E27FC236}">
+                <a16:creationId xmlns:a16="http://schemas.microsoft.com/office/drawing/2014/main" id="{06F8662D-E655-D0AB-C953-7E57D740C5D7}"/>
+              </a:ext>
+            </a:extLst>
+          </p:cNvPr>
+          <p:cNvSpPr txBox="1">
+            <a:spLocks/>
+          </p:cNvSpPr>
+          <p:nvPr/>
+        </p:nvSpPr>
+        <p:spPr>
+          <a:xfrm>
+            <a:off x="987286" y="3892823"/>
+            <a:ext cx="6367670" cy="1437863"/>
+          </a:xfrm>
+          <a:prstGeom prst="rect">
+            <a:avLst/>
+          </a:prstGeom>
+        </p:spPr>
+        <p:txBody>
+          <a:bodyPr vert="horz" lIns="91440" tIns="45720" rIns="91440" bIns="45720" rtlCol="0">
+            <a:noAutofit/>
+          </a:bodyPr>
+          <a:lstStyle>
+            <a:lvl1pPr marL="0" indent="0" algn="ctr" defTabSz="914400" rtl="0" eaLnBrk="1" latinLnBrk="0" hangingPunct="1">
+              <a:lnSpc>
+                <a:spcPct val="90000"/>
+              </a:lnSpc>
+              <a:spcBef>
+                <a:spcPts val="1000"/>
+              </a:spcBef>
+              <a:buFont typeface="Arial" panose="020B0604020202020204" pitchFamily="34" charset="0"/>
+              <a:buNone/>
+              <a:defRPr sz="2400" kern="1200">
+                <a:solidFill>
+                  <a:schemeClr val="tx1"/>
+                </a:solidFill>
+                <a:latin typeface="+mn-lt"/>
+                <a:ea typeface="+mn-ea"/>
+                <a:cs typeface="+mn-cs"/>
+              </a:defRPr>
+            </a:lvl1pPr>
+            <a:lvl2pPr marL="457200" indent="0" algn="ctr" defTabSz="914400" rtl="0" eaLnBrk="1" latinLnBrk="0" hangingPunct="1">
+              <a:lnSpc>
+                <a:spcPct val="90000"/>
+              </a:lnSpc>
+              <a:spcBef>
+                <a:spcPts val="500"/>
+              </a:spcBef>
+              <a:buFont typeface="Arial" panose="020B0604020202020204" pitchFamily="34" charset="0"/>
+              <a:buNone/>
+              <a:defRPr sz="2000" kern="1200">
+                <a:solidFill>
+                  <a:schemeClr val="tx1"/>
+                </a:solidFill>
+                <a:latin typeface="+mn-lt"/>
+                <a:ea typeface="+mn-ea"/>
+                <a:cs typeface="+mn-cs"/>
+              </a:defRPr>
+            </a:lvl2pPr>
+            <a:lvl3pPr marL="914400" indent="0" algn="ctr" defTabSz="914400" rtl="0" eaLnBrk="1" latinLnBrk="0" hangingPunct="1">
+              <a:lnSpc>
+                <a:spcPct val="90000"/>
+              </a:lnSpc>
+              <a:spcBef>
+                <a:spcPts val="500"/>
+              </a:spcBef>
+              <a:buFont typeface="Arial" panose="020B0604020202020204" pitchFamily="34" charset="0"/>
+              <a:buNone/>
+              <a:defRPr sz="1800" kern="1200">
+                <a:solidFill>
+                  <a:schemeClr val="tx1"/>
+                </a:solidFill>
+                <a:latin typeface="+mn-lt"/>
+                <a:ea typeface="+mn-ea"/>
+                <a:cs typeface="+mn-cs"/>
+              </a:defRPr>
+            </a:lvl3pPr>
+            <a:lvl4pPr marL="1371600" indent="0" algn="ctr" defTabSz="914400" rtl="0" eaLnBrk="1" latinLnBrk="0" hangingPunct="1">
+              <a:lnSpc>
+                <a:spcPct val="90000"/>
+              </a:lnSpc>
+              <a:spcBef>
+                <a:spcPts val="500"/>
+              </a:spcBef>
+              <a:buFont typeface="Arial" panose="020B0604020202020204" pitchFamily="34" charset="0"/>
+              <a:buNone/>
+              <a:defRPr sz="1600" kern="1200">
+                <a:solidFill>
+                  <a:schemeClr val="tx1"/>
+                </a:solidFill>
+                <a:latin typeface="+mn-lt"/>
+                <a:ea typeface="+mn-ea"/>
+                <a:cs typeface="+mn-cs"/>
+              </a:defRPr>
+            </a:lvl4pPr>
+            <a:lvl5pPr marL="1828800" indent="0" algn="ctr" defTabSz="914400" rtl="0" eaLnBrk="1" latinLnBrk="0" hangingPunct="1">
+              <a:lnSpc>
+                <a:spcPct val="90000"/>
+              </a:lnSpc>
+              <a:spcBef>
+                <a:spcPts val="500"/>
+              </a:spcBef>
+              <a:buFont typeface="Arial" panose="020B0604020202020204" pitchFamily="34" charset="0"/>
+              <a:buNone/>
+              <a:defRPr sz="1600" kern="1200">
+                <a:solidFill>
+                  <a:schemeClr val="tx1"/>
+                </a:solidFill>
+                <a:latin typeface="+mn-lt"/>
+                <a:ea typeface="+mn-ea"/>
+                <a:cs typeface="+mn-cs"/>
+              </a:defRPr>
+            </a:lvl5pPr>
+            <a:lvl6pPr marL="2286000" indent="0" algn="ctr" defTabSz="914400" rtl="0" eaLnBrk="1" latinLnBrk="0" hangingPunct="1">
+              <a:lnSpc>
+                <a:spcPct val="90000"/>
+              </a:lnSpc>
+              <a:spcBef>
+                <a:spcPts val="500"/>
+              </a:spcBef>
+              <a:buFont typeface="Arial" panose="020B0604020202020204" pitchFamily="34" charset="0"/>
+              <a:buNone/>
+              <a:defRPr sz="1600" kern="1200">
+                <a:solidFill>
+                  <a:schemeClr val="tx1"/>
+                </a:solidFill>
+                <a:latin typeface="+mn-lt"/>
+                <a:ea typeface="+mn-ea"/>
+                <a:cs typeface="+mn-cs"/>
+              </a:defRPr>
+            </a:lvl6pPr>
+            <a:lvl7pPr marL="2743200" indent="0" algn="ctr" defTabSz="914400" rtl="0" eaLnBrk="1" latinLnBrk="0" hangingPunct="1">
+              <a:lnSpc>
+                <a:spcPct val="90000"/>
+              </a:lnSpc>
+              <a:spcBef>
+                <a:spcPts val="500"/>
+              </a:spcBef>
+              <a:buFont typeface="Arial" panose="020B0604020202020204" pitchFamily="34" charset="0"/>
+              <a:buNone/>
+              <a:defRPr sz="1600" kern="1200">
+                <a:solidFill>
+                  <a:schemeClr val="tx1"/>
+                </a:solidFill>
+                <a:latin typeface="+mn-lt"/>
+                <a:ea typeface="+mn-ea"/>
+                <a:cs typeface="+mn-cs"/>
+              </a:defRPr>
+            </a:lvl7pPr>
+            <a:lvl8pPr marL="3200400" indent="0" algn="ctr" defTabSz="914400" rtl="0" eaLnBrk="1" latinLnBrk="0" hangingPunct="1">
+              <a:lnSpc>
+                <a:spcPct val="90000"/>
+              </a:lnSpc>
+              <a:spcBef>
+                <a:spcPts val="500"/>
+              </a:spcBef>
+              <a:buFont typeface="Arial" panose="020B0604020202020204" pitchFamily="34" charset="0"/>
+              <a:buNone/>
+              <a:defRPr sz="1600" kern="1200">
+                <a:solidFill>
+                  <a:schemeClr val="tx1"/>
+                </a:solidFill>
+                <a:latin typeface="+mn-lt"/>
+                <a:ea typeface="+mn-ea"/>
+                <a:cs typeface="+mn-cs"/>
+              </a:defRPr>
+            </a:lvl8pPr>
+            <a:lvl9pPr marL="3657600" indent="0" algn="ctr" defTabSz="914400" rtl="0" eaLnBrk="1" latinLnBrk="0" hangingPunct="1">
+              <a:lnSpc>
+                <a:spcPct val="90000"/>
+              </a:lnSpc>
+              <a:spcBef>
+                <a:spcPts val="500"/>
+              </a:spcBef>
+              <a:buFont typeface="Arial" panose="020B0604020202020204" pitchFamily="34" charset="0"/>
+              <a:buNone/>
+              <a:defRPr sz="1600" kern="1200">
+                <a:solidFill>
+                  <a:schemeClr val="tx1"/>
+                </a:solidFill>
+                <a:latin typeface="+mn-lt"/>
+                <a:ea typeface="+mn-ea"/>
+                <a:cs typeface="+mn-cs"/>
+              </a:defRPr>
+            </a:lvl9pPr>
+          </a:lstStyle>
+          <a:p>
+            <a:pPr algn="just"/>
+            <a:r>
+              <a:rPr lang="es-MX" sz="1400" b="1" dirty="0"/>
+              <a:t>¿Qué queda por hacer?</a:t>
+            </a:r>
+          </a:p>
+          <a:p>
+            <a:pPr algn="just"/>
+            <a:r>
+              <a:rPr lang="es-MX" sz="1400" dirty="0"/>
+              <a:t>5. Aplicar modelos de machine </a:t>
+            </a:r>
+            <a:r>
+              <a:rPr lang="es-MX" sz="1400" dirty="0" err="1"/>
+              <a:t>learning</a:t>
+            </a:r>
+            <a:r>
+              <a:rPr lang="es-MX" sz="1400" dirty="0"/>
+              <a:t>: </a:t>
+            </a:r>
+            <a:r>
+              <a:rPr lang="es-MX" sz="1400" dirty="0" err="1"/>
+              <a:t>XGBoost</a:t>
+            </a:r>
+            <a:r>
+              <a:rPr lang="es-MX" sz="1400" dirty="0"/>
+              <a:t>, redes neuronales (LSTM)</a:t>
+            </a:r>
+          </a:p>
+          <a:p>
+            <a:pPr algn="just"/>
+            <a:r>
+              <a:rPr lang="es-MX" sz="1400" dirty="0"/>
+              <a:t>6. Comparar modelos y seleccionar mejor</a:t>
+            </a:r>
+          </a:p>
+          <a:p>
+            <a:pPr algn="just"/>
+            <a:r>
+              <a:rPr lang="es-MX" sz="1400" dirty="0"/>
+              <a:t>7. Redacción del documento</a:t>
+            </a:r>
+          </a:p>
+          <a:p>
+            <a:pPr algn="just"/>
+            <a:r>
+              <a:rPr lang="es-MX" sz="1400" dirty="0"/>
+              <a:t>8. Presentación y sustentación</a:t>
+            </a:r>
+          </a:p>
+        </p:txBody>
+      </p:sp>
+    </p:spTree>
+    <p:extLst>
+      <p:ext uri="{BB962C8B-B14F-4D97-AF65-F5344CB8AC3E}">
+        <p14:creationId xmlns:p14="http://schemas.microsoft.com/office/powerpoint/2010/main" val="1825084229"/>
+      </p:ext>
+    </p:extLst>
+  </p:cSld>
+  <p:clrMapOvr>
+    <a:masterClrMapping/>
+  </p:clrMapOvr>
+</p:sld>
+</file>
+
+<file path=ppt/slides/slide11.xml><?xml version="1.0" encoding="utf-8"?>
+<p:sld xmlns:a="http://schemas.openxmlformats.org/drawingml/2006/main" xmlns:r="http://schemas.openxmlformats.org/officeDocument/2006/relationships" xmlns:p="http://schemas.openxmlformats.org/presentationml/2006/main">
+  <p:cSld>
+    <p:spTree>
+      <p:nvGrpSpPr>
+        <p:cNvPr id="1" name="">
+          <a:extLst>
+            <a:ext uri="{FF2B5EF4-FFF2-40B4-BE49-F238E27FC236}">
+              <a16:creationId xmlns:a16="http://schemas.microsoft.com/office/drawing/2014/main" id="{6AC5C248-460E-DD8E-9AF2-7FEC7BBB3894}"/>
+            </a:ext>
+          </a:extLst>
+        </p:cNvPr>
+        <p:cNvGrpSpPr/>
+        <p:nvPr/>
+      </p:nvGrpSpPr>
+      <p:grpSpPr>
+        <a:xfrm>
+          <a:off x="0" y="0"/>
+          <a:ext cx="0" cy="0"/>
+          <a:chOff x="0" y="0"/>
+          <a:chExt cx="0" cy="0"/>
+        </a:xfrm>
+      </p:grpSpPr>
+      <p:sp>
+        <p:nvSpPr>
+          <p:cNvPr id="3" name="Subtítulo 2">
+            <a:extLst>
+              <a:ext uri="{FF2B5EF4-FFF2-40B4-BE49-F238E27FC236}">
+                <a16:creationId xmlns:a16="http://schemas.microsoft.com/office/drawing/2014/main" id="{358FFBA6-2721-3365-E68D-AC8AD2EF99B4}"/>
+              </a:ext>
+            </a:extLst>
+          </p:cNvPr>
+          <p:cNvSpPr>
+            <a:spLocks noGrp="1"/>
+          </p:cNvSpPr>
+          <p:nvPr>
+            <p:ph type="subTitle" idx="1"/>
+          </p:nvPr>
+        </p:nvSpPr>
+        <p:spPr>
+          <a:xfrm>
+            <a:off x="2912165" y="3028121"/>
+            <a:ext cx="6367670" cy="980662"/>
+          </a:xfrm>
+        </p:spPr>
+        <p:txBody>
+          <a:bodyPr>
+            <a:noAutofit/>
+          </a:bodyPr>
+          <a:lstStyle/>
+          <a:p>
+            <a:r>
+              <a:rPr lang="es-MX" b="1" dirty="0"/>
+              <a:t>Gracias!</a:t>
+            </a:r>
+          </a:p>
+          <a:p>
+            <a:r>
+              <a:rPr lang="es-MX" dirty="0"/>
+              <a:t>Dudas, comentarios, sugerencias</a:t>
+            </a:r>
+          </a:p>
+        </p:txBody>
+      </p:sp>
+      <p:sp>
+        <p:nvSpPr>
+          <p:cNvPr id="4" name="Rectángulo 3">
+            <a:extLst>
+              <a:ext uri="{FF2B5EF4-FFF2-40B4-BE49-F238E27FC236}">
+                <a16:creationId xmlns:a16="http://schemas.microsoft.com/office/drawing/2014/main" id="{9D7C6D38-9DD4-6BC4-5E2B-A7E475A2CA41}"/>
+              </a:ext>
+            </a:extLst>
+          </p:cNvPr>
+          <p:cNvSpPr/>
+          <p:nvPr/>
+        </p:nvSpPr>
+        <p:spPr>
+          <a:xfrm>
+            <a:off x="0" y="-1"/>
+            <a:ext cx="12192000" cy="808383"/>
+          </a:xfrm>
+          <a:prstGeom prst="rect">
+            <a:avLst/>
+          </a:prstGeom>
+          <a:solidFill>
+            <a:schemeClr val="tx2">
+              <a:lumMod val="50000"/>
+              <a:lumOff val="50000"/>
+            </a:schemeClr>
+          </a:solidFill>
+          <a:ln>
+            <a:noFill/>
+          </a:ln>
+        </p:spPr>
+        <p:style>
+          <a:lnRef idx="2">
+            <a:schemeClr val="accent1">
+              <a:shade val="15000"/>
+            </a:schemeClr>
+          </a:lnRef>
+          <a:fillRef idx="1">
+            <a:schemeClr val="accent1"/>
+          </a:fillRef>
+          <a:effectRef idx="0">
+            <a:schemeClr val="accent1"/>
+          </a:effectRef>
+          <a:fontRef idx="minor">
+            <a:schemeClr val="lt1"/>
+          </a:fontRef>
+        </p:style>
+        <p:txBody>
+          <a:bodyPr rtlCol="0" anchor="ctr"/>
+          <a:lstStyle/>
+          <a:p>
+            <a:pPr algn="ctr"/>
+            <a:endParaRPr lang="es-CO"/>
+          </a:p>
+        </p:txBody>
+      </p:sp>
+      <p:pic>
+        <p:nvPicPr>
+          <p:cNvPr id="1026" name="Picture 2" descr="Carreras y oferta Académica de Pregrado | Uniandes">
+            <a:extLst>
+              <a:ext uri="{FF2B5EF4-FFF2-40B4-BE49-F238E27FC236}">
+                <a16:creationId xmlns:a16="http://schemas.microsoft.com/office/drawing/2014/main" id="{CFACC16F-AD38-B167-2C71-5368849E12F7}"/>
+              </a:ext>
+            </a:extLst>
+          </p:cNvPr>
+          <p:cNvPicPr>
+            <a:picLocks noChangeAspect="1" noChangeArrowheads="1"/>
+          </p:cNvPicPr>
+          <p:nvPr/>
+        </p:nvPicPr>
+        <p:blipFill>
+          <a:blip r:embed="rId2">
+            <a:extLst>
+              <a:ext uri="{28A0092B-C50C-407E-A947-70E740481C1C}">
+                <a14:useLocalDpi xmlns:a14="http://schemas.microsoft.com/office/drawing/2010/main" val="0"/>
+              </a:ext>
+            </a:extLst>
+          </a:blip>
+          <a:srcRect/>
+          <a:stretch>
+            <a:fillRect/>
+          </a:stretch>
+        </p:blipFill>
+        <p:spPr bwMode="auto">
+          <a:xfrm>
+            <a:off x="10668000" y="62932"/>
+            <a:ext cx="1444901" cy="682516"/>
+          </a:xfrm>
+          <a:prstGeom prst="rect">
+            <a:avLst/>
+          </a:prstGeom>
+          <a:noFill/>
+          <a:extLst>
+            <a:ext uri="{909E8E84-426E-40DD-AFC4-6F175D3DCCD1}">
+              <a14:hiddenFill xmlns:a14="http://schemas.microsoft.com/office/drawing/2010/main">
+                <a:solidFill>
+                  <a:srgbClr val="FFFFFF"/>
+                </a:solidFill>
+              </a14:hiddenFill>
+            </a:ext>
+          </a:extLst>
+        </p:spPr>
+      </p:pic>
+      <p:sp>
+        <p:nvSpPr>
+          <p:cNvPr id="5" name="CuadroTexto 4">
+            <a:extLst>
+              <a:ext uri="{FF2B5EF4-FFF2-40B4-BE49-F238E27FC236}">
+                <a16:creationId xmlns:a16="http://schemas.microsoft.com/office/drawing/2014/main" id="{3C3A45BC-25E4-F4F1-4F13-A0EFB41321DA}"/>
+              </a:ext>
+            </a:extLst>
+          </p:cNvPr>
+          <p:cNvSpPr txBox="1"/>
+          <p:nvPr/>
+        </p:nvSpPr>
+        <p:spPr>
+          <a:xfrm>
+            <a:off x="125896" y="219524"/>
+            <a:ext cx="1623392" cy="369332"/>
+          </a:xfrm>
+          <a:prstGeom prst="rect">
+            <a:avLst/>
+          </a:prstGeom>
+          <a:noFill/>
+        </p:spPr>
+        <p:txBody>
+          <a:bodyPr wrap="square" rtlCol="0">
+            <a:spAutoFit/>
+          </a:bodyPr>
+          <a:lstStyle/>
+          <a:p>
+            <a:r>
+              <a:rPr lang="es-CO" b="1" dirty="0"/>
+              <a:t>Cierre</a:t>
+            </a:r>
+          </a:p>
+        </p:txBody>
+      </p:sp>
+    </p:spTree>
+    <p:extLst>
+      <p:ext uri="{BB962C8B-B14F-4D97-AF65-F5344CB8AC3E}">
+        <p14:creationId xmlns:p14="http://schemas.microsoft.com/office/powerpoint/2010/main" val="3835149613"/>
+      </p:ext>
+    </p:extLst>
+  </p:cSld>
+  <p:clrMapOvr>
+    <a:masterClrMapping/>
+  </p:clrMapOvr>
+</p:sld>
+</file>
+
 <file path=ppt/slides/slide2.xml><?xml version="1.0" encoding="utf-8"?>
 <p:sld xmlns:a="http://schemas.openxmlformats.org/drawingml/2006/main" xmlns:r="http://schemas.openxmlformats.org/officeDocument/2006/relationships" xmlns:p="http://schemas.openxmlformats.org/presentationml/2006/main">
   <p:cSld>
@@ -3619,8 +4697,8 @@
         </p:nvSpPr>
         <p:spPr>
           <a:xfrm>
-            <a:off x="556591" y="1497494"/>
-            <a:ext cx="5751444" cy="2491410"/>
+            <a:off x="1254919" y="1683024"/>
+            <a:ext cx="5042452" cy="1921567"/>
           </a:xfrm>
         </p:spPr>
         <p:txBody>
@@ -3634,24 +4712,12 @@
               <a:buChar char="•"/>
             </a:pPr>
             <a:r>
+              <a:rPr lang="es-MX" sz="1200" b="1" dirty="0"/>
+              <a:t>Cacao colombiano </a:t>
+            </a:r>
+            <a:r>
               <a:rPr lang="es-MX" sz="1200" dirty="0"/>
-              <a:t>Reconocimiento internacional del cacao colombiano por su calidad de “</a:t>
-            </a:r>
-            <a:r>
-              <a:rPr lang="es-MX" sz="1200" b="1" dirty="0"/>
-              <a:t>fino de aroma</a:t>
-            </a:r>
-            <a:r>
-              <a:rPr lang="es-MX" sz="1200" dirty="0"/>
-              <a:t>”. El país se ha posicionado como el quinto exportador mundial de este cacao, un segmento de alta calidad que representa solo el </a:t>
-            </a:r>
-            <a:r>
-              <a:rPr lang="es-MX" sz="1200" b="1" dirty="0"/>
-              <a:t>5% de la oferta global</a:t>
-            </a:r>
-            <a:r>
-              <a:rPr lang="es-MX" sz="1200" dirty="0"/>
-              <a:t>. Según la Organización Internacional del Cacao (ICCO), el 95% del cacao colombiano cumple con esta condición.</a:t>
+              <a:t>reconocido mundialmente como “fino de aroma” (95% de la producción según ICCO).</a:t>
             </a:r>
           </a:p>
           <a:p>
@@ -3660,29 +4726,54 @@
               <a:buChar char="•"/>
             </a:pPr>
             <a:r>
+              <a:rPr lang="es-MX" sz="1200" b="1" dirty="0"/>
+              <a:t>Quinto exportador global </a:t>
+            </a:r>
+            <a:r>
               <a:rPr lang="es-MX" sz="1200" dirty="0"/>
-              <a:t>El aumento sostenido de los precios se corresponde, en parte, con la </a:t>
-            </a:r>
+              <a:t>en un segmento premium que representa solo el 5% de la oferta mundial.</a:t>
+            </a:r>
+          </a:p>
+          <a:p>
+            <a:pPr marL="285750" indent="-285750" algn="just">
+              <a:buFont typeface="Arial" panose="020B0604020202020204" pitchFamily="34" charset="0"/>
+              <a:buChar char="•"/>
+            </a:pPr>
             <a:r>
               <a:rPr lang="es-MX" sz="1200" b="1" dirty="0"/>
-              <a:t>especulación</a:t>
+              <a:t>Precios en alza </a:t>
             </a:r>
             <a:r>
               <a:rPr lang="es-MX" sz="1200" dirty="0"/>
-              <a:t> de los inversionistas en los mercados de futuros, quienes anticipan los </a:t>
+              <a:t>impulsados por disrupciones climáticas y especulación en mercados de futuros.</a:t>
+            </a:r>
+          </a:p>
+          <a:p>
+            <a:pPr marL="285750" indent="-285750" algn="just">
+              <a:buFont typeface="Arial" panose="020B0604020202020204" pitchFamily="34" charset="0"/>
+              <a:buChar char="•"/>
+            </a:pPr>
+            <a:r>
+              <a:rPr lang="es-MX" sz="1200" dirty="0"/>
+              <a:t>El precio refleja tanto la </a:t>
             </a:r>
             <a:r>
               <a:rPr lang="es-MX" sz="1200" b="1" dirty="0"/>
-              <a:t>problemas de oferta </a:t>
+              <a:t>escasez física </a:t>
             </a:r>
             <a:r>
               <a:rPr lang="es-MX" sz="1200" dirty="0"/>
-              <a:t>causados por las disrupciones climáticas. Esta dinámica significa que el precio del cacao no es solo un reflejo de la escasez física de la materia prima, sino que también es un </a:t>
+              <a:t>como las </a:t>
             </a:r>
             <a:r>
               <a:rPr lang="es-MX" sz="1200" b="1" dirty="0"/>
-              <a:t>resultado de las expectativas y la liquidez en los mercados financieros.</a:t>
-            </a:r>
+              <a:t>expectativas financieras</a:t>
+            </a:r>
+            <a:r>
+              <a:rPr lang="es-MX" sz="1200" dirty="0"/>
+              <a:t>.</a:t>
+            </a:r>
+            <a:endParaRPr lang="es-MX" sz="1200" b="1" dirty="0"/>
           </a:p>
         </p:txBody>
       </p:sp>
@@ -3954,8 +5045,8 @@
         </p:nvSpPr>
         <p:spPr>
           <a:xfrm>
-            <a:off x="556591" y="1497494"/>
-            <a:ext cx="5751444" cy="1763027"/>
+            <a:off x="1133063" y="1517371"/>
+            <a:ext cx="4850296" cy="1763027"/>
           </a:xfrm>
         </p:spPr>
         <p:txBody>
@@ -3969,16 +5060,12 @@
               <a:buChar char="•"/>
             </a:pPr>
             <a:r>
+              <a:rPr lang="es-MX" sz="1200" b="1" dirty="0"/>
+              <a:t>Escalada de precios </a:t>
+            </a:r>
+            <a:r>
               <a:rPr lang="es-MX" sz="1200" dirty="0"/>
-              <a:t>La reciente escalada de precios (+60%) es impulsada por un </a:t>
-            </a:r>
-            <a:r>
-              <a:rPr lang="es-MX" sz="1200" b="1" dirty="0"/>
-              <a:t>déficit de la oferta global y especulación financiera</a:t>
-            </a:r>
-            <a:r>
-              <a:rPr lang="es-MX" sz="1200" dirty="0"/>
-              <a:t>.</a:t>
+              <a:t>(+60%) por déficit global de oferta y especulación financiera.</a:t>
             </a:r>
           </a:p>
           <a:p>
@@ -3988,27 +5075,11 @@
             </a:pPr>
             <a:r>
               <a:rPr lang="es-MX" sz="1200" u="sng" dirty="0"/>
-              <a:t>Cambio climático</a:t>
+              <a:t>Cambio climático: </a:t>
             </a:r>
             <a:r>
               <a:rPr lang="es-MX" sz="1200" dirty="0"/>
-              <a:t>, específicamente aumento de temperaturas, ha causado </a:t>
-            </a:r>
-            <a:r>
-              <a:rPr lang="es-MX" sz="1200" b="1" dirty="0"/>
-              <a:t>menor producción </a:t>
-            </a:r>
-            <a:r>
-              <a:rPr lang="es-MX" sz="1200" dirty="0"/>
-              <a:t>en los principales países productores de África Occidental (Costa de Marfil y Ghana), pero un </a:t>
-            </a:r>
-            <a:r>
-              <a:rPr lang="es-MX" sz="1200" b="1" dirty="0"/>
-              <a:t>aumento del área de producción </a:t>
-            </a:r>
-            <a:r>
-              <a:rPr lang="es-MX" sz="1200" dirty="0"/>
-              <a:t>de Colombia en zonas anteriormente dedicadas al café.</a:t>
+              <a:t>menor producción en Costa de Marfil y Ghana.</a:t>
             </a:r>
           </a:p>
           <a:p>
@@ -4018,23 +5089,37 @@
             </a:pPr>
             <a:r>
               <a:rPr lang="es-MX" sz="1200" dirty="0"/>
-              <a:t>Estas condiciones y tendencias, aseguran la </a:t>
+              <a:t>Expansión en Colombia con </a:t>
             </a:r>
             <a:r>
               <a:rPr lang="es-MX" sz="1200" b="1" dirty="0"/>
-              <a:t>competitividad</a:t>
+              <a:t>nuevas áreas de cultivo </a:t>
             </a:r>
             <a:r>
               <a:rPr lang="es-MX" sz="1200" dirty="0"/>
-              <a:t> del sector cacaotero colombiano </a:t>
-            </a:r>
+              <a:t>en zonas antes cafeteras.</a:t>
+            </a:r>
+          </a:p>
+          <a:p>
+            <a:pPr marL="342900" indent="-342900" algn="just">
+              <a:buFont typeface="Arial" panose="020B0604020202020204" pitchFamily="34" charset="0"/>
+              <a:buChar char="•"/>
+            </a:pPr>
             <a:r>
               <a:rPr lang="es-MX" sz="1200" b="1" dirty="0"/>
-              <a:t>a largo plazo</a:t>
+              <a:t>Competitividad futura </a:t>
             </a:r>
             <a:r>
               <a:rPr lang="es-MX" sz="1200" dirty="0"/>
-              <a:t>, atrayendo inversión extranjera.</a:t>
+              <a:t>debido a las condiciones que atraen </a:t>
+            </a:r>
+            <a:r>
+              <a:rPr lang="es-MX" sz="1200" b="1" dirty="0"/>
+              <a:t>inversión extranjera </a:t>
+            </a:r>
+            <a:r>
+              <a:rPr lang="es-MX" sz="1200" dirty="0"/>
+              <a:t>al sector.</a:t>
             </a:r>
           </a:p>
         </p:txBody>
@@ -4238,15 +5323,27 @@
           <p:nvPr/>
         </p:nvPicPr>
         <p:blipFill>
-          <a:blip r:embed="rId4"/>
+          <a:blip r:embed="rId4">
+            <a:extLst>
+              <a:ext uri="{BEBA8EAE-BF5A-486C-A8C5-ECC9F3942E4B}">
+                <a14:imgProps xmlns:a14="http://schemas.microsoft.com/office/drawing/2010/main">
+                  <a14:imgLayer r:embed="rId5">
+                    <a14:imgEffect>
+                      <a14:sharpenSoften amount="50000"/>
+                    </a14:imgEffect>
+                  </a14:imgLayer>
+                </a14:imgProps>
+              </a:ext>
+            </a:extLst>
+          </a:blip>
           <a:stretch>
             <a:fillRect/>
           </a:stretch>
         </p:blipFill>
         <p:spPr>
           <a:xfrm>
-            <a:off x="1593577" y="3480047"/>
-            <a:ext cx="3929269" cy="2483430"/>
+            <a:off x="1593577" y="3480046"/>
+            <a:ext cx="3929269" cy="2629205"/>
           </a:xfrm>
           <a:prstGeom prst="rect">
             <a:avLst/>
@@ -4633,8 +5730,8 @@
         </p:nvSpPr>
         <p:spPr>
           <a:xfrm>
-            <a:off x="556591" y="3877233"/>
-            <a:ext cx="6367670" cy="1763027"/>
+            <a:off x="854765" y="3877233"/>
+            <a:ext cx="6069496" cy="1763027"/>
           </a:xfrm>
           <a:prstGeom prst="rect">
             <a:avLst/>
@@ -4828,7 +5925,7 @@
             </a:r>
             <a:r>
               <a:rPr lang="es-MX" sz="1200" dirty="0"/>
-              <a:t>debido a la eficiencia del mismo u otras variables como el rendimiento del cultivo o que la relación es demasiado compleja para ser capturada con un enfoque insuficiente. </a:t>
+              <a:t>debido a la eficiencia del mismo.</a:t>
             </a:r>
           </a:p>
           <a:p>
@@ -4866,7 +5963,7 @@
         <p:cNvPr id="1" name="">
           <a:extLst>
             <a:ext uri="{FF2B5EF4-FFF2-40B4-BE49-F238E27FC236}">
-              <a16:creationId xmlns:a16="http://schemas.microsoft.com/office/drawing/2014/main" id="{C8ED23B7-202E-2FEC-9E85-7303AF3BCEA1}"/>
+              <a16:creationId xmlns:a16="http://schemas.microsoft.com/office/drawing/2014/main" id="{67937808-50EF-A483-5217-AEA4E395C0A1}"/>
             </a:ext>
           </a:extLst>
         </p:cNvPr>
@@ -4883,94 +5980,10 @@
       </p:grpSpPr>
       <p:sp>
         <p:nvSpPr>
-          <p:cNvPr id="3" name="Subtítulo 2">
-            <a:extLst>
-              <a:ext uri="{FF2B5EF4-FFF2-40B4-BE49-F238E27FC236}">
-                <a16:creationId xmlns:a16="http://schemas.microsoft.com/office/drawing/2014/main" id="{6B3DF7AE-265B-2314-CABD-7E650040C2CE}"/>
-              </a:ext>
-            </a:extLst>
-          </p:cNvPr>
-          <p:cNvSpPr>
-            <a:spLocks noGrp="1"/>
-          </p:cNvSpPr>
-          <p:nvPr>
-            <p:ph type="subTitle" idx="1"/>
-          </p:nvPr>
-        </p:nvSpPr>
-        <p:spPr>
-          <a:xfrm>
-            <a:off x="556591" y="1991137"/>
-            <a:ext cx="6367670" cy="1437863"/>
-          </a:xfrm>
-        </p:spPr>
-        <p:txBody>
-          <a:bodyPr>
-            <a:noAutofit/>
-          </a:bodyPr>
-          <a:lstStyle/>
-          <a:p>
-            <a:pPr algn="just"/>
-            <a:r>
-              <a:rPr lang="es-MX" sz="1200" b="1" dirty="0"/>
-              <a:t>¿Qué se ha hecho?</a:t>
-            </a:r>
-          </a:p>
-          <a:p>
-            <a:pPr marL="228600" indent="-228600" algn="just">
-              <a:buFont typeface="+mj-lt"/>
-              <a:buAutoNum type="arabicPeriod"/>
-            </a:pPr>
-            <a:r>
-              <a:rPr lang="es-MX" sz="1200" dirty="0"/>
-              <a:t>Entender el contexto</a:t>
-            </a:r>
-          </a:p>
-          <a:p>
-            <a:pPr marL="228600" indent="-228600" algn="just">
-              <a:buFont typeface="+mj-lt"/>
-              <a:buAutoNum type="arabicPeriod"/>
-            </a:pPr>
-            <a:r>
-              <a:rPr lang="es-MX" sz="1200" dirty="0"/>
-              <a:t>Identificar variables a usar</a:t>
-            </a:r>
-          </a:p>
-          <a:p>
-            <a:pPr marL="228600" indent="-228600" algn="just">
-              <a:buFont typeface="+mj-lt"/>
-              <a:buAutoNum type="arabicPeriod"/>
-            </a:pPr>
-            <a:r>
-              <a:rPr lang="es-MX" sz="1200" dirty="0"/>
-              <a:t>Aplicar modelos </a:t>
-            </a:r>
-            <a:r>
-              <a:rPr lang="es-MX" sz="1200" dirty="0" err="1"/>
-              <a:t>univariados</a:t>
-            </a:r>
-            <a:r>
-              <a:rPr lang="es-MX" sz="1200" dirty="0"/>
-              <a:t>: SARIMA</a:t>
-            </a:r>
-          </a:p>
-          <a:p>
-            <a:pPr marL="228600" indent="-228600" algn="just">
-              <a:buFont typeface="+mj-lt"/>
-              <a:buAutoNum type="arabicPeriod"/>
-            </a:pPr>
-            <a:r>
-              <a:rPr lang="es-MX" sz="1200" dirty="0"/>
-              <a:t>Aplicar modelos multivariados: SARIMAX y VAR</a:t>
-            </a:r>
-          </a:p>
-        </p:txBody>
-      </p:sp>
-      <p:sp>
-        <p:nvSpPr>
           <p:cNvPr id="4" name="Rectángulo 3">
             <a:extLst>
               <a:ext uri="{FF2B5EF4-FFF2-40B4-BE49-F238E27FC236}">
-                <a16:creationId xmlns:a16="http://schemas.microsoft.com/office/drawing/2014/main" id="{78F6C11A-F841-BC13-455B-29DB63B0C8CD}"/>
+                <a16:creationId xmlns:a16="http://schemas.microsoft.com/office/drawing/2014/main" id="{E1D0FC0E-5581-C3E7-B2B6-E8454B292727}"/>
               </a:ext>
             </a:extLst>
           </p:cNvPr>
@@ -5025,7 +6038,7 @@
           <p:cNvPr id="1026" name="Picture 2" descr="Carreras y oferta Académica de Pregrado | Uniandes">
             <a:extLst>
               <a:ext uri="{FF2B5EF4-FFF2-40B4-BE49-F238E27FC236}">
-                <a16:creationId xmlns:a16="http://schemas.microsoft.com/office/drawing/2014/main" id="{AE8BF2D9-B6E7-A219-DEED-E25DE97FDD0D}"/>
+                <a16:creationId xmlns:a16="http://schemas.microsoft.com/office/drawing/2014/main" id="{A7CAE9CF-818E-046F-2C98-2BA3B535E1DF}"/>
               </a:ext>
             </a:extLst>
           </p:cNvPr>
@@ -5072,7 +6085,7 @@
           <p:cNvPr id="5" name="CuadroTexto 4">
             <a:extLst>
               <a:ext uri="{FF2B5EF4-FFF2-40B4-BE49-F238E27FC236}">
-                <a16:creationId xmlns:a16="http://schemas.microsoft.com/office/drawing/2014/main" id="{166906E4-603F-7D08-698E-FCC235F56BE9}"/>
+                <a16:creationId xmlns:a16="http://schemas.microsoft.com/office/drawing/2014/main" id="{E7982785-255A-29C8-E8F9-B54FCF6B06A9}"/>
               </a:ext>
             </a:extLst>
           </p:cNvPr>
@@ -5097,259 +6110,135 @@
           <a:p>
             <a:r>
               <a:rPr lang="es-CO" b="1" dirty="0"/>
-              <a:t>Metodología</a:t>
-            </a:r>
-          </a:p>
-        </p:txBody>
-      </p:sp>
-      <p:sp>
-        <p:nvSpPr>
-          <p:cNvPr id="2" name="Subtítulo 2">
-            <a:extLst>
-              <a:ext uri="{FF2B5EF4-FFF2-40B4-BE49-F238E27FC236}">
-                <a16:creationId xmlns:a16="http://schemas.microsoft.com/office/drawing/2014/main" id="{B6A5D0FF-1723-D124-523D-E88FA436823A}"/>
-              </a:ext>
-            </a:extLst>
-          </p:cNvPr>
-          <p:cNvSpPr txBox="1">
-            <a:spLocks/>
-          </p:cNvSpPr>
+              <a:t>Contexto</a:t>
+            </a:r>
+          </a:p>
+        </p:txBody>
+      </p:sp>
+      <p:pic>
+        <p:nvPicPr>
+          <p:cNvPr id="6" name="Imagen 5">
+            <a:extLst>
+              <a:ext uri="{FF2B5EF4-FFF2-40B4-BE49-F238E27FC236}">
+                <a16:creationId xmlns:a16="http://schemas.microsoft.com/office/drawing/2014/main" id="{95C1263D-76F3-679D-9574-1945259AD3B0}"/>
+              </a:ext>
+            </a:extLst>
+          </p:cNvPr>
+          <p:cNvPicPr>
+            <a:picLocks noChangeAspect="1"/>
+          </p:cNvPicPr>
           <p:nvPr/>
-        </p:nvSpPr>
+        </p:nvPicPr>
+        <p:blipFill>
+          <a:blip r:embed="rId3"/>
+          <a:stretch>
+            <a:fillRect/>
+          </a:stretch>
+        </p:blipFill>
         <p:spPr>
           <a:xfrm>
-            <a:off x="556591" y="3892823"/>
-            <a:ext cx="6367670" cy="1437863"/>
+            <a:off x="351731" y="1640222"/>
+            <a:ext cx="5636861" cy="1880099"/>
           </a:xfrm>
           <a:prstGeom prst="rect">
             <a:avLst/>
           </a:prstGeom>
         </p:spPr>
-        <p:txBody>
-          <a:bodyPr vert="horz" lIns="91440" tIns="45720" rIns="91440" bIns="45720" rtlCol="0">
-            <a:noAutofit/>
-          </a:bodyPr>
-          <a:lstStyle>
-            <a:lvl1pPr marL="0" indent="0" algn="ctr" defTabSz="914400" rtl="0" eaLnBrk="1" latinLnBrk="0" hangingPunct="1">
-              <a:lnSpc>
-                <a:spcPct val="90000"/>
-              </a:lnSpc>
-              <a:spcBef>
-                <a:spcPts val="1000"/>
-              </a:spcBef>
-              <a:buFont typeface="Arial" panose="020B0604020202020204" pitchFamily="34" charset="0"/>
-              <a:buNone/>
-              <a:defRPr sz="2400" kern="1200">
-                <a:solidFill>
-                  <a:schemeClr val="tx1"/>
-                </a:solidFill>
-                <a:latin typeface="+mn-lt"/>
-                <a:ea typeface="+mn-ea"/>
-                <a:cs typeface="+mn-cs"/>
-              </a:defRPr>
-            </a:lvl1pPr>
-            <a:lvl2pPr marL="457200" indent="0" algn="ctr" defTabSz="914400" rtl="0" eaLnBrk="1" latinLnBrk="0" hangingPunct="1">
-              <a:lnSpc>
-                <a:spcPct val="90000"/>
-              </a:lnSpc>
-              <a:spcBef>
-                <a:spcPts val="500"/>
-              </a:spcBef>
-              <a:buFont typeface="Arial" panose="020B0604020202020204" pitchFamily="34" charset="0"/>
-              <a:buNone/>
-              <a:defRPr sz="2000" kern="1200">
-                <a:solidFill>
-                  <a:schemeClr val="tx1"/>
-                </a:solidFill>
-                <a:latin typeface="+mn-lt"/>
-                <a:ea typeface="+mn-ea"/>
-                <a:cs typeface="+mn-cs"/>
-              </a:defRPr>
-            </a:lvl2pPr>
-            <a:lvl3pPr marL="914400" indent="0" algn="ctr" defTabSz="914400" rtl="0" eaLnBrk="1" latinLnBrk="0" hangingPunct="1">
-              <a:lnSpc>
-                <a:spcPct val="90000"/>
-              </a:lnSpc>
-              <a:spcBef>
-                <a:spcPts val="500"/>
-              </a:spcBef>
-              <a:buFont typeface="Arial" panose="020B0604020202020204" pitchFamily="34" charset="0"/>
-              <a:buNone/>
-              <a:defRPr sz="1800" kern="1200">
-                <a:solidFill>
-                  <a:schemeClr val="tx1"/>
-                </a:solidFill>
-                <a:latin typeface="+mn-lt"/>
-                <a:ea typeface="+mn-ea"/>
-                <a:cs typeface="+mn-cs"/>
-              </a:defRPr>
-            </a:lvl3pPr>
-            <a:lvl4pPr marL="1371600" indent="0" algn="ctr" defTabSz="914400" rtl="0" eaLnBrk="1" latinLnBrk="0" hangingPunct="1">
-              <a:lnSpc>
-                <a:spcPct val="90000"/>
-              </a:lnSpc>
-              <a:spcBef>
-                <a:spcPts val="500"/>
-              </a:spcBef>
-              <a:buFont typeface="Arial" panose="020B0604020202020204" pitchFamily="34" charset="0"/>
-              <a:buNone/>
-              <a:defRPr sz="1600" kern="1200">
-                <a:solidFill>
-                  <a:schemeClr val="tx1"/>
-                </a:solidFill>
-                <a:latin typeface="+mn-lt"/>
-                <a:ea typeface="+mn-ea"/>
-                <a:cs typeface="+mn-cs"/>
-              </a:defRPr>
-            </a:lvl4pPr>
-            <a:lvl5pPr marL="1828800" indent="0" algn="ctr" defTabSz="914400" rtl="0" eaLnBrk="1" latinLnBrk="0" hangingPunct="1">
-              <a:lnSpc>
-                <a:spcPct val="90000"/>
-              </a:lnSpc>
-              <a:spcBef>
-                <a:spcPts val="500"/>
-              </a:spcBef>
-              <a:buFont typeface="Arial" panose="020B0604020202020204" pitchFamily="34" charset="0"/>
-              <a:buNone/>
-              <a:defRPr sz="1600" kern="1200">
-                <a:solidFill>
-                  <a:schemeClr val="tx1"/>
-                </a:solidFill>
-                <a:latin typeface="+mn-lt"/>
-                <a:ea typeface="+mn-ea"/>
-                <a:cs typeface="+mn-cs"/>
-              </a:defRPr>
-            </a:lvl5pPr>
-            <a:lvl6pPr marL="2286000" indent="0" algn="ctr" defTabSz="914400" rtl="0" eaLnBrk="1" latinLnBrk="0" hangingPunct="1">
-              <a:lnSpc>
-                <a:spcPct val="90000"/>
-              </a:lnSpc>
-              <a:spcBef>
-                <a:spcPts val="500"/>
-              </a:spcBef>
-              <a:buFont typeface="Arial" panose="020B0604020202020204" pitchFamily="34" charset="0"/>
-              <a:buNone/>
-              <a:defRPr sz="1600" kern="1200">
-                <a:solidFill>
-                  <a:schemeClr val="tx1"/>
-                </a:solidFill>
-                <a:latin typeface="+mn-lt"/>
-                <a:ea typeface="+mn-ea"/>
-                <a:cs typeface="+mn-cs"/>
-              </a:defRPr>
-            </a:lvl6pPr>
-            <a:lvl7pPr marL="2743200" indent="0" algn="ctr" defTabSz="914400" rtl="0" eaLnBrk="1" latinLnBrk="0" hangingPunct="1">
-              <a:lnSpc>
-                <a:spcPct val="90000"/>
-              </a:lnSpc>
-              <a:spcBef>
-                <a:spcPts val="500"/>
-              </a:spcBef>
-              <a:buFont typeface="Arial" panose="020B0604020202020204" pitchFamily="34" charset="0"/>
-              <a:buNone/>
-              <a:defRPr sz="1600" kern="1200">
-                <a:solidFill>
-                  <a:schemeClr val="tx1"/>
-                </a:solidFill>
-                <a:latin typeface="+mn-lt"/>
-                <a:ea typeface="+mn-ea"/>
-                <a:cs typeface="+mn-cs"/>
-              </a:defRPr>
-            </a:lvl7pPr>
-            <a:lvl8pPr marL="3200400" indent="0" algn="ctr" defTabSz="914400" rtl="0" eaLnBrk="1" latinLnBrk="0" hangingPunct="1">
-              <a:lnSpc>
-                <a:spcPct val="90000"/>
-              </a:lnSpc>
-              <a:spcBef>
-                <a:spcPts val="500"/>
-              </a:spcBef>
-              <a:buFont typeface="Arial" panose="020B0604020202020204" pitchFamily="34" charset="0"/>
-              <a:buNone/>
-              <a:defRPr sz="1600" kern="1200">
-                <a:solidFill>
-                  <a:schemeClr val="tx1"/>
-                </a:solidFill>
-                <a:latin typeface="+mn-lt"/>
-                <a:ea typeface="+mn-ea"/>
-                <a:cs typeface="+mn-cs"/>
-              </a:defRPr>
-            </a:lvl8pPr>
-            <a:lvl9pPr marL="3657600" indent="0" algn="ctr" defTabSz="914400" rtl="0" eaLnBrk="1" latinLnBrk="0" hangingPunct="1">
-              <a:lnSpc>
-                <a:spcPct val="90000"/>
-              </a:lnSpc>
-              <a:spcBef>
-                <a:spcPts val="500"/>
-              </a:spcBef>
-              <a:buFont typeface="Arial" panose="020B0604020202020204" pitchFamily="34" charset="0"/>
-              <a:buNone/>
-              <a:defRPr sz="1600" kern="1200">
-                <a:solidFill>
-                  <a:schemeClr val="tx1"/>
-                </a:solidFill>
-                <a:latin typeface="+mn-lt"/>
-                <a:ea typeface="+mn-ea"/>
-                <a:cs typeface="+mn-cs"/>
-              </a:defRPr>
-            </a:lvl9pPr>
-          </a:lstStyle>
-          <a:p>
-            <a:pPr algn="just"/>
-            <a:r>
-              <a:rPr lang="es-MX" sz="1200" b="1" dirty="0"/>
-              <a:t>¿Qué queda por hacer?</a:t>
-            </a:r>
-          </a:p>
-          <a:p>
-            <a:pPr algn="just"/>
-            <a:r>
-              <a:rPr lang="es-MX" sz="1200" dirty="0"/>
-              <a:t>5. Aplicar modelos de machine </a:t>
-            </a:r>
-            <a:r>
-              <a:rPr lang="es-MX" sz="1200" dirty="0" err="1"/>
-              <a:t>learning</a:t>
-            </a:r>
-            <a:r>
-              <a:rPr lang="es-MX" sz="1200" dirty="0"/>
-              <a:t>: </a:t>
-            </a:r>
-            <a:r>
-              <a:rPr lang="es-MX" sz="1200" dirty="0" err="1"/>
-              <a:t>XGBoost</a:t>
-            </a:r>
-            <a:r>
-              <a:rPr lang="es-MX" sz="1200" dirty="0"/>
-              <a:t>, redes neuronales (LSTM)</a:t>
-            </a:r>
-          </a:p>
-          <a:p>
-            <a:pPr algn="just"/>
-            <a:r>
-              <a:rPr lang="es-MX" sz="1200" dirty="0"/>
-              <a:t>6. Comparar modelos y seleccionar mejor</a:t>
-            </a:r>
-          </a:p>
-          <a:p>
-            <a:pPr algn="just"/>
-            <a:r>
-              <a:rPr lang="es-MX" sz="1200" dirty="0"/>
-              <a:t>7. Redacción del documento</a:t>
-            </a:r>
-          </a:p>
-          <a:p>
-            <a:pPr algn="just"/>
-            <a:r>
-              <a:rPr lang="es-MX" sz="1200" dirty="0"/>
-              <a:t>8. Presentación y sustentación</a:t>
-            </a:r>
-          </a:p>
-        </p:txBody>
-      </p:sp>
+      </p:pic>
+      <p:pic>
+        <p:nvPicPr>
+          <p:cNvPr id="8" name="Imagen 7">
+            <a:extLst>
+              <a:ext uri="{FF2B5EF4-FFF2-40B4-BE49-F238E27FC236}">
+                <a16:creationId xmlns:a16="http://schemas.microsoft.com/office/drawing/2014/main" id="{224333C7-9340-8C8C-AFBD-2DA95A325136}"/>
+              </a:ext>
+            </a:extLst>
+          </p:cNvPr>
+          <p:cNvPicPr>
+            <a:picLocks noChangeAspect="1"/>
+          </p:cNvPicPr>
+          <p:nvPr/>
+        </p:nvPicPr>
+        <p:blipFill>
+          <a:blip r:embed="rId4"/>
+          <a:stretch>
+            <a:fillRect/>
+          </a:stretch>
+        </p:blipFill>
+        <p:spPr>
+          <a:xfrm>
+            <a:off x="389752" y="3682926"/>
+            <a:ext cx="5560817" cy="1882280"/>
+          </a:xfrm>
+          <a:prstGeom prst="rect">
+            <a:avLst/>
+          </a:prstGeom>
+        </p:spPr>
+      </p:pic>
+      <p:pic>
+        <p:nvPicPr>
+          <p:cNvPr id="11" name="Imagen 10">
+            <a:extLst>
+              <a:ext uri="{FF2B5EF4-FFF2-40B4-BE49-F238E27FC236}">
+                <a16:creationId xmlns:a16="http://schemas.microsoft.com/office/drawing/2014/main" id="{63D2AFE4-C934-A4ED-F14F-DF565C95B087}"/>
+              </a:ext>
+            </a:extLst>
+          </p:cNvPr>
+          <p:cNvPicPr>
+            <a:picLocks noChangeAspect="1"/>
+          </p:cNvPicPr>
+          <p:nvPr/>
+        </p:nvPicPr>
+        <p:blipFill>
+          <a:blip r:embed="rId5"/>
+          <a:stretch>
+            <a:fillRect/>
+          </a:stretch>
+        </p:blipFill>
+        <p:spPr>
+          <a:xfrm>
+            <a:off x="6089922" y="1696097"/>
+            <a:ext cx="5463451" cy="1828951"/>
+          </a:xfrm>
+          <a:prstGeom prst="rect">
+            <a:avLst/>
+          </a:prstGeom>
+        </p:spPr>
+      </p:pic>
+      <p:pic>
+        <p:nvPicPr>
+          <p:cNvPr id="13" name="Imagen 12">
+            <a:extLst>
+              <a:ext uri="{FF2B5EF4-FFF2-40B4-BE49-F238E27FC236}">
+                <a16:creationId xmlns:a16="http://schemas.microsoft.com/office/drawing/2014/main" id="{50050EAC-4239-3740-F684-7A3F1D30C0E8}"/>
+              </a:ext>
+            </a:extLst>
+          </p:cNvPr>
+          <p:cNvPicPr>
+            <a:picLocks noChangeAspect="1"/>
+          </p:cNvPicPr>
+          <p:nvPr/>
+        </p:nvPicPr>
+        <p:blipFill>
+          <a:blip r:embed="rId6"/>
+          <a:stretch>
+            <a:fillRect/>
+          </a:stretch>
+        </p:blipFill>
+        <p:spPr>
+          <a:xfrm>
+            <a:off x="6096000" y="3682926"/>
+            <a:ext cx="5451293" cy="1824883"/>
+          </a:xfrm>
+          <a:prstGeom prst="rect">
+            <a:avLst/>
+          </a:prstGeom>
+        </p:spPr>
+      </p:pic>
     </p:spTree>
     <p:extLst>
       <p:ext uri="{BB962C8B-B14F-4D97-AF65-F5344CB8AC3E}">
-        <p14:creationId xmlns:p14="http://schemas.microsoft.com/office/powerpoint/2010/main" val="3125701131"/>
+        <p14:creationId xmlns:p14="http://schemas.microsoft.com/office/powerpoint/2010/main" val="2294619585"/>
       </p:ext>
     </p:extLst>
   </p:cSld>
@@ -5367,7 +6256,7 @@
         <p:cNvPr id="1" name="">
           <a:extLst>
             <a:ext uri="{FF2B5EF4-FFF2-40B4-BE49-F238E27FC236}">
-              <a16:creationId xmlns:a16="http://schemas.microsoft.com/office/drawing/2014/main" id="{027336BB-4FCF-D5C2-BE8F-AA37FCB8B6B6}"/>
+              <a16:creationId xmlns:a16="http://schemas.microsoft.com/office/drawing/2014/main" id="{C8ED23B7-202E-2FEC-9E85-7303AF3BCEA1}"/>
             </a:ext>
           </a:extLst>
         </p:cNvPr>
@@ -5387,7 +6276,7 @@
           <p:cNvPr id="3" name="Subtítulo 2">
             <a:extLst>
               <a:ext uri="{FF2B5EF4-FFF2-40B4-BE49-F238E27FC236}">
-                <a16:creationId xmlns:a16="http://schemas.microsoft.com/office/drawing/2014/main" id="{E0612DCE-1DEF-6D31-048A-4DA1989D8825}"/>
+                <a16:creationId xmlns:a16="http://schemas.microsoft.com/office/drawing/2014/main" id="{6B3DF7AE-265B-2314-CABD-7E650040C2CE}"/>
               </a:ext>
             </a:extLst>
           </p:cNvPr>
@@ -5400,8 +6289,8 @@
         </p:nvSpPr>
         <p:spPr>
           <a:xfrm>
-            <a:off x="556591" y="1991137"/>
-            <a:ext cx="5340626" cy="3289854"/>
+            <a:off x="934278" y="1991137"/>
+            <a:ext cx="6367670" cy="1437863"/>
           </a:xfrm>
         </p:spPr>
         <p:txBody>
@@ -5412,109 +6301,56 @@
           <a:p>
             <a:pPr algn="just"/>
             <a:r>
-              <a:rPr lang="es-MX" sz="1200" b="1" dirty="0"/>
-              <a:t>SARIMA</a:t>
-            </a:r>
-          </a:p>
-          <a:p>
-            <a:pPr algn="just"/>
-            <a:r>
-              <a:rPr lang="es-MX" sz="1200" dirty="0"/>
-              <a:t>Un modelo SARIMA (</a:t>
-            </a:r>
-            <a:r>
-              <a:rPr lang="es-MX" sz="1200" dirty="0" err="1"/>
-              <a:t>Seasonal</a:t>
-            </a:r>
-            <a:r>
-              <a:rPr lang="es-MX" sz="1200" dirty="0"/>
-              <a:t> </a:t>
-            </a:r>
-            <a:r>
-              <a:rPr lang="es-MX" sz="1200" dirty="0" err="1"/>
-              <a:t>AutoRegressive</a:t>
-            </a:r>
-            <a:r>
-              <a:rPr lang="es-MX" sz="1200" dirty="0"/>
-              <a:t> </a:t>
-            </a:r>
-            <a:r>
-              <a:rPr lang="es-MX" sz="1200" dirty="0" err="1"/>
-              <a:t>Integrated</a:t>
-            </a:r>
-            <a:r>
-              <a:rPr lang="es-MX" sz="1200" dirty="0"/>
-              <a:t> </a:t>
-            </a:r>
-            <a:r>
-              <a:rPr lang="es-MX" sz="1200" dirty="0" err="1"/>
-              <a:t>Moving</a:t>
-            </a:r>
-            <a:r>
-              <a:rPr lang="es-MX" sz="1200" dirty="0"/>
-              <a:t> </a:t>
-            </a:r>
-            <a:r>
-              <a:rPr lang="es-MX" sz="1200" dirty="0" err="1"/>
-              <a:t>Average</a:t>
-            </a:r>
-            <a:r>
-              <a:rPr lang="es-MX" sz="1200" dirty="0"/>
-              <a:t>) es una extensión del modelo ARIMA que incorpora términos </a:t>
-            </a:r>
-            <a:r>
-              <a:rPr lang="es-MX" sz="1200" b="1" dirty="0"/>
-              <a:t>estacionales</a:t>
-            </a:r>
-            <a:r>
-              <a:rPr lang="es-MX" sz="1200" dirty="0"/>
-              <a:t> para capturar patrones periódicos en series temporales con componentes tanto no estacionales como estacionales. </a:t>
-            </a:r>
-          </a:p>
-          <a:p>
-            <a:pPr algn="just"/>
-            <a:r>
-              <a:rPr lang="es-MX" sz="1200" dirty="0"/>
-              <a:t>Este modelo utiliza como </a:t>
-            </a:r>
-            <a:r>
-              <a:rPr lang="es-MX" sz="1200" b="1" dirty="0"/>
-              <a:t>inputs</a:t>
-            </a:r>
-            <a:r>
-              <a:rPr lang="es-MX" sz="1200" dirty="0"/>
-              <a:t> una serie temporal, los órdenes de </a:t>
-            </a:r>
-            <a:r>
-              <a:rPr lang="es-MX" sz="1200" dirty="0" err="1"/>
-              <a:t>autorregresión</a:t>
-            </a:r>
-            <a:r>
-              <a:rPr lang="es-MX" sz="1200" dirty="0"/>
-              <a:t> (p) y media móvil (q) no estacionales, junto con la diferencia no estacional (d), y sus correspondientes órdenes estacionales (P, D, Q) y el periodo estacional (s). El </a:t>
-            </a:r>
-            <a:r>
-              <a:rPr lang="es-MX" sz="1200" b="1" dirty="0"/>
-              <a:t>output</a:t>
-            </a:r>
-            <a:r>
-              <a:rPr lang="es-MX" sz="1200" dirty="0"/>
-              <a:t> principal es una predicción o pronóstico de futuros valores de la serie considerando tanto su tendencia como su estacionalidad. </a:t>
-            </a:r>
-          </a:p>
-          <a:p>
-            <a:pPr algn="just"/>
-            <a:r>
-              <a:rPr lang="es-MX" sz="1200" dirty="0"/>
-              <a:t>Entre sus limitaciones están la complejidad para elegir parámetros adecuados, la necesidad de que la serie sea </a:t>
-            </a:r>
-            <a:r>
-              <a:rPr lang="es-MX" sz="1200" b="1" dirty="0"/>
-              <a:t>estacionaria</a:t>
-            </a:r>
-            <a:r>
-              <a:rPr lang="es-MX" sz="1200" dirty="0"/>
-              <a:t> (lo que puede requerir transformaciones) y que solo modela una única estacionalidad, por lo que no es adecuado para series con múltiples ciclos estacionales simultáneos.</a:t>
+              <a:rPr lang="es-MX" sz="1400" b="1" dirty="0"/>
+              <a:t>¿Qué se ha hecho?</a:t>
+            </a:r>
+          </a:p>
+          <a:p>
+            <a:pPr marL="228600" indent="-228600" algn="just">
+              <a:buFont typeface="+mj-lt"/>
+              <a:buAutoNum type="arabicPeriod"/>
+            </a:pPr>
+            <a:r>
+              <a:rPr lang="es-MX" sz="1400" dirty="0"/>
+              <a:t>Entender el contexto</a:t>
+            </a:r>
+          </a:p>
+          <a:p>
+            <a:pPr marL="228600" indent="-228600" algn="just">
+              <a:buFont typeface="+mj-lt"/>
+              <a:buAutoNum type="arabicPeriod"/>
+            </a:pPr>
+            <a:r>
+              <a:rPr lang="es-MX" sz="1400" dirty="0"/>
+              <a:t>Identificar variables a usar</a:t>
+            </a:r>
+          </a:p>
+          <a:p>
+            <a:pPr marL="228600" indent="-228600" algn="just">
+              <a:buFont typeface="+mj-lt"/>
+              <a:buAutoNum type="arabicPeriod"/>
+            </a:pPr>
+            <a:r>
+              <a:rPr lang="es-MX" sz="1400" dirty="0"/>
+              <a:t>Aplicar modelos </a:t>
+            </a:r>
+            <a:r>
+              <a:rPr lang="es-MX" sz="1400" dirty="0" err="1"/>
+              <a:t>univariados</a:t>
+            </a:r>
+            <a:r>
+              <a:rPr lang="es-MX" sz="1400" dirty="0"/>
+              <a:t>: SARIMA</a:t>
+            </a:r>
+          </a:p>
+          <a:p>
+            <a:pPr marL="228600" indent="-228600" algn="just">
+              <a:buFont typeface="+mj-lt"/>
+              <a:buAutoNum type="arabicPeriod"/>
+            </a:pPr>
+            <a:r>
+              <a:rPr lang="es-MX" sz="1400" dirty="0"/>
+              <a:t>Aplicar modelos multivariados: SARIMAX y VAR</a:t>
             </a:r>
           </a:p>
         </p:txBody>
@@ -5524,7 +6360,7 @@
           <p:cNvPr id="4" name="Rectángulo 3">
             <a:extLst>
               <a:ext uri="{FF2B5EF4-FFF2-40B4-BE49-F238E27FC236}">
-                <a16:creationId xmlns:a16="http://schemas.microsoft.com/office/drawing/2014/main" id="{4F133945-BCD6-14E9-AEDE-0113D1BD5EF2}"/>
+                <a16:creationId xmlns:a16="http://schemas.microsoft.com/office/drawing/2014/main" id="{78F6C11A-F841-BC13-455B-29DB63B0C8CD}"/>
               </a:ext>
             </a:extLst>
           </p:cNvPr>
@@ -5579,7 +6415,7 @@
           <p:cNvPr id="1026" name="Picture 2" descr="Carreras y oferta Académica de Pregrado | Uniandes">
             <a:extLst>
               <a:ext uri="{FF2B5EF4-FFF2-40B4-BE49-F238E27FC236}">
-                <a16:creationId xmlns:a16="http://schemas.microsoft.com/office/drawing/2014/main" id="{C02A295A-9B10-00E4-055B-2B5D02D1A724}"/>
+                <a16:creationId xmlns:a16="http://schemas.microsoft.com/office/drawing/2014/main" id="{AE8BF2D9-B6E7-A219-DEED-E25DE97FDD0D}"/>
               </a:ext>
             </a:extLst>
           </p:cNvPr>
@@ -5626,7 +6462,7 @@
           <p:cNvPr id="5" name="CuadroTexto 4">
             <a:extLst>
               <a:ext uri="{FF2B5EF4-FFF2-40B4-BE49-F238E27FC236}">
-                <a16:creationId xmlns:a16="http://schemas.microsoft.com/office/drawing/2014/main" id="{F76BFD8D-AABD-D78B-50C4-D0437D323616}"/>
+                <a16:creationId xmlns:a16="http://schemas.microsoft.com/office/drawing/2014/main" id="{166906E4-603F-7D08-698E-FCC235F56BE9}"/>
               </a:ext>
             </a:extLst>
           </p:cNvPr>
@@ -5651,47 +6487,17 @@
           <a:p>
             <a:r>
               <a:rPr lang="es-CO" b="1" dirty="0"/>
-              <a:t>Resultados</a:t>
-            </a:r>
-          </a:p>
-        </p:txBody>
-      </p:sp>
-      <p:pic>
-        <p:nvPicPr>
-          <p:cNvPr id="7" name="Imagen 6">
-            <a:extLst>
-              <a:ext uri="{FF2B5EF4-FFF2-40B4-BE49-F238E27FC236}">
-                <a16:creationId xmlns:a16="http://schemas.microsoft.com/office/drawing/2014/main" id="{92B8253B-EFEA-9B5F-727B-2B615C7C9478}"/>
-              </a:ext>
-            </a:extLst>
-          </p:cNvPr>
-          <p:cNvPicPr>
-            <a:picLocks noChangeAspect="1"/>
-          </p:cNvPicPr>
-          <p:nvPr/>
-        </p:nvPicPr>
-        <p:blipFill>
-          <a:blip r:embed="rId3"/>
-          <a:stretch>
-            <a:fillRect/>
-          </a:stretch>
-        </p:blipFill>
-        <p:spPr>
-          <a:xfrm>
-            <a:off x="6294785" y="1712021"/>
-            <a:ext cx="5439189" cy="3433958"/>
-          </a:xfrm>
-          <a:prstGeom prst="rect">
-            <a:avLst/>
-          </a:prstGeom>
-        </p:spPr>
-      </p:pic>
-      <p:sp>
-        <p:nvSpPr>
-          <p:cNvPr id="8" name="Subtítulo 2">
-            <a:extLst>
-              <a:ext uri="{FF2B5EF4-FFF2-40B4-BE49-F238E27FC236}">
-                <a16:creationId xmlns:a16="http://schemas.microsoft.com/office/drawing/2014/main" id="{135E7A1F-3A09-77D9-B01C-DA13E43B2176}"/>
+              <a:t>Metodología</a:t>
+            </a:r>
+          </a:p>
+        </p:txBody>
+      </p:sp>
+      <p:sp>
+        <p:nvSpPr>
+          <p:cNvPr id="2" name="Subtítulo 2">
+            <a:extLst>
+              <a:ext uri="{FF2B5EF4-FFF2-40B4-BE49-F238E27FC236}">
+                <a16:creationId xmlns:a16="http://schemas.microsoft.com/office/drawing/2014/main" id="{B6A5D0FF-1723-D124-523D-E88FA436823A}"/>
               </a:ext>
             </a:extLst>
           </p:cNvPr>
@@ -5702,8 +6508,8 @@
         </p:nvSpPr>
         <p:spPr>
           <a:xfrm>
-            <a:off x="7752522" y="5145979"/>
-            <a:ext cx="3061252" cy="1292086"/>
+            <a:off x="934278" y="3892823"/>
+            <a:ext cx="6367670" cy="1437863"/>
           </a:xfrm>
           <a:prstGeom prst="rect">
             <a:avLst/>
@@ -5878,94 +6684,108 @@
             </a:lvl9pPr>
           </a:lstStyle>
           <a:p>
-            <a:pPr>
-              <a:lnSpc>
-                <a:spcPts val="1440"/>
-              </a:lnSpc>
-              <a:spcBef>
-                <a:spcPts val="600"/>
-              </a:spcBef>
-            </a:pPr>
-            <a:r>
-              <a:rPr lang="es-MX" sz="1000" b="1" dirty="0"/>
-              <a:t>Orden no estacional: </a:t>
-            </a:r>
-            <a:r>
-              <a:rPr lang="es-MX" sz="1000" dirty="0"/>
-              <a:t>(0, 0, 0)</a:t>
-            </a:r>
-          </a:p>
-          <a:p>
-            <a:pPr>
-              <a:lnSpc>
-                <a:spcPts val="1440"/>
-              </a:lnSpc>
-              <a:spcBef>
-                <a:spcPts val="600"/>
-              </a:spcBef>
-            </a:pPr>
-            <a:r>
-              <a:rPr lang="es-MX" sz="1000" b="1" dirty="0"/>
-              <a:t>Orden estacional: </a:t>
-            </a:r>
-            <a:r>
-              <a:rPr lang="es-MX" sz="1000" dirty="0"/>
-              <a:t>(0, 1, 1, 52)</a:t>
-            </a:r>
-            <a:endParaRPr lang="es-MX" sz="1000" b="1" dirty="0"/>
-          </a:p>
-          <a:p>
-            <a:pPr>
-              <a:lnSpc>
-                <a:spcPts val="1440"/>
-              </a:lnSpc>
-              <a:spcBef>
-                <a:spcPts val="600"/>
-              </a:spcBef>
-            </a:pPr>
-            <a:r>
-              <a:rPr lang="es-MX" sz="1000" b="1" dirty="0"/>
-              <a:t>AIC:</a:t>
-            </a:r>
-            <a:r>
-              <a:rPr lang="es-MX" sz="1000" dirty="0"/>
-              <a:t> 4</a:t>
-            </a:r>
-          </a:p>
-          <a:p>
-            <a:pPr>
-              <a:lnSpc>
-                <a:spcPts val="1440"/>
-              </a:lnSpc>
-              <a:spcBef>
-                <a:spcPts val="600"/>
-              </a:spcBef>
-            </a:pPr>
-            <a:r>
-              <a:rPr lang="es-MX" sz="1000" b="1" dirty="0"/>
-              <a:t>MAE: </a:t>
-            </a:r>
-            <a:r>
-              <a:rPr lang="es-MX" sz="1000" dirty="0"/>
-              <a:t>3958.71</a:t>
-            </a:r>
-          </a:p>
-          <a:p>
-            <a:pPr>
-              <a:lnSpc>
-                <a:spcPts val="1440"/>
-              </a:lnSpc>
-              <a:spcBef>
-                <a:spcPts val="600"/>
-              </a:spcBef>
-            </a:pPr>
-            <a:r>
-              <a:rPr lang="es-MX" sz="1000" b="1" dirty="0"/>
-              <a:t>RMSE: </a:t>
-            </a:r>
-            <a:r>
-              <a:rPr lang="es-MX" sz="1000" dirty="0"/>
-              <a:t>4541.91</a:t>
+            <a:pPr algn="just"/>
+            <a:r>
+              <a:rPr lang="es-MX" sz="1400" b="1" dirty="0">
+                <a:solidFill>
+                  <a:schemeClr val="bg1">
+                    <a:lumMod val="95000"/>
+                  </a:schemeClr>
+                </a:solidFill>
+              </a:rPr>
+              <a:t>¿Qué queda por hacer?</a:t>
+            </a:r>
+          </a:p>
+          <a:p>
+            <a:pPr algn="just"/>
+            <a:r>
+              <a:rPr lang="es-MX" sz="1400" dirty="0">
+                <a:solidFill>
+                  <a:schemeClr val="bg1">
+                    <a:lumMod val="95000"/>
+                  </a:schemeClr>
+                </a:solidFill>
+              </a:rPr>
+              <a:t>5. Aplicar modelos de machine </a:t>
+            </a:r>
+            <a:r>
+              <a:rPr lang="es-MX" sz="1400" dirty="0" err="1">
+                <a:solidFill>
+                  <a:schemeClr val="bg1">
+                    <a:lumMod val="95000"/>
+                  </a:schemeClr>
+                </a:solidFill>
+              </a:rPr>
+              <a:t>learning</a:t>
+            </a:r>
+            <a:r>
+              <a:rPr lang="es-MX" sz="1400" dirty="0">
+                <a:solidFill>
+                  <a:schemeClr val="bg1">
+                    <a:lumMod val="95000"/>
+                  </a:schemeClr>
+                </a:solidFill>
+              </a:rPr>
+              <a:t>: </a:t>
+            </a:r>
+            <a:r>
+              <a:rPr lang="es-MX" sz="1400" dirty="0" err="1">
+                <a:solidFill>
+                  <a:schemeClr val="bg1">
+                    <a:lumMod val="95000"/>
+                  </a:schemeClr>
+                </a:solidFill>
+              </a:rPr>
+              <a:t>XGBoost</a:t>
+            </a:r>
+            <a:r>
+              <a:rPr lang="es-MX" sz="1400" dirty="0">
+                <a:solidFill>
+                  <a:schemeClr val="bg1">
+                    <a:lumMod val="95000"/>
+                  </a:schemeClr>
+                </a:solidFill>
+              </a:rPr>
+              <a:t>, redes neuronales (LSTM)</a:t>
+            </a:r>
+          </a:p>
+          <a:p>
+            <a:pPr algn="just"/>
+            <a:r>
+              <a:rPr lang="es-MX" sz="1400" dirty="0">
+                <a:solidFill>
+                  <a:schemeClr val="bg1">
+                    <a:lumMod val="95000"/>
+                  </a:schemeClr>
+                </a:solidFill>
+              </a:rPr>
+              <a:t>6. Comparar modelos y seleccionar mejor</a:t>
+            </a:r>
+          </a:p>
+          <a:p>
+            <a:pPr algn="just"/>
+            <a:r>
+              <a:rPr lang="es-MX" sz="1400" dirty="0">
+                <a:solidFill>
+                  <a:schemeClr val="bg1">
+                    <a:lumMod val="95000"/>
+                  </a:schemeClr>
+                </a:solidFill>
+              </a:rPr>
+              <a:t>7. Redacción del documento</a:t>
+            </a:r>
+          </a:p>
+          <a:p>
+            <a:pPr algn="just"/>
+            <a:r>
+              <a:rPr lang="es-MX" sz="1400" dirty="0">
+                <a:solidFill>
+                  <a:schemeClr val="bg1">
+                    <a:lumMod val="95000"/>
+                  </a:schemeClr>
+                </a:solidFill>
+              </a:rPr>
+              <a:t>8. Presentación y sustentación</a:t>
             </a:r>
           </a:p>
         </p:txBody>
@@ -5973,7 +6793,7 @@
     </p:spTree>
     <p:extLst>
       <p:ext uri="{BB962C8B-B14F-4D97-AF65-F5344CB8AC3E}">
-        <p14:creationId xmlns:p14="http://schemas.microsoft.com/office/powerpoint/2010/main" val="1808529488"/>
+        <p14:creationId xmlns:p14="http://schemas.microsoft.com/office/powerpoint/2010/main" val="3125701131"/>
       </p:ext>
     </p:extLst>
   </p:cSld>
@@ -5991,7 +6811,7 @@
         <p:cNvPr id="1" name="">
           <a:extLst>
             <a:ext uri="{FF2B5EF4-FFF2-40B4-BE49-F238E27FC236}">
-              <a16:creationId xmlns:a16="http://schemas.microsoft.com/office/drawing/2014/main" id="{07AC5BAB-B01E-1969-A6C1-A5D5842C13F4}"/>
+              <a16:creationId xmlns:a16="http://schemas.microsoft.com/office/drawing/2014/main" id="{027336BB-4FCF-D5C2-BE8F-AA37FCB8B6B6}"/>
             </a:ext>
           </a:extLst>
         </p:cNvPr>
@@ -6011,7 +6831,7 @@
           <p:cNvPr id="3" name="Subtítulo 2">
             <a:extLst>
               <a:ext uri="{FF2B5EF4-FFF2-40B4-BE49-F238E27FC236}">
-                <a16:creationId xmlns:a16="http://schemas.microsoft.com/office/drawing/2014/main" id="{19EBB4F4-5822-F8CA-39F5-0439B9882C53}"/>
+                <a16:creationId xmlns:a16="http://schemas.microsoft.com/office/drawing/2014/main" id="{E0612DCE-1DEF-6D31-048A-4DA1989D8825}"/>
               </a:ext>
             </a:extLst>
           </p:cNvPr>
@@ -6024,8 +6844,8 @@
         </p:nvSpPr>
         <p:spPr>
           <a:xfrm>
-            <a:off x="556591" y="1991137"/>
-            <a:ext cx="5340626" cy="3289854"/>
+            <a:off x="1040297" y="1991137"/>
+            <a:ext cx="4856920" cy="3289854"/>
           </a:xfrm>
         </p:spPr>
         <p:txBody>
@@ -6034,127 +6854,74 @@
           </a:bodyPr>
           <a:lstStyle/>
           <a:p>
+            <a:pPr algn="just">
+              <a:spcBef>
+                <a:spcPts val="0"/>
+              </a:spcBef>
+            </a:pPr>
+            <a:r>
+              <a:rPr lang="es-MX" sz="1200" b="1" dirty="0"/>
+              <a:t>SARIMA</a:t>
+            </a:r>
+          </a:p>
+          <a:p>
+            <a:pPr algn="just">
+              <a:spcBef>
+                <a:spcPts val="0"/>
+              </a:spcBef>
+            </a:pPr>
+            <a:r>
+              <a:rPr lang="en-US" sz="1000" dirty="0"/>
+              <a:t>(Seasonal </a:t>
+            </a:r>
+            <a:r>
+              <a:rPr lang="en-US" sz="1000" dirty="0" err="1"/>
+              <a:t>AutoRegressive</a:t>
+            </a:r>
+            <a:r>
+              <a:rPr lang="en-US" sz="1000" dirty="0"/>
+              <a:t> Integrated Moving Average)</a:t>
+            </a:r>
+            <a:endParaRPr lang="es-MX" sz="1000" dirty="0"/>
+          </a:p>
+          <a:p>
             <a:pPr algn="just"/>
             <a:r>
+              <a:rPr lang="es-MX" sz="1200" dirty="0"/>
+              <a:t>Extensión de ARIMA que incorpora términos estacionales para capturar patrones periódicos.</a:t>
+            </a:r>
+          </a:p>
+          <a:p>
+            <a:pPr algn="just"/>
+            <a:r>
               <a:rPr lang="es-MX" sz="1200" b="1" dirty="0"/>
-              <a:t>SARIMAX</a:t>
+              <a:t>Inputs: </a:t>
+            </a:r>
+            <a:r>
+              <a:rPr lang="es-MX" sz="1200" dirty="0"/>
+              <a:t>serie temporal, órdenes no estacionales (p, d, q) y órdenes estacionales (P, D, Q, s).</a:t>
             </a:r>
           </a:p>
           <a:p>
             <a:pPr algn="just"/>
             <a:r>
+              <a:rPr lang="es-MX" sz="1200" b="1" dirty="0"/>
+              <a:t>Output: </a:t>
+            </a:r>
+            <a:r>
               <a:rPr lang="es-MX" sz="1200" dirty="0"/>
-              <a:t>Un modelo SARIMAX (</a:t>
-            </a:r>
-            <a:r>
-              <a:rPr lang="es-MX" sz="1200" dirty="0" err="1"/>
-              <a:t>Seasonal</a:t>
+              <a:t>predicción de valores futuros considerando tendencia y estacionalidad.</a:t>
+            </a:r>
+          </a:p>
+          <a:p>
+            <a:pPr algn="just"/>
+            <a:r>
+              <a:rPr lang="es-MX" sz="1200" b="1" dirty="0"/>
+              <a:t>Limitaciones: </a:t>
             </a:r>
             <a:r>
               <a:rPr lang="es-MX" sz="1200" dirty="0"/>
-              <a:t> </a:t>
-            </a:r>
-            <a:r>
-              <a:rPr lang="es-MX" sz="1200" dirty="0" err="1"/>
-              <a:t>AutoRegressive</a:t>
-            </a:r>
-            <a:r>
-              <a:rPr lang="es-MX" sz="1200" dirty="0"/>
-              <a:t> </a:t>
-            </a:r>
-            <a:r>
-              <a:rPr lang="es-MX" sz="1200" dirty="0" err="1"/>
-              <a:t>Integrated</a:t>
-            </a:r>
-            <a:r>
-              <a:rPr lang="es-MX" sz="1200" dirty="0"/>
-              <a:t> </a:t>
-            </a:r>
-            <a:r>
-              <a:rPr lang="es-MX" sz="1200" dirty="0" err="1"/>
-              <a:t>Moving</a:t>
-            </a:r>
-            <a:r>
-              <a:rPr lang="es-MX" sz="1200" dirty="0"/>
-              <a:t> </a:t>
-            </a:r>
-            <a:r>
-              <a:rPr lang="es-MX" sz="1200" dirty="0" err="1"/>
-              <a:t>Average</a:t>
-            </a:r>
-            <a:r>
-              <a:rPr lang="es-MX" sz="1200" dirty="0"/>
-              <a:t> </a:t>
-            </a:r>
-            <a:r>
-              <a:rPr lang="es-MX" sz="1200" dirty="0" err="1"/>
-              <a:t>with</a:t>
-            </a:r>
-            <a:r>
-              <a:rPr lang="es-MX" sz="1200" dirty="0"/>
-              <a:t> </a:t>
-            </a:r>
-            <a:r>
-              <a:rPr lang="es-MX" sz="1200" dirty="0" err="1"/>
-              <a:t>eXogenous</a:t>
-            </a:r>
-            <a:r>
-              <a:rPr lang="es-MX" sz="1200" dirty="0"/>
-              <a:t> </a:t>
-            </a:r>
-            <a:r>
-              <a:rPr lang="es-MX" sz="1200" dirty="0" err="1"/>
-              <a:t>regressors</a:t>
-            </a:r>
-            <a:r>
-              <a:rPr lang="es-MX" sz="1200" dirty="0"/>
-              <a:t>) es una extensión del modelo ARIMA que incorpora patrones </a:t>
-            </a:r>
-            <a:r>
-              <a:rPr lang="es-MX" sz="1200" b="1" dirty="0"/>
-              <a:t>estacionales</a:t>
-            </a:r>
-            <a:r>
-              <a:rPr lang="es-MX" sz="1200" dirty="0"/>
-              <a:t> y </a:t>
-            </a:r>
-            <a:r>
-              <a:rPr lang="es-MX" sz="1200" b="1" dirty="0"/>
-              <a:t>variables exógenas</a:t>
-            </a:r>
-            <a:r>
-              <a:rPr lang="es-MX" sz="1200" dirty="0"/>
-              <a:t>, permitiendo capturar y pronosticar tendencias, estacionalidad y efectos de factores externos en series temporales. </a:t>
-            </a:r>
-          </a:p>
-          <a:p>
-            <a:pPr algn="just"/>
-            <a:r>
-              <a:rPr lang="es-MX" sz="1200" dirty="0"/>
-              <a:t>Necesita como </a:t>
-            </a:r>
-            <a:r>
-              <a:rPr lang="es-MX" sz="1200" b="1" dirty="0"/>
-              <a:t>inputs</a:t>
-            </a:r>
-            <a:r>
-              <a:rPr lang="es-MX" sz="1200" dirty="0"/>
-              <a:t> los parámetros del modelo: órdenes autorregresivo (p), de diferenciación (d), de media móvil (q), sus equivalentes estacionales (P, D, Q) y la periodicidad estacional (m), además de la serie temporal y las variables exógenas si las hay. Como </a:t>
-            </a:r>
-            <a:r>
-              <a:rPr lang="es-MX" sz="1200" b="1" dirty="0"/>
-              <a:t>output</a:t>
-            </a:r>
-            <a:r>
-              <a:rPr lang="es-MX" sz="1200" dirty="0"/>
-              <a:t> genera pronósticos o predicciones y una evaluación del ajuste del modelo. </a:t>
-            </a:r>
-          </a:p>
-          <a:p>
-            <a:pPr algn="just"/>
-            <a:r>
-              <a:rPr lang="es-MX" sz="1200" dirty="0"/>
-              <a:t>Sus limitaciones incluyen la necesidad de conocer o predecir las variables exógenas futuras para pronósticos válidos y que puede ser sensible a errores en la especificación de sus parámetros o supuestos de estacionariedad y estacionalidad.</a:t>
+              <a:t>selección compleja de parámetros, necesidad de estacionariedad y solo maneja una estacionalidad.</a:t>
             </a:r>
           </a:p>
         </p:txBody>
@@ -6164,7 +6931,7 @@
           <p:cNvPr id="4" name="Rectángulo 3">
             <a:extLst>
               <a:ext uri="{FF2B5EF4-FFF2-40B4-BE49-F238E27FC236}">
-                <a16:creationId xmlns:a16="http://schemas.microsoft.com/office/drawing/2014/main" id="{42107846-B800-3E06-0086-1877F6137CA3}"/>
+                <a16:creationId xmlns:a16="http://schemas.microsoft.com/office/drawing/2014/main" id="{4F133945-BCD6-14E9-AEDE-0113D1BD5EF2}"/>
               </a:ext>
             </a:extLst>
           </p:cNvPr>
@@ -6219,7 +6986,7 @@
           <p:cNvPr id="1026" name="Picture 2" descr="Carreras y oferta Académica de Pregrado | Uniandes">
             <a:extLst>
               <a:ext uri="{FF2B5EF4-FFF2-40B4-BE49-F238E27FC236}">
-                <a16:creationId xmlns:a16="http://schemas.microsoft.com/office/drawing/2014/main" id="{CA11B9A8-8A4F-D5B9-E681-FCFFC5D30E6D}"/>
+                <a16:creationId xmlns:a16="http://schemas.microsoft.com/office/drawing/2014/main" id="{C02A295A-9B10-00E4-055B-2B5D02D1A724}"/>
               </a:ext>
             </a:extLst>
           </p:cNvPr>
@@ -6266,7 +7033,7 @@
           <p:cNvPr id="5" name="CuadroTexto 4">
             <a:extLst>
               <a:ext uri="{FF2B5EF4-FFF2-40B4-BE49-F238E27FC236}">
-                <a16:creationId xmlns:a16="http://schemas.microsoft.com/office/drawing/2014/main" id="{1CB48B27-906D-6CF1-082F-1C750E0D3D6C}"/>
+                <a16:creationId xmlns:a16="http://schemas.microsoft.com/office/drawing/2014/main" id="{F76BFD8D-AABD-D78B-50C4-D0437D323616}"/>
               </a:ext>
             </a:extLst>
           </p:cNvPr>
@@ -6301,7 +7068,7 @@
           <p:cNvPr id="7" name="Imagen 6">
             <a:extLst>
               <a:ext uri="{FF2B5EF4-FFF2-40B4-BE49-F238E27FC236}">
-                <a16:creationId xmlns:a16="http://schemas.microsoft.com/office/drawing/2014/main" id="{58A2FEFB-2262-1E84-25C1-E48B1423F11F}"/>
+                <a16:creationId xmlns:a16="http://schemas.microsoft.com/office/drawing/2014/main" id="{92B8253B-EFEA-9B5F-727B-2B615C7C9478}"/>
               </a:ext>
             </a:extLst>
           </p:cNvPr>
@@ -6323,8 +7090,8 @@
         </p:blipFill>
         <p:spPr>
           <a:xfrm>
-            <a:off x="6294785" y="1817503"/>
-            <a:ext cx="5439189" cy="3222995"/>
+            <a:off x="6294785" y="1712021"/>
+            <a:ext cx="5439188" cy="3433958"/>
           </a:xfrm>
           <a:prstGeom prst="rect">
             <a:avLst/>
@@ -6336,7 +7103,7 @@
           <p:cNvPr id="8" name="Subtítulo 2">
             <a:extLst>
               <a:ext uri="{FF2B5EF4-FFF2-40B4-BE49-F238E27FC236}">
-                <a16:creationId xmlns:a16="http://schemas.microsoft.com/office/drawing/2014/main" id="{FB1E0EED-EE72-350A-A469-4DEBB29853E7}"/>
+                <a16:creationId xmlns:a16="http://schemas.microsoft.com/office/drawing/2014/main" id="{135E7A1F-3A09-77D9-B01C-DA13E43B2176}"/>
               </a:ext>
             </a:extLst>
           </p:cNvPr>
@@ -6537,7 +7304,7 @@
             </a:r>
             <a:r>
               <a:rPr lang="es-MX" sz="1000" dirty="0"/>
-              <a:t>(0, 0, 0)</a:t>
+              <a:t>(2, 1, 2)</a:t>
             </a:r>
           </a:p>
           <a:p>
@@ -6555,7 +7322,7 @@
             </a:r>
             <a:r>
               <a:rPr lang="es-MX" sz="1000" dirty="0"/>
-              <a:t>(0, 1, 1, 52)</a:t>
+              <a:t>(0, 0, 1, 52)</a:t>
             </a:r>
             <a:endParaRPr lang="es-MX" sz="1000" b="1" dirty="0"/>
           </a:p>
@@ -6574,7 +7341,7 @@
             </a:r>
             <a:r>
               <a:rPr lang="es-MX" sz="1000" dirty="0"/>
-              <a:t> 14</a:t>
+              <a:t> 143.95</a:t>
             </a:r>
           </a:p>
           <a:p>
@@ -6592,7 +7359,7 @@
             </a:r>
             <a:r>
               <a:rPr lang="es-MX" sz="1000" dirty="0"/>
-              <a:t>7479.41</a:t>
+              <a:t>1784.54</a:t>
             </a:r>
           </a:p>
           <a:p>
@@ -6610,7 +7377,7 @@
             </a:r>
             <a:r>
               <a:rPr lang="es-MX" sz="1000" dirty="0"/>
-              <a:t>8006.11</a:t>
+              <a:t>2189.54</a:t>
             </a:r>
           </a:p>
         </p:txBody>
@@ -6618,7 +7385,7 @@
     </p:spTree>
     <p:extLst>
       <p:ext uri="{BB962C8B-B14F-4D97-AF65-F5344CB8AC3E}">
-        <p14:creationId xmlns:p14="http://schemas.microsoft.com/office/powerpoint/2010/main" val="2248330113"/>
+        <p14:creationId xmlns:p14="http://schemas.microsoft.com/office/powerpoint/2010/main" val="1808529488"/>
       </p:ext>
     </p:extLst>
   </p:cSld>
@@ -6636,7 +7403,7 @@
         <p:cNvPr id="1" name="">
           <a:extLst>
             <a:ext uri="{FF2B5EF4-FFF2-40B4-BE49-F238E27FC236}">
-              <a16:creationId xmlns:a16="http://schemas.microsoft.com/office/drawing/2014/main" id="{6664A386-92BA-88B4-5721-A07FCA69627A}"/>
+              <a16:creationId xmlns:a16="http://schemas.microsoft.com/office/drawing/2014/main" id="{07AC5BAB-B01E-1969-A6C1-A5D5842C13F4}"/>
             </a:ext>
           </a:extLst>
         </p:cNvPr>
@@ -6656,7 +7423,7 @@
           <p:cNvPr id="3" name="Subtítulo 2">
             <a:extLst>
               <a:ext uri="{FF2B5EF4-FFF2-40B4-BE49-F238E27FC236}">
-                <a16:creationId xmlns:a16="http://schemas.microsoft.com/office/drawing/2014/main" id="{324BC577-5816-B7D0-08A1-26DDDEEA840A}"/>
+                <a16:creationId xmlns:a16="http://schemas.microsoft.com/office/drawing/2014/main" id="{19EBB4F4-5822-F8CA-39F5-0439B9882C53}"/>
               </a:ext>
             </a:extLst>
           </p:cNvPr>
@@ -6669,8 +7436,8 @@
         </p:nvSpPr>
         <p:spPr>
           <a:xfrm>
-            <a:off x="556591" y="1991137"/>
-            <a:ext cx="5340626" cy="3289854"/>
+            <a:off x="1046921" y="1991137"/>
+            <a:ext cx="4850295" cy="3289854"/>
           </a:xfrm>
         </p:spPr>
         <p:txBody>
@@ -6679,71 +7446,82 @@
           </a:bodyPr>
           <a:lstStyle/>
           <a:p>
+            <a:pPr algn="just">
+              <a:spcBef>
+                <a:spcPts val="0"/>
+              </a:spcBef>
+            </a:pPr>
+            <a:r>
+              <a:rPr lang="es-MX" sz="1200" b="1" dirty="0"/>
+              <a:t>SARIMAX </a:t>
+            </a:r>
+          </a:p>
+          <a:p>
+            <a:pPr algn="just">
+              <a:spcBef>
+                <a:spcPts val="0"/>
+              </a:spcBef>
+            </a:pPr>
+            <a:r>
+              <a:rPr lang="en-US" sz="1000" dirty="0"/>
+              <a:t>(Seasonal </a:t>
+            </a:r>
+            <a:r>
+              <a:rPr lang="en-US" sz="1000" dirty="0" err="1"/>
+              <a:t>AutoRegressive</a:t>
+            </a:r>
+            <a:r>
+              <a:rPr lang="en-US" sz="1000" dirty="0"/>
+              <a:t> Integrated Moving Average with </a:t>
+            </a:r>
+            <a:r>
+              <a:rPr lang="en-US" sz="1000" dirty="0" err="1"/>
+              <a:t>eXogenous</a:t>
+            </a:r>
+            <a:r>
+              <a:rPr lang="en-US" sz="1000" dirty="0"/>
+              <a:t> regressors)</a:t>
+            </a:r>
+            <a:endParaRPr lang="es-MX" sz="1000" dirty="0"/>
+          </a:p>
+          <a:p>
             <a:pPr algn="just"/>
             <a:r>
+              <a:rPr lang="es-MX" sz="1200" dirty="0"/>
+              <a:t>Extensión de ARIMA que incorpora estacionalidad y variables exógenas.</a:t>
+            </a:r>
+          </a:p>
+          <a:p>
+            <a:pPr algn="just"/>
+            <a:r>
               <a:rPr lang="es-MX" sz="1200" b="1" dirty="0"/>
-              <a:t>VAR</a:t>
+              <a:t>Inputs: </a:t>
+            </a:r>
+            <a:r>
+              <a:rPr lang="es-MX" sz="1200" dirty="0"/>
+              <a:t>serie temporal, parámetros (p, d, q), parámetros estacionales (P, D, Q, m) y variables externas.</a:t>
             </a:r>
           </a:p>
           <a:p>
             <a:pPr algn="just"/>
             <a:r>
+              <a:rPr lang="es-MX" sz="1200" b="1" dirty="0"/>
+              <a:t>Output: </a:t>
+            </a:r>
+            <a:r>
               <a:rPr lang="es-MX" sz="1200" dirty="0"/>
-              <a:t>Un modelo VAR (Vector </a:t>
-            </a:r>
-            <a:r>
-              <a:rPr lang="es-MX" sz="1200" dirty="0" err="1"/>
-              <a:t>Autoregresivo</a:t>
+              <a:t>pronósticos considerando tendencia, estacionalidad y factores externos.</a:t>
+            </a:r>
+          </a:p>
+          <a:p>
+            <a:pPr algn="just"/>
+            <a:r>
+              <a:rPr lang="es-MX" sz="1200" b="1" dirty="0"/>
+              <a:t>Limitaciones: </a:t>
             </a:r>
             <a:r>
               <a:rPr lang="es-MX" sz="1200" dirty="0"/>
-              <a:t>) es un sistema de ecuaciones simultáneas que modela la dinámica temporal entre </a:t>
-            </a:r>
-            <a:r>
-              <a:rPr lang="es-MX" sz="1200" b="1" dirty="0"/>
-              <a:t>múltiples variables endógenas</a:t>
-            </a:r>
-            <a:r>
-              <a:rPr lang="es-MX" sz="1200" dirty="0"/>
-              <a:t>, usando retardos (</a:t>
-            </a:r>
-            <a:r>
-              <a:rPr lang="es-MX" sz="1200" dirty="0" err="1"/>
-              <a:t>lags</a:t>
-            </a:r>
-            <a:r>
-              <a:rPr lang="es-MX" sz="1200" dirty="0"/>
-              <a:t>) de todas las variables para explicar su comportamiento conjunto. </a:t>
-            </a:r>
-          </a:p>
-          <a:p>
-            <a:pPr algn="just"/>
-            <a:r>
-              <a:rPr lang="es-MX" sz="1200" dirty="0"/>
-              <a:t>Los </a:t>
-            </a:r>
-            <a:r>
-              <a:rPr lang="es-MX" sz="1200" b="1" dirty="0"/>
-              <a:t>inputs</a:t>
-            </a:r>
-            <a:r>
-              <a:rPr lang="es-MX" sz="1200" dirty="0"/>
-              <a:t> del modelo son los valores pasados (rezagos) de las variables multivariantes analizadas y, opcionalmente, variables exógenas o deterministas; el </a:t>
-            </a:r>
-            <a:r>
-              <a:rPr lang="es-MX" sz="1200" b="1" dirty="0"/>
-              <a:t>output</a:t>
-            </a:r>
-            <a:r>
-              <a:rPr lang="es-MX" sz="1200" dirty="0"/>
-              <a:t> son las predicciones o respuestas futuras de cada variable en función de sus propios valores anteriores y los de las otras variables del sistema. </a:t>
-            </a:r>
-          </a:p>
-          <a:p>
-            <a:pPr algn="just"/>
-            <a:r>
-              <a:rPr lang="es-MX" sz="1200" dirty="0"/>
-              <a:t>Entre sus limitaciones están la alta sensibilidad a la multicolinealidad entre retardos, el riesgo de sobreajuste por incluir muchos parámetros, la necesidad de series estacionarias o transformaciones adecuadas, y que la interpretación causal estricta es difícil sin suposiciones adicionales.</a:t>
+              <a:t>requiere conocer o predecir variables exógenas futuras; sensible a errores en parámetros y supuestos de estacionariedad.</a:t>
             </a:r>
           </a:p>
         </p:txBody>
@@ -6753,7 +7531,7 @@
           <p:cNvPr id="4" name="Rectángulo 3">
             <a:extLst>
               <a:ext uri="{FF2B5EF4-FFF2-40B4-BE49-F238E27FC236}">
-                <a16:creationId xmlns:a16="http://schemas.microsoft.com/office/drawing/2014/main" id="{DC867BF5-B881-8867-3A01-F89DABF01B47}"/>
+                <a16:creationId xmlns:a16="http://schemas.microsoft.com/office/drawing/2014/main" id="{42107846-B800-3E06-0086-1877F6137CA3}"/>
               </a:ext>
             </a:extLst>
           </p:cNvPr>
@@ -6808,7 +7586,7 @@
           <p:cNvPr id="1026" name="Picture 2" descr="Carreras y oferta Académica de Pregrado | Uniandes">
             <a:extLst>
               <a:ext uri="{FF2B5EF4-FFF2-40B4-BE49-F238E27FC236}">
-                <a16:creationId xmlns:a16="http://schemas.microsoft.com/office/drawing/2014/main" id="{537D5F15-0D21-8A12-3403-2C1AA9C08FFF}"/>
+                <a16:creationId xmlns:a16="http://schemas.microsoft.com/office/drawing/2014/main" id="{CA11B9A8-8A4F-D5B9-E681-FCFFC5D30E6D}"/>
               </a:ext>
             </a:extLst>
           </p:cNvPr>
@@ -6855,6 +7633,593 @@
           <p:cNvPr id="5" name="CuadroTexto 4">
             <a:extLst>
               <a:ext uri="{FF2B5EF4-FFF2-40B4-BE49-F238E27FC236}">
+                <a16:creationId xmlns:a16="http://schemas.microsoft.com/office/drawing/2014/main" id="{1CB48B27-906D-6CF1-082F-1C750E0D3D6C}"/>
+              </a:ext>
+            </a:extLst>
+          </p:cNvPr>
+          <p:cNvSpPr txBox="1"/>
+          <p:nvPr/>
+        </p:nvSpPr>
+        <p:spPr>
+          <a:xfrm>
+            <a:off x="125896" y="219524"/>
+            <a:ext cx="1623392" cy="369332"/>
+          </a:xfrm>
+          <a:prstGeom prst="rect">
+            <a:avLst/>
+          </a:prstGeom>
+          <a:noFill/>
+        </p:spPr>
+        <p:txBody>
+          <a:bodyPr wrap="square" rtlCol="0">
+            <a:spAutoFit/>
+          </a:bodyPr>
+          <a:lstStyle/>
+          <a:p>
+            <a:r>
+              <a:rPr lang="es-CO" b="1" dirty="0"/>
+              <a:t>Resultados</a:t>
+            </a:r>
+          </a:p>
+        </p:txBody>
+      </p:sp>
+      <p:pic>
+        <p:nvPicPr>
+          <p:cNvPr id="7" name="Imagen 6">
+            <a:extLst>
+              <a:ext uri="{FF2B5EF4-FFF2-40B4-BE49-F238E27FC236}">
+                <a16:creationId xmlns:a16="http://schemas.microsoft.com/office/drawing/2014/main" id="{58A2FEFB-2262-1E84-25C1-E48B1423F11F}"/>
+              </a:ext>
+            </a:extLst>
+          </p:cNvPr>
+          <p:cNvPicPr>
+            <a:picLocks noChangeAspect="1"/>
+          </p:cNvPicPr>
+          <p:nvPr/>
+        </p:nvPicPr>
+        <p:blipFill>
+          <a:blip r:embed="rId3">
+            <a:extLst>
+              <a:ext uri="{28A0092B-C50C-407E-A947-70E740481C1C}">
+                <a14:useLocalDpi xmlns:a14="http://schemas.microsoft.com/office/drawing/2010/main" val="0"/>
+              </a:ext>
+            </a:extLst>
+          </a:blip>
+          <a:srcRect/>
+          <a:stretch/>
+        </p:blipFill>
+        <p:spPr>
+          <a:xfrm>
+            <a:off x="6294786" y="1817503"/>
+            <a:ext cx="5439187" cy="3222995"/>
+          </a:xfrm>
+          <a:prstGeom prst="rect">
+            <a:avLst/>
+          </a:prstGeom>
+        </p:spPr>
+      </p:pic>
+      <p:sp>
+        <p:nvSpPr>
+          <p:cNvPr id="8" name="Subtítulo 2">
+            <a:extLst>
+              <a:ext uri="{FF2B5EF4-FFF2-40B4-BE49-F238E27FC236}">
+                <a16:creationId xmlns:a16="http://schemas.microsoft.com/office/drawing/2014/main" id="{FB1E0EED-EE72-350A-A469-4DEBB29853E7}"/>
+              </a:ext>
+            </a:extLst>
+          </p:cNvPr>
+          <p:cNvSpPr txBox="1">
+            <a:spLocks/>
+          </p:cNvSpPr>
+          <p:nvPr/>
+        </p:nvSpPr>
+        <p:spPr>
+          <a:xfrm>
+            <a:off x="7752522" y="5145979"/>
+            <a:ext cx="3061252" cy="1292086"/>
+          </a:xfrm>
+          <a:prstGeom prst="rect">
+            <a:avLst/>
+          </a:prstGeom>
+        </p:spPr>
+        <p:txBody>
+          <a:bodyPr vert="horz" lIns="91440" tIns="45720" rIns="91440" bIns="45720" rtlCol="0">
+            <a:noAutofit/>
+          </a:bodyPr>
+          <a:lstStyle>
+            <a:lvl1pPr marL="0" indent="0" algn="ctr" defTabSz="914400" rtl="0" eaLnBrk="1" latinLnBrk="0" hangingPunct="1">
+              <a:lnSpc>
+                <a:spcPct val="90000"/>
+              </a:lnSpc>
+              <a:spcBef>
+                <a:spcPts val="1000"/>
+              </a:spcBef>
+              <a:buFont typeface="Arial" panose="020B0604020202020204" pitchFamily="34" charset="0"/>
+              <a:buNone/>
+              <a:defRPr sz="2400" kern="1200">
+                <a:solidFill>
+                  <a:schemeClr val="tx1"/>
+                </a:solidFill>
+                <a:latin typeface="+mn-lt"/>
+                <a:ea typeface="+mn-ea"/>
+                <a:cs typeface="+mn-cs"/>
+              </a:defRPr>
+            </a:lvl1pPr>
+            <a:lvl2pPr marL="457200" indent="0" algn="ctr" defTabSz="914400" rtl="0" eaLnBrk="1" latinLnBrk="0" hangingPunct="1">
+              <a:lnSpc>
+                <a:spcPct val="90000"/>
+              </a:lnSpc>
+              <a:spcBef>
+                <a:spcPts val="500"/>
+              </a:spcBef>
+              <a:buFont typeface="Arial" panose="020B0604020202020204" pitchFamily="34" charset="0"/>
+              <a:buNone/>
+              <a:defRPr sz="2000" kern="1200">
+                <a:solidFill>
+                  <a:schemeClr val="tx1"/>
+                </a:solidFill>
+                <a:latin typeface="+mn-lt"/>
+                <a:ea typeface="+mn-ea"/>
+                <a:cs typeface="+mn-cs"/>
+              </a:defRPr>
+            </a:lvl2pPr>
+            <a:lvl3pPr marL="914400" indent="0" algn="ctr" defTabSz="914400" rtl="0" eaLnBrk="1" latinLnBrk="0" hangingPunct="1">
+              <a:lnSpc>
+                <a:spcPct val="90000"/>
+              </a:lnSpc>
+              <a:spcBef>
+                <a:spcPts val="500"/>
+              </a:spcBef>
+              <a:buFont typeface="Arial" panose="020B0604020202020204" pitchFamily="34" charset="0"/>
+              <a:buNone/>
+              <a:defRPr sz="1800" kern="1200">
+                <a:solidFill>
+                  <a:schemeClr val="tx1"/>
+                </a:solidFill>
+                <a:latin typeface="+mn-lt"/>
+                <a:ea typeface="+mn-ea"/>
+                <a:cs typeface="+mn-cs"/>
+              </a:defRPr>
+            </a:lvl3pPr>
+            <a:lvl4pPr marL="1371600" indent="0" algn="ctr" defTabSz="914400" rtl="0" eaLnBrk="1" latinLnBrk="0" hangingPunct="1">
+              <a:lnSpc>
+                <a:spcPct val="90000"/>
+              </a:lnSpc>
+              <a:spcBef>
+                <a:spcPts val="500"/>
+              </a:spcBef>
+              <a:buFont typeface="Arial" panose="020B0604020202020204" pitchFamily="34" charset="0"/>
+              <a:buNone/>
+              <a:defRPr sz="1600" kern="1200">
+                <a:solidFill>
+                  <a:schemeClr val="tx1"/>
+                </a:solidFill>
+                <a:latin typeface="+mn-lt"/>
+                <a:ea typeface="+mn-ea"/>
+                <a:cs typeface="+mn-cs"/>
+              </a:defRPr>
+            </a:lvl4pPr>
+            <a:lvl5pPr marL="1828800" indent="0" algn="ctr" defTabSz="914400" rtl="0" eaLnBrk="1" latinLnBrk="0" hangingPunct="1">
+              <a:lnSpc>
+                <a:spcPct val="90000"/>
+              </a:lnSpc>
+              <a:spcBef>
+                <a:spcPts val="500"/>
+              </a:spcBef>
+              <a:buFont typeface="Arial" panose="020B0604020202020204" pitchFamily="34" charset="0"/>
+              <a:buNone/>
+              <a:defRPr sz="1600" kern="1200">
+                <a:solidFill>
+                  <a:schemeClr val="tx1"/>
+                </a:solidFill>
+                <a:latin typeface="+mn-lt"/>
+                <a:ea typeface="+mn-ea"/>
+                <a:cs typeface="+mn-cs"/>
+              </a:defRPr>
+            </a:lvl5pPr>
+            <a:lvl6pPr marL="2286000" indent="0" algn="ctr" defTabSz="914400" rtl="0" eaLnBrk="1" latinLnBrk="0" hangingPunct="1">
+              <a:lnSpc>
+                <a:spcPct val="90000"/>
+              </a:lnSpc>
+              <a:spcBef>
+                <a:spcPts val="500"/>
+              </a:spcBef>
+              <a:buFont typeface="Arial" panose="020B0604020202020204" pitchFamily="34" charset="0"/>
+              <a:buNone/>
+              <a:defRPr sz="1600" kern="1200">
+                <a:solidFill>
+                  <a:schemeClr val="tx1"/>
+                </a:solidFill>
+                <a:latin typeface="+mn-lt"/>
+                <a:ea typeface="+mn-ea"/>
+                <a:cs typeface="+mn-cs"/>
+              </a:defRPr>
+            </a:lvl6pPr>
+            <a:lvl7pPr marL="2743200" indent="0" algn="ctr" defTabSz="914400" rtl="0" eaLnBrk="1" latinLnBrk="0" hangingPunct="1">
+              <a:lnSpc>
+                <a:spcPct val="90000"/>
+              </a:lnSpc>
+              <a:spcBef>
+                <a:spcPts val="500"/>
+              </a:spcBef>
+              <a:buFont typeface="Arial" panose="020B0604020202020204" pitchFamily="34" charset="0"/>
+              <a:buNone/>
+              <a:defRPr sz="1600" kern="1200">
+                <a:solidFill>
+                  <a:schemeClr val="tx1"/>
+                </a:solidFill>
+                <a:latin typeface="+mn-lt"/>
+                <a:ea typeface="+mn-ea"/>
+                <a:cs typeface="+mn-cs"/>
+              </a:defRPr>
+            </a:lvl7pPr>
+            <a:lvl8pPr marL="3200400" indent="0" algn="ctr" defTabSz="914400" rtl="0" eaLnBrk="1" latinLnBrk="0" hangingPunct="1">
+              <a:lnSpc>
+                <a:spcPct val="90000"/>
+              </a:lnSpc>
+              <a:spcBef>
+                <a:spcPts val="500"/>
+              </a:spcBef>
+              <a:buFont typeface="Arial" panose="020B0604020202020204" pitchFamily="34" charset="0"/>
+              <a:buNone/>
+              <a:defRPr sz="1600" kern="1200">
+                <a:solidFill>
+                  <a:schemeClr val="tx1"/>
+                </a:solidFill>
+                <a:latin typeface="+mn-lt"/>
+                <a:ea typeface="+mn-ea"/>
+                <a:cs typeface="+mn-cs"/>
+              </a:defRPr>
+            </a:lvl8pPr>
+            <a:lvl9pPr marL="3657600" indent="0" algn="ctr" defTabSz="914400" rtl="0" eaLnBrk="1" latinLnBrk="0" hangingPunct="1">
+              <a:lnSpc>
+                <a:spcPct val="90000"/>
+              </a:lnSpc>
+              <a:spcBef>
+                <a:spcPts val="500"/>
+              </a:spcBef>
+              <a:buFont typeface="Arial" panose="020B0604020202020204" pitchFamily="34" charset="0"/>
+              <a:buNone/>
+              <a:defRPr sz="1600" kern="1200">
+                <a:solidFill>
+                  <a:schemeClr val="tx1"/>
+                </a:solidFill>
+                <a:latin typeface="+mn-lt"/>
+                <a:ea typeface="+mn-ea"/>
+                <a:cs typeface="+mn-cs"/>
+              </a:defRPr>
+            </a:lvl9pPr>
+          </a:lstStyle>
+          <a:p>
+            <a:pPr>
+              <a:lnSpc>
+                <a:spcPts val="1440"/>
+              </a:lnSpc>
+              <a:spcBef>
+                <a:spcPts val="600"/>
+              </a:spcBef>
+            </a:pPr>
+            <a:r>
+              <a:rPr lang="es-MX" sz="1000" b="1" dirty="0"/>
+              <a:t>Orden no estacional: </a:t>
+            </a:r>
+            <a:r>
+              <a:rPr lang="es-MX" sz="1000" dirty="0"/>
+              <a:t>(1, 1, 2)</a:t>
+            </a:r>
+          </a:p>
+          <a:p>
+            <a:pPr>
+              <a:lnSpc>
+                <a:spcPts val="1440"/>
+              </a:lnSpc>
+              <a:spcBef>
+                <a:spcPts val="600"/>
+              </a:spcBef>
+            </a:pPr>
+            <a:r>
+              <a:rPr lang="es-MX" sz="1000" b="1" dirty="0"/>
+              <a:t>Orden estacional: </a:t>
+            </a:r>
+            <a:r>
+              <a:rPr lang="es-MX" sz="1000" dirty="0"/>
+              <a:t>(0, 1, 1, 4)</a:t>
+            </a:r>
+            <a:endParaRPr lang="es-MX" sz="1000" b="1" dirty="0"/>
+          </a:p>
+          <a:p>
+            <a:pPr>
+              <a:lnSpc>
+                <a:spcPts val="1440"/>
+              </a:lnSpc>
+              <a:spcBef>
+                <a:spcPts val="600"/>
+              </a:spcBef>
+            </a:pPr>
+            <a:r>
+              <a:rPr lang="es-MX" sz="1000" b="1" dirty="0"/>
+              <a:t>AIC:</a:t>
+            </a:r>
+            <a:r>
+              <a:rPr lang="es-MX" sz="1000" dirty="0"/>
+              <a:t> 956.28</a:t>
+            </a:r>
+          </a:p>
+          <a:p>
+            <a:pPr>
+              <a:lnSpc>
+                <a:spcPts val="1440"/>
+              </a:lnSpc>
+              <a:spcBef>
+                <a:spcPts val="600"/>
+              </a:spcBef>
+            </a:pPr>
+            <a:r>
+              <a:rPr lang="es-MX" sz="1000" b="1" dirty="0"/>
+              <a:t>MAE: </a:t>
+            </a:r>
+            <a:r>
+              <a:rPr lang="es-MX" sz="1000" dirty="0"/>
+              <a:t>1268.97</a:t>
+            </a:r>
+          </a:p>
+          <a:p>
+            <a:pPr>
+              <a:lnSpc>
+                <a:spcPts val="1440"/>
+              </a:lnSpc>
+              <a:spcBef>
+                <a:spcPts val="600"/>
+              </a:spcBef>
+            </a:pPr>
+            <a:r>
+              <a:rPr lang="es-MX" sz="1000" b="1" dirty="0"/>
+              <a:t>RMSE: </a:t>
+            </a:r>
+            <a:r>
+              <a:rPr lang="es-MX" sz="1000" dirty="0"/>
+              <a:t>1564.17</a:t>
+            </a:r>
+          </a:p>
+        </p:txBody>
+      </p:sp>
+    </p:spTree>
+    <p:extLst>
+      <p:ext uri="{BB962C8B-B14F-4D97-AF65-F5344CB8AC3E}">
+        <p14:creationId xmlns:p14="http://schemas.microsoft.com/office/powerpoint/2010/main" val="2248330113"/>
+      </p:ext>
+    </p:extLst>
+  </p:cSld>
+  <p:clrMapOvr>
+    <a:masterClrMapping/>
+  </p:clrMapOvr>
+</p:sld>
+</file>
+
+<file path=ppt/slides/slide9.xml><?xml version="1.0" encoding="utf-8"?>
+<p:sld xmlns:a="http://schemas.openxmlformats.org/drawingml/2006/main" xmlns:r="http://schemas.openxmlformats.org/officeDocument/2006/relationships" xmlns:p="http://schemas.openxmlformats.org/presentationml/2006/main">
+  <p:cSld>
+    <p:spTree>
+      <p:nvGrpSpPr>
+        <p:cNvPr id="1" name="">
+          <a:extLst>
+            <a:ext uri="{FF2B5EF4-FFF2-40B4-BE49-F238E27FC236}">
+              <a16:creationId xmlns:a16="http://schemas.microsoft.com/office/drawing/2014/main" id="{6664A386-92BA-88B4-5721-A07FCA69627A}"/>
+            </a:ext>
+          </a:extLst>
+        </p:cNvPr>
+        <p:cNvGrpSpPr/>
+        <p:nvPr/>
+      </p:nvGrpSpPr>
+      <p:grpSpPr>
+        <a:xfrm>
+          <a:off x="0" y="0"/>
+          <a:ext cx="0" cy="0"/>
+          <a:chOff x="0" y="0"/>
+          <a:chExt cx="0" cy="0"/>
+        </a:xfrm>
+      </p:grpSpPr>
+      <p:sp>
+        <p:nvSpPr>
+          <p:cNvPr id="3" name="Subtítulo 2">
+            <a:extLst>
+              <a:ext uri="{FF2B5EF4-FFF2-40B4-BE49-F238E27FC236}">
+                <a16:creationId xmlns:a16="http://schemas.microsoft.com/office/drawing/2014/main" id="{324BC577-5816-B7D0-08A1-26DDDEEA840A}"/>
+              </a:ext>
+            </a:extLst>
+          </p:cNvPr>
+          <p:cNvSpPr>
+            <a:spLocks noGrp="1"/>
+          </p:cNvSpPr>
+          <p:nvPr>
+            <p:ph type="subTitle" idx="1"/>
+          </p:nvPr>
+        </p:nvSpPr>
+        <p:spPr>
+          <a:xfrm>
+            <a:off x="1086679" y="1991137"/>
+            <a:ext cx="4810538" cy="3289854"/>
+          </a:xfrm>
+        </p:spPr>
+        <p:txBody>
+          <a:bodyPr>
+            <a:noAutofit/>
+          </a:bodyPr>
+          <a:lstStyle/>
+          <a:p>
+            <a:pPr algn="just">
+              <a:spcBef>
+                <a:spcPts val="0"/>
+              </a:spcBef>
+            </a:pPr>
+            <a:r>
+              <a:rPr lang="es-MX" sz="1200" b="1" dirty="0"/>
+              <a:t>VAR</a:t>
+            </a:r>
+          </a:p>
+          <a:p>
+            <a:pPr algn="just">
+              <a:spcBef>
+                <a:spcPts val="0"/>
+              </a:spcBef>
+            </a:pPr>
+            <a:r>
+              <a:rPr lang="es-MX" sz="1000" dirty="0"/>
+              <a:t>(Vector </a:t>
+            </a:r>
+            <a:r>
+              <a:rPr lang="es-MX" sz="1000" dirty="0" err="1"/>
+              <a:t>AutoRegresivo</a:t>
+            </a:r>
+            <a:r>
+              <a:rPr lang="es-MX" sz="1000" dirty="0"/>
+              <a:t>)</a:t>
+            </a:r>
+          </a:p>
+          <a:p>
+            <a:pPr algn="just"/>
+            <a:r>
+              <a:rPr lang="es-MX" sz="1200" dirty="0"/>
+              <a:t>Modelo multivariante que explica la dinámica conjunta de varias variables endógenas con sus rezagos.</a:t>
+            </a:r>
+          </a:p>
+          <a:p>
+            <a:pPr algn="just"/>
+            <a:r>
+              <a:rPr lang="es-MX" sz="1200" b="1" dirty="0"/>
+              <a:t>Inputs: </a:t>
+            </a:r>
+            <a:r>
+              <a:rPr lang="es-MX" sz="1200" dirty="0"/>
+              <a:t>valores pasados de todas las variables, y opcionalmente variables exógenas o deterministas.</a:t>
+            </a:r>
+          </a:p>
+          <a:p>
+            <a:pPr algn="just"/>
+            <a:r>
+              <a:rPr lang="es-MX" sz="1200" b="1" dirty="0"/>
+              <a:t>Output: </a:t>
+            </a:r>
+            <a:r>
+              <a:rPr lang="es-MX" sz="1200" dirty="0"/>
+              <a:t>predicciones de cada variable en función de sus propios rezagos y los de las demás.</a:t>
+            </a:r>
+          </a:p>
+          <a:p>
+            <a:pPr algn="just"/>
+            <a:r>
+              <a:rPr lang="es-MX" sz="1200" dirty="0"/>
+              <a:t>Limitaciones: sensible a multicolinealidad, riesgo de sobreajuste, necesidad de estacionariedad y dificultad para interpretación causal estricta.</a:t>
+            </a:r>
+          </a:p>
+        </p:txBody>
+      </p:sp>
+      <p:sp>
+        <p:nvSpPr>
+          <p:cNvPr id="4" name="Rectángulo 3">
+            <a:extLst>
+              <a:ext uri="{FF2B5EF4-FFF2-40B4-BE49-F238E27FC236}">
+                <a16:creationId xmlns:a16="http://schemas.microsoft.com/office/drawing/2014/main" id="{DC867BF5-B881-8867-3A01-F89DABF01B47}"/>
+              </a:ext>
+            </a:extLst>
+          </p:cNvPr>
+          <p:cNvSpPr/>
+          <p:nvPr/>
+        </p:nvSpPr>
+        <p:spPr>
+          <a:xfrm>
+            <a:off x="0" y="-1"/>
+            <a:ext cx="12192000" cy="808383"/>
+          </a:xfrm>
+          <a:prstGeom prst="rect">
+            <a:avLst/>
+          </a:prstGeom>
+          <a:solidFill>
+            <a:schemeClr val="tx2">
+              <a:lumMod val="50000"/>
+              <a:lumOff val="50000"/>
+            </a:schemeClr>
+          </a:solidFill>
+          <a:ln>
+            <a:noFill/>
+          </a:ln>
+        </p:spPr>
+        <p:style>
+          <a:lnRef idx="2">
+            <a:schemeClr val="accent1">
+              <a:shade val="15000"/>
+            </a:schemeClr>
+          </a:lnRef>
+          <a:fillRef idx="1">
+            <a:schemeClr val="accent1"/>
+          </a:fillRef>
+          <a:effectRef idx="0">
+            <a:schemeClr val="accent1"/>
+          </a:effectRef>
+          <a:fontRef idx="minor">
+            <a:schemeClr val="lt1"/>
+          </a:fontRef>
+        </p:style>
+        <p:txBody>
+          <a:bodyPr rtlCol="0" anchor="ctr"/>
+          <a:lstStyle/>
+          <a:p>
+            <a:pPr algn="ctr"/>
+            <a:endParaRPr lang="es-CO"/>
+          </a:p>
+        </p:txBody>
+      </p:sp>
+      <p:pic>
+        <p:nvPicPr>
+          <p:cNvPr id="1026" name="Picture 2" descr="Carreras y oferta Académica de Pregrado | Uniandes">
+            <a:extLst>
+              <a:ext uri="{FF2B5EF4-FFF2-40B4-BE49-F238E27FC236}">
+                <a16:creationId xmlns:a16="http://schemas.microsoft.com/office/drawing/2014/main" id="{537D5F15-0D21-8A12-3403-2C1AA9C08FFF}"/>
+              </a:ext>
+            </a:extLst>
+          </p:cNvPr>
+          <p:cNvPicPr>
+            <a:picLocks noChangeAspect="1" noChangeArrowheads="1"/>
+          </p:cNvPicPr>
+          <p:nvPr/>
+        </p:nvPicPr>
+        <p:blipFill>
+          <a:blip r:embed="rId2">
+            <a:extLst>
+              <a:ext uri="{28A0092B-C50C-407E-A947-70E740481C1C}">
+                <a14:useLocalDpi xmlns:a14="http://schemas.microsoft.com/office/drawing/2010/main" val="0"/>
+              </a:ext>
+            </a:extLst>
+          </a:blip>
+          <a:srcRect/>
+          <a:stretch>
+            <a:fillRect/>
+          </a:stretch>
+        </p:blipFill>
+        <p:spPr bwMode="auto">
+          <a:xfrm>
+            <a:off x="10668000" y="62932"/>
+            <a:ext cx="1444901" cy="682516"/>
+          </a:xfrm>
+          <a:prstGeom prst="rect">
+            <a:avLst/>
+          </a:prstGeom>
+          <a:noFill/>
+          <a:extLst>
+            <a:ext uri="{909E8E84-426E-40DD-AFC4-6F175D3DCCD1}">
+              <a14:hiddenFill xmlns:a14="http://schemas.microsoft.com/office/drawing/2010/main">
+                <a:solidFill>
+                  <a:srgbClr val="FFFFFF"/>
+                </a:solidFill>
+              </a14:hiddenFill>
+            </a:ext>
+          </a:extLst>
+        </p:spPr>
+      </p:pic>
+      <p:sp>
+        <p:nvSpPr>
+          <p:cNvPr id="5" name="CuadroTexto 4">
+            <a:extLst>
+              <a:ext uri="{FF2B5EF4-FFF2-40B4-BE49-F238E27FC236}">
                 <a16:creationId xmlns:a16="http://schemas.microsoft.com/office/drawing/2014/main" id="{719387E4-6C77-DFBC-C767-95828F218FEE}"/>
               </a:ext>
             </a:extLst>
@@ -7167,6 +8532,41 @@
           </a:p>
         </p:txBody>
       </p:sp>
+      <p:pic>
+        <p:nvPicPr>
+          <p:cNvPr id="6" name="Imagen 5">
+            <a:extLst>
+              <a:ext uri="{FF2B5EF4-FFF2-40B4-BE49-F238E27FC236}">
+                <a16:creationId xmlns:a16="http://schemas.microsoft.com/office/drawing/2014/main" id="{435911E5-7130-3392-ED40-D74B22ADC32A}"/>
+              </a:ext>
+            </a:extLst>
+          </p:cNvPr>
+          <p:cNvPicPr>
+            <a:picLocks noChangeAspect="1"/>
+          </p:cNvPicPr>
+          <p:nvPr/>
+        </p:nvPicPr>
+        <p:blipFill>
+          <a:blip r:embed="rId4">
+            <a:extLst>
+              <a:ext uri="{28A0092B-C50C-407E-A947-70E740481C1C}">
+                <a14:useLocalDpi xmlns:a14="http://schemas.microsoft.com/office/drawing/2010/main" val="0"/>
+              </a:ext>
+            </a:extLst>
+          </a:blip>
+          <a:srcRect/>
+          <a:stretch/>
+        </p:blipFill>
+        <p:spPr>
+          <a:xfrm>
+            <a:off x="1086679" y="4657588"/>
+            <a:ext cx="5009321" cy="1216280"/>
+          </a:xfrm>
+          <a:prstGeom prst="rect">
+            <a:avLst/>
+          </a:prstGeom>
+        </p:spPr>
+      </p:pic>
     </p:spTree>
     <p:extLst>
       <p:ext uri="{BB962C8B-B14F-4D97-AF65-F5344CB8AC3E}">

</xml_diff>

<commit_message>
Actualizacion - Semana 8
</commit_message>
<xml_diff>
--- a/PresentacionAvances.pptx
+++ b/PresentacionAvances.pptx
@@ -135,18 +135,18 @@
   <pc:docChgLst>
     <pc:chgData name="Pedro Sánchez" userId="41291a4e6da63335" providerId="LiveId" clId="{3ED0C291-7D32-44BD-821E-EEABF2784BA8}"/>
     <pc:docChg chg="undo custSel addSld modSld sldOrd">
-      <pc:chgData name="Pedro Sánchez" userId="41291a4e6da63335" providerId="LiveId" clId="{3ED0C291-7D32-44BD-821E-EEABF2784BA8}" dt="2025-09-18T04:10:18.661" v="465" actId="1076"/>
+      <pc:chgData name="Pedro Sánchez" userId="41291a4e6da63335" providerId="LiveId" clId="{3ED0C291-7D32-44BD-821E-EEABF2784BA8}" dt="2025-09-26T15:57:39.905" v="468" actId="207"/>
       <pc:docMkLst>
         <pc:docMk/>
       </pc:docMkLst>
       <pc:sldChg chg="modSp mod">
-        <pc:chgData name="Pedro Sánchez" userId="41291a4e6da63335" providerId="LiveId" clId="{3ED0C291-7D32-44BD-821E-EEABF2784BA8}" dt="2025-09-16T14:46:23.053" v="57" actId="20577"/>
+        <pc:chgData name="Pedro Sánchez" userId="41291a4e6da63335" providerId="LiveId" clId="{3ED0C291-7D32-44BD-821E-EEABF2784BA8}" dt="2025-09-26T15:21:24.492" v="467" actId="20577"/>
         <pc:sldMkLst>
           <pc:docMk/>
           <pc:sldMk cId="2079003264" sldId="256"/>
         </pc:sldMkLst>
         <pc:spChg chg="mod">
-          <ac:chgData name="Pedro Sánchez" userId="41291a4e6da63335" providerId="LiveId" clId="{3ED0C291-7D32-44BD-821E-EEABF2784BA8}" dt="2025-09-16T14:46:23.053" v="57" actId="20577"/>
+          <ac:chgData name="Pedro Sánchez" userId="41291a4e6da63335" providerId="LiveId" clId="{3ED0C291-7D32-44BD-821E-EEABF2784BA8}" dt="2025-09-26T15:21:24.492" v="467" actId="20577"/>
           <ac:spMkLst>
             <pc:docMk/>
             <pc:sldMk cId="2079003264" sldId="256"/>
@@ -160,28 +160,12 @@
           <pc:docMk/>
           <pc:sldMk cId="3168108746" sldId="257"/>
         </pc:sldMkLst>
-        <pc:spChg chg="add">
-          <ac:chgData name="Pedro Sánchez" userId="41291a4e6da63335" providerId="LiveId" clId="{3ED0C291-7D32-44BD-821E-EEABF2784BA8}" dt="2025-09-18T03:44:50.810" v="58"/>
-          <ac:spMkLst>
-            <pc:docMk/>
-            <pc:sldMk cId="3168108746" sldId="257"/>
-            <ac:spMk id="2" creationId="{18138EA1-B63D-D902-7F32-17788F437D72}"/>
-          </ac:spMkLst>
-        </pc:spChg>
         <pc:spChg chg="mod">
           <ac:chgData name="Pedro Sánchez" userId="41291a4e6da63335" providerId="LiveId" clId="{3ED0C291-7D32-44BD-821E-EEABF2784BA8}" dt="2025-09-18T03:46:23.171" v="72" actId="14100"/>
           <ac:spMkLst>
             <pc:docMk/>
             <pc:sldMk cId="3168108746" sldId="257"/>
             <ac:spMk id="3" creationId="{38251BFC-9B91-8D60-19EB-029C5093B96D}"/>
-          </ac:spMkLst>
-        </pc:spChg>
-        <pc:spChg chg="add">
-          <ac:chgData name="Pedro Sánchez" userId="41291a4e6da63335" providerId="LiveId" clId="{3ED0C291-7D32-44BD-821E-EEABF2784BA8}" dt="2025-09-18T03:44:58.038" v="59"/>
-          <ac:spMkLst>
-            <pc:docMk/>
-            <pc:sldMk cId="3168108746" sldId="257"/>
-            <ac:spMk id="6" creationId="{77305749-19B0-AD22-66D9-EB975697649A}"/>
           </ac:spMkLst>
         </pc:spChg>
       </pc:sldChg>
@@ -191,14 +175,6 @@
           <pc:docMk/>
           <pc:sldMk cId="2424761874" sldId="258"/>
         </pc:sldMkLst>
-        <pc:spChg chg="add">
-          <ac:chgData name="Pedro Sánchez" userId="41291a4e6da63335" providerId="LiveId" clId="{3ED0C291-7D32-44BD-821E-EEABF2784BA8}" dt="2025-09-18T03:47:27.546" v="73"/>
-          <ac:spMkLst>
-            <pc:docMk/>
-            <pc:sldMk cId="2424761874" sldId="258"/>
-            <ac:spMk id="2" creationId="{D17D54F6-50C5-37EA-63CC-6890C62DAC88}"/>
-          </ac:spMkLst>
-        </pc:spChg>
         <pc:spChg chg="mod">
           <ac:chgData name="Pedro Sánchez" userId="41291a4e6da63335" providerId="LiveId" clId="{3ED0C291-7D32-44BD-821E-EEABF2784BA8}" dt="2025-09-18T03:48:48.973" v="132" actId="113"/>
           <ac:spMkLst>
@@ -232,13 +208,13 @@
         </pc:spChg>
       </pc:sldChg>
       <pc:sldChg chg="modSp mod">
-        <pc:chgData name="Pedro Sánchez" userId="41291a4e6da63335" providerId="LiveId" clId="{3ED0C291-7D32-44BD-821E-EEABF2784BA8}" dt="2025-09-18T04:10:18.661" v="465" actId="1076"/>
+        <pc:chgData name="Pedro Sánchez" userId="41291a4e6da63335" providerId="LiveId" clId="{3ED0C291-7D32-44BD-821E-EEABF2784BA8}" dt="2025-09-26T15:57:39.905" v="468" actId="207"/>
         <pc:sldMkLst>
           <pc:docMk/>
           <pc:sldMk cId="3125701131" sldId="260"/>
         </pc:sldMkLst>
         <pc:spChg chg="mod">
-          <ac:chgData name="Pedro Sánchez" userId="41291a4e6da63335" providerId="LiveId" clId="{3ED0C291-7D32-44BD-821E-EEABF2784BA8}" dt="2025-09-18T04:10:18.661" v="465" actId="1076"/>
+          <ac:chgData name="Pedro Sánchez" userId="41291a4e6da63335" providerId="LiveId" clId="{3ED0C291-7D32-44BD-821E-EEABF2784BA8}" dt="2025-09-26T15:57:39.905" v="468" actId="207"/>
           <ac:spMkLst>
             <pc:docMk/>
             <pc:sldMk cId="3125701131" sldId="260"/>
@@ -260,14 +236,6 @@
           <pc:docMk/>
           <pc:sldMk cId="1808529488" sldId="261"/>
         </pc:sldMkLst>
-        <pc:spChg chg="add">
-          <ac:chgData name="Pedro Sánchez" userId="41291a4e6da63335" providerId="LiveId" clId="{3ED0C291-7D32-44BD-821E-EEABF2784BA8}" dt="2025-09-18T03:51:02.213" v="148"/>
-          <ac:spMkLst>
-            <pc:docMk/>
-            <pc:sldMk cId="1808529488" sldId="261"/>
-            <ac:spMk id="2" creationId="{E3DAEFC2-FA3D-8F06-882D-C4C185A934D1}"/>
-          </ac:spMkLst>
-        </pc:spChg>
         <pc:spChg chg="mod">
           <ac:chgData name="Pedro Sánchez" userId="41291a4e6da63335" providerId="LiveId" clId="{3ED0C291-7D32-44BD-821E-EEABF2784BA8}" dt="2025-09-18T03:56:47.574" v="230" actId="14100"/>
           <ac:spMkLst>
@@ -376,30 +344,6 @@
           <pc:docMk/>
           <pc:sldMk cId="2294619585" sldId="265"/>
         </pc:sldMkLst>
-        <pc:spChg chg="del">
-          <ac:chgData name="Pedro Sánchez" userId="41291a4e6da63335" providerId="LiveId" clId="{3ED0C291-7D32-44BD-821E-EEABF2784BA8}" dt="2025-09-18T04:06:05.468" v="342" actId="478"/>
-          <ac:spMkLst>
-            <pc:docMk/>
-            <pc:sldMk cId="2294619585" sldId="265"/>
-            <ac:spMk id="3" creationId="{AE88FFEE-A7E1-C110-7C65-8ACC647B61AF}"/>
-          </ac:spMkLst>
-        </pc:spChg>
-        <pc:spChg chg="add del mod">
-          <ac:chgData name="Pedro Sánchez" userId="41291a4e6da63335" providerId="LiveId" clId="{3ED0C291-7D32-44BD-821E-EEABF2784BA8}" dt="2025-09-18T04:06:07.444" v="343" actId="478"/>
-          <ac:spMkLst>
-            <pc:docMk/>
-            <pc:sldMk cId="2294619585" sldId="265"/>
-            <ac:spMk id="7" creationId="{6AE70E53-1016-7DA6-BEBB-AEC225F0D4DE}"/>
-          </ac:spMkLst>
-        </pc:spChg>
-        <pc:spChg chg="del">
-          <ac:chgData name="Pedro Sánchez" userId="41291a4e6da63335" providerId="LiveId" clId="{3ED0C291-7D32-44BD-821E-EEABF2784BA8}" dt="2025-09-18T04:06:08.657" v="344" actId="478"/>
-          <ac:spMkLst>
-            <pc:docMk/>
-            <pc:sldMk cId="2294619585" sldId="265"/>
-            <ac:spMk id="14" creationId="{308CE843-A81D-DC43-C81F-9502B70C6902}"/>
-          </ac:spMkLst>
-        </pc:spChg>
         <pc:picChg chg="mod">
           <ac:chgData name="Pedro Sánchez" userId="41291a4e6da63335" providerId="LiveId" clId="{3ED0C291-7D32-44BD-821E-EEABF2784BA8}" dt="2025-09-18T04:06:38.906" v="351" actId="1076"/>
           <ac:picMkLst>
@@ -439,14 +383,6 @@
           <pc:docMk/>
           <pc:sldMk cId="3835149613" sldId="266"/>
         </pc:sldMkLst>
-        <pc:spChg chg="del">
-          <ac:chgData name="Pedro Sánchez" userId="41291a4e6da63335" providerId="LiveId" clId="{3ED0C291-7D32-44BD-821E-EEABF2784BA8}" dt="2025-09-18T04:08:49.415" v="369" actId="478"/>
-          <ac:spMkLst>
-            <pc:docMk/>
-            <pc:sldMk cId="3835149613" sldId="266"/>
-            <ac:spMk id="2" creationId="{93F2138E-FF86-3699-1F23-06E73C8F64A7}"/>
-          </ac:spMkLst>
-        </pc:spChg>
         <pc:spChg chg="mod">
           <ac:chgData name="Pedro Sánchez" userId="41291a4e6da63335" providerId="LiveId" clId="{3ED0C291-7D32-44BD-821E-EEABF2784BA8}" dt="2025-09-18T04:09:51.234" v="462" actId="1076"/>
           <ac:spMkLst>
@@ -618,7 +554,7 @@
           <a:p>
             <a:fld id="{25A05EA2-0A53-4C12-BE14-DA45449A4726}" type="datetimeFigureOut">
               <a:rPr lang="es-CO" smtClean="0"/>
-              <a:t>17/09/2025</a:t>
+              <a:t>26/09/2025</a:t>
             </a:fld>
             <a:endParaRPr lang="es-CO"/>
           </a:p>
@@ -818,7 +754,7 @@
           <a:p>
             <a:fld id="{25A05EA2-0A53-4C12-BE14-DA45449A4726}" type="datetimeFigureOut">
               <a:rPr lang="es-CO" smtClean="0"/>
-              <a:t>17/09/2025</a:t>
+              <a:t>26/09/2025</a:t>
             </a:fld>
             <a:endParaRPr lang="es-CO"/>
           </a:p>
@@ -1028,7 +964,7 @@
           <a:p>
             <a:fld id="{25A05EA2-0A53-4C12-BE14-DA45449A4726}" type="datetimeFigureOut">
               <a:rPr lang="es-CO" smtClean="0"/>
-              <a:t>17/09/2025</a:t>
+              <a:t>26/09/2025</a:t>
             </a:fld>
             <a:endParaRPr lang="es-CO"/>
           </a:p>
@@ -1228,7 +1164,7 @@
           <a:p>
             <a:fld id="{25A05EA2-0A53-4C12-BE14-DA45449A4726}" type="datetimeFigureOut">
               <a:rPr lang="es-CO" smtClean="0"/>
-              <a:t>17/09/2025</a:t>
+              <a:t>26/09/2025</a:t>
             </a:fld>
             <a:endParaRPr lang="es-CO"/>
           </a:p>
@@ -1504,7 +1440,7 @@
           <a:p>
             <a:fld id="{25A05EA2-0A53-4C12-BE14-DA45449A4726}" type="datetimeFigureOut">
               <a:rPr lang="es-CO" smtClean="0"/>
-              <a:t>17/09/2025</a:t>
+              <a:t>26/09/2025</a:t>
             </a:fld>
             <a:endParaRPr lang="es-CO"/>
           </a:p>
@@ -1772,7 +1708,7 @@
           <a:p>
             <a:fld id="{25A05EA2-0A53-4C12-BE14-DA45449A4726}" type="datetimeFigureOut">
               <a:rPr lang="es-CO" smtClean="0"/>
-              <a:t>17/09/2025</a:t>
+              <a:t>26/09/2025</a:t>
             </a:fld>
             <a:endParaRPr lang="es-CO"/>
           </a:p>
@@ -2187,7 +2123,7 @@
           <a:p>
             <a:fld id="{25A05EA2-0A53-4C12-BE14-DA45449A4726}" type="datetimeFigureOut">
               <a:rPr lang="es-CO" smtClean="0"/>
-              <a:t>17/09/2025</a:t>
+              <a:t>26/09/2025</a:t>
             </a:fld>
             <a:endParaRPr lang="es-CO"/>
           </a:p>
@@ -2329,7 +2265,7 @@
           <a:p>
             <a:fld id="{25A05EA2-0A53-4C12-BE14-DA45449A4726}" type="datetimeFigureOut">
               <a:rPr lang="es-CO" smtClean="0"/>
-              <a:t>17/09/2025</a:t>
+              <a:t>26/09/2025</a:t>
             </a:fld>
             <a:endParaRPr lang="es-CO"/>
           </a:p>
@@ -2442,7 +2378,7 @@
           <a:p>
             <a:fld id="{25A05EA2-0A53-4C12-BE14-DA45449A4726}" type="datetimeFigureOut">
               <a:rPr lang="es-CO" smtClean="0"/>
-              <a:t>17/09/2025</a:t>
+              <a:t>26/09/2025</a:t>
             </a:fld>
             <a:endParaRPr lang="es-CO"/>
           </a:p>
@@ -2755,7 +2691,7 @@
           <a:p>
             <a:fld id="{25A05EA2-0A53-4C12-BE14-DA45449A4726}" type="datetimeFigureOut">
               <a:rPr lang="es-CO" smtClean="0"/>
-              <a:t>17/09/2025</a:t>
+              <a:t>26/09/2025</a:t>
             </a:fld>
             <a:endParaRPr lang="es-CO"/>
           </a:p>
@@ -3044,7 +2980,7 @@
           <a:p>
             <a:fld id="{25A05EA2-0A53-4C12-BE14-DA45449A4726}" type="datetimeFigureOut">
               <a:rPr lang="es-CO" smtClean="0"/>
-              <a:t>17/09/2025</a:t>
+              <a:t>26/09/2025</a:t>
             </a:fld>
             <a:endParaRPr lang="es-CO"/>
           </a:p>
@@ -3287,7 +3223,7 @@
           <a:p>
             <a:fld id="{25A05EA2-0A53-4C12-BE14-DA45449A4726}" type="datetimeFigureOut">
               <a:rPr lang="es-CO" smtClean="0"/>
-              <a:t>17/09/2025</a:t>
+              <a:t>26/09/2025</a:t>
             </a:fld>
             <a:endParaRPr lang="es-CO"/>
           </a:p>
@@ -3764,7 +3700,7 @@
           <a:p>
             <a:r>
               <a:rPr lang="es-CO" dirty="0"/>
-              <a:t>Presentación de avances – Semana 7</a:t>
+              <a:t>Presentación de avances – Semana 8</a:t>
             </a:r>
           </a:p>
           <a:p>
@@ -6689,7 +6625,7 @@
               <a:rPr lang="es-MX" sz="1400" b="1" dirty="0">
                 <a:solidFill>
                   <a:schemeClr val="bg1">
-                    <a:lumMod val="95000"/>
+                    <a:lumMod val="65000"/>
                   </a:schemeClr>
                 </a:solidFill>
               </a:rPr>
@@ -6702,7 +6638,7 @@
               <a:rPr lang="es-MX" sz="1400" dirty="0">
                 <a:solidFill>
                   <a:schemeClr val="bg1">
-                    <a:lumMod val="95000"/>
+                    <a:lumMod val="65000"/>
                   </a:schemeClr>
                 </a:solidFill>
               </a:rPr>
@@ -6712,7 +6648,7 @@
               <a:rPr lang="es-MX" sz="1400" dirty="0" err="1">
                 <a:solidFill>
                   <a:schemeClr val="bg1">
-                    <a:lumMod val="95000"/>
+                    <a:lumMod val="65000"/>
                   </a:schemeClr>
                 </a:solidFill>
               </a:rPr>
@@ -6722,7 +6658,7 @@
               <a:rPr lang="es-MX" sz="1400" dirty="0">
                 <a:solidFill>
                   <a:schemeClr val="bg1">
-                    <a:lumMod val="95000"/>
+                    <a:lumMod val="65000"/>
                   </a:schemeClr>
                 </a:solidFill>
               </a:rPr>
@@ -6732,7 +6668,7 @@
               <a:rPr lang="es-MX" sz="1400" dirty="0" err="1">
                 <a:solidFill>
                   <a:schemeClr val="bg1">
-                    <a:lumMod val="95000"/>
+                    <a:lumMod val="65000"/>
                   </a:schemeClr>
                 </a:solidFill>
               </a:rPr>
@@ -6742,7 +6678,7 @@
               <a:rPr lang="es-MX" sz="1400" dirty="0">
                 <a:solidFill>
                   <a:schemeClr val="bg1">
-                    <a:lumMod val="95000"/>
+                    <a:lumMod val="65000"/>
                   </a:schemeClr>
                 </a:solidFill>
               </a:rPr>
@@ -6755,7 +6691,7 @@
               <a:rPr lang="es-MX" sz="1400" dirty="0">
                 <a:solidFill>
                   <a:schemeClr val="bg1">
-                    <a:lumMod val="95000"/>
+                    <a:lumMod val="65000"/>
                   </a:schemeClr>
                 </a:solidFill>
               </a:rPr>
@@ -6768,7 +6704,7 @@
               <a:rPr lang="es-MX" sz="1400" dirty="0">
                 <a:solidFill>
                   <a:schemeClr val="bg1">
-                    <a:lumMod val="95000"/>
+                    <a:lumMod val="65000"/>
                   </a:schemeClr>
                 </a:solidFill>
               </a:rPr>
@@ -6781,7 +6717,7 @@
               <a:rPr lang="es-MX" sz="1400" dirty="0">
                 <a:solidFill>
                   <a:schemeClr val="bg1">
-                    <a:lumMod val="95000"/>
+                    <a:lumMod val="65000"/>
                   </a:schemeClr>
                 </a:solidFill>
               </a:rPr>

</xml_diff>

<commit_message>
Actualizacion - Semana 11
</commit_message>
<xml_diff>
--- a/PresentacionAvances.pptx
+++ b/PresentacionAvances.pptx
@@ -6,16 +6,18 @@
   </p:sldMasterIdLst>
   <p:sldIdLst>
     <p:sldId id="256" r:id="rId2"/>
-    <p:sldId id="257" r:id="rId3"/>
-    <p:sldId id="258" r:id="rId4"/>
-    <p:sldId id="259" r:id="rId5"/>
-    <p:sldId id="265" r:id="rId6"/>
-    <p:sldId id="260" r:id="rId7"/>
-    <p:sldId id="261" r:id="rId8"/>
-    <p:sldId id="262" r:id="rId9"/>
-    <p:sldId id="263" r:id="rId10"/>
-    <p:sldId id="264" r:id="rId11"/>
-    <p:sldId id="266" r:id="rId12"/>
+    <p:sldId id="267" r:id="rId3"/>
+    <p:sldId id="257" r:id="rId4"/>
+    <p:sldId id="258" r:id="rId5"/>
+    <p:sldId id="259" r:id="rId6"/>
+    <p:sldId id="265" r:id="rId7"/>
+    <p:sldId id="260" r:id="rId8"/>
+    <p:sldId id="268" r:id="rId9"/>
+    <p:sldId id="261" r:id="rId10"/>
+    <p:sldId id="262" r:id="rId11"/>
+    <p:sldId id="263" r:id="rId12"/>
+    <p:sldId id="264" r:id="rId13"/>
+    <p:sldId id="266" r:id="rId14"/>
   </p:sldIdLst>
   <p:sldSz cx="12192000" cy="6858000"/>
   <p:notesSz cx="6858000" cy="9144000"/>
@@ -125,7 +127,7 @@
 <file path=ppt/revisionInfo.xml><?xml version="1.0" encoding="utf-8"?>
 <p1510:revInfo xmlns:a="http://schemas.openxmlformats.org/drawingml/2006/main" xmlns:r="http://schemas.openxmlformats.org/officeDocument/2006/relationships" xmlns:p1510="http://schemas.microsoft.com/office/powerpoint/2015/10/main">
   <p1510:revLst>
-    <p1510:client id="{FC4B2C3D-7DCE-4352-BD0F-1FDE76483D74}" v="14" dt="2025-09-18T04:08:05.746"/>
+    <p1510:client id="{9843B421-3944-4171-9FFB-A8A10F73F874}" v="1" dt="2025-10-16T21:26:55.769"/>
   </p1510:revLst>
 </p1510:revInfo>
 </file>
@@ -135,7 +137,7 @@
   <pc:docChgLst>
     <pc:chgData name="Pedro Sánchez" userId="41291a4e6da63335" providerId="LiveId" clId="{3ED0C291-7D32-44BD-821E-EEABF2784BA8}"/>
     <pc:docChg chg="undo custSel addSld modSld sldOrd">
-      <pc:chgData name="Pedro Sánchez" userId="41291a4e6da63335" providerId="LiveId" clId="{3ED0C291-7D32-44BD-821E-EEABF2784BA8}" dt="2025-09-26T15:57:39.905" v="468" actId="207"/>
+      <pc:chgData name="Pedro Sánchez" userId="41291a4e6da63335" providerId="LiveId" clId="{3ED0C291-7D32-44BD-821E-EEABF2784BA8}" dt="2025-10-16T21:32:43.393" v="582" actId="11529"/>
       <pc:docMkLst>
         <pc:docMk/>
       </pc:docMkLst>
@@ -207,14 +209,14 @@
           </ac:spMkLst>
         </pc:spChg>
       </pc:sldChg>
-      <pc:sldChg chg="modSp mod">
-        <pc:chgData name="Pedro Sánchez" userId="41291a4e6da63335" providerId="LiveId" clId="{3ED0C291-7D32-44BD-821E-EEABF2784BA8}" dt="2025-09-26T15:57:39.905" v="468" actId="207"/>
+      <pc:sldChg chg="addSp modSp mod">
+        <pc:chgData name="Pedro Sánchez" userId="41291a4e6da63335" providerId="LiveId" clId="{3ED0C291-7D32-44BD-821E-EEABF2784BA8}" dt="2025-10-16T21:24:53.728" v="512" actId="11529"/>
         <pc:sldMkLst>
           <pc:docMk/>
           <pc:sldMk cId="3125701131" sldId="260"/>
         </pc:sldMkLst>
         <pc:spChg chg="mod">
-          <ac:chgData name="Pedro Sánchez" userId="41291a4e6da63335" providerId="LiveId" clId="{3ED0C291-7D32-44BD-821E-EEABF2784BA8}" dt="2025-09-26T15:57:39.905" v="468" actId="207"/>
+          <ac:chgData name="Pedro Sánchez" userId="41291a4e6da63335" providerId="LiveId" clId="{3ED0C291-7D32-44BD-821E-EEABF2784BA8}" dt="2025-10-16T21:24:46.273" v="511" actId="20577"/>
           <ac:spMkLst>
             <pc:docMk/>
             <pc:sldMk cId="3125701131" sldId="260"/>
@@ -222,11 +224,19 @@
           </ac:spMkLst>
         </pc:spChg>
         <pc:spChg chg="mod">
-          <ac:chgData name="Pedro Sánchez" userId="41291a4e6da63335" providerId="LiveId" clId="{3ED0C291-7D32-44BD-821E-EEABF2784BA8}" dt="2025-09-18T04:10:18.661" v="465" actId="1076"/>
+          <ac:chgData name="Pedro Sánchez" userId="41291a4e6da63335" providerId="LiveId" clId="{3ED0C291-7D32-44BD-821E-EEABF2784BA8}" dt="2025-10-16T21:24:27.450" v="501" actId="1076"/>
           <ac:spMkLst>
             <pc:docMk/>
             <pc:sldMk cId="3125701131" sldId="260"/>
             <ac:spMk id="3" creationId="{6B3DF7AE-265B-2314-CABD-7E650040C2CE}"/>
+          </ac:spMkLst>
+        </pc:spChg>
+        <pc:spChg chg="add">
+          <ac:chgData name="Pedro Sánchez" userId="41291a4e6da63335" providerId="LiveId" clId="{3ED0C291-7D32-44BD-821E-EEABF2784BA8}" dt="2025-10-16T21:24:53.728" v="512" actId="11529"/>
+          <ac:spMkLst>
+            <pc:docMk/>
+            <pc:sldMk cId="3125701131" sldId="260"/>
+            <ac:spMk id="6" creationId="{F810DA46-AAEA-B176-3EDF-C1CC8E259C54}"/>
           </ac:spMkLst>
         </pc:spChg>
       </pc:sldChg>
@@ -315,8 +325,8 @@
           </ac:picMkLst>
         </pc:picChg>
       </pc:sldChg>
-      <pc:sldChg chg="modSp add mod ord">
-        <pc:chgData name="Pedro Sánchez" userId="41291a4e6da63335" providerId="LiveId" clId="{3ED0C291-7D32-44BD-821E-EEABF2784BA8}" dt="2025-09-18T04:10:09.755" v="464" actId="1076"/>
+      <pc:sldChg chg="addSp modSp add mod ord">
+        <pc:chgData name="Pedro Sánchez" userId="41291a4e6da63335" providerId="LiveId" clId="{3ED0C291-7D32-44BD-821E-EEABF2784BA8}" dt="2025-10-16T21:32:43.393" v="582" actId="11529"/>
         <pc:sldMkLst>
           <pc:docMk/>
           <pc:sldMk cId="1825084229" sldId="264"/>
@@ -337,13 +347,29 @@
             <ac:spMk id="3" creationId="{63654C2C-F047-C140-1CEA-4F3DF814A794}"/>
           </ac:spMkLst>
         </pc:spChg>
+        <pc:spChg chg="add">
+          <ac:chgData name="Pedro Sánchez" userId="41291a4e6da63335" providerId="LiveId" clId="{3ED0C291-7D32-44BD-821E-EEABF2784BA8}" dt="2025-10-16T21:32:43.393" v="582" actId="11529"/>
+          <ac:spMkLst>
+            <pc:docMk/>
+            <pc:sldMk cId="1825084229" sldId="264"/>
+            <ac:spMk id="6" creationId="{DB045DBC-CAB4-6CF2-774F-04394770B6D4}"/>
+          </ac:spMkLst>
+        </pc:spChg>
       </pc:sldChg>
       <pc:sldChg chg="addSp delSp modSp add mod">
-        <pc:chgData name="Pedro Sánchez" userId="41291a4e6da63335" providerId="LiveId" clId="{3ED0C291-7D32-44BD-821E-EEABF2784BA8}" dt="2025-09-18T04:06:38.906" v="351" actId="1076"/>
+        <pc:chgData name="Pedro Sánchez" userId="41291a4e6da63335" providerId="LiveId" clId="{3ED0C291-7D32-44BD-821E-EEABF2784BA8}" dt="2025-10-16T21:27:06.862" v="545" actId="20577"/>
         <pc:sldMkLst>
           <pc:docMk/>
           <pc:sldMk cId="2294619585" sldId="265"/>
         </pc:sldMkLst>
+        <pc:spChg chg="add mod">
+          <ac:chgData name="Pedro Sánchez" userId="41291a4e6da63335" providerId="LiveId" clId="{3ED0C291-7D32-44BD-821E-EEABF2784BA8}" dt="2025-10-16T21:27:06.862" v="545" actId="20577"/>
+          <ac:spMkLst>
+            <pc:docMk/>
+            <pc:sldMk cId="2294619585" sldId="265"/>
+            <ac:spMk id="2" creationId="{9267FDDA-4C2F-D653-585B-3BD40829D61E}"/>
+          </ac:spMkLst>
+        </pc:spChg>
         <pc:picChg chg="mod">
           <ac:chgData name="Pedro Sánchez" userId="41291a4e6da63335" providerId="LiveId" clId="{3ED0C291-7D32-44BD-821E-EEABF2784BA8}" dt="2025-09-18T04:06:38.906" v="351" actId="1076"/>
           <ac:picMkLst>
@@ -400,6 +426,36 @@
           </ac:spMkLst>
         </pc:spChg>
       </pc:sldChg>
+      <pc:sldChg chg="modSp new mod">
+        <pc:chgData name="Pedro Sánchez" userId="41291a4e6da63335" providerId="LiveId" clId="{3ED0C291-7D32-44BD-821E-EEABF2784BA8}" dt="2025-10-16T21:22:55.744" v="477" actId="20577"/>
+        <pc:sldMkLst>
+          <pc:docMk/>
+          <pc:sldMk cId="495250123" sldId="267"/>
+        </pc:sldMkLst>
+        <pc:spChg chg="mod">
+          <ac:chgData name="Pedro Sánchez" userId="41291a4e6da63335" providerId="LiveId" clId="{3ED0C291-7D32-44BD-821E-EEABF2784BA8}" dt="2025-10-16T21:22:55.744" v="477" actId="20577"/>
+          <ac:spMkLst>
+            <pc:docMk/>
+            <pc:sldMk cId="495250123" sldId="267"/>
+            <ac:spMk id="2" creationId="{0BF43F53-6045-B111-CC4C-5F6E622D4A03}"/>
+          </ac:spMkLst>
+        </pc:spChg>
+      </pc:sldChg>
+      <pc:sldChg chg="modSp new mod">
+        <pc:chgData name="Pedro Sánchez" userId="41291a4e6da63335" providerId="LiveId" clId="{3ED0C291-7D32-44BD-821E-EEABF2784BA8}" dt="2025-10-16T21:31:52.318" v="581" actId="20577"/>
+        <pc:sldMkLst>
+          <pc:docMk/>
+          <pc:sldMk cId="435417858" sldId="268"/>
+        </pc:sldMkLst>
+        <pc:spChg chg="mod">
+          <ac:chgData name="Pedro Sánchez" userId="41291a4e6da63335" providerId="LiveId" clId="{3ED0C291-7D32-44BD-821E-EEABF2784BA8}" dt="2025-10-16T21:31:52.318" v="581" actId="20577"/>
+          <ac:spMkLst>
+            <pc:docMk/>
+            <pc:sldMk cId="435417858" sldId="268"/>
+            <ac:spMk id="2" creationId="{F66A06A1-429D-5897-8071-255E7A23A151}"/>
+          </ac:spMkLst>
+        </pc:spChg>
+      </pc:sldChg>
     </pc:docChg>
   </pc:docChgLst>
 </pc:chgInfo>
@@ -554,7 +610,7 @@
           <a:p>
             <a:fld id="{25A05EA2-0A53-4C12-BE14-DA45449A4726}" type="datetimeFigureOut">
               <a:rPr lang="es-CO" smtClean="0"/>
-              <a:t>26/09/2025</a:t>
+              <a:t>16/10/2025</a:t>
             </a:fld>
             <a:endParaRPr lang="es-CO"/>
           </a:p>
@@ -754,7 +810,7 @@
           <a:p>
             <a:fld id="{25A05EA2-0A53-4C12-BE14-DA45449A4726}" type="datetimeFigureOut">
               <a:rPr lang="es-CO" smtClean="0"/>
-              <a:t>26/09/2025</a:t>
+              <a:t>16/10/2025</a:t>
             </a:fld>
             <a:endParaRPr lang="es-CO"/>
           </a:p>
@@ -964,7 +1020,7 @@
           <a:p>
             <a:fld id="{25A05EA2-0A53-4C12-BE14-DA45449A4726}" type="datetimeFigureOut">
               <a:rPr lang="es-CO" smtClean="0"/>
-              <a:t>26/09/2025</a:t>
+              <a:t>16/10/2025</a:t>
             </a:fld>
             <a:endParaRPr lang="es-CO"/>
           </a:p>
@@ -1164,7 +1220,7 @@
           <a:p>
             <a:fld id="{25A05EA2-0A53-4C12-BE14-DA45449A4726}" type="datetimeFigureOut">
               <a:rPr lang="es-CO" smtClean="0"/>
-              <a:t>26/09/2025</a:t>
+              <a:t>16/10/2025</a:t>
             </a:fld>
             <a:endParaRPr lang="es-CO"/>
           </a:p>
@@ -1440,7 +1496,7 @@
           <a:p>
             <a:fld id="{25A05EA2-0A53-4C12-BE14-DA45449A4726}" type="datetimeFigureOut">
               <a:rPr lang="es-CO" smtClean="0"/>
-              <a:t>26/09/2025</a:t>
+              <a:t>16/10/2025</a:t>
             </a:fld>
             <a:endParaRPr lang="es-CO"/>
           </a:p>
@@ -1708,7 +1764,7 @@
           <a:p>
             <a:fld id="{25A05EA2-0A53-4C12-BE14-DA45449A4726}" type="datetimeFigureOut">
               <a:rPr lang="es-CO" smtClean="0"/>
-              <a:t>26/09/2025</a:t>
+              <a:t>16/10/2025</a:t>
             </a:fld>
             <a:endParaRPr lang="es-CO"/>
           </a:p>
@@ -2123,7 +2179,7 @@
           <a:p>
             <a:fld id="{25A05EA2-0A53-4C12-BE14-DA45449A4726}" type="datetimeFigureOut">
               <a:rPr lang="es-CO" smtClean="0"/>
-              <a:t>26/09/2025</a:t>
+              <a:t>16/10/2025</a:t>
             </a:fld>
             <a:endParaRPr lang="es-CO"/>
           </a:p>
@@ -2265,7 +2321,7 @@
           <a:p>
             <a:fld id="{25A05EA2-0A53-4C12-BE14-DA45449A4726}" type="datetimeFigureOut">
               <a:rPr lang="es-CO" smtClean="0"/>
-              <a:t>26/09/2025</a:t>
+              <a:t>16/10/2025</a:t>
             </a:fld>
             <a:endParaRPr lang="es-CO"/>
           </a:p>
@@ -2378,7 +2434,7 @@
           <a:p>
             <a:fld id="{25A05EA2-0A53-4C12-BE14-DA45449A4726}" type="datetimeFigureOut">
               <a:rPr lang="es-CO" smtClean="0"/>
-              <a:t>26/09/2025</a:t>
+              <a:t>16/10/2025</a:t>
             </a:fld>
             <a:endParaRPr lang="es-CO"/>
           </a:p>
@@ -2691,7 +2747,7 @@
           <a:p>
             <a:fld id="{25A05EA2-0A53-4C12-BE14-DA45449A4726}" type="datetimeFigureOut">
               <a:rPr lang="es-CO" smtClean="0"/>
-              <a:t>26/09/2025</a:t>
+              <a:t>16/10/2025</a:t>
             </a:fld>
             <a:endParaRPr lang="es-CO"/>
           </a:p>
@@ -2980,7 +3036,7 @@
           <a:p>
             <a:fld id="{25A05EA2-0A53-4C12-BE14-DA45449A4726}" type="datetimeFigureOut">
               <a:rPr lang="es-CO" smtClean="0"/>
-              <a:t>26/09/2025</a:t>
+              <a:t>16/10/2025</a:t>
             </a:fld>
             <a:endParaRPr lang="es-CO"/>
           </a:p>
@@ -3223,7 +3279,7 @@
           <a:p>
             <a:fld id="{25A05EA2-0A53-4C12-BE14-DA45449A4726}" type="datetimeFigureOut">
               <a:rPr lang="es-CO" smtClean="0"/>
-              <a:t>26/09/2025</a:t>
+              <a:t>16/10/2025</a:t>
             </a:fld>
             <a:endParaRPr lang="es-CO"/>
           </a:p>
@@ -3843,7 +3899,7 @@
         <p:cNvPr id="1" name="">
           <a:extLst>
             <a:ext uri="{FF2B5EF4-FFF2-40B4-BE49-F238E27FC236}">
-              <a16:creationId xmlns:a16="http://schemas.microsoft.com/office/drawing/2014/main" id="{A5E0EE13-240E-308E-CF5B-8577EF461E5C}"/>
+              <a16:creationId xmlns:a16="http://schemas.microsoft.com/office/drawing/2014/main" id="{07AC5BAB-B01E-1969-A6C1-A5D5842C13F4}"/>
             </a:ext>
           </a:extLst>
         </p:cNvPr>
@@ -3863,7 +3919,7 @@
           <p:cNvPr id="3" name="Subtítulo 2">
             <a:extLst>
               <a:ext uri="{FF2B5EF4-FFF2-40B4-BE49-F238E27FC236}">
-                <a16:creationId xmlns:a16="http://schemas.microsoft.com/office/drawing/2014/main" id="{63654C2C-F047-C140-1CEA-4F3DF814A794}"/>
+                <a16:creationId xmlns:a16="http://schemas.microsoft.com/office/drawing/2014/main" id="{19EBB4F4-5822-F8CA-39F5-0439B9882C53}"/>
               </a:ext>
             </a:extLst>
           </p:cNvPr>
@@ -3876,8 +3932,8 @@
         </p:nvSpPr>
         <p:spPr>
           <a:xfrm>
-            <a:off x="987286" y="1991137"/>
-            <a:ext cx="6367670" cy="1437863"/>
+            <a:off x="1046921" y="1991137"/>
+            <a:ext cx="4850295" cy="3289854"/>
           </a:xfrm>
         </p:spPr>
         <p:txBody>
@@ -3886,100 +3942,82 @@
           </a:bodyPr>
           <a:lstStyle/>
           <a:p>
+            <a:pPr algn="just">
+              <a:spcBef>
+                <a:spcPts val="0"/>
+              </a:spcBef>
+            </a:pPr>
+            <a:r>
+              <a:rPr lang="es-MX" sz="1200" b="1" dirty="0"/>
+              <a:t>SARIMAX </a:t>
+            </a:r>
+          </a:p>
+          <a:p>
+            <a:pPr algn="just">
+              <a:spcBef>
+                <a:spcPts val="0"/>
+              </a:spcBef>
+            </a:pPr>
+            <a:r>
+              <a:rPr lang="en-US" sz="1000" dirty="0"/>
+              <a:t>(Seasonal </a:t>
+            </a:r>
+            <a:r>
+              <a:rPr lang="en-US" sz="1000" dirty="0" err="1"/>
+              <a:t>AutoRegressive</a:t>
+            </a:r>
+            <a:r>
+              <a:rPr lang="en-US" sz="1000" dirty="0"/>
+              <a:t> Integrated Moving Average with </a:t>
+            </a:r>
+            <a:r>
+              <a:rPr lang="en-US" sz="1000" dirty="0" err="1"/>
+              <a:t>eXogenous</a:t>
+            </a:r>
+            <a:r>
+              <a:rPr lang="en-US" sz="1000" dirty="0"/>
+              <a:t> regressors)</a:t>
+            </a:r>
+            <a:endParaRPr lang="es-MX" sz="1000" dirty="0"/>
+          </a:p>
+          <a:p>
             <a:pPr algn="just"/>
             <a:r>
-              <a:rPr lang="es-MX" sz="1400" b="1" dirty="0">
-                <a:solidFill>
-                  <a:schemeClr val="bg2">
-                    <a:lumMod val="75000"/>
-                  </a:schemeClr>
-                </a:solidFill>
-              </a:rPr>
-              <a:t>¿Qué se ha hecho?</a:t>
-            </a:r>
-          </a:p>
-          <a:p>
-            <a:pPr marL="228600" indent="-228600" algn="just">
-              <a:buFont typeface="+mj-lt"/>
-              <a:buAutoNum type="arabicPeriod"/>
-            </a:pPr>
-            <a:r>
-              <a:rPr lang="es-MX" sz="1400" dirty="0">
-                <a:solidFill>
-                  <a:schemeClr val="bg2">
-                    <a:lumMod val="75000"/>
-                  </a:schemeClr>
-                </a:solidFill>
-              </a:rPr>
-              <a:t>Entender el contexto</a:t>
-            </a:r>
-          </a:p>
-          <a:p>
-            <a:pPr marL="228600" indent="-228600" algn="just">
-              <a:buFont typeface="+mj-lt"/>
-              <a:buAutoNum type="arabicPeriod"/>
-            </a:pPr>
-            <a:r>
-              <a:rPr lang="es-MX" sz="1400" dirty="0">
-                <a:solidFill>
-                  <a:schemeClr val="bg2">
-                    <a:lumMod val="75000"/>
-                  </a:schemeClr>
-                </a:solidFill>
-              </a:rPr>
-              <a:t>Identificar variables a usar</a:t>
-            </a:r>
-          </a:p>
-          <a:p>
-            <a:pPr marL="228600" indent="-228600" algn="just">
-              <a:buFont typeface="+mj-lt"/>
-              <a:buAutoNum type="arabicPeriod"/>
-            </a:pPr>
-            <a:r>
-              <a:rPr lang="es-MX" sz="1400" dirty="0">
-                <a:solidFill>
-                  <a:schemeClr val="bg2">
-                    <a:lumMod val="75000"/>
-                  </a:schemeClr>
-                </a:solidFill>
-              </a:rPr>
-              <a:t>Aplicar modelos </a:t>
-            </a:r>
-            <a:r>
-              <a:rPr lang="es-MX" sz="1400" dirty="0" err="1">
-                <a:solidFill>
-                  <a:schemeClr val="bg2">
-                    <a:lumMod val="75000"/>
-                  </a:schemeClr>
-                </a:solidFill>
-              </a:rPr>
-              <a:t>univariados</a:t>
-            </a:r>
-            <a:r>
-              <a:rPr lang="es-MX" sz="1400" dirty="0">
-                <a:solidFill>
-                  <a:schemeClr val="bg2">
-                    <a:lumMod val="75000"/>
-                  </a:schemeClr>
-                </a:solidFill>
-              </a:rPr>
-              <a:t>: SARIMA</a:t>
-            </a:r>
-          </a:p>
-          <a:p>
-            <a:pPr marL="228600" indent="-228600" algn="just">
-              <a:buFont typeface="+mj-lt"/>
-              <a:buAutoNum type="arabicPeriod"/>
-            </a:pPr>
-            <a:r>
-              <a:rPr lang="es-MX" sz="1400" dirty="0">
-                <a:solidFill>
-                  <a:schemeClr val="bg2">
-                    <a:lumMod val="75000"/>
-                  </a:schemeClr>
-                </a:solidFill>
-              </a:rPr>
-              <a:t>Aplicar modelos multivariados: SARIMAX y VAR</a:t>
+              <a:rPr lang="es-MX" sz="1200" dirty="0"/>
+              <a:t>Extensión de ARIMA que incorpora estacionalidad y variables exógenas.</a:t>
+            </a:r>
+          </a:p>
+          <a:p>
+            <a:pPr algn="just"/>
+            <a:r>
+              <a:rPr lang="es-MX" sz="1200" b="1" dirty="0"/>
+              <a:t>Inputs: </a:t>
+            </a:r>
+            <a:r>
+              <a:rPr lang="es-MX" sz="1200" dirty="0"/>
+              <a:t>serie temporal, parámetros (p, d, q), parámetros estacionales (P, D, Q, m) y variables externas.</a:t>
+            </a:r>
+          </a:p>
+          <a:p>
+            <a:pPr algn="just"/>
+            <a:r>
+              <a:rPr lang="es-MX" sz="1200" b="1" dirty="0"/>
+              <a:t>Output: </a:t>
+            </a:r>
+            <a:r>
+              <a:rPr lang="es-MX" sz="1200" dirty="0"/>
+              <a:t>pronósticos considerando tendencia, estacionalidad y factores externos.</a:t>
+            </a:r>
+          </a:p>
+          <a:p>
+            <a:pPr algn="just"/>
+            <a:r>
+              <a:rPr lang="es-MX" sz="1200" b="1" dirty="0"/>
+              <a:t>Limitaciones: </a:t>
+            </a:r>
+            <a:r>
+              <a:rPr lang="es-MX" sz="1200" dirty="0"/>
+              <a:t>requiere conocer o predecir variables exógenas futuras; sensible a errores en parámetros y supuestos de estacionariedad.</a:t>
             </a:r>
           </a:p>
         </p:txBody>
@@ -3989,7 +4027,7 @@
           <p:cNvPr id="4" name="Rectángulo 3">
             <a:extLst>
               <a:ext uri="{FF2B5EF4-FFF2-40B4-BE49-F238E27FC236}">
-                <a16:creationId xmlns:a16="http://schemas.microsoft.com/office/drawing/2014/main" id="{2AC14BCC-8B44-03BC-2BE4-C144568F039D}"/>
+                <a16:creationId xmlns:a16="http://schemas.microsoft.com/office/drawing/2014/main" id="{42107846-B800-3E06-0086-1877F6137CA3}"/>
               </a:ext>
             </a:extLst>
           </p:cNvPr>
@@ -4044,7 +4082,7 @@
           <p:cNvPr id="1026" name="Picture 2" descr="Carreras y oferta Académica de Pregrado | Uniandes">
             <a:extLst>
               <a:ext uri="{FF2B5EF4-FFF2-40B4-BE49-F238E27FC236}">
-                <a16:creationId xmlns:a16="http://schemas.microsoft.com/office/drawing/2014/main" id="{C577E146-7C19-13DD-7D91-7FC5D2BC35E3}"/>
+                <a16:creationId xmlns:a16="http://schemas.microsoft.com/office/drawing/2014/main" id="{CA11B9A8-8A4F-D5B9-E681-FCFFC5D30E6D}"/>
               </a:ext>
             </a:extLst>
           </p:cNvPr>
@@ -4091,7 +4129,7 @@
           <p:cNvPr id="5" name="CuadroTexto 4">
             <a:extLst>
               <a:ext uri="{FF2B5EF4-FFF2-40B4-BE49-F238E27FC236}">
-                <a16:creationId xmlns:a16="http://schemas.microsoft.com/office/drawing/2014/main" id="{DE7E73BC-9557-F4B7-3970-53075E6B4A2B}"/>
+                <a16:creationId xmlns:a16="http://schemas.microsoft.com/office/drawing/2014/main" id="{1CB48B27-906D-6CF1-082F-1C750E0D3D6C}"/>
               </a:ext>
             </a:extLst>
           </p:cNvPr>
@@ -4116,17 +4154,52 @@
           <a:p>
             <a:r>
               <a:rPr lang="es-CO" b="1" dirty="0"/>
-              <a:t>Metodología</a:t>
-            </a:r>
-          </a:p>
-        </p:txBody>
-      </p:sp>
-      <p:sp>
-        <p:nvSpPr>
-          <p:cNvPr id="2" name="Subtítulo 2">
-            <a:extLst>
-              <a:ext uri="{FF2B5EF4-FFF2-40B4-BE49-F238E27FC236}">
-                <a16:creationId xmlns:a16="http://schemas.microsoft.com/office/drawing/2014/main" id="{06F8662D-E655-D0AB-C953-7E57D740C5D7}"/>
+              <a:t>Resultados</a:t>
+            </a:r>
+          </a:p>
+        </p:txBody>
+      </p:sp>
+      <p:pic>
+        <p:nvPicPr>
+          <p:cNvPr id="7" name="Imagen 6">
+            <a:extLst>
+              <a:ext uri="{FF2B5EF4-FFF2-40B4-BE49-F238E27FC236}">
+                <a16:creationId xmlns:a16="http://schemas.microsoft.com/office/drawing/2014/main" id="{58A2FEFB-2262-1E84-25C1-E48B1423F11F}"/>
+              </a:ext>
+            </a:extLst>
+          </p:cNvPr>
+          <p:cNvPicPr>
+            <a:picLocks noChangeAspect="1"/>
+          </p:cNvPicPr>
+          <p:nvPr/>
+        </p:nvPicPr>
+        <p:blipFill>
+          <a:blip r:embed="rId3">
+            <a:extLst>
+              <a:ext uri="{28A0092B-C50C-407E-A947-70E740481C1C}">
+                <a14:useLocalDpi xmlns:a14="http://schemas.microsoft.com/office/drawing/2010/main" val="0"/>
+              </a:ext>
+            </a:extLst>
+          </a:blip>
+          <a:srcRect/>
+          <a:stretch/>
+        </p:blipFill>
+        <p:spPr>
+          <a:xfrm>
+            <a:off x="6294786" y="1817503"/>
+            <a:ext cx="5439187" cy="3222995"/>
+          </a:xfrm>
+          <a:prstGeom prst="rect">
+            <a:avLst/>
+          </a:prstGeom>
+        </p:spPr>
+      </p:pic>
+      <p:sp>
+        <p:nvSpPr>
+          <p:cNvPr id="8" name="Subtítulo 2">
+            <a:extLst>
+              <a:ext uri="{FF2B5EF4-FFF2-40B4-BE49-F238E27FC236}">
+                <a16:creationId xmlns:a16="http://schemas.microsoft.com/office/drawing/2014/main" id="{FB1E0EED-EE72-350A-A469-4DEBB29853E7}"/>
               </a:ext>
             </a:extLst>
           </p:cNvPr>
@@ -4137,8 +4210,8 @@
         </p:nvSpPr>
         <p:spPr>
           <a:xfrm>
-            <a:off x="987286" y="3892823"/>
-            <a:ext cx="6367670" cy="1437863"/>
+            <a:off x="7752522" y="5145979"/>
+            <a:ext cx="3061252" cy="1292086"/>
           </a:xfrm>
           <a:prstGeom prst="rect">
             <a:avLst/>
@@ -4313,54 +4386,94 @@
             </a:lvl9pPr>
           </a:lstStyle>
           <a:p>
-            <a:pPr algn="just"/>
-            <a:r>
-              <a:rPr lang="es-MX" sz="1400" b="1" dirty="0"/>
-              <a:t>¿Qué queda por hacer?</a:t>
-            </a:r>
-          </a:p>
-          <a:p>
-            <a:pPr algn="just"/>
-            <a:r>
-              <a:rPr lang="es-MX" sz="1400" dirty="0"/>
-              <a:t>5. Aplicar modelos de machine </a:t>
-            </a:r>
-            <a:r>
-              <a:rPr lang="es-MX" sz="1400" dirty="0" err="1"/>
-              <a:t>learning</a:t>
-            </a:r>
-            <a:r>
-              <a:rPr lang="es-MX" sz="1400" dirty="0"/>
-              <a:t>: </a:t>
-            </a:r>
-            <a:r>
-              <a:rPr lang="es-MX" sz="1400" dirty="0" err="1"/>
-              <a:t>XGBoost</a:t>
-            </a:r>
-            <a:r>
-              <a:rPr lang="es-MX" sz="1400" dirty="0"/>
-              <a:t>, redes neuronales (LSTM)</a:t>
-            </a:r>
-          </a:p>
-          <a:p>
-            <a:pPr algn="just"/>
-            <a:r>
-              <a:rPr lang="es-MX" sz="1400" dirty="0"/>
-              <a:t>6. Comparar modelos y seleccionar mejor</a:t>
-            </a:r>
-          </a:p>
-          <a:p>
-            <a:pPr algn="just"/>
-            <a:r>
-              <a:rPr lang="es-MX" sz="1400" dirty="0"/>
-              <a:t>7. Redacción del documento</a:t>
-            </a:r>
-          </a:p>
-          <a:p>
-            <a:pPr algn="just"/>
-            <a:r>
-              <a:rPr lang="es-MX" sz="1400" dirty="0"/>
-              <a:t>8. Presentación y sustentación</a:t>
+            <a:pPr>
+              <a:lnSpc>
+                <a:spcPts val="1440"/>
+              </a:lnSpc>
+              <a:spcBef>
+                <a:spcPts val="600"/>
+              </a:spcBef>
+            </a:pPr>
+            <a:r>
+              <a:rPr lang="es-MX" sz="1000" b="1" dirty="0"/>
+              <a:t>Orden no estacional: </a:t>
+            </a:r>
+            <a:r>
+              <a:rPr lang="es-MX" sz="1000" dirty="0"/>
+              <a:t>(1, 1, 2)</a:t>
+            </a:r>
+          </a:p>
+          <a:p>
+            <a:pPr>
+              <a:lnSpc>
+                <a:spcPts val="1440"/>
+              </a:lnSpc>
+              <a:spcBef>
+                <a:spcPts val="600"/>
+              </a:spcBef>
+            </a:pPr>
+            <a:r>
+              <a:rPr lang="es-MX" sz="1000" b="1" dirty="0"/>
+              <a:t>Orden estacional: </a:t>
+            </a:r>
+            <a:r>
+              <a:rPr lang="es-MX" sz="1000" dirty="0"/>
+              <a:t>(0, 1, 1, 4)</a:t>
+            </a:r>
+            <a:endParaRPr lang="es-MX" sz="1000" b="1" dirty="0"/>
+          </a:p>
+          <a:p>
+            <a:pPr>
+              <a:lnSpc>
+                <a:spcPts val="1440"/>
+              </a:lnSpc>
+              <a:spcBef>
+                <a:spcPts val="600"/>
+              </a:spcBef>
+            </a:pPr>
+            <a:r>
+              <a:rPr lang="es-MX" sz="1000" b="1" dirty="0"/>
+              <a:t>AIC:</a:t>
+            </a:r>
+            <a:r>
+              <a:rPr lang="es-MX" sz="1000" dirty="0"/>
+              <a:t> 956.28</a:t>
+            </a:r>
+          </a:p>
+          <a:p>
+            <a:pPr>
+              <a:lnSpc>
+                <a:spcPts val="1440"/>
+              </a:lnSpc>
+              <a:spcBef>
+                <a:spcPts val="600"/>
+              </a:spcBef>
+            </a:pPr>
+            <a:r>
+              <a:rPr lang="es-MX" sz="1000" b="1" dirty="0"/>
+              <a:t>MAE: </a:t>
+            </a:r>
+            <a:r>
+              <a:rPr lang="es-MX" sz="1000" dirty="0"/>
+              <a:t>1268.97</a:t>
+            </a:r>
+          </a:p>
+          <a:p>
+            <a:pPr>
+              <a:lnSpc>
+                <a:spcPts val="1440"/>
+              </a:lnSpc>
+              <a:spcBef>
+                <a:spcPts val="600"/>
+              </a:spcBef>
+            </a:pPr>
+            <a:r>
+              <a:rPr lang="es-MX" sz="1000" b="1" dirty="0"/>
+              <a:t>RMSE: </a:t>
+            </a:r>
+            <a:r>
+              <a:rPr lang="es-MX" sz="1000" dirty="0"/>
+              <a:t>1564.17</a:t>
             </a:r>
           </a:p>
         </p:txBody>
@@ -4368,7 +4481,7 @@
     </p:spTree>
     <p:extLst>
       <p:ext uri="{BB962C8B-B14F-4D97-AF65-F5344CB8AC3E}">
-        <p14:creationId xmlns:p14="http://schemas.microsoft.com/office/powerpoint/2010/main" val="1825084229"/>
+        <p14:creationId xmlns:p14="http://schemas.microsoft.com/office/powerpoint/2010/main" val="2248330113"/>
       </p:ext>
     </p:extLst>
   </p:cSld>
@@ -4386,7 +4499,7 @@
         <p:cNvPr id="1" name="">
           <a:extLst>
             <a:ext uri="{FF2B5EF4-FFF2-40B4-BE49-F238E27FC236}">
-              <a16:creationId xmlns:a16="http://schemas.microsoft.com/office/drawing/2014/main" id="{6AC5C248-460E-DD8E-9AF2-7FEC7BBB3894}"/>
+              <a16:creationId xmlns:a16="http://schemas.microsoft.com/office/drawing/2014/main" id="{6664A386-92BA-88B4-5721-A07FCA69627A}"/>
             </a:ext>
           </a:extLst>
         </p:cNvPr>
@@ -4406,7 +4519,7 @@
           <p:cNvPr id="3" name="Subtítulo 2">
             <a:extLst>
               <a:ext uri="{FF2B5EF4-FFF2-40B4-BE49-F238E27FC236}">
-                <a16:creationId xmlns:a16="http://schemas.microsoft.com/office/drawing/2014/main" id="{358FFBA6-2721-3365-E68D-AC8AD2EF99B4}"/>
+                <a16:creationId xmlns:a16="http://schemas.microsoft.com/office/drawing/2014/main" id="{324BC577-5816-B7D0-08A1-26DDDEEA840A}"/>
               </a:ext>
             </a:extLst>
           </p:cNvPr>
@@ -4419,8 +4532,8 @@
         </p:nvSpPr>
         <p:spPr>
           <a:xfrm>
-            <a:off x="2912165" y="3028121"/>
-            <a:ext cx="6367670" cy="980662"/>
+            <a:off x="1086679" y="1991137"/>
+            <a:ext cx="4810538" cy="3289854"/>
           </a:xfrm>
         </p:spPr>
         <p:txBody>
@@ -4429,15 +4542,69 @@
           </a:bodyPr>
           <a:lstStyle/>
           <a:p>
-            <a:r>
-              <a:rPr lang="es-MX" b="1" dirty="0"/>
-              <a:t>Gracias!</a:t>
-            </a:r>
-          </a:p>
-          <a:p>
-            <a:r>
-              <a:rPr lang="es-MX" dirty="0"/>
-              <a:t>Dudas, comentarios, sugerencias</a:t>
+            <a:pPr algn="just">
+              <a:spcBef>
+                <a:spcPts val="0"/>
+              </a:spcBef>
+            </a:pPr>
+            <a:r>
+              <a:rPr lang="es-MX" sz="1200" b="1" dirty="0"/>
+              <a:t>VAR</a:t>
+            </a:r>
+          </a:p>
+          <a:p>
+            <a:pPr algn="just">
+              <a:spcBef>
+                <a:spcPts val="0"/>
+              </a:spcBef>
+            </a:pPr>
+            <a:r>
+              <a:rPr lang="es-MX" sz="1000" dirty="0"/>
+              <a:t>(Vector </a:t>
+            </a:r>
+            <a:r>
+              <a:rPr lang="es-MX" sz="1000" dirty="0" err="1"/>
+              <a:t>AutoRegresivo</a:t>
+            </a:r>
+            <a:r>
+              <a:rPr lang="es-MX" sz="1000" dirty="0"/>
+              <a:t>)</a:t>
+            </a:r>
+          </a:p>
+          <a:p>
+            <a:pPr algn="just"/>
+            <a:r>
+              <a:rPr lang="es-MX" sz="1200" dirty="0"/>
+              <a:t>Modelo multivariante que explica la dinámica conjunta de varias variables endógenas con sus rezagos.</a:t>
+            </a:r>
+          </a:p>
+          <a:p>
+            <a:pPr algn="just"/>
+            <a:r>
+              <a:rPr lang="es-MX" sz="1200" b="1" dirty="0"/>
+              <a:t>Inputs: </a:t>
+            </a:r>
+            <a:r>
+              <a:rPr lang="es-MX" sz="1200" dirty="0"/>
+              <a:t>valores pasados de todas las variables, y opcionalmente variables exógenas o deterministas.</a:t>
+            </a:r>
+          </a:p>
+          <a:p>
+            <a:pPr algn="just"/>
+            <a:r>
+              <a:rPr lang="es-MX" sz="1200" b="1" dirty="0"/>
+              <a:t>Output: </a:t>
+            </a:r>
+            <a:r>
+              <a:rPr lang="es-MX" sz="1200" dirty="0"/>
+              <a:t>predicciones de cada variable en función de sus propios rezagos y los de las demás.</a:t>
+            </a:r>
+          </a:p>
+          <a:p>
+            <a:pPr algn="just"/>
+            <a:r>
+              <a:rPr lang="es-MX" sz="1200" dirty="0"/>
+              <a:t>Limitaciones: sensible a multicolinealidad, riesgo de sobreajuste, necesidad de estacionariedad y dificultad para interpretación causal estricta.</a:t>
             </a:r>
           </a:p>
         </p:txBody>
@@ -4447,7 +4614,7 @@
           <p:cNvPr id="4" name="Rectángulo 3">
             <a:extLst>
               <a:ext uri="{FF2B5EF4-FFF2-40B4-BE49-F238E27FC236}">
-                <a16:creationId xmlns:a16="http://schemas.microsoft.com/office/drawing/2014/main" id="{9D7C6D38-9DD4-6BC4-5E2B-A7E475A2CA41}"/>
+                <a16:creationId xmlns:a16="http://schemas.microsoft.com/office/drawing/2014/main" id="{DC867BF5-B881-8867-3A01-F89DABF01B47}"/>
               </a:ext>
             </a:extLst>
           </p:cNvPr>
@@ -4502,7 +4669,7 @@
           <p:cNvPr id="1026" name="Picture 2" descr="Carreras y oferta Académica de Pregrado | Uniandes">
             <a:extLst>
               <a:ext uri="{FF2B5EF4-FFF2-40B4-BE49-F238E27FC236}">
-                <a16:creationId xmlns:a16="http://schemas.microsoft.com/office/drawing/2014/main" id="{CFACC16F-AD38-B167-2C71-5368849E12F7}"/>
+                <a16:creationId xmlns:a16="http://schemas.microsoft.com/office/drawing/2014/main" id="{537D5F15-0D21-8A12-3403-2C1AA9C08FFF}"/>
               </a:ext>
             </a:extLst>
           </p:cNvPr>
@@ -4549,7 +4716,7 @@
           <p:cNvPr id="5" name="CuadroTexto 4">
             <a:extLst>
               <a:ext uri="{FF2B5EF4-FFF2-40B4-BE49-F238E27FC236}">
-                <a16:creationId xmlns:a16="http://schemas.microsoft.com/office/drawing/2014/main" id="{3C3A45BC-25E4-F4F1-4F13-A0EFB41321DA}"/>
+                <a16:creationId xmlns:a16="http://schemas.microsoft.com/office/drawing/2014/main" id="{719387E4-6C77-DFBC-C767-95828F218FEE}"/>
               </a:ext>
             </a:extLst>
           </p:cNvPr>
@@ -4574,15 +4741,332 @@
           <a:p>
             <a:r>
               <a:rPr lang="es-CO" b="1" dirty="0"/>
-              <a:t>Cierre</a:t>
-            </a:r>
-          </a:p>
-        </p:txBody>
-      </p:sp>
+              <a:t>Resultados</a:t>
+            </a:r>
+          </a:p>
+        </p:txBody>
+      </p:sp>
+      <p:pic>
+        <p:nvPicPr>
+          <p:cNvPr id="7" name="Imagen 6">
+            <a:extLst>
+              <a:ext uri="{FF2B5EF4-FFF2-40B4-BE49-F238E27FC236}">
+                <a16:creationId xmlns:a16="http://schemas.microsoft.com/office/drawing/2014/main" id="{7748CE84-D147-EE00-E3E9-691BDBDA7E7D}"/>
+              </a:ext>
+            </a:extLst>
+          </p:cNvPr>
+          <p:cNvPicPr>
+            <a:picLocks noChangeAspect="1"/>
+          </p:cNvPicPr>
+          <p:nvPr/>
+        </p:nvPicPr>
+        <p:blipFill>
+          <a:blip r:embed="rId3">
+            <a:extLst>
+              <a:ext uri="{28A0092B-C50C-407E-A947-70E740481C1C}">
+                <a14:useLocalDpi xmlns:a14="http://schemas.microsoft.com/office/drawing/2010/main" val="0"/>
+              </a:ext>
+            </a:extLst>
+          </a:blip>
+          <a:srcRect/>
+          <a:stretch/>
+        </p:blipFill>
+        <p:spPr>
+          <a:xfrm>
+            <a:off x="6294785" y="1994604"/>
+            <a:ext cx="5439189" cy="2868792"/>
+          </a:xfrm>
+          <a:prstGeom prst="rect">
+            <a:avLst/>
+          </a:prstGeom>
+        </p:spPr>
+      </p:pic>
+      <p:sp>
+        <p:nvSpPr>
+          <p:cNvPr id="8" name="Subtítulo 2">
+            <a:extLst>
+              <a:ext uri="{FF2B5EF4-FFF2-40B4-BE49-F238E27FC236}">
+                <a16:creationId xmlns:a16="http://schemas.microsoft.com/office/drawing/2014/main" id="{5FF441EC-4775-2B8F-BF60-07F396D659DF}"/>
+              </a:ext>
+            </a:extLst>
+          </p:cNvPr>
+          <p:cNvSpPr txBox="1">
+            <a:spLocks/>
+          </p:cNvSpPr>
+          <p:nvPr/>
+        </p:nvSpPr>
+        <p:spPr>
+          <a:xfrm>
+            <a:off x="7759148" y="4960449"/>
+            <a:ext cx="3061252" cy="903639"/>
+          </a:xfrm>
+          <a:prstGeom prst="rect">
+            <a:avLst/>
+          </a:prstGeom>
+        </p:spPr>
+        <p:txBody>
+          <a:bodyPr vert="horz" lIns="91440" tIns="45720" rIns="91440" bIns="45720" rtlCol="0">
+            <a:noAutofit/>
+          </a:bodyPr>
+          <a:lstStyle>
+            <a:lvl1pPr marL="0" indent="0" algn="ctr" defTabSz="914400" rtl="0" eaLnBrk="1" latinLnBrk="0" hangingPunct="1">
+              <a:lnSpc>
+                <a:spcPct val="90000"/>
+              </a:lnSpc>
+              <a:spcBef>
+                <a:spcPts val="1000"/>
+              </a:spcBef>
+              <a:buFont typeface="Arial" panose="020B0604020202020204" pitchFamily="34" charset="0"/>
+              <a:buNone/>
+              <a:defRPr sz="2400" kern="1200">
+                <a:solidFill>
+                  <a:schemeClr val="tx1"/>
+                </a:solidFill>
+                <a:latin typeface="+mn-lt"/>
+                <a:ea typeface="+mn-ea"/>
+                <a:cs typeface="+mn-cs"/>
+              </a:defRPr>
+            </a:lvl1pPr>
+            <a:lvl2pPr marL="457200" indent="0" algn="ctr" defTabSz="914400" rtl="0" eaLnBrk="1" latinLnBrk="0" hangingPunct="1">
+              <a:lnSpc>
+                <a:spcPct val="90000"/>
+              </a:lnSpc>
+              <a:spcBef>
+                <a:spcPts val="500"/>
+              </a:spcBef>
+              <a:buFont typeface="Arial" panose="020B0604020202020204" pitchFamily="34" charset="0"/>
+              <a:buNone/>
+              <a:defRPr sz="2000" kern="1200">
+                <a:solidFill>
+                  <a:schemeClr val="tx1"/>
+                </a:solidFill>
+                <a:latin typeface="+mn-lt"/>
+                <a:ea typeface="+mn-ea"/>
+                <a:cs typeface="+mn-cs"/>
+              </a:defRPr>
+            </a:lvl2pPr>
+            <a:lvl3pPr marL="914400" indent="0" algn="ctr" defTabSz="914400" rtl="0" eaLnBrk="1" latinLnBrk="0" hangingPunct="1">
+              <a:lnSpc>
+                <a:spcPct val="90000"/>
+              </a:lnSpc>
+              <a:spcBef>
+                <a:spcPts val="500"/>
+              </a:spcBef>
+              <a:buFont typeface="Arial" panose="020B0604020202020204" pitchFamily="34" charset="0"/>
+              <a:buNone/>
+              <a:defRPr sz="1800" kern="1200">
+                <a:solidFill>
+                  <a:schemeClr val="tx1"/>
+                </a:solidFill>
+                <a:latin typeface="+mn-lt"/>
+                <a:ea typeface="+mn-ea"/>
+                <a:cs typeface="+mn-cs"/>
+              </a:defRPr>
+            </a:lvl3pPr>
+            <a:lvl4pPr marL="1371600" indent="0" algn="ctr" defTabSz="914400" rtl="0" eaLnBrk="1" latinLnBrk="0" hangingPunct="1">
+              <a:lnSpc>
+                <a:spcPct val="90000"/>
+              </a:lnSpc>
+              <a:spcBef>
+                <a:spcPts val="500"/>
+              </a:spcBef>
+              <a:buFont typeface="Arial" panose="020B0604020202020204" pitchFamily="34" charset="0"/>
+              <a:buNone/>
+              <a:defRPr sz="1600" kern="1200">
+                <a:solidFill>
+                  <a:schemeClr val="tx1"/>
+                </a:solidFill>
+                <a:latin typeface="+mn-lt"/>
+                <a:ea typeface="+mn-ea"/>
+                <a:cs typeface="+mn-cs"/>
+              </a:defRPr>
+            </a:lvl4pPr>
+            <a:lvl5pPr marL="1828800" indent="0" algn="ctr" defTabSz="914400" rtl="0" eaLnBrk="1" latinLnBrk="0" hangingPunct="1">
+              <a:lnSpc>
+                <a:spcPct val="90000"/>
+              </a:lnSpc>
+              <a:spcBef>
+                <a:spcPts val="500"/>
+              </a:spcBef>
+              <a:buFont typeface="Arial" panose="020B0604020202020204" pitchFamily="34" charset="0"/>
+              <a:buNone/>
+              <a:defRPr sz="1600" kern="1200">
+                <a:solidFill>
+                  <a:schemeClr val="tx1"/>
+                </a:solidFill>
+                <a:latin typeface="+mn-lt"/>
+                <a:ea typeface="+mn-ea"/>
+                <a:cs typeface="+mn-cs"/>
+              </a:defRPr>
+            </a:lvl5pPr>
+            <a:lvl6pPr marL="2286000" indent="0" algn="ctr" defTabSz="914400" rtl="0" eaLnBrk="1" latinLnBrk="0" hangingPunct="1">
+              <a:lnSpc>
+                <a:spcPct val="90000"/>
+              </a:lnSpc>
+              <a:spcBef>
+                <a:spcPts val="500"/>
+              </a:spcBef>
+              <a:buFont typeface="Arial" panose="020B0604020202020204" pitchFamily="34" charset="0"/>
+              <a:buNone/>
+              <a:defRPr sz="1600" kern="1200">
+                <a:solidFill>
+                  <a:schemeClr val="tx1"/>
+                </a:solidFill>
+                <a:latin typeface="+mn-lt"/>
+                <a:ea typeface="+mn-ea"/>
+                <a:cs typeface="+mn-cs"/>
+              </a:defRPr>
+            </a:lvl6pPr>
+            <a:lvl7pPr marL="2743200" indent="0" algn="ctr" defTabSz="914400" rtl="0" eaLnBrk="1" latinLnBrk="0" hangingPunct="1">
+              <a:lnSpc>
+                <a:spcPct val="90000"/>
+              </a:lnSpc>
+              <a:spcBef>
+                <a:spcPts val="500"/>
+              </a:spcBef>
+              <a:buFont typeface="Arial" panose="020B0604020202020204" pitchFamily="34" charset="0"/>
+              <a:buNone/>
+              <a:defRPr sz="1600" kern="1200">
+                <a:solidFill>
+                  <a:schemeClr val="tx1"/>
+                </a:solidFill>
+                <a:latin typeface="+mn-lt"/>
+                <a:ea typeface="+mn-ea"/>
+                <a:cs typeface="+mn-cs"/>
+              </a:defRPr>
+            </a:lvl7pPr>
+            <a:lvl8pPr marL="3200400" indent="0" algn="ctr" defTabSz="914400" rtl="0" eaLnBrk="1" latinLnBrk="0" hangingPunct="1">
+              <a:lnSpc>
+                <a:spcPct val="90000"/>
+              </a:lnSpc>
+              <a:spcBef>
+                <a:spcPts val="500"/>
+              </a:spcBef>
+              <a:buFont typeface="Arial" panose="020B0604020202020204" pitchFamily="34" charset="0"/>
+              <a:buNone/>
+              <a:defRPr sz="1600" kern="1200">
+                <a:solidFill>
+                  <a:schemeClr val="tx1"/>
+                </a:solidFill>
+                <a:latin typeface="+mn-lt"/>
+                <a:ea typeface="+mn-ea"/>
+                <a:cs typeface="+mn-cs"/>
+              </a:defRPr>
+            </a:lvl8pPr>
+            <a:lvl9pPr marL="3657600" indent="0" algn="ctr" defTabSz="914400" rtl="0" eaLnBrk="1" latinLnBrk="0" hangingPunct="1">
+              <a:lnSpc>
+                <a:spcPct val="90000"/>
+              </a:lnSpc>
+              <a:spcBef>
+                <a:spcPts val="500"/>
+              </a:spcBef>
+              <a:buFont typeface="Arial" panose="020B0604020202020204" pitchFamily="34" charset="0"/>
+              <a:buNone/>
+              <a:defRPr sz="1600" kern="1200">
+                <a:solidFill>
+                  <a:schemeClr val="tx1"/>
+                </a:solidFill>
+                <a:latin typeface="+mn-lt"/>
+                <a:ea typeface="+mn-ea"/>
+                <a:cs typeface="+mn-cs"/>
+              </a:defRPr>
+            </a:lvl9pPr>
+          </a:lstStyle>
+          <a:p>
+            <a:pPr>
+              <a:lnSpc>
+                <a:spcPts val="1440"/>
+              </a:lnSpc>
+              <a:spcBef>
+                <a:spcPts val="600"/>
+              </a:spcBef>
+            </a:pPr>
+            <a:r>
+              <a:rPr lang="es-MX" sz="1000" b="1" dirty="0"/>
+              <a:t>AIC:</a:t>
+            </a:r>
+            <a:r>
+              <a:rPr lang="es-MX" sz="1000" dirty="0"/>
+              <a:t> 60,79</a:t>
+            </a:r>
+          </a:p>
+          <a:p>
+            <a:pPr>
+              <a:lnSpc>
+                <a:spcPts val="1440"/>
+              </a:lnSpc>
+              <a:spcBef>
+                <a:spcPts val="600"/>
+              </a:spcBef>
+            </a:pPr>
+            <a:r>
+              <a:rPr lang="es-MX" sz="1000" b="1" dirty="0"/>
+              <a:t>MAE: </a:t>
+            </a:r>
+            <a:r>
+              <a:rPr lang="es-MX" sz="1000" dirty="0"/>
+              <a:t>5628.66</a:t>
+            </a:r>
+          </a:p>
+          <a:p>
+            <a:pPr>
+              <a:lnSpc>
+                <a:spcPts val="1440"/>
+              </a:lnSpc>
+              <a:spcBef>
+                <a:spcPts val="600"/>
+              </a:spcBef>
+            </a:pPr>
+            <a:r>
+              <a:rPr lang="es-MX" sz="1000" b="1" dirty="0"/>
+              <a:t>RMSE: </a:t>
+            </a:r>
+            <a:r>
+              <a:rPr lang="es-MX" sz="1000" dirty="0"/>
+              <a:t>6083.50</a:t>
+            </a:r>
+          </a:p>
+        </p:txBody>
+      </p:sp>
+      <p:pic>
+        <p:nvPicPr>
+          <p:cNvPr id="6" name="Imagen 5">
+            <a:extLst>
+              <a:ext uri="{FF2B5EF4-FFF2-40B4-BE49-F238E27FC236}">
+                <a16:creationId xmlns:a16="http://schemas.microsoft.com/office/drawing/2014/main" id="{435911E5-7130-3392-ED40-D74B22ADC32A}"/>
+              </a:ext>
+            </a:extLst>
+          </p:cNvPr>
+          <p:cNvPicPr>
+            <a:picLocks noChangeAspect="1"/>
+          </p:cNvPicPr>
+          <p:nvPr/>
+        </p:nvPicPr>
+        <p:blipFill>
+          <a:blip r:embed="rId4">
+            <a:extLst>
+              <a:ext uri="{28A0092B-C50C-407E-A947-70E740481C1C}">
+                <a14:useLocalDpi xmlns:a14="http://schemas.microsoft.com/office/drawing/2010/main" val="0"/>
+              </a:ext>
+            </a:extLst>
+          </a:blip>
+          <a:srcRect/>
+          <a:stretch/>
+        </p:blipFill>
+        <p:spPr>
+          <a:xfrm>
+            <a:off x="1086679" y="4657588"/>
+            <a:ext cx="5009321" cy="1216280"/>
+          </a:xfrm>
+          <a:prstGeom prst="rect">
+            <a:avLst/>
+          </a:prstGeom>
+        </p:spPr>
+      </p:pic>
     </p:spTree>
     <p:extLst>
       <p:ext uri="{BB962C8B-B14F-4D97-AF65-F5344CB8AC3E}">
-        <p14:creationId xmlns:p14="http://schemas.microsoft.com/office/powerpoint/2010/main" val="3835149613"/>
+        <p14:creationId xmlns:p14="http://schemas.microsoft.com/office/powerpoint/2010/main" val="856540980"/>
       </p:ext>
     </p:extLst>
   </p:cSld>
@@ -4592,7 +5076,7 @@
 </p:sld>
 </file>
 
-<file path=ppt/slides/slide2.xml><?xml version="1.0" encoding="utf-8"?>
+<file path=ppt/slides/slide12.xml><?xml version="1.0" encoding="utf-8"?>
 <p:sld xmlns:a="http://schemas.openxmlformats.org/drawingml/2006/main" xmlns:r="http://schemas.openxmlformats.org/officeDocument/2006/relationships" xmlns:p="http://schemas.openxmlformats.org/presentationml/2006/main">
   <p:cSld>
     <p:spTree>
@@ -4600,7 +5084,7 @@
         <p:cNvPr id="1" name="">
           <a:extLst>
             <a:ext uri="{FF2B5EF4-FFF2-40B4-BE49-F238E27FC236}">
-              <a16:creationId xmlns:a16="http://schemas.microsoft.com/office/drawing/2014/main" id="{30C45C26-3AC5-8702-5019-E2077CC1A74C}"/>
+              <a16:creationId xmlns:a16="http://schemas.microsoft.com/office/drawing/2014/main" id="{A5E0EE13-240E-308E-CF5B-8577EF461E5C}"/>
             </a:ext>
           </a:extLst>
         </p:cNvPr>
@@ -4620,7 +5104,7 @@
           <p:cNvPr id="3" name="Subtítulo 2">
             <a:extLst>
               <a:ext uri="{FF2B5EF4-FFF2-40B4-BE49-F238E27FC236}">
-                <a16:creationId xmlns:a16="http://schemas.microsoft.com/office/drawing/2014/main" id="{38251BFC-9B91-8D60-19EB-029C5093B96D}"/>
+                <a16:creationId xmlns:a16="http://schemas.microsoft.com/office/drawing/2014/main" id="{63654C2C-F047-C140-1CEA-4F3DF814A794}"/>
               </a:ext>
             </a:extLst>
           </p:cNvPr>
@@ -4633,8 +5117,8 @@
         </p:nvSpPr>
         <p:spPr>
           <a:xfrm>
-            <a:off x="1254919" y="1683024"/>
-            <a:ext cx="5042452" cy="1921567"/>
+            <a:off x="987286" y="1991137"/>
+            <a:ext cx="6367670" cy="1437863"/>
           </a:xfrm>
         </p:spPr>
         <p:txBody>
@@ -4643,73 +5127,101 @@
           </a:bodyPr>
           <a:lstStyle/>
           <a:p>
-            <a:pPr marL="285750" indent="-285750" algn="just">
-              <a:buFont typeface="Arial" panose="020B0604020202020204" pitchFamily="34" charset="0"/>
-              <a:buChar char="•"/>
+            <a:pPr algn="just"/>
+            <a:r>
+              <a:rPr lang="es-MX" sz="1400" b="1" dirty="0">
+                <a:solidFill>
+                  <a:schemeClr val="bg2">
+                    <a:lumMod val="75000"/>
+                  </a:schemeClr>
+                </a:solidFill>
+              </a:rPr>
+              <a:t>¿Qué se ha hecho?</a:t>
+            </a:r>
+          </a:p>
+          <a:p>
+            <a:pPr marL="228600" indent="-228600" algn="just">
+              <a:buFont typeface="+mj-lt"/>
+              <a:buAutoNum type="arabicPeriod"/>
             </a:pPr>
             <a:r>
-              <a:rPr lang="es-MX" sz="1200" b="1" dirty="0"/>
-              <a:t>Cacao colombiano </a:t>
-            </a:r>
-            <a:r>
-              <a:rPr lang="es-MX" sz="1200" dirty="0"/>
-              <a:t>reconocido mundialmente como “fino de aroma” (95% de la producción según ICCO).</a:t>
-            </a:r>
-          </a:p>
-          <a:p>
-            <a:pPr marL="285750" indent="-285750" algn="just">
-              <a:buFont typeface="Arial" panose="020B0604020202020204" pitchFamily="34" charset="0"/>
-              <a:buChar char="•"/>
+              <a:rPr lang="es-MX" sz="1400" dirty="0">
+                <a:solidFill>
+                  <a:schemeClr val="bg2">
+                    <a:lumMod val="75000"/>
+                  </a:schemeClr>
+                </a:solidFill>
+              </a:rPr>
+              <a:t>Entender el contexto</a:t>
+            </a:r>
+          </a:p>
+          <a:p>
+            <a:pPr marL="228600" indent="-228600" algn="just">
+              <a:buFont typeface="+mj-lt"/>
+              <a:buAutoNum type="arabicPeriod"/>
             </a:pPr>
             <a:r>
-              <a:rPr lang="es-MX" sz="1200" b="1" dirty="0"/>
-              <a:t>Quinto exportador global </a:t>
-            </a:r>
-            <a:r>
-              <a:rPr lang="es-MX" sz="1200" dirty="0"/>
-              <a:t>en un segmento premium que representa solo el 5% de la oferta mundial.</a:t>
-            </a:r>
-          </a:p>
-          <a:p>
-            <a:pPr marL="285750" indent="-285750" algn="just">
-              <a:buFont typeface="Arial" panose="020B0604020202020204" pitchFamily="34" charset="0"/>
-              <a:buChar char="•"/>
+              <a:rPr lang="es-MX" sz="1400" dirty="0">
+                <a:solidFill>
+                  <a:schemeClr val="bg2">
+                    <a:lumMod val="75000"/>
+                  </a:schemeClr>
+                </a:solidFill>
+              </a:rPr>
+              <a:t>Identificar variables a usar</a:t>
+            </a:r>
+          </a:p>
+          <a:p>
+            <a:pPr marL="228600" indent="-228600" algn="just">
+              <a:buFont typeface="+mj-lt"/>
+              <a:buAutoNum type="arabicPeriod"/>
             </a:pPr>
             <a:r>
-              <a:rPr lang="es-MX" sz="1200" b="1" dirty="0"/>
-              <a:t>Precios en alza </a:t>
-            </a:r>
-            <a:r>
-              <a:rPr lang="es-MX" sz="1200" dirty="0"/>
-              <a:t>impulsados por disrupciones climáticas y especulación en mercados de futuros.</a:t>
-            </a:r>
-          </a:p>
-          <a:p>
-            <a:pPr marL="285750" indent="-285750" algn="just">
-              <a:buFont typeface="Arial" panose="020B0604020202020204" pitchFamily="34" charset="0"/>
-              <a:buChar char="•"/>
+              <a:rPr lang="es-MX" sz="1400" dirty="0">
+                <a:solidFill>
+                  <a:schemeClr val="bg2">
+                    <a:lumMod val="75000"/>
+                  </a:schemeClr>
+                </a:solidFill>
+              </a:rPr>
+              <a:t>Aplicar modelos </a:t>
+            </a:r>
+            <a:r>
+              <a:rPr lang="es-MX" sz="1400" dirty="0" err="1">
+                <a:solidFill>
+                  <a:schemeClr val="bg2">
+                    <a:lumMod val="75000"/>
+                  </a:schemeClr>
+                </a:solidFill>
+              </a:rPr>
+              <a:t>univariados</a:t>
+            </a:r>
+            <a:r>
+              <a:rPr lang="es-MX" sz="1400" dirty="0">
+                <a:solidFill>
+                  <a:schemeClr val="bg2">
+                    <a:lumMod val="75000"/>
+                  </a:schemeClr>
+                </a:solidFill>
+              </a:rPr>
+              <a:t>: SARIMA</a:t>
+            </a:r>
+          </a:p>
+          <a:p>
+            <a:pPr marL="228600" indent="-228600" algn="just">
+              <a:buFont typeface="+mj-lt"/>
+              <a:buAutoNum type="arabicPeriod"/>
             </a:pPr>
             <a:r>
-              <a:rPr lang="es-MX" sz="1200" dirty="0"/>
-              <a:t>El precio refleja tanto la </a:t>
-            </a:r>
-            <a:r>
-              <a:rPr lang="es-MX" sz="1200" b="1" dirty="0"/>
-              <a:t>escasez física </a:t>
-            </a:r>
-            <a:r>
-              <a:rPr lang="es-MX" sz="1200" dirty="0"/>
-              <a:t>como las </a:t>
-            </a:r>
-            <a:r>
-              <a:rPr lang="es-MX" sz="1200" b="1" dirty="0"/>
-              <a:t>expectativas financieras</a:t>
-            </a:r>
-            <a:r>
-              <a:rPr lang="es-MX" sz="1200" dirty="0"/>
-              <a:t>.</a:t>
-            </a:r>
-            <a:endParaRPr lang="es-MX" sz="1200" b="1" dirty="0"/>
+              <a:rPr lang="es-MX" sz="1400" dirty="0">
+                <a:solidFill>
+                  <a:schemeClr val="bg2">
+                    <a:lumMod val="75000"/>
+                  </a:schemeClr>
+                </a:solidFill>
+              </a:rPr>
+              <a:t>Aplicar modelos multivariados: SARIMAX y VAR</a:t>
+            </a:r>
           </a:p>
         </p:txBody>
       </p:sp>
@@ -4718,7 +5230,7 @@
           <p:cNvPr id="4" name="Rectángulo 3">
             <a:extLst>
               <a:ext uri="{FF2B5EF4-FFF2-40B4-BE49-F238E27FC236}">
-                <a16:creationId xmlns:a16="http://schemas.microsoft.com/office/drawing/2014/main" id="{E8224227-CA34-CB91-14FC-1C28B843C5B0}"/>
+                <a16:creationId xmlns:a16="http://schemas.microsoft.com/office/drawing/2014/main" id="{2AC14BCC-8B44-03BC-2BE4-C144568F039D}"/>
               </a:ext>
             </a:extLst>
           </p:cNvPr>
@@ -4773,7 +5285,7 @@
           <p:cNvPr id="1026" name="Picture 2" descr="Carreras y oferta Académica de Pregrado | Uniandes">
             <a:extLst>
               <a:ext uri="{FF2B5EF4-FFF2-40B4-BE49-F238E27FC236}">
-                <a16:creationId xmlns:a16="http://schemas.microsoft.com/office/drawing/2014/main" id="{C4537049-F2B3-72E5-C926-95B20F3D9775}"/>
+                <a16:creationId xmlns:a16="http://schemas.microsoft.com/office/drawing/2014/main" id="{C577E146-7C19-13DD-7D91-7FC5D2BC35E3}"/>
               </a:ext>
             </a:extLst>
           </p:cNvPr>
@@ -4820,7 +5332,7 @@
           <p:cNvPr id="5" name="CuadroTexto 4">
             <a:extLst>
               <a:ext uri="{FF2B5EF4-FFF2-40B4-BE49-F238E27FC236}">
-                <a16:creationId xmlns:a16="http://schemas.microsoft.com/office/drawing/2014/main" id="{5E73BAF1-A099-3981-33AF-CDFF87554C8A}"/>
+                <a16:creationId xmlns:a16="http://schemas.microsoft.com/office/drawing/2014/main" id="{DE7E73BC-9557-F4B7-3970-53075E6B4A2B}"/>
               </a:ext>
             </a:extLst>
           </p:cNvPr>
@@ -4845,92 +5357,305 @@
           <a:p>
             <a:r>
               <a:rPr lang="es-CO" b="1" dirty="0"/>
-              <a:t>Contexto</a:t>
-            </a:r>
-          </a:p>
-        </p:txBody>
-      </p:sp>
-      <p:pic>
-        <p:nvPicPr>
-          <p:cNvPr id="11" name="Imagen 10">
-            <a:extLst>
-              <a:ext uri="{FF2B5EF4-FFF2-40B4-BE49-F238E27FC236}">
-                <a16:creationId xmlns:a16="http://schemas.microsoft.com/office/drawing/2014/main" id="{05C3ACE8-734B-43CB-0776-97196A019259}"/>
-              </a:ext>
-            </a:extLst>
-          </p:cNvPr>
-          <p:cNvPicPr>
-            <a:picLocks noChangeAspect="1"/>
-          </p:cNvPicPr>
+              <a:t>Metodología</a:t>
+            </a:r>
+          </a:p>
+        </p:txBody>
+      </p:sp>
+      <p:sp>
+        <p:nvSpPr>
+          <p:cNvPr id="2" name="Subtítulo 2">
+            <a:extLst>
+              <a:ext uri="{FF2B5EF4-FFF2-40B4-BE49-F238E27FC236}">
+                <a16:creationId xmlns:a16="http://schemas.microsoft.com/office/drawing/2014/main" id="{06F8662D-E655-D0AB-C953-7E57D740C5D7}"/>
+              </a:ext>
+            </a:extLst>
+          </p:cNvPr>
+          <p:cNvSpPr txBox="1">
+            <a:spLocks/>
+          </p:cNvSpPr>
           <p:nvPr/>
-        </p:nvPicPr>
-        <p:blipFill>
-          <a:blip r:embed="rId3"/>
-          <a:stretch>
-            <a:fillRect/>
-          </a:stretch>
-        </p:blipFill>
+        </p:nvSpPr>
         <p:spPr>
           <a:xfrm>
-            <a:off x="1338470" y="3754722"/>
-            <a:ext cx="4308820" cy="2308146"/>
+            <a:off x="987286" y="3892823"/>
+            <a:ext cx="6367670" cy="1437863"/>
           </a:xfrm>
           <a:prstGeom prst="rect">
             <a:avLst/>
           </a:prstGeom>
         </p:spPr>
-      </p:pic>
-      <p:pic>
-        <p:nvPicPr>
-          <p:cNvPr id="2052" name="Picture 4" descr="Gráfico: Los principales productores de cacao en América Latina | Statista">
-            <a:extLst>
-              <a:ext uri="{FF2B5EF4-FFF2-40B4-BE49-F238E27FC236}">
-                <a16:creationId xmlns:a16="http://schemas.microsoft.com/office/drawing/2014/main" id="{76982082-849F-A97C-90CD-F606F5A48B80}"/>
-              </a:ext>
-            </a:extLst>
-          </p:cNvPr>
-          <p:cNvPicPr>
-            <a:picLocks noChangeAspect="1" noChangeArrowheads="1"/>
-          </p:cNvPicPr>
+        <p:txBody>
+          <a:bodyPr vert="horz" lIns="91440" tIns="45720" rIns="91440" bIns="45720" rtlCol="0">
+            <a:noAutofit/>
+          </a:bodyPr>
+          <a:lstStyle>
+            <a:lvl1pPr marL="0" indent="0" algn="ctr" defTabSz="914400" rtl="0" eaLnBrk="1" latinLnBrk="0" hangingPunct="1">
+              <a:lnSpc>
+                <a:spcPct val="90000"/>
+              </a:lnSpc>
+              <a:spcBef>
+                <a:spcPts val="1000"/>
+              </a:spcBef>
+              <a:buFont typeface="Arial" panose="020B0604020202020204" pitchFamily="34" charset="0"/>
+              <a:buNone/>
+              <a:defRPr sz="2400" kern="1200">
+                <a:solidFill>
+                  <a:schemeClr val="tx1"/>
+                </a:solidFill>
+                <a:latin typeface="+mn-lt"/>
+                <a:ea typeface="+mn-ea"/>
+                <a:cs typeface="+mn-cs"/>
+              </a:defRPr>
+            </a:lvl1pPr>
+            <a:lvl2pPr marL="457200" indent="0" algn="ctr" defTabSz="914400" rtl="0" eaLnBrk="1" latinLnBrk="0" hangingPunct="1">
+              <a:lnSpc>
+                <a:spcPct val="90000"/>
+              </a:lnSpc>
+              <a:spcBef>
+                <a:spcPts val="500"/>
+              </a:spcBef>
+              <a:buFont typeface="Arial" panose="020B0604020202020204" pitchFamily="34" charset="0"/>
+              <a:buNone/>
+              <a:defRPr sz="2000" kern="1200">
+                <a:solidFill>
+                  <a:schemeClr val="tx1"/>
+                </a:solidFill>
+                <a:latin typeface="+mn-lt"/>
+                <a:ea typeface="+mn-ea"/>
+                <a:cs typeface="+mn-cs"/>
+              </a:defRPr>
+            </a:lvl2pPr>
+            <a:lvl3pPr marL="914400" indent="0" algn="ctr" defTabSz="914400" rtl="0" eaLnBrk="1" latinLnBrk="0" hangingPunct="1">
+              <a:lnSpc>
+                <a:spcPct val="90000"/>
+              </a:lnSpc>
+              <a:spcBef>
+                <a:spcPts val="500"/>
+              </a:spcBef>
+              <a:buFont typeface="Arial" panose="020B0604020202020204" pitchFamily="34" charset="0"/>
+              <a:buNone/>
+              <a:defRPr sz="1800" kern="1200">
+                <a:solidFill>
+                  <a:schemeClr val="tx1"/>
+                </a:solidFill>
+                <a:latin typeface="+mn-lt"/>
+                <a:ea typeface="+mn-ea"/>
+                <a:cs typeface="+mn-cs"/>
+              </a:defRPr>
+            </a:lvl3pPr>
+            <a:lvl4pPr marL="1371600" indent="0" algn="ctr" defTabSz="914400" rtl="0" eaLnBrk="1" latinLnBrk="0" hangingPunct="1">
+              <a:lnSpc>
+                <a:spcPct val="90000"/>
+              </a:lnSpc>
+              <a:spcBef>
+                <a:spcPts val="500"/>
+              </a:spcBef>
+              <a:buFont typeface="Arial" panose="020B0604020202020204" pitchFamily="34" charset="0"/>
+              <a:buNone/>
+              <a:defRPr sz="1600" kern="1200">
+                <a:solidFill>
+                  <a:schemeClr val="tx1"/>
+                </a:solidFill>
+                <a:latin typeface="+mn-lt"/>
+                <a:ea typeface="+mn-ea"/>
+                <a:cs typeface="+mn-cs"/>
+              </a:defRPr>
+            </a:lvl4pPr>
+            <a:lvl5pPr marL="1828800" indent="0" algn="ctr" defTabSz="914400" rtl="0" eaLnBrk="1" latinLnBrk="0" hangingPunct="1">
+              <a:lnSpc>
+                <a:spcPct val="90000"/>
+              </a:lnSpc>
+              <a:spcBef>
+                <a:spcPts val="500"/>
+              </a:spcBef>
+              <a:buFont typeface="Arial" panose="020B0604020202020204" pitchFamily="34" charset="0"/>
+              <a:buNone/>
+              <a:defRPr sz="1600" kern="1200">
+                <a:solidFill>
+                  <a:schemeClr val="tx1"/>
+                </a:solidFill>
+                <a:latin typeface="+mn-lt"/>
+                <a:ea typeface="+mn-ea"/>
+                <a:cs typeface="+mn-cs"/>
+              </a:defRPr>
+            </a:lvl5pPr>
+            <a:lvl6pPr marL="2286000" indent="0" algn="ctr" defTabSz="914400" rtl="0" eaLnBrk="1" latinLnBrk="0" hangingPunct="1">
+              <a:lnSpc>
+                <a:spcPct val="90000"/>
+              </a:lnSpc>
+              <a:spcBef>
+                <a:spcPts val="500"/>
+              </a:spcBef>
+              <a:buFont typeface="Arial" panose="020B0604020202020204" pitchFamily="34" charset="0"/>
+              <a:buNone/>
+              <a:defRPr sz="1600" kern="1200">
+                <a:solidFill>
+                  <a:schemeClr val="tx1"/>
+                </a:solidFill>
+                <a:latin typeface="+mn-lt"/>
+                <a:ea typeface="+mn-ea"/>
+                <a:cs typeface="+mn-cs"/>
+              </a:defRPr>
+            </a:lvl6pPr>
+            <a:lvl7pPr marL="2743200" indent="0" algn="ctr" defTabSz="914400" rtl="0" eaLnBrk="1" latinLnBrk="0" hangingPunct="1">
+              <a:lnSpc>
+                <a:spcPct val="90000"/>
+              </a:lnSpc>
+              <a:spcBef>
+                <a:spcPts val="500"/>
+              </a:spcBef>
+              <a:buFont typeface="Arial" panose="020B0604020202020204" pitchFamily="34" charset="0"/>
+              <a:buNone/>
+              <a:defRPr sz="1600" kern="1200">
+                <a:solidFill>
+                  <a:schemeClr val="tx1"/>
+                </a:solidFill>
+                <a:latin typeface="+mn-lt"/>
+                <a:ea typeface="+mn-ea"/>
+                <a:cs typeface="+mn-cs"/>
+              </a:defRPr>
+            </a:lvl7pPr>
+            <a:lvl8pPr marL="3200400" indent="0" algn="ctr" defTabSz="914400" rtl="0" eaLnBrk="1" latinLnBrk="0" hangingPunct="1">
+              <a:lnSpc>
+                <a:spcPct val="90000"/>
+              </a:lnSpc>
+              <a:spcBef>
+                <a:spcPts val="500"/>
+              </a:spcBef>
+              <a:buFont typeface="Arial" panose="020B0604020202020204" pitchFamily="34" charset="0"/>
+              <a:buNone/>
+              <a:defRPr sz="1600" kern="1200">
+                <a:solidFill>
+                  <a:schemeClr val="tx1"/>
+                </a:solidFill>
+                <a:latin typeface="+mn-lt"/>
+                <a:ea typeface="+mn-ea"/>
+                <a:cs typeface="+mn-cs"/>
+              </a:defRPr>
+            </a:lvl8pPr>
+            <a:lvl9pPr marL="3657600" indent="0" algn="ctr" defTabSz="914400" rtl="0" eaLnBrk="1" latinLnBrk="0" hangingPunct="1">
+              <a:lnSpc>
+                <a:spcPct val="90000"/>
+              </a:lnSpc>
+              <a:spcBef>
+                <a:spcPts val="500"/>
+              </a:spcBef>
+              <a:buFont typeface="Arial" panose="020B0604020202020204" pitchFamily="34" charset="0"/>
+              <a:buNone/>
+              <a:defRPr sz="1600" kern="1200">
+                <a:solidFill>
+                  <a:schemeClr val="tx1"/>
+                </a:solidFill>
+                <a:latin typeface="+mn-lt"/>
+                <a:ea typeface="+mn-ea"/>
+                <a:cs typeface="+mn-cs"/>
+              </a:defRPr>
+            </a:lvl9pPr>
+          </a:lstStyle>
+          <a:p>
+            <a:pPr algn="just"/>
+            <a:r>
+              <a:rPr lang="es-MX" sz="1400" b="1" dirty="0"/>
+              <a:t>¿Qué queda por hacer?</a:t>
+            </a:r>
+          </a:p>
+          <a:p>
+            <a:pPr algn="just"/>
+            <a:r>
+              <a:rPr lang="es-MX" sz="1400" dirty="0"/>
+              <a:t>5. Aplicar modelos de machine </a:t>
+            </a:r>
+            <a:r>
+              <a:rPr lang="es-MX" sz="1400" dirty="0" err="1"/>
+              <a:t>learning</a:t>
+            </a:r>
+            <a:r>
+              <a:rPr lang="es-MX" sz="1400" dirty="0"/>
+              <a:t>: </a:t>
+            </a:r>
+            <a:r>
+              <a:rPr lang="es-MX" sz="1400" dirty="0" err="1"/>
+              <a:t>XGBoost</a:t>
+            </a:r>
+            <a:r>
+              <a:rPr lang="es-MX" sz="1400" dirty="0"/>
+              <a:t>, redes neuronales (LSTM)</a:t>
+            </a:r>
+          </a:p>
+          <a:p>
+            <a:pPr algn="just"/>
+            <a:r>
+              <a:rPr lang="es-MX" sz="1400" dirty="0"/>
+              <a:t>6. Comparar modelos y seleccionar mejor</a:t>
+            </a:r>
+          </a:p>
+          <a:p>
+            <a:pPr algn="just"/>
+            <a:r>
+              <a:rPr lang="es-MX" sz="1400" dirty="0"/>
+              <a:t>7. Redacción del documento</a:t>
+            </a:r>
+          </a:p>
+          <a:p>
+            <a:pPr algn="just"/>
+            <a:r>
+              <a:rPr lang="es-MX" sz="1400" dirty="0"/>
+              <a:t>8. Presentación y sustentación</a:t>
+            </a:r>
+          </a:p>
+        </p:txBody>
+      </p:sp>
+      <p:sp>
+        <p:nvSpPr>
+          <p:cNvPr id="6" name="Flecha: pentágono 5">
+            <a:extLst>
+              <a:ext uri="{FF2B5EF4-FFF2-40B4-BE49-F238E27FC236}">
+                <a16:creationId xmlns:a16="http://schemas.microsoft.com/office/drawing/2014/main" id="{DB045DBC-CAB4-6CF2-774F-04394770B6D4}"/>
+              </a:ext>
+            </a:extLst>
+          </p:cNvPr>
+          <p:cNvSpPr/>
           <p:nvPr/>
-        </p:nvPicPr>
-        <p:blipFill>
-          <a:blip r:embed="rId4">
-            <a:extLst>
-              <a:ext uri="{28A0092B-C50C-407E-A947-70E740481C1C}">
-                <a14:useLocalDpi xmlns:a14="http://schemas.microsoft.com/office/drawing/2010/main" val="0"/>
-              </a:ext>
-            </a:extLst>
-          </a:blip>
-          <a:srcRect/>
-          <a:stretch>
-            <a:fillRect/>
-          </a:stretch>
-        </p:blipFill>
-        <p:spPr bwMode="auto">
+        </p:nvSpPr>
+        <p:spPr>
           <a:xfrm>
-            <a:off x="6947452" y="1497494"/>
-            <a:ext cx="4565374" cy="4565374"/>
+            <a:off x="7354956" y="2218544"/>
+            <a:ext cx="2133818" cy="1674279"/>
           </a:xfrm>
-          <a:prstGeom prst="rect">
+          <a:prstGeom prst="homePlate">
             <a:avLst/>
           </a:prstGeom>
-          <a:noFill/>
-          <a:extLst>
-            <a:ext uri="{909E8E84-426E-40DD-AFC4-6F175D3DCCD1}">
-              <a14:hiddenFill xmlns:a14="http://schemas.microsoft.com/office/drawing/2010/main">
-                <a:solidFill>
-                  <a:srgbClr val="FFFFFF"/>
-                </a:solidFill>
-              </a14:hiddenFill>
-            </a:ext>
-          </a:extLst>
         </p:spPr>
-      </p:pic>
+        <p:style>
+          <a:lnRef idx="2">
+            <a:schemeClr val="accent1">
+              <a:shade val="15000"/>
+            </a:schemeClr>
+          </a:lnRef>
+          <a:fillRef idx="1">
+            <a:schemeClr val="accent1"/>
+          </a:fillRef>
+          <a:effectRef idx="0">
+            <a:schemeClr val="accent1"/>
+          </a:effectRef>
+          <a:fontRef idx="minor">
+            <a:schemeClr val="lt1"/>
+          </a:fontRef>
+        </p:style>
+        <p:txBody>
+          <a:bodyPr rtlCol="0" anchor="ctr"/>
+          <a:lstStyle/>
+          <a:p>
+            <a:pPr algn="ctr"/>
+            <a:endParaRPr lang="es-CO"/>
+          </a:p>
+        </p:txBody>
+      </p:sp>
     </p:spTree>
     <p:extLst>
       <p:ext uri="{BB962C8B-B14F-4D97-AF65-F5344CB8AC3E}">
-        <p14:creationId xmlns:p14="http://schemas.microsoft.com/office/powerpoint/2010/main" val="3168108746"/>
+        <p14:creationId xmlns:p14="http://schemas.microsoft.com/office/powerpoint/2010/main" val="1825084229"/>
       </p:ext>
     </p:extLst>
   </p:cSld>
@@ -4940,7 +5665,7 @@
 </p:sld>
 </file>
 
-<file path=ppt/slides/slide3.xml><?xml version="1.0" encoding="utf-8"?>
+<file path=ppt/slides/slide13.xml><?xml version="1.0" encoding="utf-8"?>
 <p:sld xmlns:a="http://schemas.openxmlformats.org/drawingml/2006/main" xmlns:r="http://schemas.openxmlformats.org/officeDocument/2006/relationships" xmlns:p="http://schemas.openxmlformats.org/presentationml/2006/main">
   <p:cSld>
     <p:spTree>
@@ -4948,7 +5673,7 @@
         <p:cNvPr id="1" name="">
           <a:extLst>
             <a:ext uri="{FF2B5EF4-FFF2-40B4-BE49-F238E27FC236}">
-              <a16:creationId xmlns:a16="http://schemas.microsoft.com/office/drawing/2014/main" id="{32826614-A7B8-13E1-557F-01D3024DB449}"/>
+              <a16:creationId xmlns:a16="http://schemas.microsoft.com/office/drawing/2014/main" id="{6AC5C248-460E-DD8E-9AF2-7FEC7BBB3894}"/>
             </a:ext>
           </a:extLst>
         </p:cNvPr>
@@ -4968,7 +5693,7 @@
           <p:cNvPr id="3" name="Subtítulo 2">
             <a:extLst>
               <a:ext uri="{FF2B5EF4-FFF2-40B4-BE49-F238E27FC236}">
-                <a16:creationId xmlns:a16="http://schemas.microsoft.com/office/drawing/2014/main" id="{713DC48A-224C-56BB-369B-818F222D6346}"/>
+                <a16:creationId xmlns:a16="http://schemas.microsoft.com/office/drawing/2014/main" id="{358FFBA6-2721-3365-E68D-AC8AD2EF99B4}"/>
               </a:ext>
             </a:extLst>
           </p:cNvPr>
@@ -4981,8 +5706,8 @@
         </p:nvSpPr>
         <p:spPr>
           <a:xfrm>
-            <a:off x="1133063" y="1517371"/>
-            <a:ext cx="4850296" cy="1763027"/>
+            <a:off x="2912165" y="3028121"/>
+            <a:ext cx="6367670" cy="980662"/>
           </a:xfrm>
         </p:spPr>
         <p:txBody>
@@ -4991,71 +5716,15 @@
           </a:bodyPr>
           <a:lstStyle/>
           <a:p>
-            <a:pPr marL="342900" indent="-342900" algn="just">
-              <a:buFont typeface="Arial" panose="020B0604020202020204" pitchFamily="34" charset="0"/>
-              <a:buChar char="•"/>
-            </a:pPr>
-            <a:r>
-              <a:rPr lang="es-MX" sz="1200" b="1" dirty="0"/>
-              <a:t>Escalada de precios </a:t>
-            </a:r>
-            <a:r>
-              <a:rPr lang="es-MX" sz="1200" dirty="0"/>
-              <a:t>(+60%) por déficit global de oferta y especulación financiera.</a:t>
-            </a:r>
-          </a:p>
-          <a:p>
-            <a:pPr marL="342900" indent="-342900" algn="just">
-              <a:buFont typeface="Arial" panose="020B0604020202020204" pitchFamily="34" charset="0"/>
-              <a:buChar char="•"/>
-            </a:pPr>
-            <a:r>
-              <a:rPr lang="es-MX" sz="1200" u="sng" dirty="0"/>
-              <a:t>Cambio climático: </a:t>
-            </a:r>
-            <a:r>
-              <a:rPr lang="es-MX" sz="1200" dirty="0"/>
-              <a:t>menor producción en Costa de Marfil y Ghana.</a:t>
-            </a:r>
-          </a:p>
-          <a:p>
-            <a:pPr marL="342900" indent="-342900" algn="just">
-              <a:buFont typeface="Arial" panose="020B0604020202020204" pitchFamily="34" charset="0"/>
-              <a:buChar char="•"/>
-            </a:pPr>
-            <a:r>
-              <a:rPr lang="es-MX" sz="1200" dirty="0"/>
-              <a:t>Expansión en Colombia con </a:t>
-            </a:r>
-            <a:r>
-              <a:rPr lang="es-MX" sz="1200" b="1" dirty="0"/>
-              <a:t>nuevas áreas de cultivo </a:t>
-            </a:r>
-            <a:r>
-              <a:rPr lang="es-MX" sz="1200" dirty="0"/>
-              <a:t>en zonas antes cafeteras.</a:t>
-            </a:r>
-          </a:p>
-          <a:p>
-            <a:pPr marL="342900" indent="-342900" algn="just">
-              <a:buFont typeface="Arial" panose="020B0604020202020204" pitchFamily="34" charset="0"/>
-              <a:buChar char="•"/>
-            </a:pPr>
-            <a:r>
-              <a:rPr lang="es-MX" sz="1200" b="1" dirty="0"/>
-              <a:t>Competitividad futura </a:t>
-            </a:r>
-            <a:r>
-              <a:rPr lang="es-MX" sz="1200" dirty="0"/>
-              <a:t>debido a las condiciones que atraen </a:t>
-            </a:r>
-            <a:r>
-              <a:rPr lang="es-MX" sz="1200" b="1" dirty="0"/>
-              <a:t>inversión extranjera </a:t>
-            </a:r>
-            <a:r>
-              <a:rPr lang="es-MX" sz="1200" dirty="0"/>
-              <a:t>al sector.</a:t>
+            <a:r>
+              <a:rPr lang="es-MX" b="1" dirty="0"/>
+              <a:t>Gracias!</a:t>
+            </a:r>
+          </a:p>
+          <a:p>
+            <a:r>
+              <a:rPr lang="es-MX" dirty="0"/>
+              <a:t>Dudas, comentarios, sugerencias</a:t>
             </a:r>
           </a:p>
         </p:txBody>
@@ -5065,7 +5734,7 @@
           <p:cNvPr id="4" name="Rectángulo 3">
             <a:extLst>
               <a:ext uri="{FF2B5EF4-FFF2-40B4-BE49-F238E27FC236}">
-                <a16:creationId xmlns:a16="http://schemas.microsoft.com/office/drawing/2014/main" id="{8AAD544B-3517-FD6F-28F9-576B37CF4CA6}"/>
+                <a16:creationId xmlns:a16="http://schemas.microsoft.com/office/drawing/2014/main" id="{9D7C6D38-9DD4-6BC4-5E2B-A7E475A2CA41}"/>
               </a:ext>
             </a:extLst>
           </p:cNvPr>
@@ -5120,7 +5789,7 @@
           <p:cNvPr id="1026" name="Picture 2" descr="Carreras y oferta Académica de Pregrado | Uniandes">
             <a:extLst>
               <a:ext uri="{FF2B5EF4-FFF2-40B4-BE49-F238E27FC236}">
-                <a16:creationId xmlns:a16="http://schemas.microsoft.com/office/drawing/2014/main" id="{302D184A-AFD0-6EAD-CDAC-035EB9D20D42}"/>
+                <a16:creationId xmlns:a16="http://schemas.microsoft.com/office/drawing/2014/main" id="{CFACC16F-AD38-B167-2C71-5368849E12F7}"/>
               </a:ext>
             </a:extLst>
           </p:cNvPr>
@@ -5167,7 +5836,7 @@
           <p:cNvPr id="5" name="CuadroTexto 4">
             <a:extLst>
               <a:ext uri="{FF2B5EF4-FFF2-40B4-BE49-F238E27FC236}">
-                <a16:creationId xmlns:a16="http://schemas.microsoft.com/office/drawing/2014/main" id="{87A9FD78-40A2-7482-395C-86E42D4A4145}"/>
+                <a16:creationId xmlns:a16="http://schemas.microsoft.com/office/drawing/2014/main" id="{3C3A45BC-25E4-F4F1-4F13-A0EFB41321DA}"/>
               </a:ext>
             </a:extLst>
           </p:cNvPr>
@@ -5192,104 +5861,15 @@
           <a:p>
             <a:r>
               <a:rPr lang="es-CO" b="1" dirty="0"/>
-              <a:t>Contexto</a:t>
-            </a:r>
-          </a:p>
-        </p:txBody>
-      </p:sp>
-      <p:pic>
-        <p:nvPicPr>
-          <p:cNvPr id="2050" name="Picture 2" descr="Gráfico: África: principal productor mundial de cacao | Statista">
-            <a:extLst>
-              <a:ext uri="{FF2B5EF4-FFF2-40B4-BE49-F238E27FC236}">
-                <a16:creationId xmlns:a16="http://schemas.microsoft.com/office/drawing/2014/main" id="{58AA5E06-D138-0942-7D25-DF87059E3A23}"/>
-              </a:ext>
-            </a:extLst>
-          </p:cNvPr>
-          <p:cNvPicPr>
-            <a:picLocks noChangeAspect="1" noChangeArrowheads="1"/>
-          </p:cNvPicPr>
-          <p:nvPr/>
-        </p:nvPicPr>
-        <p:blipFill>
-          <a:blip r:embed="rId3">
-            <a:extLst>
-              <a:ext uri="{28A0092B-C50C-407E-A947-70E740481C1C}">
-                <a14:useLocalDpi xmlns:a14="http://schemas.microsoft.com/office/drawing/2010/main" val="0"/>
-              </a:ext>
-            </a:extLst>
-          </a:blip>
-          <a:srcRect/>
-          <a:stretch>
-            <a:fillRect/>
-          </a:stretch>
-        </p:blipFill>
-        <p:spPr bwMode="auto">
-          <a:xfrm>
-            <a:off x="6669155" y="1497494"/>
-            <a:ext cx="4459357" cy="4459357"/>
-          </a:xfrm>
-          <a:prstGeom prst="rect">
-            <a:avLst/>
-          </a:prstGeom>
-          <a:noFill/>
-          <a:extLst>
-            <a:ext uri="{909E8E84-426E-40DD-AFC4-6F175D3DCCD1}">
-              <a14:hiddenFill xmlns:a14="http://schemas.microsoft.com/office/drawing/2010/main">
-                <a:solidFill>
-                  <a:srgbClr val="FFFFFF"/>
-                </a:solidFill>
-              </a14:hiddenFill>
-            </a:ext>
-          </a:extLst>
-        </p:spPr>
-      </p:pic>
-      <p:pic>
-        <p:nvPicPr>
-          <p:cNvPr id="9" name="Imagen 8">
-            <a:extLst>
-              <a:ext uri="{FF2B5EF4-FFF2-40B4-BE49-F238E27FC236}">
-                <a16:creationId xmlns:a16="http://schemas.microsoft.com/office/drawing/2014/main" id="{04236AC5-857F-EE0C-2A7E-1CB662255589}"/>
-              </a:ext>
-            </a:extLst>
-          </p:cNvPr>
-          <p:cNvPicPr>
-            <a:picLocks noChangeAspect="1"/>
-          </p:cNvPicPr>
-          <p:nvPr/>
-        </p:nvPicPr>
-        <p:blipFill>
-          <a:blip r:embed="rId4">
-            <a:extLst>
-              <a:ext uri="{BEBA8EAE-BF5A-486C-A8C5-ECC9F3942E4B}">
-                <a14:imgProps xmlns:a14="http://schemas.microsoft.com/office/drawing/2010/main">
-                  <a14:imgLayer r:embed="rId5">
-                    <a14:imgEffect>
-                      <a14:sharpenSoften amount="50000"/>
-                    </a14:imgEffect>
-                  </a14:imgLayer>
-                </a14:imgProps>
-              </a:ext>
-            </a:extLst>
-          </a:blip>
-          <a:stretch>
-            <a:fillRect/>
-          </a:stretch>
-        </p:blipFill>
-        <p:spPr>
-          <a:xfrm>
-            <a:off x="1593577" y="3480046"/>
-            <a:ext cx="3929269" cy="2629205"/>
-          </a:xfrm>
-          <a:prstGeom prst="rect">
-            <a:avLst/>
-          </a:prstGeom>
-        </p:spPr>
-      </p:pic>
+              <a:t>Cierre</a:t>
+            </a:r>
+          </a:p>
+        </p:txBody>
+      </p:sp>
     </p:spTree>
     <p:extLst>
       <p:ext uri="{BB962C8B-B14F-4D97-AF65-F5344CB8AC3E}">
-        <p14:creationId xmlns:p14="http://schemas.microsoft.com/office/powerpoint/2010/main" val="2424761874"/>
+        <p14:creationId xmlns:p14="http://schemas.microsoft.com/office/powerpoint/2010/main" val="3835149613"/>
       </p:ext>
     </p:extLst>
   </p:cSld>
@@ -5299,7 +5879,91 @@
 </p:sld>
 </file>
 
-<file path=ppt/slides/slide4.xml><?xml version="1.0" encoding="utf-8"?>
+<file path=ppt/slides/slide2.xml><?xml version="1.0" encoding="utf-8"?>
+<p:sld xmlns:a="http://schemas.openxmlformats.org/drawingml/2006/main" xmlns:r="http://schemas.openxmlformats.org/officeDocument/2006/relationships" xmlns:p="http://schemas.openxmlformats.org/presentationml/2006/main">
+  <p:cSld>
+    <p:spTree>
+      <p:nvGrpSpPr>
+        <p:cNvPr id="1" name=""/>
+        <p:cNvGrpSpPr/>
+        <p:nvPr/>
+      </p:nvGrpSpPr>
+      <p:grpSpPr>
+        <a:xfrm>
+          <a:off x="0" y="0"/>
+          <a:ext cx="0" cy="0"/>
+          <a:chOff x="0" y="0"/>
+          <a:chExt cx="0" cy="0"/>
+        </a:xfrm>
+      </p:grpSpPr>
+      <p:sp>
+        <p:nvSpPr>
+          <p:cNvPr id="2" name="Título 1">
+            <a:extLst>
+              <a:ext uri="{FF2B5EF4-FFF2-40B4-BE49-F238E27FC236}">
+                <a16:creationId xmlns:a16="http://schemas.microsoft.com/office/drawing/2014/main" id="{0BF43F53-6045-B111-CC4C-5F6E622D4A03}"/>
+              </a:ext>
+            </a:extLst>
+          </p:cNvPr>
+          <p:cNvSpPr>
+            <a:spLocks noGrp="1"/>
+          </p:cNvSpPr>
+          <p:nvPr>
+            <p:ph type="title"/>
+          </p:nvPr>
+        </p:nvSpPr>
+        <p:spPr/>
+        <p:txBody>
+          <a:bodyPr/>
+          <a:lstStyle/>
+          <a:p>
+            <a:r>
+              <a:rPr lang="es-CO" dirty="0" err="1"/>
+              <a:t>Indice</a:t>
+            </a:r>
+            <a:endParaRPr lang="es-CO" dirty="0"/>
+          </a:p>
+        </p:txBody>
+      </p:sp>
+      <p:sp>
+        <p:nvSpPr>
+          <p:cNvPr id="3" name="Marcador de contenido 2">
+            <a:extLst>
+              <a:ext uri="{FF2B5EF4-FFF2-40B4-BE49-F238E27FC236}">
+                <a16:creationId xmlns:a16="http://schemas.microsoft.com/office/drawing/2014/main" id="{13E98E60-D2E4-90AA-8D9B-AA96D2079979}"/>
+              </a:ext>
+            </a:extLst>
+          </p:cNvPr>
+          <p:cNvSpPr>
+            <a:spLocks noGrp="1"/>
+          </p:cNvSpPr>
+          <p:nvPr>
+            <p:ph idx="1"/>
+          </p:nvPr>
+        </p:nvSpPr>
+        <p:spPr/>
+        <p:txBody>
+          <a:bodyPr/>
+          <a:lstStyle/>
+          <a:p>
+            <a:endParaRPr lang="es-CO"/>
+          </a:p>
+        </p:txBody>
+      </p:sp>
+    </p:spTree>
+    <p:extLst>
+      <p:ext uri="{BB962C8B-B14F-4D97-AF65-F5344CB8AC3E}">
+        <p14:creationId xmlns:p14="http://schemas.microsoft.com/office/powerpoint/2010/main" val="495250123"/>
+      </p:ext>
+    </p:extLst>
+  </p:cSld>
+  <p:clrMapOvr>
+    <a:masterClrMapping/>
+  </p:clrMapOvr>
+</p:sld>
+</file>
+
+<file path=ppt/slides/slide3.xml><?xml version="1.0" encoding="utf-8"?>
 <p:sld xmlns:a="http://schemas.openxmlformats.org/drawingml/2006/main" xmlns:r="http://schemas.openxmlformats.org/officeDocument/2006/relationships" xmlns:p="http://schemas.openxmlformats.org/presentationml/2006/main">
   <p:cSld>
     <p:spTree>
@@ -5307,7 +5971,7 @@
         <p:cNvPr id="1" name="">
           <a:extLst>
             <a:ext uri="{FF2B5EF4-FFF2-40B4-BE49-F238E27FC236}">
-              <a16:creationId xmlns:a16="http://schemas.microsoft.com/office/drawing/2014/main" id="{9D8382BC-81D2-BD83-B93E-A88A75EF4433}"/>
+              <a16:creationId xmlns:a16="http://schemas.microsoft.com/office/drawing/2014/main" id="{30C45C26-3AC5-8702-5019-E2077CC1A74C}"/>
             </a:ext>
           </a:extLst>
         </p:cNvPr>
@@ -5327,7 +5991,7 @@
           <p:cNvPr id="3" name="Subtítulo 2">
             <a:extLst>
               <a:ext uri="{FF2B5EF4-FFF2-40B4-BE49-F238E27FC236}">
-                <a16:creationId xmlns:a16="http://schemas.microsoft.com/office/drawing/2014/main" id="{48A0C517-95BE-D8EF-2F35-CAA7AC079CBB}"/>
+                <a16:creationId xmlns:a16="http://schemas.microsoft.com/office/drawing/2014/main" id="{38251BFC-9B91-8D60-19EB-029C5093B96D}"/>
               </a:ext>
             </a:extLst>
           </p:cNvPr>
@@ -5340,8 +6004,8 @@
         </p:nvSpPr>
         <p:spPr>
           <a:xfrm>
-            <a:off x="556591" y="1991137"/>
-            <a:ext cx="6367670" cy="1437863"/>
+            <a:off x="1254919" y="1683024"/>
+            <a:ext cx="5042452" cy="1921567"/>
           </a:xfrm>
         </p:spPr>
         <p:txBody>
@@ -5350,46 +6014,73 @@
           </a:bodyPr>
           <a:lstStyle/>
           <a:p>
-            <a:pPr marL="342900" indent="-342900" algn="just">
+            <a:pPr marL="285750" indent="-285750" algn="just">
               <a:buFont typeface="Arial" panose="020B0604020202020204" pitchFamily="34" charset="0"/>
               <a:buChar char="•"/>
             </a:pPr>
             <a:r>
               <a:rPr lang="es-MX" sz="1200" b="1" dirty="0"/>
-              <a:t>Variables climáticas*: </a:t>
+              <a:t>Cacao colombiano </a:t>
             </a:r>
             <a:r>
               <a:rPr lang="es-MX" sz="1200" dirty="0"/>
-              <a:t>Precipitación, temperatura, radiación, fenómenos naturales (El Niño o La Niña).</a:t>
-            </a:r>
-          </a:p>
-          <a:p>
-            <a:pPr marL="342900" indent="-342900" algn="just">
+              <a:t>reconocido mundialmente como “fino de aroma” (95% de la producción según ICCO).</a:t>
+            </a:r>
+          </a:p>
+          <a:p>
+            <a:pPr marL="285750" indent="-285750" algn="just">
               <a:buFont typeface="Arial" panose="020B0604020202020204" pitchFamily="34" charset="0"/>
               <a:buChar char="•"/>
             </a:pPr>
             <a:r>
               <a:rPr lang="es-MX" sz="1200" b="1" dirty="0"/>
-              <a:t>Variables de producción: </a:t>
+              <a:t>Quinto exportador global </a:t>
             </a:r>
             <a:r>
               <a:rPr lang="es-MX" sz="1200" dirty="0"/>
-              <a:t>Área cosechada, rendimiento (kg/ha), calidad, edad de las plantas, presencia de plagas.</a:t>
-            </a:r>
-          </a:p>
-          <a:p>
-            <a:pPr marL="342900" indent="-342900" algn="just">
+              <a:t>en un segmento premium que representa solo el 5% de la oferta mundial.</a:t>
+            </a:r>
+          </a:p>
+          <a:p>
+            <a:pPr marL="285750" indent="-285750" algn="just">
               <a:buFont typeface="Arial" panose="020B0604020202020204" pitchFamily="34" charset="0"/>
               <a:buChar char="•"/>
             </a:pPr>
             <a:r>
               <a:rPr lang="es-MX" sz="1200" b="1" dirty="0"/>
-              <a:t>Variables macroeconómicas: </a:t>
+              <a:t>Precios en alza </a:t>
             </a:r>
             <a:r>
               <a:rPr lang="es-MX" sz="1200" dirty="0"/>
-              <a:t>Precio internacional, precio de futuros de cacao, oferta y demanda global, inflación nacional, TRM, políticas de apoyo gubernamental.</a:t>
-            </a:r>
+              <a:t>impulsados por disrupciones climáticas y especulación en mercados de futuros.</a:t>
+            </a:r>
+          </a:p>
+          <a:p>
+            <a:pPr marL="285750" indent="-285750" algn="just">
+              <a:buFont typeface="Arial" panose="020B0604020202020204" pitchFamily="34" charset="0"/>
+              <a:buChar char="•"/>
+            </a:pPr>
+            <a:r>
+              <a:rPr lang="es-MX" sz="1200" dirty="0"/>
+              <a:t>El precio refleja tanto la </a:t>
+            </a:r>
+            <a:r>
+              <a:rPr lang="es-MX" sz="1200" b="1" dirty="0"/>
+              <a:t>escasez física </a:t>
+            </a:r>
+            <a:r>
+              <a:rPr lang="es-MX" sz="1200" dirty="0"/>
+              <a:t>como las </a:t>
+            </a:r>
+            <a:r>
+              <a:rPr lang="es-MX" sz="1200" b="1" dirty="0"/>
+              <a:t>expectativas financieras</a:t>
+            </a:r>
+            <a:r>
+              <a:rPr lang="es-MX" sz="1200" dirty="0"/>
+              <a:t>.</a:t>
+            </a:r>
+            <a:endParaRPr lang="es-MX" sz="1200" b="1" dirty="0"/>
           </a:p>
         </p:txBody>
       </p:sp>
@@ -5398,7 +6089,7 @@
           <p:cNvPr id="4" name="Rectángulo 3">
             <a:extLst>
               <a:ext uri="{FF2B5EF4-FFF2-40B4-BE49-F238E27FC236}">
-                <a16:creationId xmlns:a16="http://schemas.microsoft.com/office/drawing/2014/main" id="{517EEB17-163B-C15F-E983-6203A39EF47F}"/>
+                <a16:creationId xmlns:a16="http://schemas.microsoft.com/office/drawing/2014/main" id="{E8224227-CA34-CB91-14FC-1C28B843C5B0}"/>
               </a:ext>
             </a:extLst>
           </p:cNvPr>
@@ -5453,7 +6144,7 @@
           <p:cNvPr id="1026" name="Picture 2" descr="Carreras y oferta Académica de Pregrado | Uniandes">
             <a:extLst>
               <a:ext uri="{FF2B5EF4-FFF2-40B4-BE49-F238E27FC236}">
-                <a16:creationId xmlns:a16="http://schemas.microsoft.com/office/drawing/2014/main" id="{90B70B59-F712-6325-53EE-E7BF5F4D75DD}"/>
+                <a16:creationId xmlns:a16="http://schemas.microsoft.com/office/drawing/2014/main" id="{C4537049-F2B3-72E5-C926-95B20F3D9775}"/>
               </a:ext>
             </a:extLst>
           </p:cNvPr>
@@ -5500,7 +6191,7 @@
           <p:cNvPr id="5" name="CuadroTexto 4">
             <a:extLst>
               <a:ext uri="{FF2B5EF4-FFF2-40B4-BE49-F238E27FC236}">
-                <a16:creationId xmlns:a16="http://schemas.microsoft.com/office/drawing/2014/main" id="{774A4DE5-A496-6DF9-B054-C6758401D675}"/>
+                <a16:creationId xmlns:a16="http://schemas.microsoft.com/office/drawing/2014/main" id="{5E73BAF1-A099-3981-33AF-CDFF87554C8A}"/>
               </a:ext>
             </a:extLst>
           </p:cNvPr>
@@ -5532,10 +6223,10 @@
       </p:sp>
       <p:pic>
         <p:nvPicPr>
-          <p:cNvPr id="6" name="Imagen 5">
-            <a:extLst>
-              <a:ext uri="{FF2B5EF4-FFF2-40B4-BE49-F238E27FC236}">
-                <a16:creationId xmlns:a16="http://schemas.microsoft.com/office/drawing/2014/main" id="{6FE52EF4-0E0C-627D-BA9C-BC13647E6258}"/>
+          <p:cNvPr id="11" name="Imagen 10">
+            <a:extLst>
+              <a:ext uri="{FF2B5EF4-FFF2-40B4-BE49-F238E27FC236}">
+                <a16:creationId xmlns:a16="http://schemas.microsoft.com/office/drawing/2014/main" id="{05C3ACE8-734B-43CB-0776-97196A019259}"/>
               </a:ext>
             </a:extLst>
           </p:cNvPr>
@@ -5552,8 +6243,8 @@
         </p:blipFill>
         <p:spPr>
           <a:xfrm>
-            <a:off x="7301948" y="1068452"/>
-            <a:ext cx="3929270" cy="1310555"/>
+            <a:off x="1338470" y="3754722"/>
+            <a:ext cx="4308820" cy="2308146"/>
           </a:xfrm>
           <a:prstGeom prst="rect">
             <a:avLst/>
@@ -5562,326 +6253,55 @@
       </p:pic>
       <p:pic>
         <p:nvPicPr>
-          <p:cNvPr id="8" name="Imagen 7">
-            <a:extLst>
-              <a:ext uri="{FF2B5EF4-FFF2-40B4-BE49-F238E27FC236}">
-                <a16:creationId xmlns:a16="http://schemas.microsoft.com/office/drawing/2014/main" id="{90CCB875-ECC4-A120-426F-E2B796548C4A}"/>
+          <p:cNvPr id="2052" name="Picture 4" descr="Gráfico: Los principales productores de cacao en América Latina | Statista">
+            <a:extLst>
+              <a:ext uri="{FF2B5EF4-FFF2-40B4-BE49-F238E27FC236}">
+                <a16:creationId xmlns:a16="http://schemas.microsoft.com/office/drawing/2014/main" id="{76982082-849F-A97C-90CD-F606F5A48B80}"/>
               </a:ext>
             </a:extLst>
           </p:cNvPr>
           <p:cNvPicPr>
-            <a:picLocks noChangeAspect="1"/>
+            <a:picLocks noChangeAspect="1" noChangeArrowheads="1"/>
           </p:cNvPicPr>
           <p:nvPr/>
         </p:nvPicPr>
         <p:blipFill>
-          <a:blip r:embed="rId4"/>
+          <a:blip r:embed="rId4">
+            <a:extLst>
+              <a:ext uri="{28A0092B-C50C-407E-A947-70E740481C1C}">
+                <a14:useLocalDpi xmlns:a14="http://schemas.microsoft.com/office/drawing/2010/main" val="0"/>
+              </a:ext>
+            </a:extLst>
+          </a:blip>
+          <a:srcRect/>
           <a:stretch>
             <a:fillRect/>
           </a:stretch>
         </p:blipFill>
-        <p:spPr>
+        <p:spPr bwMode="auto">
           <a:xfrm>
-            <a:off x="7354956" y="2442628"/>
-            <a:ext cx="3876261" cy="1312075"/>
+            <a:off x="6947452" y="1497494"/>
+            <a:ext cx="4565374" cy="4565374"/>
           </a:xfrm>
           <a:prstGeom prst="rect">
             <a:avLst/>
           </a:prstGeom>
+          <a:noFill/>
+          <a:extLst>
+            <a:ext uri="{909E8E84-426E-40DD-AFC4-6F175D3DCCD1}">
+              <a14:hiddenFill xmlns:a14="http://schemas.microsoft.com/office/drawing/2010/main">
+                <a:solidFill>
+                  <a:srgbClr val="FFFFFF"/>
+                </a:solidFill>
+              </a14:hiddenFill>
+            </a:ext>
+          </a:extLst>
         </p:spPr>
       </p:pic>
-      <p:pic>
-        <p:nvPicPr>
-          <p:cNvPr id="11" name="Imagen 10">
-            <a:extLst>
-              <a:ext uri="{FF2B5EF4-FFF2-40B4-BE49-F238E27FC236}">
-                <a16:creationId xmlns:a16="http://schemas.microsoft.com/office/drawing/2014/main" id="{AF575613-E7B4-CB8C-D12A-A1232D34B642}"/>
-              </a:ext>
-            </a:extLst>
-          </p:cNvPr>
-          <p:cNvPicPr>
-            <a:picLocks noChangeAspect="1"/>
-          </p:cNvPicPr>
-          <p:nvPr/>
-        </p:nvPicPr>
-        <p:blipFill>
-          <a:blip r:embed="rId5"/>
-          <a:stretch>
-            <a:fillRect/>
-          </a:stretch>
-        </p:blipFill>
-        <p:spPr>
-          <a:xfrm>
-            <a:off x="7293186" y="3819844"/>
-            <a:ext cx="3938032" cy="1318300"/>
-          </a:xfrm>
-          <a:prstGeom prst="rect">
-            <a:avLst/>
-          </a:prstGeom>
-        </p:spPr>
-      </p:pic>
-      <p:pic>
-        <p:nvPicPr>
-          <p:cNvPr id="13" name="Imagen 12">
-            <a:extLst>
-              <a:ext uri="{FF2B5EF4-FFF2-40B4-BE49-F238E27FC236}">
-                <a16:creationId xmlns:a16="http://schemas.microsoft.com/office/drawing/2014/main" id="{4C6A3DC0-8236-A4F1-1C7E-AD652DD06540}"/>
-              </a:ext>
-            </a:extLst>
-          </p:cNvPr>
-          <p:cNvPicPr>
-            <a:picLocks noChangeAspect="1"/>
-          </p:cNvPicPr>
-          <p:nvPr/>
-        </p:nvPicPr>
-        <p:blipFill>
-          <a:blip r:embed="rId6"/>
-          <a:stretch>
-            <a:fillRect/>
-          </a:stretch>
-        </p:blipFill>
-        <p:spPr>
-          <a:xfrm>
-            <a:off x="7301948" y="5195541"/>
-            <a:ext cx="3929269" cy="1315368"/>
-          </a:xfrm>
-          <a:prstGeom prst="rect">
-            <a:avLst/>
-          </a:prstGeom>
-        </p:spPr>
-      </p:pic>
-      <p:sp>
-        <p:nvSpPr>
-          <p:cNvPr id="14" name="Subtítulo 2">
-            <a:extLst>
-              <a:ext uri="{FF2B5EF4-FFF2-40B4-BE49-F238E27FC236}">
-                <a16:creationId xmlns:a16="http://schemas.microsoft.com/office/drawing/2014/main" id="{6CEC363E-8ED6-4890-1AFD-B9CCDF29565D}"/>
-              </a:ext>
-            </a:extLst>
-          </p:cNvPr>
-          <p:cNvSpPr txBox="1">
-            <a:spLocks/>
-          </p:cNvSpPr>
-          <p:nvPr/>
-        </p:nvSpPr>
-        <p:spPr>
-          <a:xfrm>
-            <a:off x="854765" y="3877233"/>
-            <a:ext cx="6069496" cy="1763027"/>
-          </a:xfrm>
-          <a:prstGeom prst="rect">
-            <a:avLst/>
-          </a:prstGeom>
-        </p:spPr>
-        <p:txBody>
-          <a:bodyPr vert="horz" lIns="91440" tIns="45720" rIns="91440" bIns="45720" rtlCol="0">
-            <a:noAutofit/>
-          </a:bodyPr>
-          <a:lstStyle>
-            <a:lvl1pPr marL="0" indent="0" algn="ctr" defTabSz="914400" rtl="0" eaLnBrk="1" latinLnBrk="0" hangingPunct="1">
-              <a:lnSpc>
-                <a:spcPct val="90000"/>
-              </a:lnSpc>
-              <a:spcBef>
-                <a:spcPts val="1000"/>
-              </a:spcBef>
-              <a:buFont typeface="Arial" panose="020B0604020202020204" pitchFamily="34" charset="0"/>
-              <a:buNone/>
-              <a:defRPr sz="2400" kern="1200">
-                <a:solidFill>
-                  <a:schemeClr val="tx1"/>
-                </a:solidFill>
-                <a:latin typeface="+mn-lt"/>
-                <a:ea typeface="+mn-ea"/>
-                <a:cs typeface="+mn-cs"/>
-              </a:defRPr>
-            </a:lvl1pPr>
-            <a:lvl2pPr marL="457200" indent="0" algn="ctr" defTabSz="914400" rtl="0" eaLnBrk="1" latinLnBrk="0" hangingPunct="1">
-              <a:lnSpc>
-                <a:spcPct val="90000"/>
-              </a:lnSpc>
-              <a:spcBef>
-                <a:spcPts val="500"/>
-              </a:spcBef>
-              <a:buFont typeface="Arial" panose="020B0604020202020204" pitchFamily="34" charset="0"/>
-              <a:buNone/>
-              <a:defRPr sz="2000" kern="1200">
-                <a:solidFill>
-                  <a:schemeClr val="tx1"/>
-                </a:solidFill>
-                <a:latin typeface="+mn-lt"/>
-                <a:ea typeface="+mn-ea"/>
-                <a:cs typeface="+mn-cs"/>
-              </a:defRPr>
-            </a:lvl2pPr>
-            <a:lvl3pPr marL="914400" indent="0" algn="ctr" defTabSz="914400" rtl="0" eaLnBrk="1" latinLnBrk="0" hangingPunct="1">
-              <a:lnSpc>
-                <a:spcPct val="90000"/>
-              </a:lnSpc>
-              <a:spcBef>
-                <a:spcPts val="500"/>
-              </a:spcBef>
-              <a:buFont typeface="Arial" panose="020B0604020202020204" pitchFamily="34" charset="0"/>
-              <a:buNone/>
-              <a:defRPr sz="1800" kern="1200">
-                <a:solidFill>
-                  <a:schemeClr val="tx1"/>
-                </a:solidFill>
-                <a:latin typeface="+mn-lt"/>
-                <a:ea typeface="+mn-ea"/>
-                <a:cs typeface="+mn-cs"/>
-              </a:defRPr>
-            </a:lvl3pPr>
-            <a:lvl4pPr marL="1371600" indent="0" algn="ctr" defTabSz="914400" rtl="0" eaLnBrk="1" latinLnBrk="0" hangingPunct="1">
-              <a:lnSpc>
-                <a:spcPct val="90000"/>
-              </a:lnSpc>
-              <a:spcBef>
-                <a:spcPts val="500"/>
-              </a:spcBef>
-              <a:buFont typeface="Arial" panose="020B0604020202020204" pitchFamily="34" charset="0"/>
-              <a:buNone/>
-              <a:defRPr sz="1600" kern="1200">
-                <a:solidFill>
-                  <a:schemeClr val="tx1"/>
-                </a:solidFill>
-                <a:latin typeface="+mn-lt"/>
-                <a:ea typeface="+mn-ea"/>
-                <a:cs typeface="+mn-cs"/>
-              </a:defRPr>
-            </a:lvl4pPr>
-            <a:lvl5pPr marL="1828800" indent="0" algn="ctr" defTabSz="914400" rtl="0" eaLnBrk="1" latinLnBrk="0" hangingPunct="1">
-              <a:lnSpc>
-                <a:spcPct val="90000"/>
-              </a:lnSpc>
-              <a:spcBef>
-                <a:spcPts val="500"/>
-              </a:spcBef>
-              <a:buFont typeface="Arial" panose="020B0604020202020204" pitchFamily="34" charset="0"/>
-              <a:buNone/>
-              <a:defRPr sz="1600" kern="1200">
-                <a:solidFill>
-                  <a:schemeClr val="tx1"/>
-                </a:solidFill>
-                <a:latin typeface="+mn-lt"/>
-                <a:ea typeface="+mn-ea"/>
-                <a:cs typeface="+mn-cs"/>
-              </a:defRPr>
-            </a:lvl5pPr>
-            <a:lvl6pPr marL="2286000" indent="0" algn="ctr" defTabSz="914400" rtl="0" eaLnBrk="1" latinLnBrk="0" hangingPunct="1">
-              <a:lnSpc>
-                <a:spcPct val="90000"/>
-              </a:lnSpc>
-              <a:spcBef>
-                <a:spcPts val="500"/>
-              </a:spcBef>
-              <a:buFont typeface="Arial" panose="020B0604020202020204" pitchFamily="34" charset="0"/>
-              <a:buNone/>
-              <a:defRPr sz="1600" kern="1200">
-                <a:solidFill>
-                  <a:schemeClr val="tx1"/>
-                </a:solidFill>
-                <a:latin typeface="+mn-lt"/>
-                <a:ea typeface="+mn-ea"/>
-                <a:cs typeface="+mn-cs"/>
-              </a:defRPr>
-            </a:lvl6pPr>
-            <a:lvl7pPr marL="2743200" indent="0" algn="ctr" defTabSz="914400" rtl="0" eaLnBrk="1" latinLnBrk="0" hangingPunct="1">
-              <a:lnSpc>
-                <a:spcPct val="90000"/>
-              </a:lnSpc>
-              <a:spcBef>
-                <a:spcPts val="500"/>
-              </a:spcBef>
-              <a:buFont typeface="Arial" panose="020B0604020202020204" pitchFamily="34" charset="0"/>
-              <a:buNone/>
-              <a:defRPr sz="1600" kern="1200">
-                <a:solidFill>
-                  <a:schemeClr val="tx1"/>
-                </a:solidFill>
-                <a:latin typeface="+mn-lt"/>
-                <a:ea typeface="+mn-ea"/>
-                <a:cs typeface="+mn-cs"/>
-              </a:defRPr>
-            </a:lvl7pPr>
-            <a:lvl8pPr marL="3200400" indent="0" algn="ctr" defTabSz="914400" rtl="0" eaLnBrk="1" latinLnBrk="0" hangingPunct="1">
-              <a:lnSpc>
-                <a:spcPct val="90000"/>
-              </a:lnSpc>
-              <a:spcBef>
-                <a:spcPts val="500"/>
-              </a:spcBef>
-              <a:buFont typeface="Arial" panose="020B0604020202020204" pitchFamily="34" charset="0"/>
-              <a:buNone/>
-              <a:defRPr sz="1600" kern="1200">
-                <a:solidFill>
-                  <a:schemeClr val="tx1"/>
-                </a:solidFill>
-                <a:latin typeface="+mn-lt"/>
-                <a:ea typeface="+mn-ea"/>
-                <a:cs typeface="+mn-cs"/>
-              </a:defRPr>
-            </a:lvl8pPr>
-            <a:lvl9pPr marL="3657600" indent="0" algn="ctr" defTabSz="914400" rtl="0" eaLnBrk="1" latinLnBrk="0" hangingPunct="1">
-              <a:lnSpc>
-                <a:spcPct val="90000"/>
-              </a:lnSpc>
-              <a:spcBef>
-                <a:spcPts val="500"/>
-              </a:spcBef>
-              <a:buFont typeface="Arial" panose="020B0604020202020204" pitchFamily="34" charset="0"/>
-              <a:buNone/>
-              <a:defRPr sz="1600" kern="1200">
-                <a:solidFill>
-                  <a:schemeClr val="tx1"/>
-                </a:solidFill>
-                <a:latin typeface="+mn-lt"/>
-                <a:ea typeface="+mn-ea"/>
-                <a:cs typeface="+mn-cs"/>
-              </a:defRPr>
-            </a:lvl9pPr>
-          </a:lstStyle>
-          <a:p>
-            <a:pPr algn="just"/>
-            <a:r>
-              <a:rPr lang="es-MX" sz="1200" dirty="0"/>
-              <a:t>*Contrario a las expectativas, los modelos que incorporaron variables climáticas </a:t>
-            </a:r>
-            <a:r>
-              <a:rPr lang="es-MX" sz="1200" b="1" dirty="0"/>
-              <a:t>no mejoraron la precisión</a:t>
-            </a:r>
-            <a:r>
-              <a:rPr lang="es-MX" sz="1200" dirty="0"/>
-              <a:t> sobre un modelo de línea de base que se basaba únicamente en datos de precios históricos. Este resultado sugiere que el impacto de los factores climáticos podría ya estar </a:t>
-            </a:r>
-            <a:r>
-              <a:rPr lang="es-MX" sz="1200" b="1" dirty="0"/>
-              <a:t>internalizado en los precios de mercado </a:t>
-            </a:r>
-            <a:r>
-              <a:rPr lang="es-MX" sz="1200" dirty="0"/>
-              <a:t>debido a la eficiencia del mismo.</a:t>
-            </a:r>
-          </a:p>
-          <a:p>
-            <a:pPr algn="just"/>
-            <a:r>
-              <a:rPr lang="es-MX" sz="1200" b="1" dirty="0"/>
-              <a:t>Fuente: </a:t>
-            </a:r>
-            <a:r>
-              <a:rPr lang="en-US" sz="1200" dirty="0"/>
-              <a:t>Bergander, W. (2025, July 6). Gothenburg University. Deep Learning Cocoa Price Prediction with Weather Data. https://gupea.ub.gu.se/handle/2077/88748</a:t>
-            </a:r>
-            <a:endParaRPr lang="es-MX" sz="1200" dirty="0"/>
-          </a:p>
-        </p:txBody>
-      </p:sp>
     </p:spTree>
     <p:extLst>
       <p:ext uri="{BB962C8B-B14F-4D97-AF65-F5344CB8AC3E}">
-        <p14:creationId xmlns:p14="http://schemas.microsoft.com/office/powerpoint/2010/main" val="152558511"/>
+        <p14:creationId xmlns:p14="http://schemas.microsoft.com/office/powerpoint/2010/main" val="3168108746"/>
       </p:ext>
     </p:extLst>
   </p:cSld>
@@ -5891,7 +6311,7 @@
 </p:sld>
 </file>
 
-<file path=ppt/slides/slide5.xml><?xml version="1.0" encoding="utf-8"?>
+<file path=ppt/slides/slide4.xml><?xml version="1.0" encoding="utf-8"?>
 <p:sld xmlns:a="http://schemas.openxmlformats.org/drawingml/2006/main" xmlns:r="http://schemas.openxmlformats.org/officeDocument/2006/relationships" xmlns:p="http://schemas.openxmlformats.org/presentationml/2006/main">
   <p:cSld>
     <p:spTree>
@@ -5899,7 +6319,7 @@
         <p:cNvPr id="1" name="">
           <a:extLst>
             <a:ext uri="{FF2B5EF4-FFF2-40B4-BE49-F238E27FC236}">
-              <a16:creationId xmlns:a16="http://schemas.microsoft.com/office/drawing/2014/main" id="{67937808-50EF-A483-5217-AEA4E395C0A1}"/>
+              <a16:creationId xmlns:a16="http://schemas.microsoft.com/office/drawing/2014/main" id="{32826614-A7B8-13E1-557F-01D3024DB449}"/>
             </a:ext>
           </a:extLst>
         </p:cNvPr>
@@ -5916,10 +6336,107 @@
       </p:grpSpPr>
       <p:sp>
         <p:nvSpPr>
+          <p:cNvPr id="3" name="Subtítulo 2">
+            <a:extLst>
+              <a:ext uri="{FF2B5EF4-FFF2-40B4-BE49-F238E27FC236}">
+                <a16:creationId xmlns:a16="http://schemas.microsoft.com/office/drawing/2014/main" id="{713DC48A-224C-56BB-369B-818F222D6346}"/>
+              </a:ext>
+            </a:extLst>
+          </p:cNvPr>
+          <p:cNvSpPr>
+            <a:spLocks noGrp="1"/>
+          </p:cNvSpPr>
+          <p:nvPr>
+            <p:ph type="subTitle" idx="1"/>
+          </p:nvPr>
+        </p:nvSpPr>
+        <p:spPr>
+          <a:xfrm>
+            <a:off x="1133063" y="1517371"/>
+            <a:ext cx="4850296" cy="1763027"/>
+          </a:xfrm>
+        </p:spPr>
+        <p:txBody>
+          <a:bodyPr>
+            <a:noAutofit/>
+          </a:bodyPr>
+          <a:lstStyle/>
+          <a:p>
+            <a:pPr marL="342900" indent="-342900" algn="just">
+              <a:buFont typeface="Arial" panose="020B0604020202020204" pitchFamily="34" charset="0"/>
+              <a:buChar char="•"/>
+            </a:pPr>
+            <a:r>
+              <a:rPr lang="es-MX" sz="1200" b="1" dirty="0"/>
+              <a:t>Escalada de precios </a:t>
+            </a:r>
+            <a:r>
+              <a:rPr lang="es-MX" sz="1200" dirty="0"/>
+              <a:t>(+60%) por déficit global de oferta y especulación financiera.</a:t>
+            </a:r>
+          </a:p>
+          <a:p>
+            <a:pPr marL="342900" indent="-342900" algn="just">
+              <a:buFont typeface="Arial" panose="020B0604020202020204" pitchFamily="34" charset="0"/>
+              <a:buChar char="•"/>
+            </a:pPr>
+            <a:r>
+              <a:rPr lang="es-MX" sz="1200" u="sng" dirty="0"/>
+              <a:t>Cambio climático: </a:t>
+            </a:r>
+            <a:r>
+              <a:rPr lang="es-MX" sz="1200" dirty="0"/>
+              <a:t>menor producción en Costa de Marfil y Ghana.</a:t>
+            </a:r>
+          </a:p>
+          <a:p>
+            <a:pPr marL="342900" indent="-342900" algn="just">
+              <a:buFont typeface="Arial" panose="020B0604020202020204" pitchFamily="34" charset="0"/>
+              <a:buChar char="•"/>
+            </a:pPr>
+            <a:r>
+              <a:rPr lang="es-MX" sz="1200" dirty="0"/>
+              <a:t>Expansión en Colombia con </a:t>
+            </a:r>
+            <a:r>
+              <a:rPr lang="es-MX" sz="1200" b="1" dirty="0"/>
+              <a:t>nuevas áreas de cultivo </a:t>
+            </a:r>
+            <a:r>
+              <a:rPr lang="es-MX" sz="1200" dirty="0"/>
+              <a:t>en zonas antes cafeteras.</a:t>
+            </a:r>
+          </a:p>
+          <a:p>
+            <a:pPr marL="342900" indent="-342900" algn="just">
+              <a:buFont typeface="Arial" panose="020B0604020202020204" pitchFamily="34" charset="0"/>
+              <a:buChar char="•"/>
+            </a:pPr>
+            <a:r>
+              <a:rPr lang="es-MX" sz="1200" b="1" dirty="0"/>
+              <a:t>Competitividad futura </a:t>
+            </a:r>
+            <a:r>
+              <a:rPr lang="es-MX" sz="1200" dirty="0"/>
+              <a:t>debido a las condiciones que atraen </a:t>
+            </a:r>
+            <a:r>
+              <a:rPr lang="es-MX" sz="1200" b="1" dirty="0"/>
+              <a:t>inversión extranjera </a:t>
+            </a:r>
+            <a:r>
+              <a:rPr lang="es-MX" sz="1200" dirty="0"/>
+              <a:t>al sector.</a:t>
+            </a:r>
+          </a:p>
+        </p:txBody>
+      </p:sp>
+      <p:sp>
+        <p:nvSpPr>
           <p:cNvPr id="4" name="Rectángulo 3">
             <a:extLst>
               <a:ext uri="{FF2B5EF4-FFF2-40B4-BE49-F238E27FC236}">
-                <a16:creationId xmlns:a16="http://schemas.microsoft.com/office/drawing/2014/main" id="{E1D0FC0E-5581-C3E7-B2B6-E8454B292727}"/>
+                <a16:creationId xmlns:a16="http://schemas.microsoft.com/office/drawing/2014/main" id="{8AAD544B-3517-FD6F-28F9-576B37CF4CA6}"/>
               </a:ext>
             </a:extLst>
           </p:cNvPr>
@@ -5974,7 +6491,7 @@
           <p:cNvPr id="1026" name="Picture 2" descr="Carreras y oferta Académica de Pregrado | Uniandes">
             <a:extLst>
               <a:ext uri="{FF2B5EF4-FFF2-40B4-BE49-F238E27FC236}">
-                <a16:creationId xmlns:a16="http://schemas.microsoft.com/office/drawing/2014/main" id="{A7CAE9CF-818E-046F-2C98-2BA3B535E1DF}"/>
+                <a16:creationId xmlns:a16="http://schemas.microsoft.com/office/drawing/2014/main" id="{302D184A-AFD0-6EAD-CDAC-035EB9D20D42}"/>
               </a:ext>
             </a:extLst>
           </p:cNvPr>
@@ -6021,7 +6538,7 @@
           <p:cNvPr id="5" name="CuadroTexto 4">
             <a:extLst>
               <a:ext uri="{FF2B5EF4-FFF2-40B4-BE49-F238E27FC236}">
-                <a16:creationId xmlns:a16="http://schemas.microsoft.com/office/drawing/2014/main" id="{E7982785-255A-29C8-E8F9-B54FCF6B06A9}"/>
+                <a16:creationId xmlns:a16="http://schemas.microsoft.com/office/drawing/2014/main" id="{87A9FD78-40A2-7482-395C-86E42D4A4145}"/>
               </a:ext>
             </a:extLst>
           </p:cNvPr>
@@ -6053,10 +6570,57 @@
       </p:sp>
       <p:pic>
         <p:nvPicPr>
-          <p:cNvPr id="6" name="Imagen 5">
-            <a:extLst>
-              <a:ext uri="{FF2B5EF4-FFF2-40B4-BE49-F238E27FC236}">
-                <a16:creationId xmlns:a16="http://schemas.microsoft.com/office/drawing/2014/main" id="{95C1263D-76F3-679D-9574-1945259AD3B0}"/>
+          <p:cNvPr id="2050" name="Picture 2" descr="Gráfico: África: principal productor mundial de cacao | Statista">
+            <a:extLst>
+              <a:ext uri="{FF2B5EF4-FFF2-40B4-BE49-F238E27FC236}">
+                <a16:creationId xmlns:a16="http://schemas.microsoft.com/office/drawing/2014/main" id="{58AA5E06-D138-0942-7D25-DF87059E3A23}"/>
+              </a:ext>
+            </a:extLst>
+          </p:cNvPr>
+          <p:cNvPicPr>
+            <a:picLocks noChangeAspect="1" noChangeArrowheads="1"/>
+          </p:cNvPicPr>
+          <p:nvPr/>
+        </p:nvPicPr>
+        <p:blipFill>
+          <a:blip r:embed="rId3">
+            <a:extLst>
+              <a:ext uri="{28A0092B-C50C-407E-A947-70E740481C1C}">
+                <a14:useLocalDpi xmlns:a14="http://schemas.microsoft.com/office/drawing/2010/main" val="0"/>
+              </a:ext>
+            </a:extLst>
+          </a:blip>
+          <a:srcRect/>
+          <a:stretch>
+            <a:fillRect/>
+          </a:stretch>
+        </p:blipFill>
+        <p:spPr bwMode="auto">
+          <a:xfrm>
+            <a:off x="6669155" y="1497494"/>
+            <a:ext cx="4459357" cy="4459357"/>
+          </a:xfrm>
+          <a:prstGeom prst="rect">
+            <a:avLst/>
+          </a:prstGeom>
+          <a:noFill/>
+          <a:extLst>
+            <a:ext uri="{909E8E84-426E-40DD-AFC4-6F175D3DCCD1}">
+              <a14:hiddenFill xmlns:a14="http://schemas.microsoft.com/office/drawing/2010/main">
+                <a:solidFill>
+                  <a:srgbClr val="FFFFFF"/>
+                </a:solidFill>
+              </a14:hiddenFill>
+            </a:ext>
+          </a:extLst>
+        </p:spPr>
+      </p:pic>
+      <p:pic>
+        <p:nvPicPr>
+          <p:cNvPr id="9" name="Imagen 8">
+            <a:extLst>
+              <a:ext uri="{FF2B5EF4-FFF2-40B4-BE49-F238E27FC236}">
+                <a16:creationId xmlns:a16="http://schemas.microsoft.com/office/drawing/2014/main" id="{04236AC5-857F-EE0C-2A7E-1CB662255589}"/>
               </a:ext>
             </a:extLst>
           </p:cNvPr>
@@ -6066,105 +6630,27 @@
           <p:nvPr/>
         </p:nvPicPr>
         <p:blipFill>
-          <a:blip r:embed="rId3"/>
+          <a:blip r:embed="rId4">
+            <a:extLst>
+              <a:ext uri="{BEBA8EAE-BF5A-486C-A8C5-ECC9F3942E4B}">
+                <a14:imgProps xmlns:a14="http://schemas.microsoft.com/office/drawing/2010/main">
+                  <a14:imgLayer r:embed="rId5">
+                    <a14:imgEffect>
+                      <a14:sharpenSoften amount="50000"/>
+                    </a14:imgEffect>
+                  </a14:imgLayer>
+                </a14:imgProps>
+              </a:ext>
+            </a:extLst>
+          </a:blip>
           <a:stretch>
             <a:fillRect/>
           </a:stretch>
         </p:blipFill>
         <p:spPr>
           <a:xfrm>
-            <a:off x="351731" y="1640222"/>
-            <a:ext cx="5636861" cy="1880099"/>
-          </a:xfrm>
-          <a:prstGeom prst="rect">
-            <a:avLst/>
-          </a:prstGeom>
-        </p:spPr>
-      </p:pic>
-      <p:pic>
-        <p:nvPicPr>
-          <p:cNvPr id="8" name="Imagen 7">
-            <a:extLst>
-              <a:ext uri="{FF2B5EF4-FFF2-40B4-BE49-F238E27FC236}">
-                <a16:creationId xmlns:a16="http://schemas.microsoft.com/office/drawing/2014/main" id="{224333C7-9340-8C8C-AFBD-2DA95A325136}"/>
-              </a:ext>
-            </a:extLst>
-          </p:cNvPr>
-          <p:cNvPicPr>
-            <a:picLocks noChangeAspect="1"/>
-          </p:cNvPicPr>
-          <p:nvPr/>
-        </p:nvPicPr>
-        <p:blipFill>
-          <a:blip r:embed="rId4"/>
-          <a:stretch>
-            <a:fillRect/>
-          </a:stretch>
-        </p:blipFill>
-        <p:spPr>
-          <a:xfrm>
-            <a:off x="389752" y="3682926"/>
-            <a:ext cx="5560817" cy="1882280"/>
-          </a:xfrm>
-          <a:prstGeom prst="rect">
-            <a:avLst/>
-          </a:prstGeom>
-        </p:spPr>
-      </p:pic>
-      <p:pic>
-        <p:nvPicPr>
-          <p:cNvPr id="11" name="Imagen 10">
-            <a:extLst>
-              <a:ext uri="{FF2B5EF4-FFF2-40B4-BE49-F238E27FC236}">
-                <a16:creationId xmlns:a16="http://schemas.microsoft.com/office/drawing/2014/main" id="{63D2AFE4-C934-A4ED-F14F-DF565C95B087}"/>
-              </a:ext>
-            </a:extLst>
-          </p:cNvPr>
-          <p:cNvPicPr>
-            <a:picLocks noChangeAspect="1"/>
-          </p:cNvPicPr>
-          <p:nvPr/>
-        </p:nvPicPr>
-        <p:blipFill>
-          <a:blip r:embed="rId5"/>
-          <a:stretch>
-            <a:fillRect/>
-          </a:stretch>
-        </p:blipFill>
-        <p:spPr>
-          <a:xfrm>
-            <a:off x="6089922" y="1696097"/>
-            <a:ext cx="5463451" cy="1828951"/>
-          </a:xfrm>
-          <a:prstGeom prst="rect">
-            <a:avLst/>
-          </a:prstGeom>
-        </p:spPr>
-      </p:pic>
-      <p:pic>
-        <p:nvPicPr>
-          <p:cNvPr id="13" name="Imagen 12">
-            <a:extLst>
-              <a:ext uri="{FF2B5EF4-FFF2-40B4-BE49-F238E27FC236}">
-                <a16:creationId xmlns:a16="http://schemas.microsoft.com/office/drawing/2014/main" id="{50050EAC-4239-3740-F684-7A3F1D30C0E8}"/>
-              </a:ext>
-            </a:extLst>
-          </p:cNvPr>
-          <p:cNvPicPr>
-            <a:picLocks noChangeAspect="1"/>
-          </p:cNvPicPr>
-          <p:nvPr/>
-        </p:nvPicPr>
-        <p:blipFill>
-          <a:blip r:embed="rId6"/>
-          <a:stretch>
-            <a:fillRect/>
-          </a:stretch>
-        </p:blipFill>
-        <p:spPr>
-          <a:xfrm>
-            <a:off x="6096000" y="3682926"/>
-            <a:ext cx="5451293" cy="1824883"/>
+            <a:off x="1593577" y="3480046"/>
+            <a:ext cx="3929269" cy="2629205"/>
           </a:xfrm>
           <a:prstGeom prst="rect">
             <a:avLst/>
@@ -6174,7 +6660,7 @@
     </p:spTree>
     <p:extLst>
       <p:ext uri="{BB962C8B-B14F-4D97-AF65-F5344CB8AC3E}">
-        <p14:creationId xmlns:p14="http://schemas.microsoft.com/office/powerpoint/2010/main" val="2294619585"/>
+        <p14:creationId xmlns:p14="http://schemas.microsoft.com/office/powerpoint/2010/main" val="2424761874"/>
       </p:ext>
     </p:extLst>
   </p:cSld>
@@ -6184,7 +6670,7 @@
 </p:sld>
 </file>
 
-<file path=ppt/slides/slide6.xml><?xml version="1.0" encoding="utf-8"?>
+<file path=ppt/slides/slide5.xml><?xml version="1.0" encoding="utf-8"?>
 <p:sld xmlns:a="http://schemas.openxmlformats.org/drawingml/2006/main" xmlns:r="http://schemas.openxmlformats.org/officeDocument/2006/relationships" xmlns:p="http://schemas.openxmlformats.org/presentationml/2006/main">
   <p:cSld>
     <p:spTree>
@@ -6192,7 +6678,7 @@
         <p:cNvPr id="1" name="">
           <a:extLst>
             <a:ext uri="{FF2B5EF4-FFF2-40B4-BE49-F238E27FC236}">
-              <a16:creationId xmlns:a16="http://schemas.microsoft.com/office/drawing/2014/main" id="{C8ED23B7-202E-2FEC-9E85-7303AF3BCEA1}"/>
+              <a16:creationId xmlns:a16="http://schemas.microsoft.com/office/drawing/2014/main" id="{9D8382BC-81D2-BD83-B93E-A88A75EF4433}"/>
             </a:ext>
           </a:extLst>
         </p:cNvPr>
@@ -6212,7 +6698,7 @@
           <p:cNvPr id="3" name="Subtítulo 2">
             <a:extLst>
               <a:ext uri="{FF2B5EF4-FFF2-40B4-BE49-F238E27FC236}">
-                <a16:creationId xmlns:a16="http://schemas.microsoft.com/office/drawing/2014/main" id="{6B3DF7AE-265B-2314-CABD-7E650040C2CE}"/>
+                <a16:creationId xmlns:a16="http://schemas.microsoft.com/office/drawing/2014/main" id="{48A0C517-95BE-D8EF-2F35-CAA7AC079CBB}"/>
               </a:ext>
             </a:extLst>
           </p:cNvPr>
@@ -6225,7 +6711,7 @@
         </p:nvSpPr>
         <p:spPr>
           <a:xfrm>
-            <a:off x="934278" y="1991137"/>
+            <a:off x="556591" y="1991137"/>
             <a:ext cx="6367670" cy="1437863"/>
           </a:xfrm>
         </p:spPr>
@@ -6235,58 +6721,45 @@
           </a:bodyPr>
           <a:lstStyle/>
           <a:p>
-            <a:pPr algn="just"/>
-            <a:r>
-              <a:rPr lang="es-MX" sz="1400" b="1" dirty="0"/>
-              <a:t>¿Qué se ha hecho?</a:t>
-            </a:r>
-          </a:p>
-          <a:p>
-            <a:pPr marL="228600" indent="-228600" algn="just">
-              <a:buFont typeface="+mj-lt"/>
-              <a:buAutoNum type="arabicPeriod"/>
+            <a:pPr marL="342900" indent="-342900" algn="just">
+              <a:buFont typeface="Arial" panose="020B0604020202020204" pitchFamily="34" charset="0"/>
+              <a:buChar char="•"/>
             </a:pPr>
             <a:r>
-              <a:rPr lang="es-MX" sz="1400" dirty="0"/>
-              <a:t>Entender el contexto</a:t>
-            </a:r>
-          </a:p>
-          <a:p>
-            <a:pPr marL="228600" indent="-228600" algn="just">
-              <a:buFont typeface="+mj-lt"/>
-              <a:buAutoNum type="arabicPeriod"/>
+              <a:rPr lang="es-MX" sz="1200" b="1" dirty="0"/>
+              <a:t>Variables climáticas*: </a:t>
+            </a:r>
+            <a:r>
+              <a:rPr lang="es-MX" sz="1200" dirty="0"/>
+              <a:t>Precipitación, temperatura, radiación, fenómenos naturales (El Niño o La Niña).</a:t>
+            </a:r>
+          </a:p>
+          <a:p>
+            <a:pPr marL="342900" indent="-342900" algn="just">
+              <a:buFont typeface="Arial" panose="020B0604020202020204" pitchFamily="34" charset="0"/>
+              <a:buChar char="•"/>
             </a:pPr>
             <a:r>
-              <a:rPr lang="es-MX" sz="1400" dirty="0"/>
-              <a:t>Identificar variables a usar</a:t>
-            </a:r>
-          </a:p>
-          <a:p>
-            <a:pPr marL="228600" indent="-228600" algn="just">
-              <a:buFont typeface="+mj-lt"/>
-              <a:buAutoNum type="arabicPeriod"/>
+              <a:rPr lang="es-MX" sz="1200" b="1" dirty="0"/>
+              <a:t>Variables de producción: </a:t>
+            </a:r>
+            <a:r>
+              <a:rPr lang="es-MX" sz="1200" dirty="0"/>
+              <a:t>Área cosechada, rendimiento (kg/ha), calidad, edad de las plantas, presencia de plagas.</a:t>
+            </a:r>
+          </a:p>
+          <a:p>
+            <a:pPr marL="342900" indent="-342900" algn="just">
+              <a:buFont typeface="Arial" panose="020B0604020202020204" pitchFamily="34" charset="0"/>
+              <a:buChar char="•"/>
             </a:pPr>
             <a:r>
-              <a:rPr lang="es-MX" sz="1400" dirty="0"/>
-              <a:t>Aplicar modelos </a:t>
-            </a:r>
-            <a:r>
-              <a:rPr lang="es-MX" sz="1400" dirty="0" err="1"/>
-              <a:t>univariados</a:t>
-            </a:r>
-            <a:r>
-              <a:rPr lang="es-MX" sz="1400" dirty="0"/>
-              <a:t>: SARIMA</a:t>
-            </a:r>
-          </a:p>
-          <a:p>
-            <a:pPr marL="228600" indent="-228600" algn="just">
-              <a:buFont typeface="+mj-lt"/>
-              <a:buAutoNum type="arabicPeriod"/>
-            </a:pPr>
-            <a:r>
-              <a:rPr lang="es-MX" sz="1400" dirty="0"/>
-              <a:t>Aplicar modelos multivariados: SARIMAX y VAR</a:t>
+              <a:rPr lang="es-MX" sz="1200" b="1" dirty="0"/>
+              <a:t>Variables macroeconómicas: </a:t>
+            </a:r>
+            <a:r>
+              <a:rPr lang="es-MX" sz="1200" dirty="0"/>
+              <a:t>Precio internacional, precio de futuros de cacao, oferta y demanda global, inflación nacional, TRM, políticas de apoyo gubernamental.</a:t>
             </a:r>
           </a:p>
         </p:txBody>
@@ -6296,7 +6769,7 @@
           <p:cNvPr id="4" name="Rectángulo 3">
             <a:extLst>
               <a:ext uri="{FF2B5EF4-FFF2-40B4-BE49-F238E27FC236}">
-                <a16:creationId xmlns:a16="http://schemas.microsoft.com/office/drawing/2014/main" id="{78F6C11A-F841-BC13-455B-29DB63B0C8CD}"/>
+                <a16:creationId xmlns:a16="http://schemas.microsoft.com/office/drawing/2014/main" id="{517EEB17-163B-C15F-E983-6203A39EF47F}"/>
               </a:ext>
             </a:extLst>
           </p:cNvPr>
@@ -6351,7 +6824,7 @@
           <p:cNvPr id="1026" name="Picture 2" descr="Carreras y oferta Académica de Pregrado | Uniandes">
             <a:extLst>
               <a:ext uri="{FF2B5EF4-FFF2-40B4-BE49-F238E27FC236}">
-                <a16:creationId xmlns:a16="http://schemas.microsoft.com/office/drawing/2014/main" id="{AE8BF2D9-B6E7-A219-DEED-E25DE97FDD0D}"/>
+                <a16:creationId xmlns:a16="http://schemas.microsoft.com/office/drawing/2014/main" id="{90B70B59-F712-6325-53EE-E7BF5F4D75DD}"/>
               </a:ext>
             </a:extLst>
           </p:cNvPr>
@@ -6398,7 +6871,7 @@
           <p:cNvPr id="5" name="CuadroTexto 4">
             <a:extLst>
               <a:ext uri="{FF2B5EF4-FFF2-40B4-BE49-F238E27FC236}">
-                <a16:creationId xmlns:a16="http://schemas.microsoft.com/office/drawing/2014/main" id="{166906E4-603F-7D08-698E-FCC235F56BE9}"/>
+                <a16:creationId xmlns:a16="http://schemas.microsoft.com/office/drawing/2014/main" id="{774A4DE5-A496-6DF9-B054-C6758401D675}"/>
               </a:ext>
             </a:extLst>
           </p:cNvPr>
@@ -6423,17 +6896,137 @@
           <a:p>
             <a:r>
               <a:rPr lang="es-CO" b="1" dirty="0"/>
-              <a:t>Metodología</a:t>
-            </a:r>
-          </a:p>
-        </p:txBody>
-      </p:sp>
-      <p:sp>
-        <p:nvSpPr>
-          <p:cNvPr id="2" name="Subtítulo 2">
-            <a:extLst>
-              <a:ext uri="{FF2B5EF4-FFF2-40B4-BE49-F238E27FC236}">
-                <a16:creationId xmlns:a16="http://schemas.microsoft.com/office/drawing/2014/main" id="{B6A5D0FF-1723-D124-523D-E88FA436823A}"/>
+              <a:t>Contexto</a:t>
+            </a:r>
+          </a:p>
+        </p:txBody>
+      </p:sp>
+      <p:pic>
+        <p:nvPicPr>
+          <p:cNvPr id="6" name="Imagen 5">
+            <a:extLst>
+              <a:ext uri="{FF2B5EF4-FFF2-40B4-BE49-F238E27FC236}">
+                <a16:creationId xmlns:a16="http://schemas.microsoft.com/office/drawing/2014/main" id="{6FE52EF4-0E0C-627D-BA9C-BC13647E6258}"/>
+              </a:ext>
+            </a:extLst>
+          </p:cNvPr>
+          <p:cNvPicPr>
+            <a:picLocks noChangeAspect="1"/>
+          </p:cNvPicPr>
+          <p:nvPr/>
+        </p:nvPicPr>
+        <p:blipFill>
+          <a:blip r:embed="rId3"/>
+          <a:stretch>
+            <a:fillRect/>
+          </a:stretch>
+        </p:blipFill>
+        <p:spPr>
+          <a:xfrm>
+            <a:off x="7301948" y="1068452"/>
+            <a:ext cx="3929270" cy="1310555"/>
+          </a:xfrm>
+          <a:prstGeom prst="rect">
+            <a:avLst/>
+          </a:prstGeom>
+        </p:spPr>
+      </p:pic>
+      <p:pic>
+        <p:nvPicPr>
+          <p:cNvPr id="8" name="Imagen 7">
+            <a:extLst>
+              <a:ext uri="{FF2B5EF4-FFF2-40B4-BE49-F238E27FC236}">
+                <a16:creationId xmlns:a16="http://schemas.microsoft.com/office/drawing/2014/main" id="{90CCB875-ECC4-A120-426F-E2B796548C4A}"/>
+              </a:ext>
+            </a:extLst>
+          </p:cNvPr>
+          <p:cNvPicPr>
+            <a:picLocks noChangeAspect="1"/>
+          </p:cNvPicPr>
+          <p:nvPr/>
+        </p:nvPicPr>
+        <p:blipFill>
+          <a:blip r:embed="rId4"/>
+          <a:stretch>
+            <a:fillRect/>
+          </a:stretch>
+        </p:blipFill>
+        <p:spPr>
+          <a:xfrm>
+            <a:off x="7354956" y="2442628"/>
+            <a:ext cx="3876261" cy="1312075"/>
+          </a:xfrm>
+          <a:prstGeom prst="rect">
+            <a:avLst/>
+          </a:prstGeom>
+        </p:spPr>
+      </p:pic>
+      <p:pic>
+        <p:nvPicPr>
+          <p:cNvPr id="11" name="Imagen 10">
+            <a:extLst>
+              <a:ext uri="{FF2B5EF4-FFF2-40B4-BE49-F238E27FC236}">
+                <a16:creationId xmlns:a16="http://schemas.microsoft.com/office/drawing/2014/main" id="{AF575613-E7B4-CB8C-D12A-A1232D34B642}"/>
+              </a:ext>
+            </a:extLst>
+          </p:cNvPr>
+          <p:cNvPicPr>
+            <a:picLocks noChangeAspect="1"/>
+          </p:cNvPicPr>
+          <p:nvPr/>
+        </p:nvPicPr>
+        <p:blipFill>
+          <a:blip r:embed="rId5"/>
+          <a:stretch>
+            <a:fillRect/>
+          </a:stretch>
+        </p:blipFill>
+        <p:spPr>
+          <a:xfrm>
+            <a:off x="7293186" y="3819844"/>
+            <a:ext cx="3938032" cy="1318300"/>
+          </a:xfrm>
+          <a:prstGeom prst="rect">
+            <a:avLst/>
+          </a:prstGeom>
+        </p:spPr>
+      </p:pic>
+      <p:pic>
+        <p:nvPicPr>
+          <p:cNvPr id="13" name="Imagen 12">
+            <a:extLst>
+              <a:ext uri="{FF2B5EF4-FFF2-40B4-BE49-F238E27FC236}">
+                <a16:creationId xmlns:a16="http://schemas.microsoft.com/office/drawing/2014/main" id="{4C6A3DC0-8236-A4F1-1C7E-AD652DD06540}"/>
+              </a:ext>
+            </a:extLst>
+          </p:cNvPr>
+          <p:cNvPicPr>
+            <a:picLocks noChangeAspect="1"/>
+          </p:cNvPicPr>
+          <p:nvPr/>
+        </p:nvPicPr>
+        <p:blipFill>
+          <a:blip r:embed="rId6"/>
+          <a:stretch>
+            <a:fillRect/>
+          </a:stretch>
+        </p:blipFill>
+        <p:spPr>
+          <a:xfrm>
+            <a:off x="7301948" y="5195541"/>
+            <a:ext cx="3929269" cy="1315368"/>
+          </a:xfrm>
+          <a:prstGeom prst="rect">
+            <a:avLst/>
+          </a:prstGeom>
+        </p:spPr>
+      </p:pic>
+      <p:sp>
+        <p:nvSpPr>
+          <p:cNvPr id="14" name="Subtítulo 2">
+            <a:extLst>
+              <a:ext uri="{FF2B5EF4-FFF2-40B4-BE49-F238E27FC236}">
+                <a16:creationId xmlns:a16="http://schemas.microsoft.com/office/drawing/2014/main" id="{6CEC363E-8ED6-4890-1AFD-B9CCDF29565D}"/>
               </a:ext>
             </a:extLst>
           </p:cNvPr>
@@ -6444,8 +7037,8 @@
         </p:nvSpPr>
         <p:spPr>
           <a:xfrm>
-            <a:off x="934278" y="3892823"/>
-            <a:ext cx="6367670" cy="1437863"/>
+            <a:off x="854765" y="3877233"/>
+            <a:ext cx="6069496" cy="1763027"/>
           </a:xfrm>
           <a:prstGeom prst="rect">
             <a:avLst/>
@@ -6622,114 +7215,44 @@
           <a:p>
             <a:pPr algn="just"/>
             <a:r>
-              <a:rPr lang="es-MX" sz="1400" b="1" dirty="0">
-                <a:solidFill>
-                  <a:schemeClr val="bg1">
-                    <a:lumMod val="65000"/>
-                  </a:schemeClr>
-                </a:solidFill>
-              </a:rPr>
-              <a:t>¿Qué queda por hacer?</a:t>
+              <a:rPr lang="es-MX" sz="1200" dirty="0"/>
+              <a:t>*Contrario a las expectativas, los modelos que incorporaron variables climáticas </a:t>
+            </a:r>
+            <a:r>
+              <a:rPr lang="es-MX" sz="1200" b="1" dirty="0"/>
+              <a:t>no mejoraron la precisión</a:t>
+            </a:r>
+            <a:r>
+              <a:rPr lang="es-MX" sz="1200" dirty="0"/>
+              <a:t> sobre un modelo de línea de base que se basaba únicamente en datos de precios históricos. Este resultado sugiere que el impacto de los factores climáticos podría ya estar </a:t>
+            </a:r>
+            <a:r>
+              <a:rPr lang="es-MX" sz="1200" b="1" dirty="0"/>
+              <a:t>internalizado en los precios de mercado </a:t>
+            </a:r>
+            <a:r>
+              <a:rPr lang="es-MX" sz="1200" dirty="0"/>
+              <a:t>debido a la eficiencia del mismo.</a:t>
             </a:r>
           </a:p>
           <a:p>
             <a:pPr algn="just"/>
             <a:r>
-              <a:rPr lang="es-MX" sz="1400" dirty="0">
-                <a:solidFill>
-                  <a:schemeClr val="bg1">
-                    <a:lumMod val="65000"/>
-                  </a:schemeClr>
-                </a:solidFill>
-              </a:rPr>
-              <a:t>5. Aplicar modelos de machine </a:t>
-            </a:r>
-            <a:r>
-              <a:rPr lang="es-MX" sz="1400" dirty="0" err="1">
-                <a:solidFill>
-                  <a:schemeClr val="bg1">
-                    <a:lumMod val="65000"/>
-                  </a:schemeClr>
-                </a:solidFill>
-              </a:rPr>
-              <a:t>learning</a:t>
-            </a:r>
-            <a:r>
-              <a:rPr lang="es-MX" sz="1400" dirty="0">
-                <a:solidFill>
-                  <a:schemeClr val="bg1">
-                    <a:lumMod val="65000"/>
-                  </a:schemeClr>
-                </a:solidFill>
-              </a:rPr>
-              <a:t>: </a:t>
-            </a:r>
-            <a:r>
-              <a:rPr lang="es-MX" sz="1400" dirty="0" err="1">
-                <a:solidFill>
-                  <a:schemeClr val="bg1">
-                    <a:lumMod val="65000"/>
-                  </a:schemeClr>
-                </a:solidFill>
-              </a:rPr>
-              <a:t>XGBoost</a:t>
-            </a:r>
-            <a:r>
-              <a:rPr lang="es-MX" sz="1400" dirty="0">
-                <a:solidFill>
-                  <a:schemeClr val="bg1">
-                    <a:lumMod val="65000"/>
-                  </a:schemeClr>
-                </a:solidFill>
-              </a:rPr>
-              <a:t>, redes neuronales (LSTM)</a:t>
-            </a:r>
-          </a:p>
-          <a:p>
-            <a:pPr algn="just"/>
-            <a:r>
-              <a:rPr lang="es-MX" sz="1400" dirty="0">
-                <a:solidFill>
-                  <a:schemeClr val="bg1">
-                    <a:lumMod val="65000"/>
-                  </a:schemeClr>
-                </a:solidFill>
-              </a:rPr>
-              <a:t>6. Comparar modelos y seleccionar mejor</a:t>
-            </a:r>
-          </a:p>
-          <a:p>
-            <a:pPr algn="just"/>
-            <a:r>
-              <a:rPr lang="es-MX" sz="1400" dirty="0">
-                <a:solidFill>
-                  <a:schemeClr val="bg1">
-                    <a:lumMod val="65000"/>
-                  </a:schemeClr>
-                </a:solidFill>
-              </a:rPr>
-              <a:t>7. Redacción del documento</a:t>
-            </a:r>
-          </a:p>
-          <a:p>
-            <a:pPr algn="just"/>
-            <a:r>
-              <a:rPr lang="es-MX" sz="1400" dirty="0">
-                <a:solidFill>
-                  <a:schemeClr val="bg1">
-                    <a:lumMod val="65000"/>
-                  </a:schemeClr>
-                </a:solidFill>
-              </a:rPr>
-              <a:t>8. Presentación y sustentación</a:t>
-            </a:r>
+              <a:rPr lang="es-MX" sz="1200" b="1" dirty="0"/>
+              <a:t>Fuente: </a:t>
+            </a:r>
+            <a:r>
+              <a:rPr lang="en-US" sz="1200" dirty="0"/>
+              <a:t>Bergander, W. (2025, July 6). Gothenburg University. Deep Learning Cocoa Price Prediction with Weather Data. https://gupea.ub.gu.se/handle/2077/88748</a:t>
+            </a:r>
+            <a:endParaRPr lang="es-MX" sz="1200" dirty="0"/>
           </a:p>
         </p:txBody>
       </p:sp>
     </p:spTree>
     <p:extLst>
       <p:ext uri="{BB962C8B-B14F-4D97-AF65-F5344CB8AC3E}">
-        <p14:creationId xmlns:p14="http://schemas.microsoft.com/office/powerpoint/2010/main" val="3125701131"/>
+        <p14:creationId xmlns:p14="http://schemas.microsoft.com/office/powerpoint/2010/main" val="152558511"/>
       </p:ext>
     </p:extLst>
   </p:cSld>
@@ -6739,7 +7262,7 @@
 </p:sld>
 </file>
 
-<file path=ppt/slides/slide7.xml><?xml version="1.0" encoding="utf-8"?>
+<file path=ppt/slides/slide6.xml><?xml version="1.0" encoding="utf-8"?>
 <p:sld xmlns:a="http://schemas.openxmlformats.org/drawingml/2006/main" xmlns:r="http://schemas.openxmlformats.org/officeDocument/2006/relationships" xmlns:p="http://schemas.openxmlformats.org/presentationml/2006/main">
   <p:cSld>
     <p:spTree>
@@ -6747,7 +7270,7 @@
         <p:cNvPr id="1" name="">
           <a:extLst>
             <a:ext uri="{FF2B5EF4-FFF2-40B4-BE49-F238E27FC236}">
-              <a16:creationId xmlns:a16="http://schemas.microsoft.com/office/drawing/2014/main" id="{027336BB-4FCF-D5C2-BE8F-AA37FCB8B6B6}"/>
+              <a16:creationId xmlns:a16="http://schemas.microsoft.com/office/drawing/2014/main" id="{67937808-50EF-A483-5217-AEA4E395C0A1}"/>
             </a:ext>
           </a:extLst>
         </p:cNvPr>
@@ -6764,110 +7287,10 @@
       </p:grpSpPr>
       <p:sp>
         <p:nvSpPr>
-          <p:cNvPr id="3" name="Subtítulo 2">
-            <a:extLst>
-              <a:ext uri="{FF2B5EF4-FFF2-40B4-BE49-F238E27FC236}">
-                <a16:creationId xmlns:a16="http://schemas.microsoft.com/office/drawing/2014/main" id="{E0612DCE-1DEF-6D31-048A-4DA1989D8825}"/>
-              </a:ext>
-            </a:extLst>
-          </p:cNvPr>
-          <p:cNvSpPr>
-            <a:spLocks noGrp="1"/>
-          </p:cNvSpPr>
-          <p:nvPr>
-            <p:ph type="subTitle" idx="1"/>
-          </p:nvPr>
-        </p:nvSpPr>
-        <p:spPr>
-          <a:xfrm>
-            <a:off x="1040297" y="1991137"/>
-            <a:ext cx="4856920" cy="3289854"/>
-          </a:xfrm>
-        </p:spPr>
-        <p:txBody>
-          <a:bodyPr>
-            <a:noAutofit/>
-          </a:bodyPr>
-          <a:lstStyle/>
-          <a:p>
-            <a:pPr algn="just">
-              <a:spcBef>
-                <a:spcPts val="0"/>
-              </a:spcBef>
-            </a:pPr>
-            <a:r>
-              <a:rPr lang="es-MX" sz="1200" b="1" dirty="0"/>
-              <a:t>SARIMA</a:t>
-            </a:r>
-          </a:p>
-          <a:p>
-            <a:pPr algn="just">
-              <a:spcBef>
-                <a:spcPts val="0"/>
-              </a:spcBef>
-            </a:pPr>
-            <a:r>
-              <a:rPr lang="en-US" sz="1000" dirty="0"/>
-              <a:t>(Seasonal </a:t>
-            </a:r>
-            <a:r>
-              <a:rPr lang="en-US" sz="1000" dirty="0" err="1"/>
-              <a:t>AutoRegressive</a:t>
-            </a:r>
-            <a:r>
-              <a:rPr lang="en-US" sz="1000" dirty="0"/>
-              <a:t> Integrated Moving Average)</a:t>
-            </a:r>
-            <a:endParaRPr lang="es-MX" sz="1000" dirty="0"/>
-          </a:p>
-          <a:p>
-            <a:pPr algn="just"/>
-            <a:r>
-              <a:rPr lang="es-MX" sz="1200" dirty="0"/>
-              <a:t>Extensión de ARIMA que incorpora términos estacionales para capturar patrones periódicos.</a:t>
-            </a:r>
-          </a:p>
-          <a:p>
-            <a:pPr algn="just"/>
-            <a:r>
-              <a:rPr lang="es-MX" sz="1200" b="1" dirty="0"/>
-              <a:t>Inputs: </a:t>
-            </a:r>
-            <a:r>
-              <a:rPr lang="es-MX" sz="1200" dirty="0"/>
-              <a:t>serie temporal, órdenes no estacionales (p, d, q) y órdenes estacionales (P, D, Q, s).</a:t>
-            </a:r>
-          </a:p>
-          <a:p>
-            <a:pPr algn="just"/>
-            <a:r>
-              <a:rPr lang="es-MX" sz="1200" b="1" dirty="0"/>
-              <a:t>Output: </a:t>
-            </a:r>
-            <a:r>
-              <a:rPr lang="es-MX" sz="1200" dirty="0"/>
-              <a:t>predicción de valores futuros considerando tendencia y estacionalidad.</a:t>
-            </a:r>
-          </a:p>
-          <a:p>
-            <a:pPr algn="just"/>
-            <a:r>
-              <a:rPr lang="es-MX" sz="1200" b="1" dirty="0"/>
-              <a:t>Limitaciones: </a:t>
-            </a:r>
-            <a:r>
-              <a:rPr lang="es-MX" sz="1200" dirty="0"/>
-              <a:t>selección compleja de parámetros, necesidad de estacionariedad y solo maneja una estacionalidad.</a:t>
-            </a:r>
-          </a:p>
-        </p:txBody>
-      </p:sp>
-      <p:sp>
-        <p:nvSpPr>
           <p:cNvPr id="4" name="Rectángulo 3">
             <a:extLst>
               <a:ext uri="{FF2B5EF4-FFF2-40B4-BE49-F238E27FC236}">
-                <a16:creationId xmlns:a16="http://schemas.microsoft.com/office/drawing/2014/main" id="{4F133945-BCD6-14E9-AEDE-0113D1BD5EF2}"/>
+                <a16:creationId xmlns:a16="http://schemas.microsoft.com/office/drawing/2014/main" id="{E1D0FC0E-5581-C3E7-B2B6-E8454B292727}"/>
               </a:ext>
             </a:extLst>
           </p:cNvPr>
@@ -6922,7 +7345,7 @@
           <p:cNvPr id="1026" name="Picture 2" descr="Carreras y oferta Académica de Pregrado | Uniandes">
             <a:extLst>
               <a:ext uri="{FF2B5EF4-FFF2-40B4-BE49-F238E27FC236}">
-                <a16:creationId xmlns:a16="http://schemas.microsoft.com/office/drawing/2014/main" id="{C02A295A-9B10-00E4-055B-2B5D02D1A724}"/>
+                <a16:creationId xmlns:a16="http://schemas.microsoft.com/office/drawing/2014/main" id="{A7CAE9CF-818E-046F-2C98-2BA3B535E1DF}"/>
               </a:ext>
             </a:extLst>
           </p:cNvPr>
@@ -6969,7 +7392,7 @@
           <p:cNvPr id="5" name="CuadroTexto 4">
             <a:extLst>
               <a:ext uri="{FF2B5EF4-FFF2-40B4-BE49-F238E27FC236}">
-                <a16:creationId xmlns:a16="http://schemas.microsoft.com/office/drawing/2014/main" id="{F76BFD8D-AABD-D78B-50C4-D0437D323616}"/>
+                <a16:creationId xmlns:a16="http://schemas.microsoft.com/office/drawing/2014/main" id="{E7982785-255A-29C8-E8F9-B54FCF6B06A9}"/>
               </a:ext>
             </a:extLst>
           </p:cNvPr>
@@ -6994,17 +7417,17 @@
           <a:p>
             <a:r>
               <a:rPr lang="es-CO" b="1" dirty="0"/>
-              <a:t>Resultados</a:t>
+              <a:t>Contexto</a:t>
             </a:r>
           </a:p>
         </p:txBody>
       </p:sp>
       <p:pic>
         <p:nvPicPr>
-          <p:cNvPr id="7" name="Imagen 6">
-            <a:extLst>
-              <a:ext uri="{FF2B5EF4-FFF2-40B4-BE49-F238E27FC236}">
-                <a16:creationId xmlns:a16="http://schemas.microsoft.com/office/drawing/2014/main" id="{92B8253B-EFEA-9B5F-727B-2B615C7C9478}"/>
+          <p:cNvPr id="6" name="Imagen 5">
+            <a:extLst>
+              <a:ext uri="{FF2B5EF4-FFF2-40B4-BE49-F238E27FC236}">
+                <a16:creationId xmlns:a16="http://schemas.microsoft.com/office/drawing/2014/main" id="{95C1263D-76F3-679D-9574-1945259AD3B0}"/>
               </a:ext>
             </a:extLst>
           </p:cNvPr>
@@ -7014,306 +7437,142 @@
           <p:nvPr/>
         </p:nvPicPr>
         <p:blipFill>
-          <a:blip r:embed="rId3">
-            <a:extLst>
-              <a:ext uri="{28A0092B-C50C-407E-A947-70E740481C1C}">
-                <a14:useLocalDpi xmlns:a14="http://schemas.microsoft.com/office/drawing/2010/main" val="0"/>
-              </a:ext>
-            </a:extLst>
-          </a:blip>
-          <a:srcRect/>
-          <a:stretch/>
+          <a:blip r:embed="rId3"/>
+          <a:stretch>
+            <a:fillRect/>
+          </a:stretch>
         </p:blipFill>
         <p:spPr>
           <a:xfrm>
-            <a:off x="6294785" y="1712021"/>
-            <a:ext cx="5439188" cy="3433958"/>
+            <a:off x="351731" y="1640222"/>
+            <a:ext cx="5636861" cy="1880099"/>
           </a:xfrm>
           <a:prstGeom prst="rect">
             <a:avLst/>
           </a:prstGeom>
         </p:spPr>
       </p:pic>
-      <p:sp>
-        <p:nvSpPr>
-          <p:cNvPr id="8" name="Subtítulo 2">
-            <a:extLst>
-              <a:ext uri="{FF2B5EF4-FFF2-40B4-BE49-F238E27FC236}">
-                <a16:creationId xmlns:a16="http://schemas.microsoft.com/office/drawing/2014/main" id="{135E7A1F-3A09-77D9-B01C-DA13E43B2176}"/>
-              </a:ext>
-            </a:extLst>
-          </p:cNvPr>
-          <p:cNvSpPr txBox="1">
-            <a:spLocks/>
-          </p:cNvSpPr>
+      <p:pic>
+        <p:nvPicPr>
+          <p:cNvPr id="8" name="Imagen 7">
+            <a:extLst>
+              <a:ext uri="{FF2B5EF4-FFF2-40B4-BE49-F238E27FC236}">
+                <a16:creationId xmlns:a16="http://schemas.microsoft.com/office/drawing/2014/main" id="{224333C7-9340-8C8C-AFBD-2DA95A325136}"/>
+              </a:ext>
+            </a:extLst>
+          </p:cNvPr>
+          <p:cNvPicPr>
+            <a:picLocks noChangeAspect="1"/>
+          </p:cNvPicPr>
           <p:nvPr/>
-        </p:nvSpPr>
+        </p:nvPicPr>
+        <p:blipFill>
+          <a:blip r:embed="rId4"/>
+          <a:stretch>
+            <a:fillRect/>
+          </a:stretch>
+        </p:blipFill>
         <p:spPr>
           <a:xfrm>
-            <a:off x="7752522" y="5145979"/>
-            <a:ext cx="3061252" cy="1292086"/>
+            <a:off x="389752" y="3682926"/>
+            <a:ext cx="5560817" cy="1882280"/>
           </a:xfrm>
           <a:prstGeom prst="rect">
             <a:avLst/>
           </a:prstGeom>
         </p:spPr>
-        <p:txBody>
-          <a:bodyPr vert="horz" lIns="91440" tIns="45720" rIns="91440" bIns="45720" rtlCol="0">
-            <a:noAutofit/>
+      </p:pic>
+      <p:pic>
+        <p:nvPicPr>
+          <p:cNvPr id="11" name="Imagen 10">
+            <a:extLst>
+              <a:ext uri="{FF2B5EF4-FFF2-40B4-BE49-F238E27FC236}">
+                <a16:creationId xmlns:a16="http://schemas.microsoft.com/office/drawing/2014/main" id="{63D2AFE4-C934-A4ED-F14F-DF565C95B087}"/>
+              </a:ext>
+            </a:extLst>
+          </p:cNvPr>
+          <p:cNvPicPr>
+            <a:picLocks noChangeAspect="1"/>
+          </p:cNvPicPr>
+          <p:nvPr/>
+        </p:nvPicPr>
+        <p:blipFill>
+          <a:blip r:embed="rId5"/>
+          <a:stretch>
+            <a:fillRect/>
+          </a:stretch>
+        </p:blipFill>
+        <p:spPr>
+          <a:xfrm>
+            <a:off x="6089922" y="1696097"/>
+            <a:ext cx="5463451" cy="1828951"/>
+          </a:xfrm>
+          <a:prstGeom prst="rect">
+            <a:avLst/>
+          </a:prstGeom>
+        </p:spPr>
+      </p:pic>
+      <p:pic>
+        <p:nvPicPr>
+          <p:cNvPr id="13" name="Imagen 12">
+            <a:extLst>
+              <a:ext uri="{FF2B5EF4-FFF2-40B4-BE49-F238E27FC236}">
+                <a16:creationId xmlns:a16="http://schemas.microsoft.com/office/drawing/2014/main" id="{50050EAC-4239-3740-F684-7A3F1D30C0E8}"/>
+              </a:ext>
+            </a:extLst>
+          </p:cNvPr>
+          <p:cNvPicPr>
+            <a:picLocks noChangeAspect="1"/>
+          </p:cNvPicPr>
+          <p:nvPr/>
+        </p:nvPicPr>
+        <p:blipFill>
+          <a:blip r:embed="rId6"/>
+          <a:stretch>
+            <a:fillRect/>
+          </a:stretch>
+        </p:blipFill>
+        <p:spPr>
+          <a:xfrm>
+            <a:off x="6096000" y="3682926"/>
+            <a:ext cx="5451293" cy="1824883"/>
+          </a:xfrm>
+          <a:prstGeom prst="rect">
+            <a:avLst/>
+          </a:prstGeom>
+        </p:spPr>
+      </p:pic>
+      <p:sp>
+        <p:nvSpPr>
+          <p:cNvPr id="2" name="CuadroTexto 1">
+            <a:extLst>
+              <a:ext uri="{FF2B5EF4-FFF2-40B4-BE49-F238E27FC236}">
+                <a16:creationId xmlns:a16="http://schemas.microsoft.com/office/drawing/2014/main" id="{9267FDDA-4C2F-D653-585B-3BD40829D61E}"/>
+              </a:ext>
+            </a:extLst>
+          </p:cNvPr>
+          <p:cNvSpPr txBox="1"/>
+          <p:nvPr/>
+        </p:nvSpPr>
+        <p:spPr>
+          <a:xfrm>
+            <a:off x="3957403" y="1019331"/>
+            <a:ext cx="3462728" cy="369332"/>
+          </a:xfrm>
+          <a:prstGeom prst="rect">
+            <a:avLst/>
+          </a:prstGeom>
+          <a:noFill/>
+        </p:spPr>
+        <p:txBody>
+          <a:bodyPr wrap="square" rtlCol="0">
+            <a:spAutoFit/>
           </a:bodyPr>
-          <a:lstStyle>
-            <a:lvl1pPr marL="0" indent="0" algn="ctr" defTabSz="914400" rtl="0" eaLnBrk="1" latinLnBrk="0" hangingPunct="1">
-              <a:lnSpc>
-                <a:spcPct val="90000"/>
-              </a:lnSpc>
-              <a:spcBef>
-                <a:spcPts val="1000"/>
-              </a:spcBef>
-              <a:buFont typeface="Arial" panose="020B0604020202020204" pitchFamily="34" charset="0"/>
-              <a:buNone/>
-              <a:defRPr sz="2400" kern="1200">
-                <a:solidFill>
-                  <a:schemeClr val="tx1"/>
-                </a:solidFill>
-                <a:latin typeface="+mn-lt"/>
-                <a:ea typeface="+mn-ea"/>
-                <a:cs typeface="+mn-cs"/>
-              </a:defRPr>
-            </a:lvl1pPr>
-            <a:lvl2pPr marL="457200" indent="0" algn="ctr" defTabSz="914400" rtl="0" eaLnBrk="1" latinLnBrk="0" hangingPunct="1">
-              <a:lnSpc>
-                <a:spcPct val="90000"/>
-              </a:lnSpc>
-              <a:spcBef>
-                <a:spcPts val="500"/>
-              </a:spcBef>
-              <a:buFont typeface="Arial" panose="020B0604020202020204" pitchFamily="34" charset="0"/>
-              <a:buNone/>
-              <a:defRPr sz="2000" kern="1200">
-                <a:solidFill>
-                  <a:schemeClr val="tx1"/>
-                </a:solidFill>
-                <a:latin typeface="+mn-lt"/>
-                <a:ea typeface="+mn-ea"/>
-                <a:cs typeface="+mn-cs"/>
-              </a:defRPr>
-            </a:lvl2pPr>
-            <a:lvl3pPr marL="914400" indent="0" algn="ctr" defTabSz="914400" rtl="0" eaLnBrk="1" latinLnBrk="0" hangingPunct="1">
-              <a:lnSpc>
-                <a:spcPct val="90000"/>
-              </a:lnSpc>
-              <a:spcBef>
-                <a:spcPts val="500"/>
-              </a:spcBef>
-              <a:buFont typeface="Arial" panose="020B0604020202020204" pitchFamily="34" charset="0"/>
-              <a:buNone/>
-              <a:defRPr sz="1800" kern="1200">
-                <a:solidFill>
-                  <a:schemeClr val="tx1"/>
-                </a:solidFill>
-                <a:latin typeface="+mn-lt"/>
-                <a:ea typeface="+mn-ea"/>
-                <a:cs typeface="+mn-cs"/>
-              </a:defRPr>
-            </a:lvl3pPr>
-            <a:lvl4pPr marL="1371600" indent="0" algn="ctr" defTabSz="914400" rtl="0" eaLnBrk="1" latinLnBrk="0" hangingPunct="1">
-              <a:lnSpc>
-                <a:spcPct val="90000"/>
-              </a:lnSpc>
-              <a:spcBef>
-                <a:spcPts val="500"/>
-              </a:spcBef>
-              <a:buFont typeface="Arial" panose="020B0604020202020204" pitchFamily="34" charset="0"/>
-              <a:buNone/>
-              <a:defRPr sz="1600" kern="1200">
-                <a:solidFill>
-                  <a:schemeClr val="tx1"/>
-                </a:solidFill>
-                <a:latin typeface="+mn-lt"/>
-                <a:ea typeface="+mn-ea"/>
-                <a:cs typeface="+mn-cs"/>
-              </a:defRPr>
-            </a:lvl4pPr>
-            <a:lvl5pPr marL="1828800" indent="0" algn="ctr" defTabSz="914400" rtl="0" eaLnBrk="1" latinLnBrk="0" hangingPunct="1">
-              <a:lnSpc>
-                <a:spcPct val="90000"/>
-              </a:lnSpc>
-              <a:spcBef>
-                <a:spcPts val="500"/>
-              </a:spcBef>
-              <a:buFont typeface="Arial" panose="020B0604020202020204" pitchFamily="34" charset="0"/>
-              <a:buNone/>
-              <a:defRPr sz="1600" kern="1200">
-                <a:solidFill>
-                  <a:schemeClr val="tx1"/>
-                </a:solidFill>
-                <a:latin typeface="+mn-lt"/>
-                <a:ea typeface="+mn-ea"/>
-                <a:cs typeface="+mn-cs"/>
-              </a:defRPr>
-            </a:lvl5pPr>
-            <a:lvl6pPr marL="2286000" indent="0" algn="ctr" defTabSz="914400" rtl="0" eaLnBrk="1" latinLnBrk="0" hangingPunct="1">
-              <a:lnSpc>
-                <a:spcPct val="90000"/>
-              </a:lnSpc>
-              <a:spcBef>
-                <a:spcPts val="500"/>
-              </a:spcBef>
-              <a:buFont typeface="Arial" panose="020B0604020202020204" pitchFamily="34" charset="0"/>
-              <a:buNone/>
-              <a:defRPr sz="1600" kern="1200">
-                <a:solidFill>
-                  <a:schemeClr val="tx1"/>
-                </a:solidFill>
-                <a:latin typeface="+mn-lt"/>
-                <a:ea typeface="+mn-ea"/>
-                <a:cs typeface="+mn-cs"/>
-              </a:defRPr>
-            </a:lvl6pPr>
-            <a:lvl7pPr marL="2743200" indent="0" algn="ctr" defTabSz="914400" rtl="0" eaLnBrk="1" latinLnBrk="0" hangingPunct="1">
-              <a:lnSpc>
-                <a:spcPct val="90000"/>
-              </a:lnSpc>
-              <a:spcBef>
-                <a:spcPts val="500"/>
-              </a:spcBef>
-              <a:buFont typeface="Arial" panose="020B0604020202020204" pitchFamily="34" charset="0"/>
-              <a:buNone/>
-              <a:defRPr sz="1600" kern="1200">
-                <a:solidFill>
-                  <a:schemeClr val="tx1"/>
-                </a:solidFill>
-                <a:latin typeface="+mn-lt"/>
-                <a:ea typeface="+mn-ea"/>
-                <a:cs typeface="+mn-cs"/>
-              </a:defRPr>
-            </a:lvl7pPr>
-            <a:lvl8pPr marL="3200400" indent="0" algn="ctr" defTabSz="914400" rtl="0" eaLnBrk="1" latinLnBrk="0" hangingPunct="1">
-              <a:lnSpc>
-                <a:spcPct val="90000"/>
-              </a:lnSpc>
-              <a:spcBef>
-                <a:spcPts val="500"/>
-              </a:spcBef>
-              <a:buFont typeface="Arial" panose="020B0604020202020204" pitchFamily="34" charset="0"/>
-              <a:buNone/>
-              <a:defRPr sz="1600" kern="1200">
-                <a:solidFill>
-                  <a:schemeClr val="tx1"/>
-                </a:solidFill>
-                <a:latin typeface="+mn-lt"/>
-                <a:ea typeface="+mn-ea"/>
-                <a:cs typeface="+mn-cs"/>
-              </a:defRPr>
-            </a:lvl8pPr>
-            <a:lvl9pPr marL="3657600" indent="0" algn="ctr" defTabSz="914400" rtl="0" eaLnBrk="1" latinLnBrk="0" hangingPunct="1">
-              <a:lnSpc>
-                <a:spcPct val="90000"/>
-              </a:lnSpc>
-              <a:spcBef>
-                <a:spcPts val="500"/>
-              </a:spcBef>
-              <a:buFont typeface="Arial" panose="020B0604020202020204" pitchFamily="34" charset="0"/>
-              <a:buNone/>
-              <a:defRPr sz="1600" kern="1200">
-                <a:solidFill>
-                  <a:schemeClr val="tx1"/>
-                </a:solidFill>
-                <a:latin typeface="+mn-lt"/>
-                <a:ea typeface="+mn-ea"/>
-                <a:cs typeface="+mn-cs"/>
-              </a:defRPr>
-            </a:lvl9pPr>
-          </a:lstStyle>
-          <a:p>
-            <a:pPr>
-              <a:lnSpc>
-                <a:spcPts val="1440"/>
-              </a:lnSpc>
-              <a:spcBef>
-                <a:spcPts val="600"/>
-              </a:spcBef>
-            </a:pPr>
-            <a:r>
-              <a:rPr lang="es-MX" sz="1000" b="1" dirty="0"/>
-              <a:t>Orden no estacional: </a:t>
-            </a:r>
-            <a:r>
-              <a:rPr lang="es-MX" sz="1000" dirty="0"/>
-              <a:t>(2, 1, 2)</a:t>
-            </a:r>
-          </a:p>
-          <a:p>
-            <a:pPr>
-              <a:lnSpc>
-                <a:spcPts val="1440"/>
-              </a:lnSpc>
-              <a:spcBef>
-                <a:spcPts val="600"/>
-              </a:spcBef>
-            </a:pPr>
-            <a:r>
-              <a:rPr lang="es-MX" sz="1000" b="1" dirty="0"/>
-              <a:t>Orden estacional: </a:t>
-            </a:r>
-            <a:r>
-              <a:rPr lang="es-MX" sz="1000" dirty="0"/>
-              <a:t>(0, 0, 1, 52)</a:t>
-            </a:r>
-            <a:endParaRPr lang="es-MX" sz="1000" b="1" dirty="0"/>
-          </a:p>
-          <a:p>
-            <a:pPr>
-              <a:lnSpc>
-                <a:spcPts val="1440"/>
-              </a:lnSpc>
-              <a:spcBef>
-                <a:spcPts val="600"/>
-              </a:spcBef>
-            </a:pPr>
-            <a:r>
-              <a:rPr lang="es-MX" sz="1000" b="1" dirty="0"/>
-              <a:t>AIC:</a:t>
-            </a:r>
-            <a:r>
-              <a:rPr lang="es-MX" sz="1000" dirty="0"/>
-              <a:t> 143.95</a:t>
-            </a:r>
-          </a:p>
-          <a:p>
-            <a:pPr>
-              <a:lnSpc>
-                <a:spcPts val="1440"/>
-              </a:lnSpc>
-              <a:spcBef>
-                <a:spcPts val="600"/>
-              </a:spcBef>
-            </a:pPr>
-            <a:r>
-              <a:rPr lang="es-MX" sz="1000" b="1" dirty="0"/>
-              <a:t>MAE: </a:t>
-            </a:r>
-            <a:r>
-              <a:rPr lang="es-MX" sz="1000" dirty="0"/>
-              <a:t>1784.54</a:t>
-            </a:r>
-          </a:p>
-          <a:p>
-            <a:pPr>
-              <a:lnSpc>
-                <a:spcPts val="1440"/>
-              </a:lnSpc>
-              <a:spcBef>
-                <a:spcPts val="600"/>
-              </a:spcBef>
-            </a:pPr>
-            <a:r>
-              <a:rPr lang="es-MX" sz="1000" b="1" dirty="0"/>
-              <a:t>RMSE: </a:t>
-            </a:r>
-            <a:r>
-              <a:rPr lang="es-MX" sz="1000" dirty="0"/>
-              <a:t>2189.54</a:t>
+          <a:lstStyle/>
+          <a:p>
+            <a:r>
+              <a:rPr lang="es-CO" dirty="0"/>
+              <a:t>Ajustar tamaño de letras</a:t>
             </a:r>
           </a:p>
         </p:txBody>
@@ -7321,7 +7580,7 @@
     </p:spTree>
     <p:extLst>
       <p:ext uri="{BB962C8B-B14F-4D97-AF65-F5344CB8AC3E}">
-        <p14:creationId xmlns:p14="http://schemas.microsoft.com/office/powerpoint/2010/main" val="1808529488"/>
+        <p14:creationId xmlns:p14="http://schemas.microsoft.com/office/powerpoint/2010/main" val="2294619585"/>
       </p:ext>
     </p:extLst>
   </p:cSld>
@@ -7331,7 +7590,7 @@
 </p:sld>
 </file>
 
-<file path=ppt/slides/slide8.xml><?xml version="1.0" encoding="utf-8"?>
+<file path=ppt/slides/slide7.xml><?xml version="1.0" encoding="utf-8"?>
 <p:sld xmlns:a="http://schemas.openxmlformats.org/drawingml/2006/main" xmlns:r="http://schemas.openxmlformats.org/officeDocument/2006/relationships" xmlns:p="http://schemas.openxmlformats.org/presentationml/2006/main">
   <p:cSld>
     <p:spTree>
@@ -7339,7 +7598,7 @@
         <p:cNvPr id="1" name="">
           <a:extLst>
             <a:ext uri="{FF2B5EF4-FFF2-40B4-BE49-F238E27FC236}">
-              <a16:creationId xmlns:a16="http://schemas.microsoft.com/office/drawing/2014/main" id="{07AC5BAB-B01E-1969-A6C1-A5D5842C13F4}"/>
+              <a16:creationId xmlns:a16="http://schemas.microsoft.com/office/drawing/2014/main" id="{C8ED23B7-202E-2FEC-9E85-7303AF3BCEA1}"/>
             </a:ext>
           </a:extLst>
         </p:cNvPr>
@@ -7359,7 +7618,7 @@
           <p:cNvPr id="3" name="Subtítulo 2">
             <a:extLst>
               <a:ext uri="{FF2B5EF4-FFF2-40B4-BE49-F238E27FC236}">
-                <a16:creationId xmlns:a16="http://schemas.microsoft.com/office/drawing/2014/main" id="{19EBB4F4-5822-F8CA-39F5-0439B9882C53}"/>
+                <a16:creationId xmlns:a16="http://schemas.microsoft.com/office/drawing/2014/main" id="{6B3DF7AE-265B-2314-CABD-7E650040C2CE}"/>
               </a:ext>
             </a:extLst>
           </p:cNvPr>
@@ -7372,8 +7631,8 @@
         </p:nvSpPr>
         <p:spPr>
           <a:xfrm>
-            <a:off x="1046921" y="1991137"/>
-            <a:ext cx="4850295" cy="3289854"/>
+            <a:off x="934278" y="1631671"/>
+            <a:ext cx="6367670" cy="1437863"/>
           </a:xfrm>
         </p:spPr>
         <p:txBody>
@@ -7382,82 +7641,68 @@
           </a:bodyPr>
           <a:lstStyle/>
           <a:p>
-            <a:pPr algn="just">
-              <a:spcBef>
-                <a:spcPts val="0"/>
-              </a:spcBef>
+            <a:pPr algn="just"/>
+            <a:r>
+              <a:rPr lang="es-MX" sz="1400" b="1" dirty="0"/>
+              <a:t>¿Qué se ha hecho?</a:t>
+            </a:r>
+          </a:p>
+          <a:p>
+            <a:pPr marL="228600" indent="-228600" algn="just">
+              <a:buFont typeface="+mj-lt"/>
+              <a:buAutoNum type="arabicPeriod"/>
             </a:pPr>
             <a:r>
-              <a:rPr lang="es-MX" sz="1200" b="1" dirty="0"/>
-              <a:t>SARIMAX </a:t>
-            </a:r>
-          </a:p>
-          <a:p>
-            <a:pPr algn="just">
-              <a:spcBef>
-                <a:spcPts val="0"/>
-              </a:spcBef>
+              <a:rPr lang="es-MX" sz="1400" dirty="0"/>
+              <a:t>Revisión de literatura</a:t>
+            </a:r>
+          </a:p>
+          <a:p>
+            <a:pPr marL="228600" indent="-228600" algn="just">
+              <a:buFont typeface="+mj-lt"/>
+              <a:buAutoNum type="arabicPeriod"/>
             </a:pPr>
             <a:r>
-              <a:rPr lang="en-US" sz="1000" dirty="0"/>
-              <a:t>(Seasonal </a:t>
-            </a:r>
-            <a:r>
-              <a:rPr lang="en-US" sz="1000" dirty="0" err="1"/>
-              <a:t>AutoRegressive</a:t>
-            </a:r>
-            <a:r>
-              <a:rPr lang="en-US" sz="1000" dirty="0"/>
-              <a:t> Integrated Moving Average with </a:t>
-            </a:r>
-            <a:r>
-              <a:rPr lang="en-US" sz="1000" dirty="0" err="1"/>
-              <a:t>eXogenous</a:t>
-            </a:r>
-            <a:r>
-              <a:rPr lang="en-US" sz="1000" dirty="0"/>
-              <a:t> regressors)</a:t>
-            </a:r>
-            <a:endParaRPr lang="es-MX" sz="1000" dirty="0"/>
-          </a:p>
-          <a:p>
-            <a:pPr algn="just"/>
-            <a:r>
-              <a:rPr lang="es-MX" sz="1200" dirty="0"/>
-              <a:t>Extensión de ARIMA que incorpora estacionalidad y variables exógenas.</a:t>
-            </a:r>
-          </a:p>
-          <a:p>
-            <a:pPr algn="just"/>
-            <a:r>
-              <a:rPr lang="es-MX" sz="1200" b="1" dirty="0"/>
-              <a:t>Inputs: </a:t>
-            </a:r>
-            <a:r>
-              <a:rPr lang="es-MX" sz="1200" dirty="0"/>
-              <a:t>serie temporal, parámetros (p, d, q), parámetros estacionales (P, D, Q, m) y variables externas.</a:t>
-            </a:r>
-          </a:p>
-          <a:p>
-            <a:pPr algn="just"/>
-            <a:r>
-              <a:rPr lang="es-MX" sz="1200" b="1" dirty="0"/>
-              <a:t>Output: </a:t>
-            </a:r>
-            <a:r>
-              <a:rPr lang="es-MX" sz="1200" dirty="0"/>
-              <a:t>pronósticos considerando tendencia, estacionalidad y factores externos.</a:t>
-            </a:r>
-          </a:p>
-          <a:p>
-            <a:pPr algn="just"/>
-            <a:r>
-              <a:rPr lang="es-MX" sz="1200" b="1" dirty="0"/>
-              <a:t>Limitaciones: </a:t>
-            </a:r>
-            <a:r>
-              <a:rPr lang="es-MX" sz="1200" dirty="0"/>
-              <a:t>requiere conocer o predecir variables exógenas futuras; sensible a errores en parámetros y supuestos de estacionariedad.</a:t>
+              <a:rPr lang="es-MX" sz="1400" dirty="0"/>
+              <a:t>Entender el contexto</a:t>
+            </a:r>
+          </a:p>
+          <a:p>
+            <a:pPr marL="228600" indent="-228600" algn="just">
+              <a:buFont typeface="+mj-lt"/>
+              <a:buAutoNum type="arabicPeriod"/>
+            </a:pPr>
+            <a:r>
+              <a:rPr lang="es-MX" sz="1400" dirty="0"/>
+              <a:t>Identificar variables a usar</a:t>
+            </a:r>
+          </a:p>
+          <a:p>
+            <a:pPr marL="228600" indent="-228600" algn="just">
+              <a:buFont typeface="+mj-lt"/>
+              <a:buAutoNum type="arabicPeriod"/>
+            </a:pPr>
+            <a:r>
+              <a:rPr lang="es-MX" sz="1400" dirty="0"/>
+              <a:t>Aplicar modelos </a:t>
+            </a:r>
+            <a:r>
+              <a:rPr lang="es-MX" sz="1400" dirty="0" err="1"/>
+              <a:t>univariados</a:t>
+            </a:r>
+            <a:r>
+              <a:rPr lang="es-MX" sz="1400" dirty="0"/>
+              <a:t>: SARIMA</a:t>
+            </a:r>
+          </a:p>
+          <a:p>
+            <a:pPr marL="228600" indent="-228600" algn="just">
+              <a:buFont typeface="+mj-lt"/>
+              <a:buAutoNum type="arabicPeriod"/>
+            </a:pPr>
+            <a:r>
+              <a:rPr lang="es-MX" sz="1400" dirty="0"/>
+              <a:t>Aplicar modelos multivariados: SARIMAX y VAR</a:t>
             </a:r>
           </a:p>
         </p:txBody>
@@ -7467,7 +7712,7 @@
           <p:cNvPr id="4" name="Rectángulo 3">
             <a:extLst>
               <a:ext uri="{FF2B5EF4-FFF2-40B4-BE49-F238E27FC236}">
-                <a16:creationId xmlns:a16="http://schemas.microsoft.com/office/drawing/2014/main" id="{42107846-B800-3E06-0086-1877F6137CA3}"/>
+                <a16:creationId xmlns:a16="http://schemas.microsoft.com/office/drawing/2014/main" id="{78F6C11A-F841-BC13-455B-29DB63B0C8CD}"/>
               </a:ext>
             </a:extLst>
           </p:cNvPr>
@@ -7522,7 +7767,7 @@
           <p:cNvPr id="1026" name="Picture 2" descr="Carreras y oferta Académica de Pregrado | Uniandes">
             <a:extLst>
               <a:ext uri="{FF2B5EF4-FFF2-40B4-BE49-F238E27FC236}">
-                <a16:creationId xmlns:a16="http://schemas.microsoft.com/office/drawing/2014/main" id="{CA11B9A8-8A4F-D5B9-E681-FCFFC5D30E6D}"/>
+                <a16:creationId xmlns:a16="http://schemas.microsoft.com/office/drawing/2014/main" id="{AE8BF2D9-B6E7-A219-DEED-E25DE97FDD0D}"/>
               </a:ext>
             </a:extLst>
           </p:cNvPr>
@@ -7569,7 +7814,7 @@
           <p:cNvPr id="5" name="CuadroTexto 4">
             <a:extLst>
               <a:ext uri="{FF2B5EF4-FFF2-40B4-BE49-F238E27FC236}">
-                <a16:creationId xmlns:a16="http://schemas.microsoft.com/office/drawing/2014/main" id="{1CB48B27-906D-6CF1-082F-1C750E0D3D6C}"/>
+                <a16:creationId xmlns:a16="http://schemas.microsoft.com/office/drawing/2014/main" id="{166906E4-603F-7D08-698E-FCC235F56BE9}"/>
               </a:ext>
             </a:extLst>
           </p:cNvPr>
@@ -7594,52 +7839,17 @@
           <a:p>
             <a:r>
               <a:rPr lang="es-CO" b="1" dirty="0"/>
-              <a:t>Resultados</a:t>
-            </a:r>
-          </a:p>
-        </p:txBody>
-      </p:sp>
-      <p:pic>
-        <p:nvPicPr>
-          <p:cNvPr id="7" name="Imagen 6">
-            <a:extLst>
-              <a:ext uri="{FF2B5EF4-FFF2-40B4-BE49-F238E27FC236}">
-                <a16:creationId xmlns:a16="http://schemas.microsoft.com/office/drawing/2014/main" id="{58A2FEFB-2262-1E84-25C1-E48B1423F11F}"/>
-              </a:ext>
-            </a:extLst>
-          </p:cNvPr>
-          <p:cNvPicPr>
-            <a:picLocks noChangeAspect="1"/>
-          </p:cNvPicPr>
-          <p:nvPr/>
-        </p:nvPicPr>
-        <p:blipFill>
-          <a:blip r:embed="rId3">
-            <a:extLst>
-              <a:ext uri="{28A0092B-C50C-407E-A947-70E740481C1C}">
-                <a14:useLocalDpi xmlns:a14="http://schemas.microsoft.com/office/drawing/2010/main" val="0"/>
-              </a:ext>
-            </a:extLst>
-          </a:blip>
-          <a:srcRect/>
-          <a:stretch/>
-        </p:blipFill>
-        <p:spPr>
-          <a:xfrm>
-            <a:off x="6294786" y="1817503"/>
-            <a:ext cx="5439187" cy="3222995"/>
-          </a:xfrm>
-          <a:prstGeom prst="rect">
-            <a:avLst/>
-          </a:prstGeom>
-        </p:spPr>
-      </p:pic>
-      <p:sp>
-        <p:nvSpPr>
-          <p:cNvPr id="8" name="Subtítulo 2">
-            <a:extLst>
-              <a:ext uri="{FF2B5EF4-FFF2-40B4-BE49-F238E27FC236}">
-                <a16:creationId xmlns:a16="http://schemas.microsoft.com/office/drawing/2014/main" id="{FB1E0EED-EE72-350A-A469-4DEBB29853E7}"/>
+              <a:t>Metodología</a:t>
+            </a:r>
+          </a:p>
+        </p:txBody>
+      </p:sp>
+      <p:sp>
+        <p:nvSpPr>
+          <p:cNvPr id="2" name="Subtítulo 2">
+            <a:extLst>
+              <a:ext uri="{FF2B5EF4-FFF2-40B4-BE49-F238E27FC236}">
+                <a16:creationId xmlns:a16="http://schemas.microsoft.com/office/drawing/2014/main" id="{B6A5D0FF-1723-D124-523D-E88FA436823A}"/>
               </a:ext>
             </a:extLst>
           </p:cNvPr>
@@ -7650,8 +7860,8 @@
         </p:nvSpPr>
         <p:spPr>
           <a:xfrm>
-            <a:off x="7752522" y="5145979"/>
-            <a:ext cx="3061252" cy="1292086"/>
+            <a:off x="934278" y="3892823"/>
+            <a:ext cx="6367670" cy="1437863"/>
           </a:xfrm>
           <a:prstGeom prst="rect">
             <a:avLst/>
@@ -7826,102 +8036,236 @@
             </a:lvl9pPr>
           </a:lstStyle>
           <a:p>
-            <a:pPr>
-              <a:lnSpc>
-                <a:spcPts val="1440"/>
-              </a:lnSpc>
-              <a:spcBef>
-                <a:spcPts val="600"/>
-              </a:spcBef>
-            </a:pPr>
-            <a:r>
-              <a:rPr lang="es-MX" sz="1000" b="1" dirty="0"/>
-              <a:t>Orden no estacional: </a:t>
-            </a:r>
-            <a:r>
-              <a:rPr lang="es-MX" sz="1000" dirty="0"/>
-              <a:t>(1, 1, 2)</a:t>
-            </a:r>
-          </a:p>
-          <a:p>
-            <a:pPr>
-              <a:lnSpc>
-                <a:spcPts val="1440"/>
-              </a:lnSpc>
-              <a:spcBef>
-                <a:spcPts val="600"/>
-              </a:spcBef>
-            </a:pPr>
-            <a:r>
-              <a:rPr lang="es-MX" sz="1000" b="1" dirty="0"/>
-              <a:t>Orden estacional: </a:t>
-            </a:r>
-            <a:r>
-              <a:rPr lang="es-MX" sz="1000" dirty="0"/>
-              <a:t>(0, 1, 1, 4)</a:t>
-            </a:r>
-            <a:endParaRPr lang="es-MX" sz="1000" b="1" dirty="0"/>
-          </a:p>
-          <a:p>
-            <a:pPr>
-              <a:lnSpc>
-                <a:spcPts val="1440"/>
-              </a:lnSpc>
-              <a:spcBef>
-                <a:spcPts val="600"/>
-              </a:spcBef>
-            </a:pPr>
-            <a:r>
-              <a:rPr lang="es-MX" sz="1000" b="1" dirty="0"/>
-              <a:t>AIC:</a:t>
-            </a:r>
-            <a:r>
-              <a:rPr lang="es-MX" sz="1000" dirty="0"/>
-              <a:t> 956.28</a:t>
-            </a:r>
-          </a:p>
-          <a:p>
-            <a:pPr>
-              <a:lnSpc>
-                <a:spcPts val="1440"/>
-              </a:lnSpc>
-              <a:spcBef>
-                <a:spcPts val="600"/>
-              </a:spcBef>
-            </a:pPr>
-            <a:r>
-              <a:rPr lang="es-MX" sz="1000" b="1" dirty="0"/>
-              <a:t>MAE: </a:t>
-            </a:r>
-            <a:r>
-              <a:rPr lang="es-MX" sz="1000" dirty="0"/>
-              <a:t>1268.97</a:t>
-            </a:r>
-          </a:p>
-          <a:p>
-            <a:pPr>
-              <a:lnSpc>
-                <a:spcPts val="1440"/>
-              </a:lnSpc>
-              <a:spcBef>
-                <a:spcPts val="600"/>
-              </a:spcBef>
-            </a:pPr>
-            <a:r>
-              <a:rPr lang="es-MX" sz="1000" b="1" dirty="0"/>
-              <a:t>RMSE: </a:t>
-            </a:r>
-            <a:r>
-              <a:rPr lang="es-MX" sz="1000" dirty="0"/>
-              <a:t>1564.17</a:t>
-            </a:r>
+            <a:pPr algn="just"/>
+            <a:r>
+              <a:rPr lang="es-MX" sz="1400" b="1" dirty="0">
+                <a:solidFill>
+                  <a:schemeClr val="bg1">
+                    <a:lumMod val="65000"/>
+                  </a:schemeClr>
+                </a:solidFill>
+              </a:rPr>
+              <a:t>¿Qué queda por hacer?</a:t>
+            </a:r>
+          </a:p>
+          <a:p>
+            <a:pPr algn="just"/>
+            <a:r>
+              <a:rPr lang="es-MX" sz="1400" dirty="0">
+                <a:solidFill>
+                  <a:schemeClr val="bg1">
+                    <a:lumMod val="65000"/>
+                  </a:schemeClr>
+                </a:solidFill>
+              </a:rPr>
+              <a:t>5. Aplicar modelos de machine </a:t>
+            </a:r>
+            <a:r>
+              <a:rPr lang="es-MX" sz="1400" dirty="0" err="1">
+                <a:solidFill>
+                  <a:schemeClr val="bg1">
+                    <a:lumMod val="65000"/>
+                  </a:schemeClr>
+                </a:solidFill>
+              </a:rPr>
+              <a:t>learning</a:t>
+            </a:r>
+            <a:r>
+              <a:rPr lang="es-MX" sz="1400" dirty="0">
+                <a:solidFill>
+                  <a:schemeClr val="bg1">
+                    <a:lumMod val="65000"/>
+                  </a:schemeClr>
+                </a:solidFill>
+              </a:rPr>
+              <a:t>: </a:t>
+            </a:r>
+            <a:r>
+              <a:rPr lang="es-MX" sz="1400" dirty="0" err="1">
+                <a:solidFill>
+                  <a:schemeClr val="bg1">
+                    <a:lumMod val="65000"/>
+                  </a:schemeClr>
+                </a:solidFill>
+              </a:rPr>
+              <a:t>XGBoost</a:t>
+            </a:r>
+            <a:r>
+              <a:rPr lang="es-MX" sz="1400" dirty="0">
+                <a:solidFill>
+                  <a:schemeClr val="bg1">
+                    <a:lumMod val="65000"/>
+                  </a:schemeClr>
+                </a:solidFill>
+              </a:rPr>
+              <a:t>, redes neuronales (LSTM)</a:t>
+            </a:r>
+          </a:p>
+          <a:p>
+            <a:pPr algn="just"/>
+            <a:r>
+              <a:rPr lang="es-MX" sz="1400" dirty="0">
+                <a:solidFill>
+                  <a:schemeClr val="bg1">
+                    <a:lumMod val="65000"/>
+                  </a:schemeClr>
+                </a:solidFill>
+              </a:rPr>
+              <a:t>6. Comparar modelos y seleccionar mejor</a:t>
+            </a:r>
+          </a:p>
+          <a:p>
+            <a:pPr algn="just"/>
+            <a:r>
+              <a:rPr lang="es-MX" sz="1400" dirty="0">
+                <a:solidFill>
+                  <a:schemeClr val="bg1">
+                    <a:lumMod val="65000"/>
+                  </a:schemeClr>
+                </a:solidFill>
+              </a:rPr>
+              <a:t>7. Resultados</a:t>
+            </a:r>
+          </a:p>
+        </p:txBody>
+      </p:sp>
+      <p:sp>
+        <p:nvSpPr>
+          <p:cNvPr id="6" name="Flecha: a la derecha 5">
+            <a:extLst>
+              <a:ext uri="{FF2B5EF4-FFF2-40B4-BE49-F238E27FC236}">
+                <a16:creationId xmlns:a16="http://schemas.microsoft.com/office/drawing/2014/main" id="{F810DA46-AAEA-B176-3EDF-C1CC8E259C54}"/>
+              </a:ext>
+            </a:extLst>
+          </p:cNvPr>
+          <p:cNvSpPr/>
+          <p:nvPr/>
+        </p:nvSpPr>
+        <p:spPr>
+          <a:xfrm>
+            <a:off x="6550702" y="2023672"/>
+            <a:ext cx="3252865" cy="1573967"/>
+          </a:xfrm>
+          <a:prstGeom prst="rightArrow">
+            <a:avLst/>
+          </a:prstGeom>
+        </p:spPr>
+        <p:style>
+          <a:lnRef idx="2">
+            <a:schemeClr val="accent1">
+              <a:shade val="15000"/>
+            </a:schemeClr>
+          </a:lnRef>
+          <a:fillRef idx="1">
+            <a:schemeClr val="accent1"/>
+          </a:fillRef>
+          <a:effectRef idx="0">
+            <a:schemeClr val="accent1"/>
+          </a:effectRef>
+          <a:fontRef idx="minor">
+            <a:schemeClr val="lt1"/>
+          </a:fontRef>
+        </p:style>
+        <p:txBody>
+          <a:bodyPr rtlCol="0" anchor="ctr"/>
+          <a:lstStyle/>
+          <a:p>
+            <a:pPr algn="ctr"/>
+            <a:endParaRPr lang="es-CO"/>
           </a:p>
         </p:txBody>
       </p:sp>
     </p:spTree>
     <p:extLst>
       <p:ext uri="{BB962C8B-B14F-4D97-AF65-F5344CB8AC3E}">
-        <p14:creationId xmlns:p14="http://schemas.microsoft.com/office/powerpoint/2010/main" val="2248330113"/>
+        <p14:creationId xmlns:p14="http://schemas.microsoft.com/office/powerpoint/2010/main" val="3125701131"/>
+      </p:ext>
+    </p:extLst>
+  </p:cSld>
+  <p:clrMapOvr>
+    <a:masterClrMapping/>
+  </p:clrMapOvr>
+</p:sld>
+</file>
+
+<file path=ppt/slides/slide8.xml><?xml version="1.0" encoding="utf-8"?>
+<p:sld xmlns:a="http://schemas.openxmlformats.org/drawingml/2006/main" xmlns:r="http://schemas.openxmlformats.org/officeDocument/2006/relationships" xmlns:p="http://schemas.openxmlformats.org/presentationml/2006/main">
+  <p:cSld>
+    <p:spTree>
+      <p:nvGrpSpPr>
+        <p:cNvPr id="1" name=""/>
+        <p:cNvGrpSpPr/>
+        <p:nvPr/>
+      </p:nvGrpSpPr>
+      <p:grpSpPr>
+        <a:xfrm>
+          <a:off x="0" y="0"/>
+          <a:ext cx="0" cy="0"/>
+          <a:chOff x="0" y="0"/>
+          <a:chExt cx="0" cy="0"/>
+        </a:xfrm>
+      </p:grpSpPr>
+      <p:sp>
+        <p:nvSpPr>
+          <p:cNvPr id="2" name="Título 1">
+            <a:extLst>
+              <a:ext uri="{FF2B5EF4-FFF2-40B4-BE49-F238E27FC236}">
+                <a16:creationId xmlns:a16="http://schemas.microsoft.com/office/drawing/2014/main" id="{F66A06A1-429D-5897-8071-255E7A23A151}"/>
+              </a:ext>
+            </a:extLst>
+          </p:cNvPr>
+          <p:cNvSpPr>
+            <a:spLocks noGrp="1"/>
+          </p:cNvSpPr>
+          <p:nvPr>
+            <p:ph type="title"/>
+          </p:nvPr>
+        </p:nvSpPr>
+        <p:spPr/>
+        <p:txBody>
+          <a:bodyPr/>
+          <a:lstStyle/>
+          <a:p>
+            <a:r>
+              <a:rPr lang="es-CO" dirty="0" err="1"/>
+              <a:t>Presentacion</a:t>
+            </a:r>
+            <a:r>
+              <a:rPr lang="es-CO" dirty="0"/>
+              <a:t> de los modelos</a:t>
+            </a:r>
+          </a:p>
+        </p:txBody>
+      </p:sp>
+      <p:sp>
+        <p:nvSpPr>
+          <p:cNvPr id="3" name="Marcador de contenido 2">
+            <a:extLst>
+              <a:ext uri="{FF2B5EF4-FFF2-40B4-BE49-F238E27FC236}">
+                <a16:creationId xmlns:a16="http://schemas.microsoft.com/office/drawing/2014/main" id="{EA9D602E-B23F-BD8F-9456-36C9AACF83FE}"/>
+              </a:ext>
+            </a:extLst>
+          </p:cNvPr>
+          <p:cNvSpPr>
+            <a:spLocks noGrp="1"/>
+          </p:cNvSpPr>
+          <p:nvPr>
+            <p:ph idx="1"/>
+          </p:nvPr>
+        </p:nvSpPr>
+        <p:spPr/>
+        <p:txBody>
+          <a:bodyPr/>
+          <a:lstStyle/>
+          <a:p>
+            <a:endParaRPr lang="es-CO"/>
+          </a:p>
+        </p:txBody>
+      </p:sp>
+    </p:spTree>
+    <p:extLst>
+      <p:ext uri="{BB962C8B-B14F-4D97-AF65-F5344CB8AC3E}">
+        <p14:creationId xmlns:p14="http://schemas.microsoft.com/office/powerpoint/2010/main" val="435417858"/>
       </p:ext>
     </p:extLst>
   </p:cSld>
@@ -7939,7 +8283,7 @@
         <p:cNvPr id="1" name="">
           <a:extLst>
             <a:ext uri="{FF2B5EF4-FFF2-40B4-BE49-F238E27FC236}">
-              <a16:creationId xmlns:a16="http://schemas.microsoft.com/office/drawing/2014/main" id="{6664A386-92BA-88B4-5721-A07FCA69627A}"/>
+              <a16:creationId xmlns:a16="http://schemas.microsoft.com/office/drawing/2014/main" id="{027336BB-4FCF-D5C2-BE8F-AA37FCB8B6B6}"/>
             </a:ext>
           </a:extLst>
         </p:cNvPr>
@@ -7959,7 +8303,7 @@
           <p:cNvPr id="3" name="Subtítulo 2">
             <a:extLst>
               <a:ext uri="{FF2B5EF4-FFF2-40B4-BE49-F238E27FC236}">
-                <a16:creationId xmlns:a16="http://schemas.microsoft.com/office/drawing/2014/main" id="{324BC577-5816-B7D0-08A1-26DDDEEA840A}"/>
+                <a16:creationId xmlns:a16="http://schemas.microsoft.com/office/drawing/2014/main" id="{E0612DCE-1DEF-6D31-048A-4DA1989D8825}"/>
               </a:ext>
             </a:extLst>
           </p:cNvPr>
@@ -7972,8 +8316,8 @@
         </p:nvSpPr>
         <p:spPr>
           <a:xfrm>
-            <a:off x="1086679" y="1991137"/>
-            <a:ext cx="4810538" cy="3289854"/>
+            <a:off x="1040297" y="1991137"/>
+            <a:ext cx="4856920" cy="3289854"/>
           </a:xfrm>
         </p:spPr>
         <p:txBody>
@@ -7989,7 +8333,7 @@
             </a:pPr>
             <a:r>
               <a:rPr lang="es-MX" sz="1200" b="1" dirty="0"/>
-              <a:t>VAR</a:t>
+              <a:t>SARIMA</a:t>
             </a:r>
           </a:p>
           <a:p>
@@ -7999,23 +8343,24 @@
               </a:spcBef>
             </a:pPr>
             <a:r>
-              <a:rPr lang="es-MX" sz="1000" dirty="0"/>
-              <a:t>(Vector </a:t>
-            </a:r>
-            <a:r>
-              <a:rPr lang="es-MX" sz="1000" dirty="0" err="1"/>
-              <a:t>AutoRegresivo</a:t>
-            </a:r>
-            <a:r>
-              <a:rPr lang="es-MX" sz="1000" dirty="0"/>
-              <a:t>)</a:t>
-            </a:r>
+              <a:rPr lang="en-US" sz="1000" dirty="0"/>
+              <a:t>(Seasonal </a:t>
+            </a:r>
+            <a:r>
+              <a:rPr lang="en-US" sz="1000" dirty="0" err="1"/>
+              <a:t>AutoRegressive</a:t>
+            </a:r>
+            <a:r>
+              <a:rPr lang="en-US" sz="1000" dirty="0"/>
+              <a:t> Integrated Moving Average)</a:t>
+            </a:r>
+            <a:endParaRPr lang="es-MX" sz="1000" dirty="0"/>
           </a:p>
           <a:p>
             <a:pPr algn="just"/>
             <a:r>
               <a:rPr lang="es-MX" sz="1200" dirty="0"/>
-              <a:t>Modelo multivariante que explica la dinámica conjunta de varias variables endógenas con sus rezagos.</a:t>
+              <a:t>Extensión de ARIMA que incorpora términos estacionales para capturar patrones periódicos.</a:t>
             </a:r>
           </a:p>
           <a:p>
@@ -8026,7 +8371,7 @@
             </a:r>
             <a:r>
               <a:rPr lang="es-MX" sz="1200" dirty="0"/>
-              <a:t>valores pasados de todas las variables, y opcionalmente variables exógenas o deterministas.</a:t>
+              <a:t>serie temporal, órdenes no estacionales (p, d, q) y órdenes estacionales (P, D, Q, s).</a:t>
             </a:r>
           </a:p>
           <a:p>
@@ -8037,14 +8382,18 @@
             </a:r>
             <a:r>
               <a:rPr lang="es-MX" sz="1200" dirty="0"/>
-              <a:t>predicciones de cada variable en función de sus propios rezagos y los de las demás.</a:t>
+              <a:t>predicción de valores futuros considerando tendencia y estacionalidad.</a:t>
             </a:r>
           </a:p>
           <a:p>
             <a:pPr algn="just"/>
             <a:r>
+              <a:rPr lang="es-MX" sz="1200" b="1" dirty="0"/>
+              <a:t>Limitaciones: </a:t>
+            </a:r>
+            <a:r>
               <a:rPr lang="es-MX" sz="1200" dirty="0"/>
-              <a:t>Limitaciones: sensible a multicolinealidad, riesgo de sobreajuste, necesidad de estacionariedad y dificultad para interpretación causal estricta.</a:t>
+              <a:t>selección compleja de parámetros, necesidad de estacionariedad y solo maneja una estacionalidad.</a:t>
             </a:r>
           </a:p>
         </p:txBody>
@@ -8054,7 +8403,7 @@
           <p:cNvPr id="4" name="Rectángulo 3">
             <a:extLst>
               <a:ext uri="{FF2B5EF4-FFF2-40B4-BE49-F238E27FC236}">
-                <a16:creationId xmlns:a16="http://schemas.microsoft.com/office/drawing/2014/main" id="{DC867BF5-B881-8867-3A01-F89DABF01B47}"/>
+                <a16:creationId xmlns:a16="http://schemas.microsoft.com/office/drawing/2014/main" id="{4F133945-BCD6-14E9-AEDE-0113D1BD5EF2}"/>
               </a:ext>
             </a:extLst>
           </p:cNvPr>
@@ -8109,7 +8458,7 @@
           <p:cNvPr id="1026" name="Picture 2" descr="Carreras y oferta Académica de Pregrado | Uniandes">
             <a:extLst>
               <a:ext uri="{FF2B5EF4-FFF2-40B4-BE49-F238E27FC236}">
-                <a16:creationId xmlns:a16="http://schemas.microsoft.com/office/drawing/2014/main" id="{537D5F15-0D21-8A12-3403-2C1AA9C08FFF}"/>
+                <a16:creationId xmlns:a16="http://schemas.microsoft.com/office/drawing/2014/main" id="{C02A295A-9B10-00E4-055B-2B5D02D1A724}"/>
               </a:ext>
             </a:extLst>
           </p:cNvPr>
@@ -8156,7 +8505,7 @@
           <p:cNvPr id="5" name="CuadroTexto 4">
             <a:extLst>
               <a:ext uri="{FF2B5EF4-FFF2-40B4-BE49-F238E27FC236}">
-                <a16:creationId xmlns:a16="http://schemas.microsoft.com/office/drawing/2014/main" id="{719387E4-6C77-DFBC-C767-95828F218FEE}"/>
+                <a16:creationId xmlns:a16="http://schemas.microsoft.com/office/drawing/2014/main" id="{F76BFD8D-AABD-D78B-50C4-D0437D323616}"/>
               </a:ext>
             </a:extLst>
           </p:cNvPr>
@@ -8191,7 +8540,7 @@
           <p:cNvPr id="7" name="Imagen 6">
             <a:extLst>
               <a:ext uri="{FF2B5EF4-FFF2-40B4-BE49-F238E27FC236}">
-                <a16:creationId xmlns:a16="http://schemas.microsoft.com/office/drawing/2014/main" id="{7748CE84-D147-EE00-E3E9-691BDBDA7E7D}"/>
+                <a16:creationId xmlns:a16="http://schemas.microsoft.com/office/drawing/2014/main" id="{92B8253B-EFEA-9B5F-727B-2B615C7C9478}"/>
               </a:ext>
             </a:extLst>
           </p:cNvPr>
@@ -8213,8 +8562,8 @@
         </p:blipFill>
         <p:spPr>
           <a:xfrm>
-            <a:off x="6294785" y="1994604"/>
-            <a:ext cx="5439189" cy="2868792"/>
+            <a:off x="6294785" y="1712021"/>
+            <a:ext cx="5439188" cy="3433958"/>
           </a:xfrm>
           <a:prstGeom prst="rect">
             <a:avLst/>
@@ -8226,7 +8575,7 @@
           <p:cNvPr id="8" name="Subtítulo 2">
             <a:extLst>
               <a:ext uri="{FF2B5EF4-FFF2-40B4-BE49-F238E27FC236}">
-                <a16:creationId xmlns:a16="http://schemas.microsoft.com/office/drawing/2014/main" id="{5FF441EC-4775-2B8F-BF60-07F396D659DF}"/>
+                <a16:creationId xmlns:a16="http://schemas.microsoft.com/office/drawing/2014/main" id="{135E7A1F-3A09-77D9-B01C-DA13E43B2176}"/>
               </a:ext>
             </a:extLst>
           </p:cNvPr>
@@ -8237,8 +8586,8 @@
         </p:nvSpPr>
         <p:spPr>
           <a:xfrm>
-            <a:off x="7759148" y="4960449"/>
-            <a:ext cx="3061252" cy="903639"/>
+            <a:off x="7752522" y="5145979"/>
+            <a:ext cx="3061252" cy="1292086"/>
           </a:xfrm>
           <a:prstGeom prst="rect">
             <a:avLst/>
@@ -8423,11 +8772,11 @@
             </a:pPr>
             <a:r>
               <a:rPr lang="es-MX" sz="1000" b="1" dirty="0"/>
-              <a:t>AIC:</a:t>
+              <a:t>Orden no estacional: </a:t>
             </a:r>
             <a:r>
               <a:rPr lang="es-MX" sz="1000" dirty="0"/>
-              <a:t> 60,79</a:t>
+              <a:t>(2, 1, 2)</a:t>
             </a:r>
           </a:p>
           <a:p>
@@ -8441,12 +8790,13 @@
             </a:pPr>
             <a:r>
               <a:rPr lang="es-MX" sz="1000" b="1" dirty="0"/>
-              <a:t>MAE: </a:t>
+              <a:t>Orden estacional: </a:t>
             </a:r>
             <a:r>
               <a:rPr lang="es-MX" sz="1000" dirty="0"/>
-              <a:t>5628.66</a:t>
-            </a:r>
+              <a:t>(0, 0, 1, 52)</a:t>
+            </a:r>
+            <a:endParaRPr lang="es-MX" sz="1000" b="1" dirty="0"/>
           </a:p>
           <a:p>
             <a:pPr>
@@ -8459,54 +8809,55 @@
             </a:pPr>
             <a:r>
               <a:rPr lang="es-MX" sz="1000" b="1" dirty="0"/>
+              <a:t>AIC:</a:t>
+            </a:r>
+            <a:r>
+              <a:rPr lang="es-MX" sz="1000" dirty="0"/>
+              <a:t> 143.95</a:t>
+            </a:r>
+          </a:p>
+          <a:p>
+            <a:pPr>
+              <a:lnSpc>
+                <a:spcPts val="1440"/>
+              </a:lnSpc>
+              <a:spcBef>
+                <a:spcPts val="600"/>
+              </a:spcBef>
+            </a:pPr>
+            <a:r>
+              <a:rPr lang="es-MX" sz="1000" b="1" dirty="0"/>
+              <a:t>MAE: </a:t>
+            </a:r>
+            <a:r>
+              <a:rPr lang="es-MX" sz="1000" dirty="0"/>
+              <a:t>1784.54</a:t>
+            </a:r>
+          </a:p>
+          <a:p>
+            <a:pPr>
+              <a:lnSpc>
+                <a:spcPts val="1440"/>
+              </a:lnSpc>
+              <a:spcBef>
+                <a:spcPts val="600"/>
+              </a:spcBef>
+            </a:pPr>
+            <a:r>
+              <a:rPr lang="es-MX" sz="1000" b="1" dirty="0"/>
               <a:t>RMSE: </a:t>
             </a:r>
             <a:r>
               <a:rPr lang="es-MX" sz="1000" dirty="0"/>
-              <a:t>6083.50</a:t>
-            </a:r>
-          </a:p>
-        </p:txBody>
-      </p:sp>
-      <p:pic>
-        <p:nvPicPr>
-          <p:cNvPr id="6" name="Imagen 5">
-            <a:extLst>
-              <a:ext uri="{FF2B5EF4-FFF2-40B4-BE49-F238E27FC236}">
-                <a16:creationId xmlns:a16="http://schemas.microsoft.com/office/drawing/2014/main" id="{435911E5-7130-3392-ED40-D74B22ADC32A}"/>
-              </a:ext>
-            </a:extLst>
-          </p:cNvPr>
-          <p:cNvPicPr>
-            <a:picLocks noChangeAspect="1"/>
-          </p:cNvPicPr>
-          <p:nvPr/>
-        </p:nvPicPr>
-        <p:blipFill>
-          <a:blip r:embed="rId4">
-            <a:extLst>
-              <a:ext uri="{28A0092B-C50C-407E-A947-70E740481C1C}">
-                <a14:useLocalDpi xmlns:a14="http://schemas.microsoft.com/office/drawing/2010/main" val="0"/>
-              </a:ext>
-            </a:extLst>
-          </a:blip>
-          <a:srcRect/>
-          <a:stretch/>
-        </p:blipFill>
-        <p:spPr>
-          <a:xfrm>
-            <a:off x="1086679" y="4657588"/>
-            <a:ext cx="5009321" cy="1216280"/>
-          </a:xfrm>
-          <a:prstGeom prst="rect">
-            <a:avLst/>
-          </a:prstGeom>
-        </p:spPr>
-      </p:pic>
+              <a:t>2189.54</a:t>
+            </a:r>
+          </a:p>
+        </p:txBody>
+      </p:sp>
     </p:spTree>
     <p:extLst>
       <p:ext uri="{BB962C8B-B14F-4D97-AF65-F5344CB8AC3E}">
-        <p14:creationId xmlns:p14="http://schemas.microsoft.com/office/powerpoint/2010/main" val="856540980"/>
+        <p14:creationId xmlns:p14="http://schemas.microsoft.com/office/powerpoint/2010/main" val="1808529488"/>
       </p:ext>
     </p:extLst>
   </p:cSld>

</xml_diff>